<commit_message>
add objectives to deck
Signed-off-by: Jack (T.) Jia <jack-tiefeng.jia@ibm.com>
</commit_message>
<xml_diff>
--- a/Project Management/PI Planning/20PI4 Planning/Zowe Community Squad Focus for 20PI4.pptx
+++ b/Project Management/PI Planning/20PI4 Planning/Zowe Community Squad Focus for 20PI4.pptx
@@ -8,7 +8,7 @@
     <p:sldMasterId id="2147483687" r:id="rId4"/>
   </p:sldMasterIdLst>
   <p:notesMasterIdLst>
-    <p:notesMasterId r:id="rId13"/>
+    <p:notesMasterId r:id="rId16"/>
   </p:notesMasterIdLst>
   <p:sldIdLst>
     <p:sldId id="256" r:id="rId5"/>
@@ -17,8 +17,11 @@
     <p:sldId id="259" r:id="rId8"/>
     <p:sldId id="260" r:id="rId9"/>
     <p:sldId id="261" r:id="rId10"/>
-    <p:sldId id="264" r:id="rId11"/>
-    <p:sldId id="265" r:id="rId12"/>
+    <p:sldId id="267" r:id="rId11"/>
+    <p:sldId id="268" r:id="rId12"/>
+    <p:sldId id="269" r:id="rId13"/>
+    <p:sldId id="264" r:id="rId14"/>
+    <p:sldId id="265" r:id="rId15"/>
   </p:sldIdLst>
   <p:sldSz cx="9144000" cy="5143500" type="screen16x9"/>
   <p:notesSz cx="6858000" cy="9144000"/>
@@ -476,6 +479,100 @@
       </p:grpSpPr>
       <p:sp>
         <p:nvSpPr>
+          <p:cNvPr id="2" name="Slide Image Placeholder 1"/>
+          <p:cNvSpPr>
+            <a:spLocks noGrp="1" noRot="1" noChangeAspect="1"/>
+          </p:cNvSpPr>
+          <p:nvPr>
+            <p:ph type="sldImg"/>
+          </p:nvPr>
+        </p:nvSpPr>
+        <p:spPr>
+          <a:xfrm>
+            <a:off x="533400" y="763588"/>
+            <a:ext cx="6704013" cy="3771900"/>
+          </a:xfrm>
+        </p:spPr>
+      </p:sp>
+      <p:sp>
+        <p:nvSpPr>
+          <p:cNvPr id="3" name="Notes Placeholder 2"/>
+          <p:cNvSpPr>
+            <a:spLocks noGrp="1"/>
+          </p:cNvSpPr>
+          <p:nvPr>
+            <p:ph type="body" idx="1"/>
+          </p:nvPr>
+        </p:nvSpPr>
+        <p:spPr/>
+        <p:txBody>
+          <a:bodyPr/>
+          <a:lstStyle/>
+          <a:p>
+            <a:endParaRPr lang="en-US" dirty="0"/>
+          </a:p>
+        </p:txBody>
+      </p:sp>
+      <p:sp>
+        <p:nvSpPr>
+          <p:cNvPr id="4" name="Slide Number Placeholder 3"/>
+          <p:cNvSpPr>
+            <a:spLocks noGrp="1"/>
+          </p:cNvSpPr>
+          <p:nvPr>
+            <p:ph type="sldNum"/>
+          </p:nvPr>
+        </p:nvSpPr>
+        <p:spPr/>
+        <p:txBody>
+          <a:bodyPr/>
+          <a:lstStyle/>
+          <a:p>
+            <a:pPr algn="r"/>
+            <a:fld id="{BA3CDCDB-E9EF-4257-93B9-33682187AA79}" type="slidenum">
+              <a:rPr lang="en-US" sz="1400" b="0" strike="noStrike" spc="-1" smtClean="0">
+                <a:latin typeface="Times New Roman"/>
+              </a:rPr>
+              <a:t>5</a:t>
+            </a:fld>
+            <a:endParaRPr lang="en-US" sz="1400" b="0" strike="noStrike" spc="-1">
+              <a:latin typeface="Times New Roman"/>
+            </a:endParaRPr>
+          </a:p>
+        </p:txBody>
+      </p:sp>
+    </p:spTree>
+    <p:extLst>
+      <p:ext uri="{BB962C8B-B14F-4D97-AF65-F5344CB8AC3E}">
+        <p14:creationId xmlns:p14="http://schemas.microsoft.com/office/powerpoint/2010/main" val="3725876168"/>
+      </p:ext>
+    </p:extLst>
+  </p:cSld>
+  <p:clrMapOvr>
+    <a:masterClrMapping/>
+  </p:clrMapOvr>
+</p:notes>
+</file>
+
+<file path=ppt/notesSlides/notesSlide2.xml><?xml version="1.0" encoding="utf-8"?>
+<p:notes xmlns:a="http://schemas.openxmlformats.org/drawingml/2006/main" xmlns:r="http://schemas.openxmlformats.org/officeDocument/2006/relationships" xmlns:p="http://schemas.openxmlformats.org/presentationml/2006/main">
+  <p:cSld>
+    <p:spTree>
+      <p:nvGrpSpPr>
+        <p:cNvPr id="1" name=""/>
+        <p:cNvGrpSpPr/>
+        <p:nvPr/>
+      </p:nvGrpSpPr>
+      <p:grpSpPr>
+        <a:xfrm>
+          <a:off x="0" y="0"/>
+          <a:ext cx="0" cy="0"/>
+          <a:chOff x="0" y="0"/>
+          <a:chExt cx="0" cy="0"/>
+        </a:xfrm>
+      </p:grpSpPr>
+      <p:sp>
+        <p:nvSpPr>
           <p:cNvPr id="243" name="PlaceHolder 1"/>
           <p:cNvSpPr>
             <a:spLocks noGrp="1" noRot="1" noChangeAspect="1"/>
@@ -611,6 +708,504 @@
         </p:txBody>
       </p:sp>
     </p:spTree>
+  </p:cSld>
+  <p:clrMapOvr>
+    <a:masterClrMapping/>
+  </p:clrMapOvr>
+</p:notes>
+</file>
+
+<file path=ppt/notesSlides/notesSlide3.xml><?xml version="1.0" encoding="utf-8"?>
+<p:notes xmlns:a="http://schemas.openxmlformats.org/drawingml/2006/main" xmlns:r="http://schemas.openxmlformats.org/officeDocument/2006/relationships" xmlns:p="http://schemas.openxmlformats.org/presentationml/2006/main">
+  <p:cSld>
+    <p:spTree>
+      <p:nvGrpSpPr>
+        <p:cNvPr id="1" name=""/>
+        <p:cNvGrpSpPr/>
+        <p:nvPr/>
+      </p:nvGrpSpPr>
+      <p:grpSpPr>
+        <a:xfrm>
+          <a:off x="0" y="0"/>
+          <a:ext cx="0" cy="0"/>
+          <a:chOff x="0" y="0"/>
+          <a:chExt cx="0" cy="0"/>
+        </a:xfrm>
+      </p:grpSpPr>
+      <p:sp>
+        <p:nvSpPr>
+          <p:cNvPr id="243" name="PlaceHolder 1"/>
+          <p:cNvSpPr>
+            <a:spLocks noGrp="1" noRot="1" noChangeAspect="1"/>
+          </p:cNvSpPr>
+          <p:nvPr>
+            <p:ph type="sldImg"/>
+          </p:nvPr>
+        </p:nvSpPr>
+        <p:spPr>
+          <a:xfrm>
+            <a:off x="381000" y="685800"/>
+            <a:ext cx="6096000" cy="3429000"/>
+          </a:xfrm>
+          <a:prstGeom prst="rect">
+            <a:avLst/>
+          </a:prstGeom>
+        </p:spPr>
+      </p:sp>
+      <p:sp>
+        <p:nvSpPr>
+          <p:cNvPr id="244" name="PlaceHolder 2"/>
+          <p:cNvSpPr>
+            <a:spLocks noGrp="1"/>
+          </p:cNvSpPr>
+          <p:nvPr>
+            <p:ph type="body"/>
+          </p:nvPr>
+        </p:nvSpPr>
+        <p:spPr>
+          <a:xfrm>
+            <a:off x="685800" y="4343400"/>
+            <a:ext cx="5486040" cy="4114440"/>
+          </a:xfrm>
+          <a:prstGeom prst="rect">
+            <a:avLst/>
+          </a:prstGeom>
+        </p:spPr>
+        <p:txBody>
+          <a:bodyPr tIns="91440" bIns="91440">
+            <a:noAutofit/>
+          </a:bodyPr>
+          <a:lstStyle/>
+          <a:p>
+            <a:pPr marL="158760">
+              <a:lnSpc>
+                <a:spcPct val="100000"/>
+              </a:lnSpc>
+            </a:pPr>
+            <a:r>
+              <a:rPr lang="en-US" sz="1100" b="0" strike="noStrike" spc="-1">
+                <a:solidFill>
+                  <a:srgbClr val="000000"/>
+                </a:solidFill>
+                <a:latin typeface="Arial"/>
+                <a:ea typeface="Arial"/>
+              </a:rPr>
+              <a:t>Notes: </a:t>
+            </a:r>
+            <a:endParaRPr lang="en-US" sz="1100" b="0" strike="noStrike" spc="-1">
+              <a:latin typeface="Arial"/>
+            </a:endParaRPr>
+          </a:p>
+          <a:p>
+            <a:pPr marL="158760">
+              <a:lnSpc>
+                <a:spcPct val="100000"/>
+              </a:lnSpc>
+            </a:pPr>
+            <a:r>
+              <a:rPr lang="en-US" sz="1100" b="0" strike="noStrike" spc="-1">
+                <a:solidFill>
+                  <a:srgbClr val="000000"/>
+                </a:solidFill>
+                <a:latin typeface="Arial"/>
+                <a:ea typeface="Arial"/>
+              </a:rPr>
+              <a:t>x.509 is one of the  industry standard ways of authenticating to backend services</a:t>
+            </a:r>
+            <a:endParaRPr lang="en-US" sz="1100" b="0" strike="noStrike" spc="-1">
+              <a:latin typeface="Arial"/>
+            </a:endParaRPr>
+          </a:p>
+          <a:p>
+            <a:pPr marL="158760">
+              <a:lnSpc>
+                <a:spcPct val="100000"/>
+              </a:lnSpc>
+            </a:pPr>
+            <a:r>
+              <a:rPr lang="en-US" sz="1100" b="0" strike="noStrike" spc="-1">
+                <a:solidFill>
+                  <a:srgbClr val="000000"/>
+                </a:solidFill>
+                <a:latin typeface="Arial"/>
+                <a:ea typeface="Arial"/>
+              </a:rPr>
+              <a:t>Zowe Client apps will need to be updated to support client certs</a:t>
+            </a:r>
+            <a:endParaRPr lang="en-US" sz="1100" b="0" strike="noStrike" spc="-1">
+              <a:latin typeface="Arial"/>
+            </a:endParaRPr>
+          </a:p>
+          <a:p>
+            <a:pPr marL="158760">
+              <a:lnSpc>
+                <a:spcPct val="100000"/>
+              </a:lnSpc>
+            </a:pPr>
+            <a:r>
+              <a:rPr lang="en-US" sz="1100" b="0" strike="noStrike" spc="-1">
+                <a:solidFill>
+                  <a:srgbClr val="000000"/>
+                </a:solidFill>
+                <a:latin typeface="Arial"/>
+                <a:ea typeface="Arial"/>
+              </a:rPr>
+              <a:t>Customer apps may have their own way of supporting client certs</a:t>
+            </a:r>
+            <a:endParaRPr lang="en-US" sz="1100" b="0" strike="noStrike" spc="-1">
+              <a:latin typeface="Arial"/>
+            </a:endParaRPr>
+          </a:p>
+          <a:p>
+            <a:pPr marL="158760">
+              <a:lnSpc>
+                <a:spcPct val="100000"/>
+              </a:lnSpc>
+            </a:pPr>
+            <a:endParaRPr lang="en-US" sz="1100" b="0" strike="noStrike" spc="-1">
+              <a:latin typeface="Arial"/>
+            </a:endParaRPr>
+          </a:p>
+        </p:txBody>
+      </p:sp>
+    </p:spTree>
+    <p:extLst>
+      <p:ext uri="{BB962C8B-B14F-4D97-AF65-F5344CB8AC3E}">
+        <p14:creationId xmlns:p14="http://schemas.microsoft.com/office/powerpoint/2010/main" val="3714303811"/>
+      </p:ext>
+    </p:extLst>
+  </p:cSld>
+  <p:clrMapOvr>
+    <a:masterClrMapping/>
+  </p:clrMapOvr>
+</p:notes>
+</file>
+
+<file path=ppt/notesSlides/notesSlide4.xml><?xml version="1.0" encoding="utf-8"?>
+<p:notes xmlns:a="http://schemas.openxmlformats.org/drawingml/2006/main" xmlns:r="http://schemas.openxmlformats.org/officeDocument/2006/relationships" xmlns:p="http://schemas.openxmlformats.org/presentationml/2006/main">
+  <p:cSld>
+    <p:spTree>
+      <p:nvGrpSpPr>
+        <p:cNvPr id="1" name=""/>
+        <p:cNvGrpSpPr/>
+        <p:nvPr/>
+      </p:nvGrpSpPr>
+      <p:grpSpPr>
+        <a:xfrm>
+          <a:off x="0" y="0"/>
+          <a:ext cx="0" cy="0"/>
+          <a:chOff x="0" y="0"/>
+          <a:chExt cx="0" cy="0"/>
+        </a:xfrm>
+      </p:grpSpPr>
+      <p:sp>
+        <p:nvSpPr>
+          <p:cNvPr id="243" name="PlaceHolder 1"/>
+          <p:cNvSpPr>
+            <a:spLocks noGrp="1" noRot="1" noChangeAspect="1"/>
+          </p:cNvSpPr>
+          <p:nvPr>
+            <p:ph type="sldImg"/>
+          </p:nvPr>
+        </p:nvSpPr>
+        <p:spPr>
+          <a:xfrm>
+            <a:off x="381000" y="685800"/>
+            <a:ext cx="6096000" cy="3429000"/>
+          </a:xfrm>
+          <a:prstGeom prst="rect">
+            <a:avLst/>
+          </a:prstGeom>
+        </p:spPr>
+      </p:sp>
+      <p:sp>
+        <p:nvSpPr>
+          <p:cNvPr id="244" name="PlaceHolder 2"/>
+          <p:cNvSpPr>
+            <a:spLocks noGrp="1"/>
+          </p:cNvSpPr>
+          <p:nvPr>
+            <p:ph type="body"/>
+          </p:nvPr>
+        </p:nvSpPr>
+        <p:spPr>
+          <a:xfrm>
+            <a:off x="685800" y="4343400"/>
+            <a:ext cx="5486040" cy="4114440"/>
+          </a:xfrm>
+          <a:prstGeom prst="rect">
+            <a:avLst/>
+          </a:prstGeom>
+        </p:spPr>
+        <p:txBody>
+          <a:bodyPr tIns="91440" bIns="91440">
+            <a:noAutofit/>
+          </a:bodyPr>
+          <a:lstStyle/>
+          <a:p>
+            <a:pPr marL="158760">
+              <a:lnSpc>
+                <a:spcPct val="100000"/>
+              </a:lnSpc>
+            </a:pPr>
+            <a:r>
+              <a:rPr lang="en-US" sz="1100" b="0" strike="noStrike" spc="-1">
+                <a:solidFill>
+                  <a:srgbClr val="000000"/>
+                </a:solidFill>
+                <a:latin typeface="Arial"/>
+                <a:ea typeface="Arial"/>
+              </a:rPr>
+              <a:t>Notes: </a:t>
+            </a:r>
+            <a:endParaRPr lang="en-US" sz="1100" b="0" strike="noStrike" spc="-1">
+              <a:latin typeface="Arial"/>
+            </a:endParaRPr>
+          </a:p>
+          <a:p>
+            <a:pPr marL="158760">
+              <a:lnSpc>
+                <a:spcPct val="100000"/>
+              </a:lnSpc>
+            </a:pPr>
+            <a:r>
+              <a:rPr lang="en-US" sz="1100" b="0" strike="noStrike" spc="-1">
+                <a:solidFill>
+                  <a:srgbClr val="000000"/>
+                </a:solidFill>
+                <a:latin typeface="Arial"/>
+                <a:ea typeface="Arial"/>
+              </a:rPr>
+              <a:t>x.509 is one of the  industry standard ways of authenticating to backend services</a:t>
+            </a:r>
+            <a:endParaRPr lang="en-US" sz="1100" b="0" strike="noStrike" spc="-1">
+              <a:latin typeface="Arial"/>
+            </a:endParaRPr>
+          </a:p>
+          <a:p>
+            <a:pPr marL="158760">
+              <a:lnSpc>
+                <a:spcPct val="100000"/>
+              </a:lnSpc>
+            </a:pPr>
+            <a:r>
+              <a:rPr lang="en-US" sz="1100" b="0" strike="noStrike" spc="-1">
+                <a:solidFill>
+                  <a:srgbClr val="000000"/>
+                </a:solidFill>
+                <a:latin typeface="Arial"/>
+                <a:ea typeface="Arial"/>
+              </a:rPr>
+              <a:t>Zowe Client apps will need to be updated to support client certs</a:t>
+            </a:r>
+            <a:endParaRPr lang="en-US" sz="1100" b="0" strike="noStrike" spc="-1">
+              <a:latin typeface="Arial"/>
+            </a:endParaRPr>
+          </a:p>
+          <a:p>
+            <a:pPr marL="158760">
+              <a:lnSpc>
+                <a:spcPct val="100000"/>
+              </a:lnSpc>
+            </a:pPr>
+            <a:r>
+              <a:rPr lang="en-US" sz="1100" b="0" strike="noStrike" spc="-1">
+                <a:solidFill>
+                  <a:srgbClr val="000000"/>
+                </a:solidFill>
+                <a:latin typeface="Arial"/>
+                <a:ea typeface="Arial"/>
+              </a:rPr>
+              <a:t>Customer apps may have their own way of supporting client certs</a:t>
+            </a:r>
+            <a:endParaRPr lang="en-US" sz="1100" b="0" strike="noStrike" spc="-1">
+              <a:latin typeface="Arial"/>
+            </a:endParaRPr>
+          </a:p>
+          <a:p>
+            <a:pPr marL="158760">
+              <a:lnSpc>
+                <a:spcPct val="100000"/>
+              </a:lnSpc>
+            </a:pPr>
+            <a:endParaRPr lang="en-US" sz="1100" b="0" strike="noStrike" spc="-1">
+              <a:latin typeface="Arial"/>
+            </a:endParaRPr>
+          </a:p>
+        </p:txBody>
+      </p:sp>
+    </p:spTree>
+    <p:extLst>
+      <p:ext uri="{BB962C8B-B14F-4D97-AF65-F5344CB8AC3E}">
+        <p14:creationId xmlns:p14="http://schemas.microsoft.com/office/powerpoint/2010/main" val="2284638772"/>
+      </p:ext>
+    </p:extLst>
+  </p:cSld>
+  <p:clrMapOvr>
+    <a:masterClrMapping/>
+  </p:clrMapOvr>
+</p:notes>
+</file>
+
+<file path=ppt/notesSlides/notesSlide5.xml><?xml version="1.0" encoding="utf-8"?>
+<p:notes xmlns:a="http://schemas.openxmlformats.org/drawingml/2006/main" xmlns:r="http://schemas.openxmlformats.org/officeDocument/2006/relationships" xmlns:p="http://schemas.openxmlformats.org/presentationml/2006/main">
+  <p:cSld>
+    <p:spTree>
+      <p:nvGrpSpPr>
+        <p:cNvPr id="1" name=""/>
+        <p:cNvGrpSpPr/>
+        <p:nvPr/>
+      </p:nvGrpSpPr>
+      <p:grpSpPr>
+        <a:xfrm>
+          <a:off x="0" y="0"/>
+          <a:ext cx="0" cy="0"/>
+          <a:chOff x="0" y="0"/>
+          <a:chExt cx="0" cy="0"/>
+        </a:xfrm>
+      </p:grpSpPr>
+      <p:sp>
+        <p:nvSpPr>
+          <p:cNvPr id="243" name="PlaceHolder 1"/>
+          <p:cNvSpPr>
+            <a:spLocks noGrp="1" noRot="1" noChangeAspect="1"/>
+          </p:cNvSpPr>
+          <p:nvPr>
+            <p:ph type="sldImg"/>
+          </p:nvPr>
+        </p:nvSpPr>
+        <p:spPr>
+          <a:xfrm>
+            <a:off x="381000" y="685800"/>
+            <a:ext cx="6096000" cy="3429000"/>
+          </a:xfrm>
+          <a:prstGeom prst="rect">
+            <a:avLst/>
+          </a:prstGeom>
+        </p:spPr>
+      </p:sp>
+      <p:sp>
+        <p:nvSpPr>
+          <p:cNvPr id="244" name="PlaceHolder 2"/>
+          <p:cNvSpPr>
+            <a:spLocks noGrp="1"/>
+          </p:cNvSpPr>
+          <p:nvPr>
+            <p:ph type="body"/>
+          </p:nvPr>
+        </p:nvSpPr>
+        <p:spPr>
+          <a:xfrm>
+            <a:off x="685800" y="4343400"/>
+            <a:ext cx="5486040" cy="4114440"/>
+          </a:xfrm>
+          <a:prstGeom prst="rect">
+            <a:avLst/>
+          </a:prstGeom>
+        </p:spPr>
+        <p:txBody>
+          <a:bodyPr tIns="91440" bIns="91440">
+            <a:noAutofit/>
+          </a:bodyPr>
+          <a:lstStyle/>
+          <a:p>
+            <a:pPr marL="158760">
+              <a:lnSpc>
+                <a:spcPct val="100000"/>
+              </a:lnSpc>
+            </a:pPr>
+            <a:r>
+              <a:rPr lang="en-US" sz="1100" b="0" strike="noStrike" spc="-1">
+                <a:solidFill>
+                  <a:srgbClr val="000000"/>
+                </a:solidFill>
+                <a:latin typeface="Arial"/>
+                <a:ea typeface="Arial"/>
+              </a:rPr>
+              <a:t>Notes: </a:t>
+            </a:r>
+            <a:endParaRPr lang="en-US" sz="1100" b="0" strike="noStrike" spc="-1">
+              <a:latin typeface="Arial"/>
+            </a:endParaRPr>
+          </a:p>
+          <a:p>
+            <a:pPr marL="158760">
+              <a:lnSpc>
+                <a:spcPct val="100000"/>
+              </a:lnSpc>
+            </a:pPr>
+            <a:r>
+              <a:rPr lang="en-US" sz="1100" b="0" strike="noStrike" spc="-1">
+                <a:solidFill>
+                  <a:srgbClr val="000000"/>
+                </a:solidFill>
+                <a:latin typeface="Arial"/>
+                <a:ea typeface="Arial"/>
+              </a:rPr>
+              <a:t>x.509 is one of the  industry standard ways of authenticating to backend services</a:t>
+            </a:r>
+            <a:endParaRPr lang="en-US" sz="1100" b="0" strike="noStrike" spc="-1">
+              <a:latin typeface="Arial"/>
+            </a:endParaRPr>
+          </a:p>
+          <a:p>
+            <a:pPr marL="158760">
+              <a:lnSpc>
+                <a:spcPct val="100000"/>
+              </a:lnSpc>
+            </a:pPr>
+            <a:r>
+              <a:rPr lang="en-US" sz="1100" b="0" strike="noStrike" spc="-1">
+                <a:solidFill>
+                  <a:srgbClr val="000000"/>
+                </a:solidFill>
+                <a:latin typeface="Arial"/>
+                <a:ea typeface="Arial"/>
+              </a:rPr>
+              <a:t>Zowe Client apps will need to be updated to support client certs</a:t>
+            </a:r>
+            <a:endParaRPr lang="en-US" sz="1100" b="0" strike="noStrike" spc="-1">
+              <a:latin typeface="Arial"/>
+            </a:endParaRPr>
+          </a:p>
+          <a:p>
+            <a:pPr marL="158760">
+              <a:lnSpc>
+                <a:spcPct val="100000"/>
+              </a:lnSpc>
+            </a:pPr>
+            <a:r>
+              <a:rPr lang="en-US" sz="1100" b="0" strike="noStrike" spc="-1">
+                <a:solidFill>
+                  <a:srgbClr val="000000"/>
+                </a:solidFill>
+                <a:latin typeface="Arial"/>
+                <a:ea typeface="Arial"/>
+              </a:rPr>
+              <a:t>Customer apps may have their own way of supporting client certs</a:t>
+            </a:r>
+            <a:endParaRPr lang="en-US" sz="1100" b="0" strike="noStrike" spc="-1">
+              <a:latin typeface="Arial"/>
+            </a:endParaRPr>
+          </a:p>
+          <a:p>
+            <a:pPr marL="158760">
+              <a:lnSpc>
+                <a:spcPct val="100000"/>
+              </a:lnSpc>
+            </a:pPr>
+            <a:endParaRPr lang="en-US" sz="1100" b="0" strike="noStrike" spc="-1">
+              <a:latin typeface="Arial"/>
+            </a:endParaRPr>
+          </a:p>
+        </p:txBody>
+      </p:sp>
+    </p:spTree>
+    <p:extLst>
+      <p:ext uri="{BB962C8B-B14F-4D97-AF65-F5344CB8AC3E}">
+        <p14:creationId xmlns:p14="http://schemas.microsoft.com/office/powerpoint/2010/main" val="1361380048"/>
+      </p:ext>
+    </p:extLst>
   </p:cSld>
   <p:clrMapOvr>
     <a:masterClrMapping/>
@@ -9514,6 +10109,300 @@
 </p:sld>
 </file>
 
+<file path=ppt/slides/slide10.xml><?xml version="1.0" encoding="utf-8"?>
+<p:sld xmlns:a="http://schemas.openxmlformats.org/drawingml/2006/main" xmlns:r="http://schemas.openxmlformats.org/officeDocument/2006/relationships" xmlns:p="http://schemas.openxmlformats.org/presentationml/2006/main">
+  <p:cSld>
+    <p:spTree>
+      <p:nvGrpSpPr>
+        <p:cNvPr id="1" name=""/>
+        <p:cNvGrpSpPr/>
+        <p:nvPr/>
+      </p:nvGrpSpPr>
+      <p:grpSpPr>
+        <a:xfrm>
+          <a:off x="0" y="0"/>
+          <a:ext cx="0" cy="0"/>
+          <a:chOff x="0" y="0"/>
+          <a:chExt cx="0" cy="0"/>
+        </a:xfrm>
+      </p:grpSpPr>
+      <p:sp>
+        <p:nvSpPr>
+          <p:cNvPr id="188" name="TextShape 1"/>
+          <p:cNvSpPr txBox="1"/>
+          <p:nvPr/>
+        </p:nvSpPr>
+        <p:spPr>
+          <a:xfrm>
+            <a:off x="308520" y="3525840"/>
+            <a:ext cx="6446160" cy="392040"/>
+          </a:xfrm>
+          <a:prstGeom prst="rect">
+            <a:avLst/>
+          </a:prstGeom>
+          <a:noFill/>
+          <a:ln>
+            <a:noFill/>
+          </a:ln>
+        </p:spPr>
+        <p:txBody>
+          <a:bodyPr lIns="0" tIns="0" rIns="0" bIns="0" anchor="b">
+            <a:noAutofit/>
+          </a:bodyPr>
+          <a:lstStyle/>
+          <a:p>
+            <a:pPr marL="457200" indent="-228240">
+              <a:lnSpc>
+                <a:spcPct val="85000"/>
+              </a:lnSpc>
+              <a:spcBef>
+                <a:spcPts val="901"/>
+              </a:spcBef>
+            </a:pPr>
+            <a:r>
+              <a:rPr lang="en-US" sz="3000" b="1" strike="noStrike" spc="-1" dirty="0">
+                <a:solidFill>
+                  <a:srgbClr val="000000"/>
+                </a:solidFill>
+                <a:latin typeface="Arial"/>
+                <a:ea typeface="Arial"/>
+              </a:rPr>
+              <a:t>TBD Squad Focus</a:t>
+            </a:r>
+            <a:endParaRPr lang="en-US" sz="3000" b="0" strike="noStrike" spc="-1" dirty="0">
+              <a:solidFill>
+                <a:srgbClr val="000000"/>
+              </a:solidFill>
+              <a:latin typeface="Arial"/>
+            </a:endParaRPr>
+          </a:p>
+          <a:p>
+            <a:pPr marL="457200" indent="-228240">
+              <a:lnSpc>
+                <a:spcPct val="85000"/>
+              </a:lnSpc>
+              <a:spcBef>
+                <a:spcPts val="901"/>
+              </a:spcBef>
+            </a:pPr>
+            <a:r>
+              <a:rPr lang="en-US" sz="2000" b="1" strike="noStrike" spc="-1" dirty="0">
+                <a:solidFill>
+                  <a:srgbClr val="000000"/>
+                </a:solidFill>
+                <a:latin typeface="Arial"/>
+                <a:ea typeface="Arial"/>
+              </a:rPr>
+              <a:t>TBD (Squad Lead)</a:t>
+            </a:r>
+            <a:endParaRPr lang="en-US" sz="2000" b="0" strike="noStrike" spc="-1" dirty="0">
+              <a:solidFill>
+                <a:srgbClr val="000000"/>
+              </a:solidFill>
+              <a:latin typeface="Arial"/>
+            </a:endParaRPr>
+          </a:p>
+        </p:txBody>
+      </p:sp>
+    </p:spTree>
+  </p:cSld>
+  <p:clrMapOvr>
+    <a:masterClrMapping/>
+  </p:clrMapOvr>
+  <p:transition spd="med">
+    <p:fade/>
+  </p:transition>
+  <p:timing>
+    <p:tnLst>
+      <p:par>
+        <p:cTn id="1" dur="indefinite" restart="never" nodeType="tmRoot">
+          <p:childTnLst>
+            <p:seq>
+              <p:cTn id="2" dur="indefinite" nodeType="mainSeq"/>
+              <p:prevCondLst>
+                <p:cond evt="onPrev" delay="0">
+                  <p:tgtEl>
+                    <p:sldTgt/>
+                  </p:tgtEl>
+                </p:cond>
+              </p:prevCondLst>
+              <p:nextCondLst>
+                <p:cond evt="onNext" delay="0">
+                  <p:tgtEl>
+                    <p:sldTgt/>
+                  </p:tgtEl>
+                </p:cond>
+              </p:nextCondLst>
+            </p:seq>
+          </p:childTnLst>
+        </p:cTn>
+      </p:par>
+    </p:tnLst>
+  </p:timing>
+</p:sld>
+</file>
+
+<file path=ppt/slides/slide11.xml><?xml version="1.0" encoding="utf-8"?>
+<p:sld xmlns:a="http://schemas.openxmlformats.org/drawingml/2006/main" xmlns:r="http://schemas.openxmlformats.org/officeDocument/2006/relationships" xmlns:p="http://schemas.openxmlformats.org/presentationml/2006/main">
+  <p:cSld>
+    <p:spTree>
+      <p:nvGrpSpPr>
+        <p:cNvPr id="1" name=""/>
+        <p:cNvGrpSpPr/>
+        <p:nvPr/>
+      </p:nvGrpSpPr>
+      <p:grpSpPr>
+        <a:xfrm>
+          <a:off x="0" y="0"/>
+          <a:ext cx="0" cy="0"/>
+          <a:chOff x="0" y="0"/>
+          <a:chExt cx="0" cy="0"/>
+        </a:xfrm>
+      </p:grpSpPr>
+      <p:sp>
+        <p:nvSpPr>
+          <p:cNvPr id="189" name="TextShape 1"/>
+          <p:cNvSpPr txBox="1"/>
+          <p:nvPr/>
+        </p:nvSpPr>
+        <p:spPr>
+          <a:xfrm>
+            <a:off x="334080" y="159480"/>
+            <a:ext cx="7893720" cy="447120"/>
+          </a:xfrm>
+          <a:prstGeom prst="rect">
+            <a:avLst/>
+          </a:prstGeom>
+          <a:noFill/>
+          <a:ln>
+            <a:noFill/>
+          </a:ln>
+        </p:spPr>
+        <p:txBody>
+          <a:bodyPr tIns="91440" bIns="91440" anchor="ctr">
+            <a:noAutofit/>
+          </a:bodyPr>
+          <a:lstStyle/>
+          <a:p>
+            <a:pPr>
+              <a:lnSpc>
+                <a:spcPct val="100000"/>
+              </a:lnSpc>
+            </a:pPr>
+            <a:r>
+              <a:rPr lang="en-US" sz="2600" b="0" strike="noStrike" spc="-1" dirty="0">
+                <a:solidFill>
+                  <a:srgbClr val="262626"/>
+                </a:solidFill>
+                <a:latin typeface="Gill Sans"/>
+                <a:ea typeface="Gill Sans"/>
+              </a:rPr>
+              <a:t>Title</a:t>
+            </a:r>
+            <a:endParaRPr lang="en-US" sz="2600" b="0" strike="noStrike" spc="-1" dirty="0">
+              <a:solidFill>
+                <a:srgbClr val="000000"/>
+              </a:solidFill>
+              <a:latin typeface="Arial"/>
+            </a:endParaRPr>
+          </a:p>
+        </p:txBody>
+      </p:sp>
+      <p:sp>
+        <p:nvSpPr>
+          <p:cNvPr id="190" name="TextShape 2"/>
+          <p:cNvSpPr txBox="1"/>
+          <p:nvPr/>
+        </p:nvSpPr>
+        <p:spPr>
+          <a:xfrm>
+            <a:off x="336600" y="682920"/>
+            <a:ext cx="8349840" cy="4177800"/>
+          </a:xfrm>
+          <a:prstGeom prst="rect">
+            <a:avLst/>
+          </a:prstGeom>
+          <a:noFill/>
+          <a:ln>
+            <a:noFill/>
+          </a:ln>
+        </p:spPr>
+        <p:txBody>
+          <a:bodyPr tIns="91440" bIns="91440">
+            <a:noAutofit/>
+          </a:bodyPr>
+          <a:lstStyle/>
+          <a:p>
+            <a:pPr marL="457200" indent="-355320">
+              <a:lnSpc>
+                <a:spcPct val="100000"/>
+              </a:lnSpc>
+              <a:spcBef>
+                <a:spcPts val="400"/>
+              </a:spcBef>
+              <a:buClr>
+                <a:srgbClr val="000000"/>
+              </a:buClr>
+              <a:buFont typeface="Arial"/>
+              <a:buChar char="•"/>
+            </a:pPr>
+            <a:r>
+              <a:rPr lang="en-US" sz="1800" b="0" strike="noStrike" spc="-1" dirty="0">
+                <a:solidFill>
+                  <a:srgbClr val="000000"/>
+                </a:solidFill>
+                <a:latin typeface="Gill Sans"/>
+                <a:ea typeface="Gill Sans"/>
+              </a:rPr>
+              <a:t>TBD</a:t>
+            </a:r>
+            <a:endParaRPr lang="en-US" sz="1600" b="0" strike="noStrike" spc="-1" dirty="0">
+              <a:solidFill>
+                <a:srgbClr val="000000"/>
+              </a:solidFill>
+              <a:latin typeface="Arial"/>
+            </a:endParaRPr>
+          </a:p>
+        </p:txBody>
+      </p:sp>
+    </p:spTree>
+  </p:cSld>
+  <p:clrMapOvr>
+    <a:masterClrMapping/>
+  </p:clrMapOvr>
+  <p:transition spd="med">
+    <p:fade thruBlk="1"/>
+  </p:transition>
+  <p:timing>
+    <p:tnLst>
+      <p:par>
+        <p:cTn id="1" dur="indefinite" restart="never" nodeType="tmRoot">
+          <p:childTnLst>
+            <p:seq>
+              <p:cTn id="2" dur="indefinite" nodeType="mainSeq"/>
+              <p:prevCondLst>
+                <p:cond evt="onPrev" delay="0">
+                  <p:tgtEl>
+                    <p:sldTgt/>
+                  </p:tgtEl>
+                </p:cond>
+              </p:prevCondLst>
+              <p:nextCondLst>
+                <p:cond evt="onNext" delay="0">
+                  <p:tgtEl>
+                    <p:sldTgt/>
+                  </p:tgtEl>
+                </p:cond>
+              </p:nextCondLst>
+            </p:seq>
+          </p:childTnLst>
+        </p:cTn>
+      </p:par>
+    </p:tnLst>
+  </p:timing>
+</p:sld>
+</file>
+
 <file path=ppt/slides/slide2.xml><?xml version="1.0" encoding="utf-8"?>
 <p:sld xmlns:a="http://schemas.openxmlformats.org/drawingml/2006/main" xmlns:r="http://schemas.openxmlformats.org/officeDocument/2006/relationships" xmlns:p="http://schemas.openxmlformats.org/presentationml/2006/main">
   <p:cSld>
@@ -10039,7 +10928,7 @@
                 <a:latin typeface="Arial"/>
                 <a:ea typeface="Arial"/>
               </a:rPr>
-              <a:t>TBD Squad Focus</a:t>
+              <a:t>System Squad Focus</a:t>
             </a:r>
             <a:endParaRPr lang="en-US" sz="3000" b="0" strike="noStrike" spc="-1" dirty="0">
               <a:solidFill>
@@ -10229,20 +11118,278 @@
               <a:buChar char="•"/>
             </a:pPr>
             <a:r>
-              <a:rPr lang="en-US" sz="2000" b="0" strike="noStrike" spc="-1" dirty="0">
+              <a:rPr lang="en-US" sz="2000" strike="noStrike" spc="-1" dirty="0">
                 <a:solidFill>
                   <a:srgbClr val="000000"/>
                 </a:solidFill>
-                <a:latin typeface="Gill Sans"/>
+                <a:latin typeface="Gill Sans" panose="020B0502020104020203" pitchFamily="34" charset="-79"/>
                 <a:ea typeface="Gill Sans"/>
+                <a:cs typeface="Gill Sans" panose="020B0502020104020203" pitchFamily="34" charset="-79"/>
               </a:rPr>
-              <a:t>Dependencies</a:t>
+              <a:t>As High Availability Theme moving to implementation stage, will need many su</a:t>
             </a:r>
-            <a:endParaRPr lang="en-US" sz="2000" b="0" strike="noStrike" spc="-1" dirty="0">
-              <a:solidFill>
-                <a:srgbClr val="000000"/>
-              </a:solidFill>
-              <a:latin typeface="Arial"/>
+            <a:r>
+              <a:rPr lang="en-US" sz="2000" spc="-1" dirty="0">
+                <a:solidFill>
+                  <a:srgbClr val="000000"/>
+                </a:solidFill>
+                <a:latin typeface="Gill Sans" panose="020B0502020104020203" pitchFamily="34" charset="-79"/>
+                <a:ea typeface="Gill Sans"/>
+                <a:cs typeface="Gill Sans" panose="020B0502020104020203" pitchFamily="34" charset="-79"/>
+              </a:rPr>
+              <a:t>pports from other squads like PI3:</a:t>
+            </a:r>
+          </a:p>
+          <a:p>
+            <a:pPr marL="914400" lvl="1" indent="-355320">
+              <a:spcBef>
+                <a:spcPts val="400"/>
+              </a:spcBef>
+              <a:buClr>
+                <a:srgbClr val="000000"/>
+              </a:buClr>
+              <a:buFont typeface="Arial"/>
+              <a:buChar char="•"/>
+            </a:pPr>
+            <a:r>
+              <a:rPr lang="en-US" sz="2000" strike="noStrike" spc="-1" dirty="0">
+                <a:solidFill>
+                  <a:srgbClr val="000000"/>
+                </a:solidFill>
+                <a:latin typeface="Gill Sans" panose="020B0502020104020203" pitchFamily="34" charset="-79"/>
+                <a:cs typeface="Gill Sans" panose="020B0502020104020203" pitchFamily="34" charset="-79"/>
+              </a:rPr>
+              <a:t>API ML Squad </a:t>
+            </a:r>
+            <a:r>
+              <a:rPr lang="en-US" sz="2000" spc="-1" dirty="0">
+                <a:solidFill>
+                  <a:srgbClr val="000000"/>
+                </a:solidFill>
+                <a:latin typeface="Gill Sans" panose="020B0502020104020203" pitchFamily="34" charset="-79"/>
+                <a:cs typeface="Gill Sans" panose="020B0502020104020203" pitchFamily="34" charset="-79"/>
+              </a:rPr>
+              <a:t>–</a:t>
+            </a:r>
+            <a:r>
+              <a:rPr lang="en-US" sz="2000" strike="noStrike" spc="-1" dirty="0">
+                <a:solidFill>
+                  <a:srgbClr val="000000"/>
+                </a:solidFill>
+                <a:latin typeface="Gill Sans" panose="020B0502020104020203" pitchFamily="34" charset="-79"/>
+                <a:cs typeface="Gill Sans" panose="020B0502020104020203" pitchFamily="34" charset="-79"/>
+              </a:rPr>
+              <a:t> Caching API,  APIML packaging, certificates, </a:t>
+            </a:r>
+            <a:r>
+              <a:rPr lang="en-US" sz="2000" strike="noStrike" spc="-1" dirty="0" err="1">
+                <a:solidFill>
+                  <a:srgbClr val="000000"/>
+                </a:solidFill>
+                <a:latin typeface="Gill Sans" panose="020B0502020104020203" pitchFamily="34" charset="-79"/>
+                <a:cs typeface="Gill Sans" panose="020B0502020104020203" pitchFamily="34" charset="-79"/>
+              </a:rPr>
+              <a:t>etc</a:t>
+            </a:r>
+            <a:endParaRPr lang="en-US" sz="2000" strike="noStrike" spc="-1" dirty="0">
+              <a:solidFill>
+                <a:srgbClr val="000000"/>
+              </a:solidFill>
+              <a:latin typeface="Gill Sans" panose="020B0502020104020203" pitchFamily="34" charset="-79"/>
+              <a:cs typeface="Gill Sans" panose="020B0502020104020203" pitchFamily="34" charset="-79"/>
+            </a:endParaRPr>
+          </a:p>
+          <a:p>
+            <a:pPr marL="914400" lvl="1" indent="-355320">
+              <a:spcBef>
+                <a:spcPts val="400"/>
+              </a:spcBef>
+              <a:buClr>
+                <a:srgbClr val="000000"/>
+              </a:buClr>
+              <a:buFont typeface="Arial"/>
+              <a:buChar char="•"/>
+            </a:pPr>
+            <a:r>
+              <a:rPr lang="en-US" sz="2000" spc="-1" dirty="0">
+                <a:solidFill>
+                  <a:srgbClr val="000000"/>
+                </a:solidFill>
+                <a:latin typeface="Gill Sans" panose="020B0502020104020203" pitchFamily="34" charset="-79"/>
+                <a:cs typeface="Gill Sans" panose="020B0502020104020203" pitchFamily="34" charset="-79"/>
+              </a:rPr>
+              <a:t>Web UI Squad – Zowe Launcher, ZSS/ZIS improvements</a:t>
+            </a:r>
+          </a:p>
+          <a:p>
+            <a:pPr marL="914400" lvl="1" indent="-355320">
+              <a:spcBef>
+                <a:spcPts val="400"/>
+              </a:spcBef>
+              <a:buClr>
+                <a:srgbClr val="000000"/>
+              </a:buClr>
+              <a:buFont typeface="Arial"/>
+              <a:buChar char="•"/>
+            </a:pPr>
+            <a:r>
+              <a:rPr lang="en-US" sz="2000" strike="noStrike" spc="-1" dirty="0">
+                <a:solidFill>
+                  <a:srgbClr val="000000"/>
+                </a:solidFill>
+                <a:latin typeface="Gill Sans" panose="020B0502020104020203" pitchFamily="34" charset="-79"/>
+                <a:cs typeface="Gill Sans" panose="020B0502020104020203" pitchFamily="34" charset="-79"/>
+              </a:rPr>
+              <a:t>Docs Squad </a:t>
+            </a:r>
+            <a:r>
+              <a:rPr lang="en-US" sz="2000" spc="-1" dirty="0">
+                <a:solidFill>
+                  <a:srgbClr val="000000"/>
+                </a:solidFill>
+                <a:latin typeface="Gill Sans" panose="020B0502020104020203" pitchFamily="34" charset="-79"/>
+                <a:cs typeface="Gill Sans" panose="020B0502020104020203" pitchFamily="34" charset="-79"/>
+              </a:rPr>
+              <a:t>–</a:t>
+            </a:r>
+            <a:r>
+              <a:rPr lang="en-US" sz="2000" strike="noStrike" spc="-1" dirty="0">
+                <a:solidFill>
+                  <a:srgbClr val="000000"/>
+                </a:solidFill>
+                <a:latin typeface="Gill Sans" panose="020B0502020104020203" pitchFamily="34" charset="-79"/>
+                <a:cs typeface="Gill Sans" panose="020B0502020104020203" pitchFamily="34" charset="-79"/>
+              </a:rPr>
+              <a:t> improve documentation</a:t>
+            </a:r>
+          </a:p>
+          <a:p>
+            <a:pPr marL="457200" indent="-355320">
+              <a:spcBef>
+                <a:spcPts val="400"/>
+              </a:spcBef>
+              <a:buClr>
+                <a:srgbClr val="000000"/>
+              </a:buClr>
+              <a:buFont typeface="Arial"/>
+              <a:buChar char="•"/>
+            </a:pPr>
+            <a:endParaRPr lang="en-US" sz="2000" spc="-1" dirty="0">
+              <a:solidFill>
+                <a:srgbClr val="000000"/>
+              </a:solidFill>
+              <a:latin typeface="Gill Sans" panose="020B0502020104020203" pitchFamily="34" charset="-79"/>
+              <a:cs typeface="Gill Sans" panose="020B0502020104020203" pitchFamily="34" charset="-79"/>
+            </a:endParaRPr>
+          </a:p>
+          <a:p>
+            <a:pPr marL="457200" indent="-355320">
+              <a:spcBef>
+                <a:spcPts val="400"/>
+              </a:spcBef>
+              <a:buClr>
+                <a:srgbClr val="000000"/>
+              </a:buClr>
+              <a:buFont typeface="Arial"/>
+              <a:buChar char="•"/>
+            </a:pPr>
+            <a:r>
+              <a:rPr lang="en-US" sz="2000" strike="noStrike" spc="-1" dirty="0">
+                <a:solidFill>
+                  <a:srgbClr val="000000"/>
+                </a:solidFill>
+                <a:latin typeface="Gill Sans" panose="020B0502020104020203" pitchFamily="34" charset="-79"/>
+                <a:cs typeface="Gill Sans" panose="020B0502020104020203" pitchFamily="34" charset="-79"/>
+              </a:rPr>
+              <a:t>Risks </a:t>
+            </a:r>
+            <a:r>
+              <a:rPr lang="en-US" sz="2000" spc="-1" dirty="0">
+                <a:solidFill>
+                  <a:srgbClr val="000000"/>
+                </a:solidFill>
+                <a:latin typeface="Gill Sans" panose="020B0502020104020203" pitchFamily="34" charset="-79"/>
+                <a:cs typeface="Gill Sans" panose="020B0502020104020203" pitchFamily="34" charset="-79"/>
+              </a:rPr>
+              <a:t>on </a:t>
+            </a:r>
+            <a:r>
+              <a:rPr lang="en-US" sz="2000" strike="noStrike" spc="-1" dirty="0">
+                <a:solidFill>
+                  <a:srgbClr val="000000"/>
+                </a:solidFill>
+                <a:latin typeface="Gill Sans" panose="020B0502020104020203" pitchFamily="34" charset="-79"/>
+                <a:cs typeface="Gill Sans" panose="020B0502020104020203" pitchFamily="34" charset="-79"/>
+              </a:rPr>
+              <a:t>Infrastructure</a:t>
+            </a:r>
+          </a:p>
+          <a:p>
+            <a:pPr marL="914400" lvl="1" indent="-355320">
+              <a:spcBef>
+                <a:spcPts val="400"/>
+              </a:spcBef>
+              <a:buClr>
+                <a:srgbClr val="000000"/>
+              </a:buClr>
+              <a:buFont typeface="Arial"/>
+              <a:buChar char="•"/>
+            </a:pPr>
+            <a:r>
+              <a:rPr lang="en-US" sz="2000" strike="noStrike" spc="-1" dirty="0">
+                <a:solidFill>
+                  <a:srgbClr val="000000"/>
+                </a:solidFill>
+                <a:latin typeface="Gill Sans" panose="020B0502020104020203" pitchFamily="34" charset="-79"/>
+                <a:cs typeface="Gill Sans" panose="020B0502020104020203" pitchFamily="34" charset="-79"/>
+              </a:rPr>
+              <a:t>We don’t have open infrastructure to </a:t>
+            </a:r>
+            <a:r>
+              <a:rPr lang="en-US" sz="2000" spc="-1" dirty="0">
+                <a:solidFill>
+                  <a:srgbClr val="000000"/>
+                </a:solidFill>
+                <a:latin typeface="Gill Sans" panose="020B0502020104020203" pitchFamily="34" charset="-79"/>
+                <a:cs typeface="Gill Sans" panose="020B0502020104020203" pitchFamily="34" charset="-79"/>
+              </a:rPr>
+              <a:t>test deployment on Sysplex.</a:t>
+            </a:r>
+            <a:endParaRPr lang="en-US" sz="2000" strike="noStrike" spc="-1" dirty="0">
+              <a:solidFill>
+                <a:srgbClr val="000000"/>
+              </a:solidFill>
+              <a:latin typeface="Gill Sans" panose="020B0502020104020203" pitchFamily="34" charset="-79"/>
+              <a:cs typeface="Gill Sans" panose="020B0502020104020203" pitchFamily="34" charset="-79"/>
+            </a:endParaRPr>
+          </a:p>
+          <a:p>
+            <a:pPr marL="914400" lvl="1" indent="-355320">
+              <a:spcBef>
+                <a:spcPts val="400"/>
+              </a:spcBef>
+              <a:buClr>
+                <a:srgbClr val="000000"/>
+              </a:buClr>
+              <a:buFont typeface="Arial"/>
+              <a:buChar char="•"/>
+            </a:pPr>
+            <a:r>
+              <a:rPr lang="en-US" sz="2000" spc="-1" dirty="0">
+                <a:solidFill>
+                  <a:srgbClr val="000000"/>
+                </a:solidFill>
+                <a:latin typeface="Gill Sans" panose="020B0502020104020203" pitchFamily="34" charset="-79"/>
+                <a:cs typeface="Gill Sans" panose="020B0502020104020203" pitchFamily="34" charset="-79"/>
+              </a:rPr>
+              <a:t>Will rely on Broadcom’s experts and supports to verify deployment  on Sysplex with ACF2 and Top Secret.</a:t>
+            </a:r>
+            <a:endParaRPr lang="en-US" sz="2000" strike="noStrike" spc="-1" dirty="0">
+              <a:solidFill>
+                <a:srgbClr val="000000"/>
+              </a:solidFill>
+              <a:latin typeface="Gill Sans" panose="020B0502020104020203" pitchFamily="34" charset="-79"/>
+              <a:cs typeface="Gill Sans" panose="020B0502020104020203" pitchFamily="34" charset="-79"/>
             </a:endParaRPr>
           </a:p>
         </p:txBody>
@@ -10333,14 +11480,14 @@
               </a:lnSpc>
             </a:pPr>
             <a:r>
-              <a:rPr lang="en-US" sz="3000" b="0" strike="noStrike" spc="-1" dirty="0">
+              <a:rPr lang="en-US" sz="3000" spc="-1" dirty="0">
                 <a:solidFill>
                   <a:srgbClr val="262626"/>
                 </a:solidFill>
                 <a:latin typeface="Gill Sans"/>
                 <a:ea typeface="Gill Sans"/>
               </a:rPr>
-              <a:t>TBD Title</a:t>
+              <a:t>Performance - Enhance Test Coverage</a:t>
             </a:r>
             <a:endParaRPr lang="en-US" sz="3000" b="0" strike="noStrike" spc="-1" dirty="0">
               <a:solidFill>
@@ -10359,8 +11506,8 @@
         </p:nvSpPr>
         <p:spPr>
           <a:xfrm>
-            <a:off x="306360" y="774000"/>
-            <a:ext cx="8368920" cy="4147560"/>
+            <a:off x="405518" y="774000"/>
+            <a:ext cx="8269762" cy="4147560"/>
           </a:xfrm>
           <a:prstGeom prst="rect">
             <a:avLst/>
@@ -10385,21 +11532,260 @@
               </a:spcBef>
             </a:pPr>
             <a:r>
-              <a:rPr lang="en-US" sz="2000" b="0" u="sng" strike="noStrike" spc="-1" dirty="0">
-                <a:solidFill>
-                  <a:srgbClr val="0000FF"/>
-                </a:solidFill>
-                <a:uFillTx/>
+              <a:rPr lang="en-US" spc="-1" dirty="0">
+                <a:latin typeface="Gill Sans"/>
+                <a:ea typeface="Gill Sans"/>
+                <a:hlinkClick r:id="rId3"/>
+              </a:rPr>
+              <a:t>Epic: Zowe Performance Test - Stage 2 - Enhance Test Coverage (2020PI4)</a:t>
+            </a:r>
+            <a:endParaRPr lang="en-US" spc="-1" dirty="0">
+              <a:latin typeface="Gill Sans"/>
+              <a:ea typeface="Gill Sans"/>
+            </a:endParaRPr>
+          </a:p>
+          <a:p>
+            <a:pPr marL="101520">
+              <a:lnSpc>
+                <a:spcPct val="100000"/>
+              </a:lnSpc>
+              <a:spcBef>
+                <a:spcPts val="400"/>
+              </a:spcBef>
+            </a:pPr>
+            <a:endParaRPr lang="en-US" spc="-1" dirty="0">
+              <a:latin typeface="Gill Sans"/>
+              <a:ea typeface="Gill Sans"/>
+            </a:endParaRPr>
+          </a:p>
+          <a:p>
+            <a:pPr marL="444420" indent="-342900">
+              <a:lnSpc>
+                <a:spcPct val="100000"/>
+              </a:lnSpc>
+              <a:spcBef>
+                <a:spcPts val="400"/>
+              </a:spcBef>
+              <a:buFont typeface="Wingdings" pitchFamily="2" charset="2"/>
+              <a:buChar char="Ø"/>
+            </a:pPr>
+            <a:r>
+              <a:rPr lang="en-US" spc="-1" dirty="0">
                 <a:latin typeface="Gill Sans"/>
                 <a:ea typeface="Gill Sans"/>
               </a:rPr>
-              <a:t>TBD</a:t>
+              <a:t>Finalize primary and component-level test suites </a:t>
             </a:r>
-            <a:endParaRPr lang="en-US" sz="2000" b="0" strike="noStrike" spc="-1" dirty="0">
-              <a:solidFill>
-                <a:srgbClr val="000000"/>
-              </a:solidFill>
-              <a:latin typeface="Arial"/>
+            <a:r>
+              <a:rPr lang="en-US" sz="1000" i="1" spc="-1" dirty="0">
+                <a:solidFill>
+                  <a:schemeClr val="tx1">
+                    <a:lumMod val="50000"/>
+                    <a:lumOff val="50000"/>
+                  </a:schemeClr>
+                </a:solidFill>
+                <a:latin typeface="Gill Sans"/>
+                <a:ea typeface="Gill Sans"/>
+              </a:rPr>
+              <a:t>Continue item from PI3</a:t>
+            </a:r>
+            <a:endParaRPr lang="en-US" i="1" spc="-1" dirty="0">
+              <a:solidFill>
+                <a:schemeClr val="tx1">
+                  <a:lumMod val="50000"/>
+                  <a:lumOff val="50000"/>
+                </a:schemeClr>
+              </a:solidFill>
+              <a:latin typeface="Gill Sans"/>
+              <a:ea typeface="Gill Sans"/>
+            </a:endParaRPr>
+          </a:p>
+          <a:p>
+            <a:pPr marL="901620" lvl="1" indent="-342900">
+              <a:spcBef>
+                <a:spcPts val="400"/>
+              </a:spcBef>
+              <a:buFont typeface="Wingdings" pitchFamily="2" charset="2"/>
+              <a:buChar char="v"/>
+            </a:pPr>
+            <a:r>
+              <a:rPr lang="en-US" spc="-1" dirty="0">
+                <a:latin typeface="Gill Sans"/>
+                <a:ea typeface="Gill Sans"/>
+                <a:hlinkClick r:id="rId4"/>
+              </a:rPr>
+              <a:t>Create primary performance test suite</a:t>
+            </a:r>
+            <a:endParaRPr lang="en-US" spc="-1" dirty="0">
+              <a:latin typeface="Gill Sans"/>
+              <a:ea typeface="Gill Sans"/>
+            </a:endParaRPr>
+          </a:p>
+          <a:p>
+            <a:pPr marL="901620" lvl="1" indent="-342900">
+              <a:spcBef>
+                <a:spcPts val="400"/>
+              </a:spcBef>
+              <a:buFont typeface="Wingdings" pitchFamily="2" charset="2"/>
+              <a:buChar char="v"/>
+            </a:pPr>
+            <a:r>
+              <a:rPr lang="en-US" spc="-1" dirty="0">
+                <a:latin typeface="Gill Sans"/>
+                <a:ea typeface="Gill Sans"/>
+                <a:hlinkClick r:id="rId5"/>
+              </a:rPr>
+              <a:t>Create dedicated performance test suite for APIML</a:t>
+            </a:r>
+            <a:endParaRPr lang="en-US" spc="-1" dirty="0">
+              <a:latin typeface="Gill Sans"/>
+              <a:ea typeface="Gill Sans"/>
+            </a:endParaRPr>
+          </a:p>
+          <a:p>
+            <a:pPr marL="901620" lvl="1" indent="-342900">
+              <a:spcBef>
+                <a:spcPts val="400"/>
+              </a:spcBef>
+              <a:buFont typeface="Wingdings" pitchFamily="2" charset="2"/>
+              <a:buChar char="v"/>
+            </a:pPr>
+            <a:r>
+              <a:rPr lang="en-US" spc="-1" dirty="0">
+                <a:latin typeface="Gill Sans"/>
+                <a:ea typeface="Gill Sans"/>
+                <a:hlinkClick r:id="rId6"/>
+              </a:rPr>
+              <a:t>Create dedicated performance test suite for Explorer APIs</a:t>
+            </a:r>
+            <a:endParaRPr lang="en-US" spc="-1" dirty="0">
+              <a:latin typeface="Gill Sans"/>
+              <a:ea typeface="Gill Sans"/>
+            </a:endParaRPr>
+          </a:p>
+          <a:p>
+            <a:pPr marL="901620" lvl="1" indent="-342900">
+              <a:spcBef>
+                <a:spcPts val="400"/>
+              </a:spcBef>
+              <a:buFont typeface="Wingdings" pitchFamily="2" charset="2"/>
+              <a:buChar char="v"/>
+            </a:pPr>
+            <a:r>
+              <a:rPr lang="en-US" spc="-1" dirty="0">
+                <a:latin typeface="Gill Sans"/>
+                <a:ea typeface="Gill Sans"/>
+                <a:hlinkClick r:id="rId7"/>
+              </a:rPr>
+              <a:t>Create dedicated performance test suite for Desktop</a:t>
+            </a:r>
+            <a:endParaRPr lang="en-US" spc="-1" dirty="0">
+              <a:latin typeface="Gill Sans"/>
+              <a:ea typeface="Gill Sans"/>
+            </a:endParaRPr>
+          </a:p>
+          <a:p>
+            <a:pPr marL="444420" indent="-342900">
+              <a:lnSpc>
+                <a:spcPct val="100000"/>
+              </a:lnSpc>
+              <a:spcBef>
+                <a:spcPts val="400"/>
+              </a:spcBef>
+              <a:buFont typeface="Wingdings" pitchFamily="2" charset="2"/>
+              <a:buChar char="Ø"/>
+            </a:pPr>
+            <a:r>
+              <a:rPr lang="en-US" spc="-1" dirty="0">
+                <a:latin typeface="Gill Sans"/>
+                <a:ea typeface="Gill Sans"/>
+                <a:hlinkClick r:id="rId8"/>
+              </a:rPr>
+              <a:t>Create dummy server for APIML testing</a:t>
+            </a:r>
+            <a:endParaRPr lang="en-US" spc="-1" dirty="0">
+              <a:latin typeface="Gill Sans"/>
+              <a:ea typeface="Gill Sans"/>
+            </a:endParaRPr>
+          </a:p>
+          <a:p>
+            <a:pPr marL="444420" indent="-342900">
+              <a:lnSpc>
+                <a:spcPct val="100000"/>
+              </a:lnSpc>
+              <a:spcBef>
+                <a:spcPts val="400"/>
+              </a:spcBef>
+              <a:buFont typeface="Wingdings" pitchFamily="2" charset="2"/>
+              <a:buChar char="Ø"/>
+            </a:pPr>
+            <a:r>
+              <a:rPr lang="en-US" spc="-1" dirty="0">
+                <a:latin typeface="Gill Sans"/>
+                <a:ea typeface="Gill Sans"/>
+                <a:hlinkClick r:id="rId9"/>
+              </a:rPr>
+              <a:t>Run Metrics Server off-</a:t>
+            </a:r>
+            <a:r>
+              <a:rPr lang="en-US" spc="-1" dirty="0" err="1">
+                <a:latin typeface="Gill Sans"/>
+                <a:ea typeface="Gill Sans"/>
+                <a:hlinkClick r:id="rId9"/>
+              </a:rPr>
+              <a:t>zOS</a:t>
+            </a:r>
+            <a:endParaRPr lang="en-US" spc="-1" dirty="0">
+              <a:latin typeface="Gill Sans"/>
+              <a:ea typeface="Gill Sans"/>
+            </a:endParaRPr>
+          </a:p>
+          <a:p>
+            <a:pPr marL="444420" indent="-342900">
+              <a:lnSpc>
+                <a:spcPct val="100000"/>
+              </a:lnSpc>
+              <a:spcBef>
+                <a:spcPts val="400"/>
+              </a:spcBef>
+              <a:buFont typeface="Wingdings" pitchFamily="2" charset="2"/>
+              <a:buChar char="Ø"/>
+            </a:pPr>
+            <a:r>
+              <a:rPr lang="en-US" spc="-1" dirty="0">
+                <a:latin typeface="Gill Sans"/>
+                <a:ea typeface="Gill Sans"/>
+                <a:hlinkClick r:id="rId10"/>
+              </a:rPr>
+              <a:t>Add ability to test performance of different endpoints in parallel</a:t>
+            </a:r>
+            <a:endParaRPr lang="en-US" spc="-1" dirty="0">
+              <a:latin typeface="Gill Sans"/>
+              <a:ea typeface="Gill Sans"/>
+            </a:endParaRPr>
+          </a:p>
+          <a:p>
+            <a:pPr marL="444420" indent="-342900">
+              <a:lnSpc>
+                <a:spcPct val="100000"/>
+              </a:lnSpc>
+              <a:spcBef>
+                <a:spcPts val="400"/>
+              </a:spcBef>
+              <a:buFont typeface="Wingdings" pitchFamily="2" charset="2"/>
+              <a:buChar char="Ø"/>
+            </a:pPr>
+            <a:r>
+              <a:rPr lang="en-US" spc="-1" dirty="0">
+                <a:latin typeface="Gill Sans"/>
+                <a:ea typeface="Gill Sans"/>
+                <a:hlinkClick r:id="rId11"/>
+              </a:rPr>
+              <a:t>Validate test report with other methods</a:t>
+            </a:r>
+            <a:endParaRPr lang="en-US" spc="-1" dirty="0">
+              <a:latin typeface="Gill Sans"/>
+              <a:ea typeface="Gill Sans"/>
             </a:endParaRPr>
           </a:p>
         </p:txBody>
@@ -10461,14 +11847,14 @@
       </p:grpSpPr>
       <p:sp>
         <p:nvSpPr>
-          <p:cNvPr id="188" name="TextShape 1"/>
+          <p:cNvPr id="182" name="TextShape 1"/>
           <p:cNvSpPr txBox="1"/>
           <p:nvPr/>
         </p:nvSpPr>
         <p:spPr>
           <a:xfrm>
-            <a:off x="308520" y="3525840"/>
-            <a:ext cx="6446160" cy="392040"/>
+            <a:off x="334080" y="159480"/>
+            <a:ext cx="7893720" cy="447120"/>
           </a:xfrm>
           <a:prstGeom prst="rect">
             <a:avLst/>
@@ -10479,71 +11865,337 @@
           </a:ln>
         </p:spPr>
         <p:txBody>
-          <a:bodyPr lIns="0" tIns="0" rIns="0" bIns="0" anchor="b">
+          <a:bodyPr tIns="91440" bIns="91440" anchor="ctr">
             <a:noAutofit/>
           </a:bodyPr>
           <a:lstStyle/>
           <a:p>
-            <a:pPr marL="457200" indent="-228240">
+            <a:pPr>
               <a:lnSpc>
-                <a:spcPct val="85000"/>
+                <a:spcPct val="100000"/>
+              </a:lnSpc>
+            </a:pPr>
+            <a:r>
+              <a:rPr lang="en-US" sz="3000" spc="-1" dirty="0">
+                <a:solidFill>
+                  <a:srgbClr val="262626"/>
+                </a:solidFill>
+                <a:latin typeface="Gill Sans"/>
+                <a:ea typeface="Gill Sans"/>
+              </a:rPr>
+              <a:t>High Availability – New Components &amp; Sysplex</a:t>
+            </a:r>
+            <a:endParaRPr lang="en-US" sz="3000" b="0" strike="noStrike" spc="-1" dirty="0">
+              <a:solidFill>
+                <a:srgbClr val="000000"/>
+              </a:solidFill>
+              <a:latin typeface="Arial"/>
+            </a:endParaRPr>
+          </a:p>
+        </p:txBody>
+      </p:sp>
+      <p:sp>
+        <p:nvSpPr>
+          <p:cNvPr id="183" name="TextShape 2"/>
+          <p:cNvSpPr txBox="1"/>
+          <p:nvPr/>
+        </p:nvSpPr>
+        <p:spPr>
+          <a:xfrm>
+            <a:off x="405518" y="774000"/>
+            <a:ext cx="8269762" cy="4147560"/>
+          </a:xfrm>
+          <a:prstGeom prst="rect">
+            <a:avLst/>
+          </a:prstGeom>
+          <a:noFill/>
+          <a:ln>
+            <a:noFill/>
+          </a:ln>
+        </p:spPr>
+        <p:txBody>
+          <a:bodyPr tIns="91440" bIns="91440">
+            <a:noAutofit/>
+          </a:bodyPr>
+          <a:lstStyle/>
+          <a:p>
+            <a:pPr marL="101520">
+              <a:lnSpc>
+                <a:spcPct val="100000"/>
               </a:lnSpc>
               <a:spcBef>
-                <a:spcPts val="901"/>
+                <a:spcPts val="400"/>
               </a:spcBef>
             </a:pPr>
             <a:r>
-              <a:rPr lang="en-US" sz="3000" b="1" strike="noStrike" spc="-1" dirty="0">
-                <a:solidFill>
-                  <a:srgbClr val="000000"/>
-                </a:solidFill>
-                <a:latin typeface="Arial"/>
-                <a:ea typeface="Arial"/>
+              <a:rPr lang="en-US" spc="-1" dirty="0">
+                <a:latin typeface="Gill Sans"/>
+                <a:ea typeface="Gill Sans"/>
+                <a:hlinkClick r:id="rId3"/>
               </a:rPr>
-              <a:t>TBD Squad Focus</a:t>
+              <a:t>Epic – High Availability</a:t>
             </a:r>
-            <a:endParaRPr lang="en-US" sz="3000" b="0" strike="noStrike" spc="-1" dirty="0">
-              <a:solidFill>
-                <a:srgbClr val="000000"/>
-              </a:solidFill>
-              <a:latin typeface="Arial"/>
-            </a:endParaRPr>
-          </a:p>
-          <a:p>
-            <a:pPr marL="457200" indent="-228240">
+            <a:endParaRPr lang="en-US" spc="-1" dirty="0">
+              <a:latin typeface="Gill Sans"/>
+              <a:ea typeface="Gill Sans"/>
+            </a:endParaRPr>
+          </a:p>
+          <a:p>
+            <a:pPr marL="101520">
               <a:lnSpc>
-                <a:spcPct val="85000"/>
+                <a:spcPct val="100000"/>
               </a:lnSpc>
               <a:spcBef>
-                <a:spcPts val="901"/>
+                <a:spcPts val="400"/>
               </a:spcBef>
             </a:pPr>
+            <a:endParaRPr lang="en-US" spc="-1" dirty="0">
+              <a:latin typeface="Gill Sans"/>
+              <a:ea typeface="Gill Sans"/>
+            </a:endParaRPr>
+          </a:p>
+          <a:p>
+            <a:pPr marL="444420" indent="-342900">
+              <a:spcBef>
+                <a:spcPts val="400"/>
+              </a:spcBef>
+              <a:buFont typeface="Wingdings" pitchFamily="2" charset="2"/>
+              <a:buChar char="Ø"/>
+            </a:pPr>
             <a:r>
-              <a:rPr lang="en-US" sz="2000" b="1" strike="noStrike" spc="-1" dirty="0">
-                <a:solidFill>
-                  <a:srgbClr val="000000"/>
-                </a:solidFill>
-                <a:latin typeface="Arial"/>
-                <a:ea typeface="Arial"/>
+              <a:rPr lang="en-US" spc="-1" dirty="0">
+                <a:latin typeface="Gill Sans"/>
+                <a:ea typeface="Gill Sans"/>
+                <a:hlinkClick r:id="rId4"/>
               </a:rPr>
-              <a:t>TBD (Squad Lead)</a:t>
+              <a:t>Create Caching API with VSAM support</a:t>
             </a:r>
-            <a:endParaRPr lang="en-US" sz="2000" b="0" strike="noStrike" spc="-1" dirty="0">
-              <a:solidFill>
-                <a:srgbClr val="000000"/>
-              </a:solidFill>
-              <a:latin typeface="Arial"/>
+            <a:endParaRPr lang="en-US" spc="-1" dirty="0">
+              <a:latin typeface="Gill Sans"/>
+              <a:ea typeface="Gill Sans"/>
+            </a:endParaRPr>
+          </a:p>
+          <a:p>
+            <a:pPr marL="444420" indent="-342900">
+              <a:spcBef>
+                <a:spcPts val="400"/>
+              </a:spcBef>
+              <a:buFont typeface="Wingdings" pitchFamily="2" charset="2"/>
+              <a:buChar char="Ø"/>
+            </a:pPr>
+            <a:r>
+              <a:rPr lang="en-US" spc="-1" dirty="0">
+                <a:latin typeface="Gill Sans"/>
+                <a:ea typeface="Gill Sans"/>
+                <a:hlinkClick r:id="rId5"/>
+              </a:rPr>
+              <a:t>Implement and integrate Zowe Launcher</a:t>
+            </a:r>
+            <a:r>
+              <a:rPr lang="en-US" spc="-1" dirty="0">
+                <a:latin typeface="Gill Sans"/>
+                <a:ea typeface="Gill Sans"/>
+              </a:rPr>
+              <a:t> (Stage 1)</a:t>
+            </a:r>
+          </a:p>
+          <a:p>
+            <a:pPr marL="444420" indent="-342900">
+              <a:spcBef>
+                <a:spcPts val="400"/>
+              </a:spcBef>
+              <a:buFont typeface="Wingdings" pitchFamily="2" charset="2"/>
+              <a:buChar char="Ø"/>
+            </a:pPr>
+            <a:endParaRPr lang="en-US" spc="-1" dirty="0">
+              <a:latin typeface="Gill Sans"/>
+              <a:ea typeface="Gill Sans"/>
+            </a:endParaRPr>
+          </a:p>
+          <a:p>
+            <a:pPr marL="444420" indent="-342900">
+              <a:spcBef>
+                <a:spcPts val="400"/>
+              </a:spcBef>
+              <a:buFont typeface="Wingdings" pitchFamily="2" charset="2"/>
+              <a:buChar char="Ø"/>
+            </a:pPr>
+            <a:r>
+              <a:rPr lang="en-US" spc="-1" dirty="0">
+                <a:latin typeface="Gill Sans"/>
+                <a:ea typeface="Gill Sans"/>
+              </a:rPr>
+              <a:t>Starting Zowe in Sysplex</a:t>
+            </a:r>
+          </a:p>
+          <a:p>
+            <a:pPr marL="901620" lvl="1" indent="-342900">
+              <a:spcBef>
+                <a:spcPts val="400"/>
+              </a:spcBef>
+              <a:buFont typeface="Wingdings" pitchFamily="2" charset="2"/>
+              <a:buChar char="v"/>
+            </a:pPr>
+            <a:r>
+              <a:rPr lang="en-US" sz="1600" spc="-1" dirty="0">
+                <a:latin typeface="Gill Sans"/>
+                <a:ea typeface="Gill Sans"/>
+                <a:hlinkClick r:id="rId6"/>
+              </a:rPr>
+              <a:t>Verify and document z/OSMF on Sysplex configuration</a:t>
+            </a:r>
+            <a:r>
+              <a:rPr lang="en-US" sz="1600" spc="-1" dirty="0">
+                <a:latin typeface="Gill Sans"/>
+                <a:ea typeface="Gill Sans"/>
+              </a:rPr>
+              <a:t> (shared SAF user registry</a:t>
+            </a:r>
+          </a:p>
+          <a:p>
+            <a:pPr marL="901620" lvl="1" indent="-342900">
+              <a:spcBef>
+                <a:spcPts val="400"/>
+              </a:spcBef>
+              <a:buFont typeface="Wingdings" pitchFamily="2" charset="2"/>
+              <a:buChar char="v"/>
+            </a:pPr>
+            <a:r>
+              <a:rPr lang="en-US" sz="1600" spc="-1" dirty="0">
+                <a:latin typeface="Gill Sans"/>
+                <a:ea typeface="Gill Sans"/>
+              </a:rPr>
+              <a:t>Document how to configure </a:t>
+            </a:r>
+            <a:r>
+              <a:rPr lang="en-US" sz="1600" spc="-1" dirty="0">
+                <a:latin typeface="Gill Sans"/>
+                <a:ea typeface="Gill Sans"/>
+                <a:hlinkClick r:id="rId7"/>
+              </a:rPr>
+              <a:t>port sharing</a:t>
+            </a:r>
+            <a:r>
+              <a:rPr lang="en-US" sz="1600" spc="-1" dirty="0">
+                <a:latin typeface="Gill Sans"/>
+                <a:ea typeface="Gill Sans"/>
+              </a:rPr>
+              <a:t> and </a:t>
+            </a:r>
+            <a:r>
+              <a:rPr lang="en-US" sz="1600" spc="-1" dirty="0">
+                <a:latin typeface="Gill Sans"/>
+                <a:ea typeface="Gill Sans"/>
+                <a:hlinkClick r:id="rId8"/>
+              </a:rPr>
+              <a:t>D-DIVPA</a:t>
+            </a:r>
+            <a:r>
+              <a:rPr lang="en-US" sz="1600" spc="-1" dirty="0">
+                <a:latin typeface="Gill Sans"/>
+                <a:ea typeface="Gill Sans"/>
+              </a:rPr>
+              <a:t> for API Gateway</a:t>
+            </a:r>
+          </a:p>
+          <a:p>
+            <a:pPr marL="901620" lvl="1" indent="-342900">
+              <a:spcBef>
+                <a:spcPts val="400"/>
+              </a:spcBef>
+              <a:buFont typeface="Wingdings" pitchFamily="2" charset="2"/>
+              <a:buChar char="v"/>
+            </a:pPr>
+            <a:r>
+              <a:rPr lang="en-US" sz="1600" spc="-1" dirty="0">
+                <a:latin typeface="Gill Sans"/>
+                <a:ea typeface="Gill Sans"/>
+                <a:hlinkClick r:id="rId9"/>
+              </a:rPr>
+              <a:t>Verify and document requirement on shared USS file system, and shared VSAM data set</a:t>
+            </a:r>
+            <a:endParaRPr lang="en-US" sz="1600" spc="-1" dirty="0">
+              <a:latin typeface="Gill Sans"/>
+              <a:ea typeface="Gill Sans"/>
+            </a:endParaRPr>
+          </a:p>
+          <a:p>
+            <a:pPr marL="901620" lvl="1" indent="-342900">
+              <a:spcBef>
+                <a:spcPts val="400"/>
+              </a:spcBef>
+              <a:buFont typeface="Wingdings" pitchFamily="2" charset="2"/>
+              <a:buChar char="v"/>
+            </a:pPr>
+            <a:r>
+              <a:rPr lang="en-US" sz="1600" spc="-1" dirty="0">
+                <a:latin typeface="Gill Sans"/>
+                <a:ea typeface="Gill Sans"/>
+                <a:hlinkClick r:id="rId10"/>
+              </a:rPr>
+              <a:t>Test and implement ARM policy</a:t>
+            </a:r>
+            <a:endParaRPr lang="en-US" sz="1600" spc="-1" dirty="0">
+              <a:latin typeface="Gill Sans"/>
+              <a:ea typeface="Gill Sans"/>
+            </a:endParaRPr>
+          </a:p>
+          <a:p>
+            <a:pPr marL="901620" lvl="1" indent="-342900">
+              <a:spcBef>
+                <a:spcPts val="400"/>
+              </a:spcBef>
+              <a:buFont typeface="Wingdings" pitchFamily="2" charset="2"/>
+              <a:buChar char="v"/>
+            </a:pPr>
+            <a:r>
+              <a:rPr lang="en-US" sz="1600" spc="-1" dirty="0">
+                <a:latin typeface="Gill Sans"/>
+                <a:ea typeface="Gill Sans"/>
+                <a:hlinkClick r:id="rId11"/>
+              </a:rPr>
+              <a:t>Validate Apiml &amp; zOSMF HA with ACF2 and Top Secret Enabled Sysplex</a:t>
+            </a:r>
+            <a:endParaRPr lang="en-US" sz="1600" spc="-1" dirty="0">
+              <a:latin typeface="Gill Sans"/>
+              <a:ea typeface="Gill Sans"/>
+            </a:endParaRPr>
+          </a:p>
+          <a:p>
+            <a:pPr marL="901620" lvl="1" indent="-342900">
+              <a:spcBef>
+                <a:spcPts val="400"/>
+              </a:spcBef>
+              <a:buFont typeface="Wingdings" pitchFamily="2" charset="2"/>
+              <a:buChar char="v"/>
+            </a:pPr>
+            <a:r>
+              <a:rPr lang="en-US" sz="1600" spc="-1" dirty="0">
+                <a:latin typeface="Gill Sans"/>
+                <a:ea typeface="Gill Sans"/>
+                <a:hlinkClick r:id="rId12"/>
+              </a:rPr>
+              <a:t>Verify how CLI works with Sysplex</a:t>
+            </a:r>
+            <a:endParaRPr lang="en-US" sz="1600" spc="-1" dirty="0">
+              <a:latin typeface="Gill Sans"/>
+              <a:ea typeface="Gill Sans"/>
             </a:endParaRPr>
           </a:p>
         </p:txBody>
       </p:sp>
     </p:spTree>
+    <p:extLst>
+      <p:ext uri="{BB962C8B-B14F-4D97-AF65-F5344CB8AC3E}">
+        <p14:creationId xmlns:p14="http://schemas.microsoft.com/office/powerpoint/2010/main" val="54868531"/>
+      </p:ext>
+    </p:extLst>
   </p:cSld>
   <p:clrMapOvr>
     <a:masterClrMapping/>
   </p:clrMapOvr>
   <p:transition spd="med">
-    <p:fade/>
+    <p:fade thruBlk="1"/>
   </p:transition>
   <p:timing>
     <p:tnLst>
@@ -10594,7 +12246,7 @@
       </p:grpSpPr>
       <p:sp>
         <p:nvSpPr>
-          <p:cNvPr id="189" name="TextShape 1"/>
+          <p:cNvPr id="182" name="TextShape 1"/>
           <p:cNvSpPr txBox="1"/>
           <p:nvPr/>
         </p:nvSpPr>
@@ -10623,34 +12275,34 @@
               </a:lnSpc>
             </a:pPr>
             <a:r>
-              <a:rPr lang="en-US" sz="2600" b="0" strike="noStrike" spc="-1" dirty="0">
+              <a:rPr lang="en-US" sz="2400" spc="-1" dirty="0">
                 <a:solidFill>
                   <a:srgbClr val="262626"/>
                 </a:solidFill>
                 <a:latin typeface="Gill Sans"/>
                 <a:ea typeface="Gill Sans"/>
               </a:rPr>
-              <a:t>Title</a:t>
+              <a:t>High Availability – Existing Components &amp; Certificates</a:t>
             </a:r>
-            <a:endParaRPr lang="en-US" sz="2600" b="0" strike="noStrike" spc="-1" dirty="0">
-              <a:solidFill>
-                <a:srgbClr val="000000"/>
-              </a:solidFill>
-              <a:latin typeface="Arial"/>
-            </a:endParaRPr>
-          </a:p>
-        </p:txBody>
-      </p:sp>
-      <p:sp>
-        <p:nvSpPr>
-          <p:cNvPr id="190" name="TextShape 2"/>
+            <a:endParaRPr lang="en-US" sz="2400" b="0" strike="noStrike" spc="-1" dirty="0">
+              <a:solidFill>
+                <a:srgbClr val="000000"/>
+              </a:solidFill>
+              <a:latin typeface="Arial"/>
+            </a:endParaRPr>
+          </a:p>
+        </p:txBody>
+      </p:sp>
+      <p:sp>
+        <p:nvSpPr>
+          <p:cNvPr id="183" name="TextShape 2"/>
           <p:cNvSpPr txBox="1"/>
           <p:nvPr/>
         </p:nvSpPr>
         <p:spPr>
           <a:xfrm>
-            <a:off x="336600" y="682920"/>
-            <a:ext cx="8349840" cy="4177800"/>
+            <a:off x="405518" y="683812"/>
+            <a:ext cx="8269762" cy="4237748"/>
           </a:xfrm>
           <a:prstGeom prst="rect">
             <a:avLst/>
@@ -10666,39 +12318,459 @@
           </a:bodyPr>
           <a:lstStyle/>
           <a:p>
-            <a:pPr marL="457200" indent="-355320">
+            <a:pPr marL="387270" indent="-285750">
+              <a:spcBef>
+                <a:spcPts val="400"/>
+              </a:spcBef>
+              <a:buFont typeface="Wingdings" pitchFamily="2" charset="2"/>
+              <a:buChar char="Ø"/>
+            </a:pPr>
+            <a:r>
+              <a:rPr lang="en-US" spc="-1" dirty="0">
+                <a:latin typeface="Gill Sans"/>
+                <a:ea typeface="Gill Sans"/>
+              </a:rPr>
+              <a:t>Preparing Zowe and Components for HA</a:t>
+            </a:r>
+          </a:p>
+          <a:p>
+            <a:pPr marL="901620" lvl="1" indent="-342900">
+              <a:spcBef>
+                <a:spcPts val="400"/>
+              </a:spcBef>
+              <a:buFont typeface="Wingdings" pitchFamily="2" charset="2"/>
+              <a:buChar char="v"/>
+            </a:pPr>
+            <a:r>
+              <a:rPr lang="en-US" sz="1600" spc="-1" dirty="0">
+                <a:latin typeface="Gill Sans"/>
+                <a:ea typeface="Gill Sans"/>
+                <a:hlinkClick r:id="rId3"/>
+              </a:rPr>
+              <a:t>Break down apiml package into 3 individual components</a:t>
+            </a:r>
+            <a:endParaRPr lang="en-US" sz="1600" spc="-1" dirty="0">
+              <a:latin typeface="Gill Sans"/>
+              <a:ea typeface="Gill Sans"/>
+            </a:endParaRPr>
+          </a:p>
+          <a:p>
+            <a:pPr marL="901620" lvl="1" indent="-342900">
+              <a:spcBef>
+                <a:spcPts val="400"/>
+              </a:spcBef>
+              <a:buFont typeface="Wingdings" pitchFamily="2" charset="2"/>
+              <a:buChar char="v"/>
+            </a:pPr>
+            <a:r>
+              <a:rPr lang="en-US" sz="1600" spc="-1" dirty="0">
+                <a:latin typeface="Gill Sans"/>
+                <a:ea typeface="Gill Sans"/>
+                <a:hlinkClick r:id="rId4"/>
+              </a:rPr>
+              <a:t>Define manifest file for Zowe packages to simplify Zowe Launcher configurations</a:t>
+            </a:r>
+            <a:endParaRPr lang="en-US" sz="1600" spc="-1" dirty="0">
+              <a:latin typeface="Gill Sans"/>
+              <a:ea typeface="Gill Sans"/>
+            </a:endParaRPr>
+          </a:p>
+          <a:p>
+            <a:pPr marL="901620" lvl="1" indent="-342900">
+              <a:spcBef>
+                <a:spcPts val="400"/>
+              </a:spcBef>
+              <a:buFont typeface="Wingdings" pitchFamily="2" charset="2"/>
+              <a:buChar char="v"/>
+            </a:pPr>
+            <a:r>
+              <a:rPr lang="en-US" sz="1600" spc="-1" dirty="0">
+                <a:latin typeface="Gill Sans"/>
+                <a:ea typeface="Gill Sans"/>
+                <a:hlinkClick r:id="rId5"/>
+              </a:rPr>
+              <a:t>Add new configuration entries in instance.env to support multiple instances of components</a:t>
+            </a:r>
+            <a:endParaRPr lang="en-US" sz="1600" spc="-1" dirty="0">
+              <a:latin typeface="Gill Sans"/>
+              <a:ea typeface="Gill Sans"/>
+            </a:endParaRPr>
+          </a:p>
+          <a:p>
+            <a:pPr marL="901620" lvl="1" indent="-342900">
+              <a:spcBef>
+                <a:spcPts val="400"/>
+              </a:spcBef>
+              <a:buFont typeface="Wingdings" pitchFamily="2" charset="2"/>
+              <a:buChar char="v"/>
+            </a:pPr>
+            <a:r>
+              <a:rPr lang="en-US" sz="1600" spc="-1" dirty="0">
+                <a:latin typeface="Gill Sans"/>
+                <a:ea typeface="Gill Sans"/>
+                <a:hlinkClick r:id="rId6"/>
+              </a:rPr>
+              <a:t>Automatically configure ARM policy for Zowe Launcher</a:t>
+            </a:r>
+            <a:endParaRPr lang="en-US" sz="1600" spc="-1" dirty="0">
+              <a:latin typeface="Gill Sans"/>
+              <a:ea typeface="Gill Sans"/>
+            </a:endParaRPr>
+          </a:p>
+          <a:p>
+            <a:pPr marL="901620" lvl="1" indent="-342900">
+              <a:spcBef>
+                <a:spcPts val="400"/>
+              </a:spcBef>
+              <a:buFont typeface="Wingdings" pitchFamily="2" charset="2"/>
+              <a:buChar char="v"/>
+            </a:pPr>
+            <a:r>
+              <a:rPr lang="en-US" sz="1600" spc="-1" dirty="0">
+                <a:latin typeface="Gill Sans"/>
+                <a:ea typeface="Gill Sans"/>
+                <a:hlinkClick r:id="rId7"/>
+              </a:rPr>
+              <a:t>Improve lifecycle </a:t>
+            </a:r>
+            <a:r>
+              <a:rPr lang="en-US" sz="1600" spc="-1" dirty="0" err="1">
+                <a:latin typeface="Gill Sans"/>
+                <a:ea typeface="Gill Sans"/>
+                <a:hlinkClick r:id="rId7"/>
+              </a:rPr>
+              <a:t>start.sh</a:t>
+            </a:r>
+            <a:r>
+              <a:rPr lang="en-US" sz="1600" spc="-1" dirty="0">
+                <a:latin typeface="Gill Sans"/>
+                <a:ea typeface="Gill Sans"/>
+                <a:hlinkClick r:id="rId7"/>
+              </a:rPr>
+              <a:t> to properly trap termination signals and kill child processes</a:t>
+            </a:r>
+            <a:endParaRPr lang="en-US" sz="1600" spc="-1" dirty="0">
+              <a:latin typeface="Gill Sans"/>
+              <a:ea typeface="Gill Sans"/>
+            </a:endParaRPr>
+          </a:p>
+          <a:p>
+            <a:pPr marL="901620" lvl="1" indent="-342900">
+              <a:spcBef>
+                <a:spcPts val="400"/>
+              </a:spcBef>
+              <a:buFont typeface="Wingdings" pitchFamily="2" charset="2"/>
+              <a:buChar char="v"/>
+            </a:pPr>
+            <a:r>
+              <a:rPr lang="en-US" sz="1600" spc="-1" dirty="0">
+                <a:latin typeface="Gill Sans"/>
+                <a:ea typeface="Gill Sans"/>
+                <a:hlinkClick r:id="rId8"/>
+              </a:rPr>
+              <a:t>Change ZSS to be registered under API Discovery Service</a:t>
+            </a:r>
+            <a:endParaRPr lang="en-US" sz="1600" spc="-1" dirty="0">
+              <a:latin typeface="Gill Sans"/>
+              <a:ea typeface="Gill Sans"/>
+            </a:endParaRPr>
+          </a:p>
+          <a:p>
+            <a:pPr marL="444420" indent="-342900">
+              <a:spcBef>
+                <a:spcPts val="400"/>
+              </a:spcBef>
+              <a:buFont typeface="Wingdings" pitchFamily="2" charset="2"/>
+              <a:buChar char="Ø"/>
+            </a:pPr>
+            <a:endParaRPr lang="en-US" spc="-1" dirty="0">
+              <a:latin typeface="Gill Sans"/>
+              <a:ea typeface="Gill Sans"/>
+            </a:endParaRPr>
+          </a:p>
+          <a:p>
+            <a:pPr marL="444420" indent="-342900">
+              <a:spcBef>
+                <a:spcPts val="400"/>
+              </a:spcBef>
+              <a:buFont typeface="Wingdings" pitchFamily="2" charset="2"/>
+              <a:buChar char="Ø"/>
+            </a:pPr>
+            <a:r>
+              <a:rPr lang="en-US" spc="-1" dirty="0">
+                <a:latin typeface="Gill Sans"/>
+                <a:ea typeface="Gill Sans"/>
+              </a:rPr>
+              <a:t>Certificate Configuration Improvement</a:t>
+            </a:r>
+          </a:p>
+          <a:p>
+            <a:pPr marL="901620" lvl="1" indent="-342900">
+              <a:spcBef>
+                <a:spcPts val="400"/>
+              </a:spcBef>
+              <a:buFont typeface="Wingdings" pitchFamily="2" charset="2"/>
+              <a:buChar char="v"/>
+            </a:pPr>
+            <a:r>
+              <a:rPr lang="en-US" sz="1600" spc="-1" dirty="0">
+                <a:latin typeface="Gill Sans"/>
+                <a:ea typeface="Gill Sans"/>
+                <a:hlinkClick r:id="rId9"/>
+              </a:rPr>
+              <a:t>Add flexibility to define certificate for internal and external usage</a:t>
+            </a:r>
+            <a:endParaRPr lang="en-US" sz="1600" spc="-1" dirty="0">
+              <a:latin typeface="Gill Sans"/>
+              <a:ea typeface="Gill Sans"/>
+            </a:endParaRPr>
+          </a:p>
+          <a:p>
+            <a:pPr marL="901620" lvl="1" indent="-342900">
+              <a:spcBef>
+                <a:spcPts val="400"/>
+              </a:spcBef>
+              <a:buFont typeface="Wingdings" pitchFamily="2" charset="2"/>
+              <a:buChar char="v"/>
+            </a:pPr>
+            <a:r>
+              <a:rPr lang="en-US" sz="1600" spc="-1" dirty="0">
+                <a:latin typeface="Gill Sans"/>
+                <a:ea typeface="Gill Sans"/>
+                <a:hlinkClick r:id="rId10"/>
+              </a:rPr>
+              <a:t>Allow to define multiple domains / IPs as Subject Alternative Name (SAN) when storing certificate(s) in Keyring</a:t>
+            </a:r>
+            <a:endParaRPr lang="en-US" sz="1600" spc="-1" dirty="0">
+              <a:latin typeface="Gill Sans"/>
+              <a:ea typeface="Gill Sans"/>
+            </a:endParaRPr>
+          </a:p>
+        </p:txBody>
+      </p:sp>
+    </p:spTree>
+    <p:extLst>
+      <p:ext uri="{BB962C8B-B14F-4D97-AF65-F5344CB8AC3E}">
+        <p14:creationId xmlns:p14="http://schemas.microsoft.com/office/powerpoint/2010/main" val="259758416"/>
+      </p:ext>
+    </p:extLst>
+  </p:cSld>
+  <p:clrMapOvr>
+    <a:masterClrMapping/>
+  </p:clrMapOvr>
+  <p:transition spd="med">
+    <p:fade thruBlk="1"/>
+  </p:transition>
+  <p:timing>
+    <p:tnLst>
+      <p:par>
+        <p:cTn id="1" dur="indefinite" restart="never" nodeType="tmRoot">
+          <p:childTnLst>
+            <p:seq>
+              <p:cTn id="2" dur="indefinite" nodeType="mainSeq"/>
+              <p:prevCondLst>
+                <p:cond evt="onPrev" delay="0">
+                  <p:tgtEl>
+                    <p:sldTgt/>
+                  </p:tgtEl>
+                </p:cond>
+              </p:prevCondLst>
+              <p:nextCondLst>
+                <p:cond evt="onNext" delay="0">
+                  <p:tgtEl>
+                    <p:sldTgt/>
+                  </p:tgtEl>
+                </p:cond>
+              </p:nextCondLst>
+            </p:seq>
+          </p:childTnLst>
+        </p:cTn>
+      </p:par>
+    </p:tnLst>
+  </p:timing>
+</p:sld>
+</file>
+
+<file path=ppt/slides/slide9.xml><?xml version="1.0" encoding="utf-8"?>
+<p:sld xmlns:a="http://schemas.openxmlformats.org/drawingml/2006/main" xmlns:r="http://schemas.openxmlformats.org/officeDocument/2006/relationships" xmlns:p="http://schemas.openxmlformats.org/presentationml/2006/main">
+  <p:cSld>
+    <p:spTree>
+      <p:nvGrpSpPr>
+        <p:cNvPr id="1" name=""/>
+        <p:cNvGrpSpPr/>
+        <p:nvPr/>
+      </p:nvGrpSpPr>
+      <p:grpSpPr>
+        <a:xfrm>
+          <a:off x="0" y="0"/>
+          <a:ext cx="0" cy="0"/>
+          <a:chOff x="0" y="0"/>
+          <a:chExt cx="0" cy="0"/>
+        </a:xfrm>
+      </p:grpSpPr>
+      <p:sp>
+        <p:nvSpPr>
+          <p:cNvPr id="182" name="TextShape 1"/>
+          <p:cNvSpPr txBox="1"/>
+          <p:nvPr/>
+        </p:nvSpPr>
+        <p:spPr>
+          <a:xfrm>
+            <a:off x="334080" y="159480"/>
+            <a:ext cx="7893720" cy="447120"/>
+          </a:xfrm>
+          <a:prstGeom prst="rect">
+            <a:avLst/>
+          </a:prstGeom>
+          <a:noFill/>
+          <a:ln>
+            <a:noFill/>
+          </a:ln>
+        </p:spPr>
+        <p:txBody>
+          <a:bodyPr tIns="91440" bIns="91440" anchor="ctr">
+            <a:noAutofit/>
+          </a:bodyPr>
+          <a:lstStyle/>
+          <a:p>
+            <a:pPr>
               <a:lnSpc>
                 <a:spcPct val="100000"/>
               </a:lnSpc>
-              <a:spcBef>
-                <a:spcPts val="400"/>
-              </a:spcBef>
-              <a:buClr>
-                <a:srgbClr val="000000"/>
-              </a:buClr>
-              <a:buFont typeface="Arial"/>
-              <a:buChar char="•"/>
             </a:pPr>
             <a:r>
-              <a:rPr lang="en-US" sz="1800" b="0" strike="noStrike" spc="-1" dirty="0">
+              <a:rPr lang="en-US" sz="3000" spc="-1" dirty="0">
                 <a:solidFill>
-                  <a:srgbClr val="000000"/>
+                  <a:srgbClr val="262626"/>
                 </a:solidFill>
                 <a:latin typeface="Gill Sans"/>
                 <a:ea typeface="Gill Sans"/>
               </a:rPr>
-              <a:t>TBD</a:t>
+              <a:t>CI/CD – Extension Installation</a:t>
             </a:r>
-            <a:endParaRPr lang="en-US" sz="1600" b="0" strike="noStrike" spc="-1" dirty="0">
-              <a:solidFill>
-                <a:srgbClr val="000000"/>
-              </a:solidFill>
-              <a:latin typeface="Arial"/>
-            </a:endParaRPr>
+            <a:endParaRPr lang="en-US" sz="3000" b="0" strike="noStrike" spc="-1" dirty="0">
+              <a:solidFill>
+                <a:srgbClr val="000000"/>
+              </a:solidFill>
+              <a:latin typeface="Arial"/>
+            </a:endParaRPr>
+          </a:p>
+        </p:txBody>
+      </p:sp>
+      <p:sp>
+        <p:nvSpPr>
+          <p:cNvPr id="183" name="TextShape 2"/>
+          <p:cNvSpPr txBox="1"/>
+          <p:nvPr/>
+        </p:nvSpPr>
+        <p:spPr>
+          <a:xfrm>
+            <a:off x="405518" y="993913"/>
+            <a:ext cx="8269762" cy="3808676"/>
+          </a:xfrm>
+          <a:prstGeom prst="rect">
+            <a:avLst/>
+          </a:prstGeom>
+          <a:noFill/>
+          <a:ln>
+            <a:noFill/>
+          </a:ln>
+        </p:spPr>
+        <p:txBody>
+          <a:bodyPr tIns="91440" bIns="91440">
+            <a:noAutofit/>
+          </a:bodyPr>
+          <a:lstStyle/>
+          <a:p>
+            <a:pPr marL="387270" indent="-285750">
+              <a:spcBef>
+                <a:spcPts val="400"/>
+              </a:spcBef>
+              <a:buFont typeface="Wingdings" pitchFamily="2" charset="2"/>
+              <a:buChar char="Ø"/>
+            </a:pPr>
+            <a:r>
+              <a:rPr lang="en-US" spc="-1" dirty="0">
+                <a:latin typeface="Gill Sans"/>
+                <a:ea typeface="Gill Sans"/>
+                <a:hlinkClick r:id="rId3"/>
+              </a:rPr>
+              <a:t>Create extension installation script, playbook and test cases to validate installation</a:t>
+            </a:r>
+            <a:endParaRPr lang="en-US" spc="-1" dirty="0">
+              <a:latin typeface="Gill Sans"/>
+              <a:ea typeface="Gill Sans"/>
+            </a:endParaRPr>
+          </a:p>
+          <a:p>
+            <a:pPr marL="387270" indent="-285750">
+              <a:spcBef>
+                <a:spcPts val="400"/>
+              </a:spcBef>
+              <a:buFont typeface="Wingdings" pitchFamily="2" charset="2"/>
+              <a:buChar char="Ø"/>
+            </a:pPr>
+            <a:endParaRPr lang="en-US" spc="-1" dirty="0">
+              <a:latin typeface="Gill Sans"/>
+              <a:ea typeface="Gill Sans"/>
+            </a:endParaRPr>
+          </a:p>
+          <a:p>
+            <a:pPr marL="844470" lvl="1" indent="-285750">
+              <a:spcBef>
+                <a:spcPts val="400"/>
+              </a:spcBef>
+              <a:buFont typeface="Wingdings" pitchFamily="2" charset="2"/>
+              <a:buChar char="v"/>
+            </a:pPr>
+            <a:r>
+              <a:rPr lang="en-US" spc="-1" dirty="0">
+                <a:latin typeface="Gill Sans"/>
+                <a:ea typeface="Gill Sans"/>
+              </a:rPr>
+              <a:t>Create extension installation script</a:t>
+            </a:r>
+          </a:p>
+          <a:p>
+            <a:pPr marL="844470" lvl="1" indent="-285750">
+              <a:spcBef>
+                <a:spcPts val="400"/>
+              </a:spcBef>
+              <a:buFont typeface="Wingdings" pitchFamily="2" charset="2"/>
+              <a:buChar char="v"/>
+            </a:pPr>
+            <a:r>
+              <a:rPr lang="en-US" spc="-1" dirty="0">
+                <a:latin typeface="Gill Sans"/>
+                <a:ea typeface="Gill Sans"/>
+              </a:rPr>
+              <a:t>Create new Ansible playbook to install extension</a:t>
+            </a:r>
+          </a:p>
+          <a:p>
+            <a:pPr marL="844470" lvl="1" indent="-285750">
+              <a:spcBef>
+                <a:spcPts val="400"/>
+              </a:spcBef>
+              <a:buFont typeface="Wingdings" pitchFamily="2" charset="2"/>
+              <a:buChar char="v"/>
+            </a:pPr>
+            <a:r>
+              <a:rPr lang="en-US" spc="-1" dirty="0">
+                <a:latin typeface="Gill Sans"/>
+                <a:ea typeface="Gill Sans"/>
+              </a:rPr>
+              <a:t>Create new test cases which will validate extension installation</a:t>
+            </a:r>
           </a:p>
         </p:txBody>
       </p:sp>
     </p:spTree>
+    <p:extLst>
+      <p:ext uri="{BB962C8B-B14F-4D97-AF65-F5344CB8AC3E}">
+        <p14:creationId xmlns:p14="http://schemas.microsoft.com/office/powerpoint/2010/main" val="2730694854"/>
+      </p:ext>
+    </p:extLst>
   </p:cSld>
   <p:clrMapOvr>
     <a:masterClrMapping/>

</xml_diff>

<commit_message>
Add CI/CD objectives to ppt
</commit_message>
<xml_diff>
--- a/Project Management/PI Planning/20PI4 Planning/Zowe Community Squad Focus for 20PI4.pptx
+++ b/Project Management/PI Planning/20PI4 Planning/Zowe Community Squad Focus for 20PI4.pptx
@@ -1,6 +1,6 @@
 
 <file path=ppt/presentation.xml><?xml version="1.0" encoding="utf-8"?>
-<p:presentation xmlns:a="http://schemas.openxmlformats.org/drawingml/2006/main" xmlns:r="http://schemas.openxmlformats.org/officeDocument/2006/relationships" xmlns:p="http://schemas.openxmlformats.org/presentationml/2006/main">
+<p:presentation xmlns:a="http://schemas.openxmlformats.org/drawingml/2006/main" xmlns:r="http://schemas.openxmlformats.org/officeDocument/2006/relationships" xmlns:p="http://schemas.openxmlformats.org/presentationml/2006/main" saveSubsetFonts="1">
   <p:sldMasterIdLst>
     <p:sldMasterId id="2147483648" r:id="rId1"/>
     <p:sldMasterId id="2147483661" r:id="rId2"/>
@@ -8,7 +8,7 @@
     <p:sldMasterId id="2147483687" r:id="rId4"/>
   </p:sldMasterIdLst>
   <p:notesMasterIdLst>
-    <p:notesMasterId r:id="rId16"/>
+    <p:notesMasterId r:id="rId20"/>
   </p:notesMasterIdLst>
   <p:sldIdLst>
     <p:sldId id="256" r:id="rId5"/>
@@ -20,8 +20,12 @@
     <p:sldId id="267" r:id="rId11"/>
     <p:sldId id="268" r:id="rId12"/>
     <p:sldId id="269" r:id="rId13"/>
-    <p:sldId id="264" r:id="rId14"/>
-    <p:sldId id="265" r:id="rId15"/>
+    <p:sldId id="270" r:id="rId14"/>
+    <p:sldId id="271" r:id="rId15"/>
+    <p:sldId id="272" r:id="rId16"/>
+    <p:sldId id="273" r:id="rId17"/>
+    <p:sldId id="264" r:id="rId18"/>
+    <p:sldId id="265" r:id="rId19"/>
   </p:sldIdLst>
   <p:sldSz cx="9144000" cy="5143500" type="screen16x9"/>
   <p:notesSz cx="6858000" cy="9144000"/>
@@ -1048,6 +1052,670 @@
 </file>
 
 <file path=ppt/notesSlides/notesSlide5.xml><?xml version="1.0" encoding="utf-8"?>
+<p:notes xmlns:a="http://schemas.openxmlformats.org/drawingml/2006/main" xmlns:r="http://schemas.openxmlformats.org/officeDocument/2006/relationships" xmlns:p="http://schemas.openxmlformats.org/presentationml/2006/main">
+  <p:cSld>
+    <p:spTree>
+      <p:nvGrpSpPr>
+        <p:cNvPr id="1" name=""/>
+        <p:cNvGrpSpPr/>
+        <p:nvPr/>
+      </p:nvGrpSpPr>
+      <p:grpSpPr>
+        <a:xfrm>
+          <a:off x="0" y="0"/>
+          <a:ext cx="0" cy="0"/>
+          <a:chOff x="0" y="0"/>
+          <a:chExt cx="0" cy="0"/>
+        </a:xfrm>
+      </p:grpSpPr>
+      <p:sp>
+        <p:nvSpPr>
+          <p:cNvPr id="243" name="PlaceHolder 1"/>
+          <p:cNvSpPr>
+            <a:spLocks noGrp="1" noRot="1" noChangeAspect="1"/>
+          </p:cNvSpPr>
+          <p:nvPr>
+            <p:ph type="sldImg"/>
+          </p:nvPr>
+        </p:nvSpPr>
+        <p:spPr>
+          <a:xfrm>
+            <a:off x="381000" y="685800"/>
+            <a:ext cx="6096000" cy="3429000"/>
+          </a:xfrm>
+          <a:prstGeom prst="rect">
+            <a:avLst/>
+          </a:prstGeom>
+        </p:spPr>
+      </p:sp>
+      <p:sp>
+        <p:nvSpPr>
+          <p:cNvPr id="244" name="PlaceHolder 2"/>
+          <p:cNvSpPr>
+            <a:spLocks noGrp="1"/>
+          </p:cNvSpPr>
+          <p:nvPr>
+            <p:ph type="body"/>
+          </p:nvPr>
+        </p:nvSpPr>
+        <p:spPr>
+          <a:xfrm>
+            <a:off x="685800" y="4343400"/>
+            <a:ext cx="5486040" cy="4114440"/>
+          </a:xfrm>
+          <a:prstGeom prst="rect">
+            <a:avLst/>
+          </a:prstGeom>
+        </p:spPr>
+        <p:txBody>
+          <a:bodyPr tIns="91440" bIns="91440">
+            <a:noAutofit/>
+          </a:bodyPr>
+          <a:lstStyle/>
+          <a:p>
+            <a:pPr marL="158760">
+              <a:lnSpc>
+                <a:spcPct val="100000"/>
+              </a:lnSpc>
+            </a:pPr>
+            <a:r>
+              <a:rPr lang="en-US" sz="1100" b="0" strike="noStrike" spc="-1">
+                <a:solidFill>
+                  <a:srgbClr val="000000"/>
+                </a:solidFill>
+                <a:latin typeface="Arial"/>
+                <a:ea typeface="Arial"/>
+              </a:rPr>
+              <a:t>Notes: </a:t>
+            </a:r>
+            <a:endParaRPr lang="en-US" sz="1100" b="0" strike="noStrike" spc="-1">
+              <a:latin typeface="Arial"/>
+            </a:endParaRPr>
+          </a:p>
+          <a:p>
+            <a:pPr marL="158760">
+              <a:lnSpc>
+                <a:spcPct val="100000"/>
+              </a:lnSpc>
+            </a:pPr>
+            <a:r>
+              <a:rPr lang="en-US" sz="1100" b="0" strike="noStrike" spc="-1">
+                <a:solidFill>
+                  <a:srgbClr val="000000"/>
+                </a:solidFill>
+                <a:latin typeface="Arial"/>
+                <a:ea typeface="Arial"/>
+              </a:rPr>
+              <a:t>x.509 is one of the  industry standard ways of authenticating to backend services</a:t>
+            </a:r>
+            <a:endParaRPr lang="en-US" sz="1100" b="0" strike="noStrike" spc="-1">
+              <a:latin typeface="Arial"/>
+            </a:endParaRPr>
+          </a:p>
+          <a:p>
+            <a:pPr marL="158760">
+              <a:lnSpc>
+                <a:spcPct val="100000"/>
+              </a:lnSpc>
+            </a:pPr>
+            <a:r>
+              <a:rPr lang="en-US" sz="1100" b="0" strike="noStrike" spc="-1">
+                <a:solidFill>
+                  <a:srgbClr val="000000"/>
+                </a:solidFill>
+                <a:latin typeface="Arial"/>
+                <a:ea typeface="Arial"/>
+              </a:rPr>
+              <a:t>Zowe Client apps will need to be updated to support client certs</a:t>
+            </a:r>
+            <a:endParaRPr lang="en-US" sz="1100" b="0" strike="noStrike" spc="-1">
+              <a:latin typeface="Arial"/>
+            </a:endParaRPr>
+          </a:p>
+          <a:p>
+            <a:pPr marL="158760">
+              <a:lnSpc>
+                <a:spcPct val="100000"/>
+              </a:lnSpc>
+            </a:pPr>
+            <a:r>
+              <a:rPr lang="en-US" sz="1100" b="0" strike="noStrike" spc="-1">
+                <a:solidFill>
+                  <a:srgbClr val="000000"/>
+                </a:solidFill>
+                <a:latin typeface="Arial"/>
+                <a:ea typeface="Arial"/>
+              </a:rPr>
+              <a:t>Customer apps may have their own way of supporting client certs</a:t>
+            </a:r>
+            <a:endParaRPr lang="en-US" sz="1100" b="0" strike="noStrike" spc="-1">
+              <a:latin typeface="Arial"/>
+            </a:endParaRPr>
+          </a:p>
+          <a:p>
+            <a:pPr marL="158760">
+              <a:lnSpc>
+                <a:spcPct val="100000"/>
+              </a:lnSpc>
+            </a:pPr>
+            <a:endParaRPr lang="en-US" sz="1100" b="0" strike="noStrike" spc="-1">
+              <a:latin typeface="Arial"/>
+            </a:endParaRPr>
+          </a:p>
+        </p:txBody>
+      </p:sp>
+    </p:spTree>
+    <p:extLst>
+      <p:ext uri="{BB962C8B-B14F-4D97-AF65-F5344CB8AC3E}">
+        <p14:creationId xmlns:p14="http://schemas.microsoft.com/office/powerpoint/2010/main" val="1361380048"/>
+      </p:ext>
+    </p:extLst>
+  </p:cSld>
+  <p:clrMapOvr>
+    <a:masterClrMapping/>
+  </p:clrMapOvr>
+</p:notes>
+</file>
+
+<file path=ppt/notesSlides/notesSlide6.xml><?xml version="1.0" encoding="utf-8"?>
+<p:notes xmlns:a="http://schemas.openxmlformats.org/drawingml/2006/main" xmlns:r="http://schemas.openxmlformats.org/officeDocument/2006/relationships" xmlns:p="http://schemas.openxmlformats.org/presentationml/2006/main">
+  <p:cSld>
+    <p:spTree>
+      <p:nvGrpSpPr>
+        <p:cNvPr id="1" name=""/>
+        <p:cNvGrpSpPr/>
+        <p:nvPr/>
+      </p:nvGrpSpPr>
+      <p:grpSpPr>
+        <a:xfrm>
+          <a:off x="0" y="0"/>
+          <a:ext cx="0" cy="0"/>
+          <a:chOff x="0" y="0"/>
+          <a:chExt cx="0" cy="0"/>
+        </a:xfrm>
+      </p:grpSpPr>
+      <p:sp>
+        <p:nvSpPr>
+          <p:cNvPr id="243" name="PlaceHolder 1"/>
+          <p:cNvSpPr>
+            <a:spLocks noGrp="1" noRot="1" noChangeAspect="1"/>
+          </p:cNvSpPr>
+          <p:nvPr>
+            <p:ph type="sldImg"/>
+          </p:nvPr>
+        </p:nvSpPr>
+        <p:spPr>
+          <a:xfrm>
+            <a:off x="381000" y="685800"/>
+            <a:ext cx="6096000" cy="3429000"/>
+          </a:xfrm>
+          <a:prstGeom prst="rect">
+            <a:avLst/>
+          </a:prstGeom>
+        </p:spPr>
+      </p:sp>
+      <p:sp>
+        <p:nvSpPr>
+          <p:cNvPr id="244" name="PlaceHolder 2"/>
+          <p:cNvSpPr>
+            <a:spLocks noGrp="1"/>
+          </p:cNvSpPr>
+          <p:nvPr>
+            <p:ph type="body"/>
+          </p:nvPr>
+        </p:nvSpPr>
+        <p:spPr>
+          <a:xfrm>
+            <a:off x="685800" y="4343400"/>
+            <a:ext cx="5486040" cy="4114440"/>
+          </a:xfrm>
+          <a:prstGeom prst="rect">
+            <a:avLst/>
+          </a:prstGeom>
+        </p:spPr>
+        <p:txBody>
+          <a:bodyPr tIns="91440" bIns="91440">
+            <a:noAutofit/>
+          </a:bodyPr>
+          <a:lstStyle/>
+          <a:p>
+            <a:pPr marL="158760">
+              <a:lnSpc>
+                <a:spcPct val="100000"/>
+              </a:lnSpc>
+            </a:pPr>
+            <a:r>
+              <a:rPr lang="en-US" sz="1100" b="0" strike="noStrike" spc="-1">
+                <a:solidFill>
+                  <a:srgbClr val="000000"/>
+                </a:solidFill>
+                <a:latin typeface="Arial"/>
+                <a:ea typeface="Arial"/>
+              </a:rPr>
+              <a:t>Notes: </a:t>
+            </a:r>
+            <a:endParaRPr lang="en-US" sz="1100" b="0" strike="noStrike" spc="-1">
+              <a:latin typeface="Arial"/>
+            </a:endParaRPr>
+          </a:p>
+          <a:p>
+            <a:pPr marL="158760">
+              <a:lnSpc>
+                <a:spcPct val="100000"/>
+              </a:lnSpc>
+            </a:pPr>
+            <a:r>
+              <a:rPr lang="en-US" sz="1100" b="0" strike="noStrike" spc="-1">
+                <a:solidFill>
+                  <a:srgbClr val="000000"/>
+                </a:solidFill>
+                <a:latin typeface="Arial"/>
+                <a:ea typeface="Arial"/>
+              </a:rPr>
+              <a:t>x.509 is one of the  industry standard ways of authenticating to backend services</a:t>
+            </a:r>
+            <a:endParaRPr lang="en-US" sz="1100" b="0" strike="noStrike" spc="-1">
+              <a:latin typeface="Arial"/>
+            </a:endParaRPr>
+          </a:p>
+          <a:p>
+            <a:pPr marL="158760">
+              <a:lnSpc>
+                <a:spcPct val="100000"/>
+              </a:lnSpc>
+            </a:pPr>
+            <a:r>
+              <a:rPr lang="en-US" sz="1100" b="0" strike="noStrike" spc="-1">
+                <a:solidFill>
+                  <a:srgbClr val="000000"/>
+                </a:solidFill>
+                <a:latin typeface="Arial"/>
+                <a:ea typeface="Arial"/>
+              </a:rPr>
+              <a:t>Zowe Client apps will need to be updated to support client certs</a:t>
+            </a:r>
+            <a:endParaRPr lang="en-US" sz="1100" b="0" strike="noStrike" spc="-1">
+              <a:latin typeface="Arial"/>
+            </a:endParaRPr>
+          </a:p>
+          <a:p>
+            <a:pPr marL="158760">
+              <a:lnSpc>
+                <a:spcPct val="100000"/>
+              </a:lnSpc>
+            </a:pPr>
+            <a:r>
+              <a:rPr lang="en-US" sz="1100" b="0" strike="noStrike" spc="-1">
+                <a:solidFill>
+                  <a:srgbClr val="000000"/>
+                </a:solidFill>
+                <a:latin typeface="Arial"/>
+                <a:ea typeface="Arial"/>
+              </a:rPr>
+              <a:t>Customer apps may have their own way of supporting client certs</a:t>
+            </a:r>
+            <a:endParaRPr lang="en-US" sz="1100" b="0" strike="noStrike" spc="-1">
+              <a:latin typeface="Arial"/>
+            </a:endParaRPr>
+          </a:p>
+          <a:p>
+            <a:pPr marL="158760">
+              <a:lnSpc>
+                <a:spcPct val="100000"/>
+              </a:lnSpc>
+            </a:pPr>
+            <a:endParaRPr lang="en-US" sz="1100" b="0" strike="noStrike" spc="-1">
+              <a:latin typeface="Arial"/>
+            </a:endParaRPr>
+          </a:p>
+        </p:txBody>
+      </p:sp>
+    </p:spTree>
+    <p:extLst>
+      <p:ext uri="{BB962C8B-B14F-4D97-AF65-F5344CB8AC3E}">
+        <p14:creationId xmlns:p14="http://schemas.microsoft.com/office/powerpoint/2010/main" val="1361380048"/>
+      </p:ext>
+    </p:extLst>
+  </p:cSld>
+  <p:clrMapOvr>
+    <a:masterClrMapping/>
+  </p:clrMapOvr>
+</p:notes>
+</file>
+
+<file path=ppt/notesSlides/notesSlide7.xml><?xml version="1.0" encoding="utf-8"?>
+<p:notes xmlns:a="http://schemas.openxmlformats.org/drawingml/2006/main" xmlns:r="http://schemas.openxmlformats.org/officeDocument/2006/relationships" xmlns:p="http://schemas.openxmlformats.org/presentationml/2006/main">
+  <p:cSld>
+    <p:spTree>
+      <p:nvGrpSpPr>
+        <p:cNvPr id="1" name=""/>
+        <p:cNvGrpSpPr/>
+        <p:nvPr/>
+      </p:nvGrpSpPr>
+      <p:grpSpPr>
+        <a:xfrm>
+          <a:off x="0" y="0"/>
+          <a:ext cx="0" cy="0"/>
+          <a:chOff x="0" y="0"/>
+          <a:chExt cx="0" cy="0"/>
+        </a:xfrm>
+      </p:grpSpPr>
+      <p:sp>
+        <p:nvSpPr>
+          <p:cNvPr id="243" name="PlaceHolder 1"/>
+          <p:cNvSpPr>
+            <a:spLocks noGrp="1" noRot="1" noChangeAspect="1"/>
+          </p:cNvSpPr>
+          <p:nvPr>
+            <p:ph type="sldImg"/>
+          </p:nvPr>
+        </p:nvSpPr>
+        <p:spPr>
+          <a:xfrm>
+            <a:off x="381000" y="685800"/>
+            <a:ext cx="6096000" cy="3429000"/>
+          </a:xfrm>
+          <a:prstGeom prst="rect">
+            <a:avLst/>
+          </a:prstGeom>
+        </p:spPr>
+      </p:sp>
+      <p:sp>
+        <p:nvSpPr>
+          <p:cNvPr id="244" name="PlaceHolder 2"/>
+          <p:cNvSpPr>
+            <a:spLocks noGrp="1"/>
+          </p:cNvSpPr>
+          <p:nvPr>
+            <p:ph type="body"/>
+          </p:nvPr>
+        </p:nvSpPr>
+        <p:spPr>
+          <a:xfrm>
+            <a:off x="685800" y="4343400"/>
+            <a:ext cx="5486040" cy="4114440"/>
+          </a:xfrm>
+          <a:prstGeom prst="rect">
+            <a:avLst/>
+          </a:prstGeom>
+        </p:spPr>
+        <p:txBody>
+          <a:bodyPr tIns="91440" bIns="91440">
+            <a:noAutofit/>
+          </a:bodyPr>
+          <a:lstStyle/>
+          <a:p>
+            <a:pPr marL="158760">
+              <a:lnSpc>
+                <a:spcPct val="100000"/>
+              </a:lnSpc>
+            </a:pPr>
+            <a:r>
+              <a:rPr lang="en-US" sz="1100" b="0" strike="noStrike" spc="-1">
+                <a:solidFill>
+                  <a:srgbClr val="000000"/>
+                </a:solidFill>
+                <a:latin typeface="Arial"/>
+                <a:ea typeface="Arial"/>
+              </a:rPr>
+              <a:t>Notes: </a:t>
+            </a:r>
+            <a:endParaRPr lang="en-US" sz="1100" b="0" strike="noStrike" spc="-1">
+              <a:latin typeface="Arial"/>
+            </a:endParaRPr>
+          </a:p>
+          <a:p>
+            <a:pPr marL="158760">
+              <a:lnSpc>
+                <a:spcPct val="100000"/>
+              </a:lnSpc>
+            </a:pPr>
+            <a:r>
+              <a:rPr lang="en-US" sz="1100" b="0" strike="noStrike" spc="-1">
+                <a:solidFill>
+                  <a:srgbClr val="000000"/>
+                </a:solidFill>
+                <a:latin typeface="Arial"/>
+                <a:ea typeface="Arial"/>
+              </a:rPr>
+              <a:t>x.509 is one of the  industry standard ways of authenticating to backend services</a:t>
+            </a:r>
+            <a:endParaRPr lang="en-US" sz="1100" b="0" strike="noStrike" spc="-1">
+              <a:latin typeface="Arial"/>
+            </a:endParaRPr>
+          </a:p>
+          <a:p>
+            <a:pPr marL="158760">
+              <a:lnSpc>
+                <a:spcPct val="100000"/>
+              </a:lnSpc>
+            </a:pPr>
+            <a:r>
+              <a:rPr lang="en-US" sz="1100" b="0" strike="noStrike" spc="-1">
+                <a:solidFill>
+                  <a:srgbClr val="000000"/>
+                </a:solidFill>
+                <a:latin typeface="Arial"/>
+                <a:ea typeface="Arial"/>
+              </a:rPr>
+              <a:t>Zowe Client apps will need to be updated to support client certs</a:t>
+            </a:r>
+            <a:endParaRPr lang="en-US" sz="1100" b="0" strike="noStrike" spc="-1">
+              <a:latin typeface="Arial"/>
+            </a:endParaRPr>
+          </a:p>
+          <a:p>
+            <a:pPr marL="158760">
+              <a:lnSpc>
+                <a:spcPct val="100000"/>
+              </a:lnSpc>
+            </a:pPr>
+            <a:r>
+              <a:rPr lang="en-US" sz="1100" b="0" strike="noStrike" spc="-1">
+                <a:solidFill>
+                  <a:srgbClr val="000000"/>
+                </a:solidFill>
+                <a:latin typeface="Arial"/>
+                <a:ea typeface="Arial"/>
+              </a:rPr>
+              <a:t>Customer apps may have their own way of supporting client certs</a:t>
+            </a:r>
+            <a:endParaRPr lang="en-US" sz="1100" b="0" strike="noStrike" spc="-1">
+              <a:latin typeface="Arial"/>
+            </a:endParaRPr>
+          </a:p>
+          <a:p>
+            <a:pPr marL="158760">
+              <a:lnSpc>
+                <a:spcPct val="100000"/>
+              </a:lnSpc>
+            </a:pPr>
+            <a:endParaRPr lang="en-US" sz="1100" b="0" strike="noStrike" spc="-1">
+              <a:latin typeface="Arial"/>
+            </a:endParaRPr>
+          </a:p>
+        </p:txBody>
+      </p:sp>
+    </p:spTree>
+    <p:extLst>
+      <p:ext uri="{BB962C8B-B14F-4D97-AF65-F5344CB8AC3E}">
+        <p14:creationId xmlns:p14="http://schemas.microsoft.com/office/powerpoint/2010/main" val="1361380048"/>
+      </p:ext>
+    </p:extLst>
+  </p:cSld>
+  <p:clrMapOvr>
+    <a:masterClrMapping/>
+  </p:clrMapOvr>
+</p:notes>
+</file>
+
+<file path=ppt/notesSlides/notesSlide8.xml><?xml version="1.0" encoding="utf-8"?>
+<p:notes xmlns:a="http://schemas.openxmlformats.org/drawingml/2006/main" xmlns:r="http://schemas.openxmlformats.org/officeDocument/2006/relationships" xmlns:p="http://schemas.openxmlformats.org/presentationml/2006/main">
+  <p:cSld>
+    <p:spTree>
+      <p:nvGrpSpPr>
+        <p:cNvPr id="1" name=""/>
+        <p:cNvGrpSpPr/>
+        <p:nvPr/>
+      </p:nvGrpSpPr>
+      <p:grpSpPr>
+        <a:xfrm>
+          <a:off x="0" y="0"/>
+          <a:ext cx="0" cy="0"/>
+          <a:chOff x="0" y="0"/>
+          <a:chExt cx="0" cy="0"/>
+        </a:xfrm>
+      </p:grpSpPr>
+      <p:sp>
+        <p:nvSpPr>
+          <p:cNvPr id="243" name="PlaceHolder 1"/>
+          <p:cNvSpPr>
+            <a:spLocks noGrp="1" noRot="1" noChangeAspect="1"/>
+          </p:cNvSpPr>
+          <p:nvPr>
+            <p:ph type="sldImg"/>
+          </p:nvPr>
+        </p:nvSpPr>
+        <p:spPr>
+          <a:xfrm>
+            <a:off x="381000" y="685800"/>
+            <a:ext cx="6096000" cy="3429000"/>
+          </a:xfrm>
+          <a:prstGeom prst="rect">
+            <a:avLst/>
+          </a:prstGeom>
+        </p:spPr>
+      </p:sp>
+      <p:sp>
+        <p:nvSpPr>
+          <p:cNvPr id="244" name="PlaceHolder 2"/>
+          <p:cNvSpPr>
+            <a:spLocks noGrp="1"/>
+          </p:cNvSpPr>
+          <p:nvPr>
+            <p:ph type="body"/>
+          </p:nvPr>
+        </p:nvSpPr>
+        <p:spPr>
+          <a:xfrm>
+            <a:off x="685800" y="4343400"/>
+            <a:ext cx="5486040" cy="4114440"/>
+          </a:xfrm>
+          <a:prstGeom prst="rect">
+            <a:avLst/>
+          </a:prstGeom>
+        </p:spPr>
+        <p:txBody>
+          <a:bodyPr tIns="91440" bIns="91440">
+            <a:noAutofit/>
+          </a:bodyPr>
+          <a:lstStyle/>
+          <a:p>
+            <a:pPr marL="158760">
+              <a:lnSpc>
+                <a:spcPct val="100000"/>
+              </a:lnSpc>
+            </a:pPr>
+            <a:r>
+              <a:rPr lang="en-US" sz="1100" b="0" strike="noStrike" spc="-1">
+                <a:solidFill>
+                  <a:srgbClr val="000000"/>
+                </a:solidFill>
+                <a:latin typeface="Arial"/>
+                <a:ea typeface="Arial"/>
+              </a:rPr>
+              <a:t>Notes: </a:t>
+            </a:r>
+            <a:endParaRPr lang="en-US" sz="1100" b="0" strike="noStrike" spc="-1">
+              <a:latin typeface="Arial"/>
+            </a:endParaRPr>
+          </a:p>
+          <a:p>
+            <a:pPr marL="158760">
+              <a:lnSpc>
+                <a:spcPct val="100000"/>
+              </a:lnSpc>
+            </a:pPr>
+            <a:r>
+              <a:rPr lang="en-US" sz="1100" b="0" strike="noStrike" spc="-1">
+                <a:solidFill>
+                  <a:srgbClr val="000000"/>
+                </a:solidFill>
+                <a:latin typeface="Arial"/>
+                <a:ea typeface="Arial"/>
+              </a:rPr>
+              <a:t>x.509 is one of the  industry standard ways of authenticating to backend services</a:t>
+            </a:r>
+            <a:endParaRPr lang="en-US" sz="1100" b="0" strike="noStrike" spc="-1">
+              <a:latin typeface="Arial"/>
+            </a:endParaRPr>
+          </a:p>
+          <a:p>
+            <a:pPr marL="158760">
+              <a:lnSpc>
+                <a:spcPct val="100000"/>
+              </a:lnSpc>
+            </a:pPr>
+            <a:r>
+              <a:rPr lang="en-US" sz="1100" b="0" strike="noStrike" spc="-1">
+                <a:solidFill>
+                  <a:srgbClr val="000000"/>
+                </a:solidFill>
+                <a:latin typeface="Arial"/>
+                <a:ea typeface="Arial"/>
+              </a:rPr>
+              <a:t>Zowe Client apps will need to be updated to support client certs</a:t>
+            </a:r>
+            <a:endParaRPr lang="en-US" sz="1100" b="0" strike="noStrike" spc="-1">
+              <a:latin typeface="Arial"/>
+            </a:endParaRPr>
+          </a:p>
+          <a:p>
+            <a:pPr marL="158760">
+              <a:lnSpc>
+                <a:spcPct val="100000"/>
+              </a:lnSpc>
+            </a:pPr>
+            <a:r>
+              <a:rPr lang="en-US" sz="1100" b="0" strike="noStrike" spc="-1">
+                <a:solidFill>
+                  <a:srgbClr val="000000"/>
+                </a:solidFill>
+                <a:latin typeface="Arial"/>
+                <a:ea typeface="Arial"/>
+              </a:rPr>
+              <a:t>Customer apps may have their own way of supporting client certs</a:t>
+            </a:r>
+            <a:endParaRPr lang="en-US" sz="1100" b="0" strike="noStrike" spc="-1">
+              <a:latin typeface="Arial"/>
+            </a:endParaRPr>
+          </a:p>
+          <a:p>
+            <a:pPr marL="158760">
+              <a:lnSpc>
+                <a:spcPct val="100000"/>
+              </a:lnSpc>
+            </a:pPr>
+            <a:endParaRPr lang="en-US" sz="1100" b="0" strike="noStrike" spc="-1">
+              <a:latin typeface="Arial"/>
+            </a:endParaRPr>
+          </a:p>
+        </p:txBody>
+      </p:sp>
+    </p:spTree>
+    <p:extLst>
+      <p:ext uri="{BB962C8B-B14F-4D97-AF65-F5344CB8AC3E}">
+        <p14:creationId xmlns:p14="http://schemas.microsoft.com/office/powerpoint/2010/main" val="1361380048"/>
+      </p:ext>
+    </p:extLst>
+  </p:cSld>
+  <p:clrMapOvr>
+    <a:masterClrMapping/>
+  </p:clrMapOvr>
+</p:notes>
+</file>
+
+<file path=ppt/notesSlides/notesSlide9.xml><?xml version="1.0" encoding="utf-8"?>
 <p:notes xmlns:a="http://schemas.openxmlformats.org/drawingml/2006/main" xmlns:r="http://schemas.openxmlformats.org/officeDocument/2006/relationships" xmlns:p="http://schemas.openxmlformats.org/presentationml/2006/main">
   <p:cSld>
     <p:spTree>
@@ -10128,6 +10796,1380 @@
       </p:grpSpPr>
       <p:sp>
         <p:nvSpPr>
+          <p:cNvPr id="182" name="TextShape 1"/>
+          <p:cNvSpPr txBox="1"/>
+          <p:nvPr/>
+        </p:nvSpPr>
+        <p:spPr>
+          <a:xfrm>
+            <a:off x="334080" y="159480"/>
+            <a:ext cx="7893720" cy="447120"/>
+          </a:xfrm>
+          <a:prstGeom prst="rect">
+            <a:avLst/>
+          </a:prstGeom>
+          <a:noFill/>
+          <a:ln>
+            <a:noFill/>
+          </a:ln>
+        </p:spPr>
+        <p:txBody>
+          <a:bodyPr tIns="91440" bIns="91440" anchor="ctr">
+            <a:noAutofit/>
+          </a:bodyPr>
+          <a:lstStyle/>
+          <a:p>
+            <a:pPr>
+              <a:lnSpc>
+                <a:spcPct val="100000"/>
+              </a:lnSpc>
+            </a:pPr>
+            <a:r>
+              <a:rPr lang="en-US" sz="3000" spc="-1" dirty="0">
+                <a:solidFill>
+                  <a:srgbClr val="262626"/>
+                </a:solidFill>
+                <a:latin typeface="Gill Sans"/>
+                <a:ea typeface="Gill Sans"/>
+              </a:rPr>
+              <a:t>CI/CD – </a:t>
+            </a:r>
+            <a:r>
+              <a:rPr lang="en-GB" sz="3200" dirty="0">
+                <a:solidFill>
+                  <a:srgbClr val="222222"/>
+                </a:solidFill>
+                <a:effectLst/>
+                <a:latin typeface="Lato"/>
+              </a:rPr>
+              <a:t>Automated testing catch-up</a:t>
+            </a:r>
+            <a:endParaRPr lang="en-US" sz="3000" b="0" strike="noStrike" spc="-1" dirty="0">
+              <a:solidFill>
+                <a:srgbClr val="000000"/>
+              </a:solidFill>
+              <a:latin typeface="Arial"/>
+            </a:endParaRPr>
+          </a:p>
+        </p:txBody>
+      </p:sp>
+      <p:sp>
+        <p:nvSpPr>
+          <p:cNvPr id="183" name="TextShape 2"/>
+          <p:cNvSpPr txBox="1"/>
+          <p:nvPr/>
+        </p:nvSpPr>
+        <p:spPr>
+          <a:xfrm>
+            <a:off x="405518" y="993913"/>
+            <a:ext cx="8269762" cy="3808676"/>
+          </a:xfrm>
+          <a:prstGeom prst="rect">
+            <a:avLst/>
+          </a:prstGeom>
+          <a:noFill/>
+          <a:ln>
+            <a:noFill/>
+          </a:ln>
+        </p:spPr>
+        <p:txBody>
+          <a:bodyPr tIns="91440" bIns="91440">
+            <a:noAutofit/>
+          </a:bodyPr>
+          <a:lstStyle/>
+          <a:p>
+            <a:pPr marL="387270" indent="-285750">
+              <a:spcBef>
+                <a:spcPts val="400"/>
+              </a:spcBef>
+              <a:buFont typeface="Wingdings" pitchFamily="2" charset="2"/>
+              <a:buChar char="Ø"/>
+            </a:pPr>
+            <a:r>
+              <a:rPr lang="en-GB" dirty="0">
+                <a:solidFill>
+                  <a:srgbClr val="222222"/>
+                </a:solidFill>
+                <a:effectLst/>
+                <a:latin typeface="Lato"/>
+              </a:rPr>
+              <a:t>Decide on and complete what testing we require for keyrings and </a:t>
+            </a:r>
+            <a:r>
+              <a:rPr lang="en-GB" dirty="0" err="1">
+                <a:solidFill>
+                  <a:srgbClr val="222222"/>
+                </a:solidFill>
+                <a:effectLst/>
+                <a:latin typeface="Lato"/>
+              </a:rPr>
+              <a:t>uss</a:t>
+            </a:r>
+            <a:r>
+              <a:rPr lang="en-GB" dirty="0">
+                <a:solidFill>
+                  <a:srgbClr val="222222"/>
+                </a:solidFill>
+                <a:effectLst/>
+                <a:latin typeface="Lato"/>
+              </a:rPr>
+              <a:t> certificates </a:t>
+            </a:r>
+          </a:p>
+          <a:p>
+            <a:pPr marL="844470" lvl="1" indent="-285750">
+              <a:spcBef>
+                <a:spcPts val="400"/>
+              </a:spcBef>
+              <a:buFont typeface="Arial" panose="020B0604020202020204" pitchFamily="34" charset="0"/>
+              <a:buChar char="•"/>
+            </a:pPr>
+            <a:r>
+              <a:rPr lang="en-GB" sz="1600" dirty="0">
+                <a:solidFill>
+                  <a:srgbClr val="222222"/>
+                </a:solidFill>
+                <a:effectLst/>
+                <a:latin typeface="Lato"/>
+              </a:rPr>
+              <a:t>(eg better TSS and ACF2 support for keyrings, more certificate scenarios like importing external certificates)</a:t>
+            </a:r>
+          </a:p>
+          <a:p>
+            <a:pPr marL="387270" indent="-285750">
+              <a:spcBef>
+                <a:spcPts val="400"/>
+              </a:spcBef>
+              <a:buFont typeface="Wingdings" pitchFamily="2" charset="2"/>
+              <a:buChar char="Ø"/>
+            </a:pPr>
+            <a:endParaRPr lang="en-GB" sz="1600" spc="-1" dirty="0">
+              <a:solidFill>
+                <a:srgbClr val="222222"/>
+              </a:solidFill>
+              <a:latin typeface="Lato"/>
+              <a:ea typeface="Gill Sans"/>
+            </a:endParaRPr>
+          </a:p>
+          <a:p>
+            <a:pPr marL="387270" indent="-285750">
+              <a:spcBef>
+                <a:spcPts val="400"/>
+              </a:spcBef>
+              <a:buFont typeface="Wingdings" pitchFamily="2" charset="2"/>
+              <a:buChar char="Ø"/>
+            </a:pPr>
+            <a:r>
+              <a:rPr lang="en-GB" dirty="0" err="1">
+                <a:solidFill>
+                  <a:srgbClr val="222222"/>
+                </a:solidFill>
+                <a:effectLst/>
+                <a:latin typeface="Lato"/>
+              </a:rPr>
+              <a:t>zlux</a:t>
+            </a:r>
+            <a:r>
+              <a:rPr lang="en-GB" dirty="0">
+                <a:solidFill>
+                  <a:srgbClr val="222222"/>
+                </a:solidFill>
+                <a:effectLst/>
+                <a:latin typeface="Lato"/>
+              </a:rPr>
+              <a:t> and </a:t>
+            </a:r>
+            <a:r>
+              <a:rPr lang="en-GB" dirty="0" err="1">
+                <a:solidFill>
+                  <a:srgbClr val="222222"/>
+                </a:solidFill>
+                <a:effectLst/>
+                <a:latin typeface="Lato"/>
+              </a:rPr>
+              <a:t>apiml</a:t>
+            </a:r>
+            <a:r>
+              <a:rPr lang="en-GB" dirty="0">
+                <a:solidFill>
+                  <a:srgbClr val="222222"/>
+                </a:solidFill>
+                <a:effectLst/>
+                <a:latin typeface="Lato"/>
+              </a:rPr>
+              <a:t> component testing into open source</a:t>
+            </a:r>
+          </a:p>
+          <a:p>
+            <a:pPr marL="387270" indent="-285750">
+              <a:spcBef>
+                <a:spcPts val="400"/>
+              </a:spcBef>
+              <a:buFont typeface="Wingdings" pitchFamily="2" charset="2"/>
+              <a:buChar char="Ø"/>
+            </a:pPr>
+            <a:endParaRPr lang="en-GB" spc="-1" dirty="0">
+              <a:solidFill>
+                <a:srgbClr val="222222"/>
+              </a:solidFill>
+              <a:latin typeface="Lato"/>
+              <a:ea typeface="Gill Sans"/>
+            </a:endParaRPr>
+          </a:p>
+          <a:p>
+            <a:pPr marL="387270" indent="-285750">
+              <a:spcBef>
+                <a:spcPts val="400"/>
+              </a:spcBef>
+              <a:buFont typeface="Wingdings" pitchFamily="2" charset="2"/>
+              <a:buChar char="Ø"/>
+            </a:pPr>
+            <a:r>
+              <a:rPr lang="en-GB" dirty="0">
+                <a:solidFill>
+                  <a:srgbClr val="222222"/>
+                </a:solidFill>
+                <a:effectLst/>
+                <a:latin typeface="Lato"/>
+              </a:rPr>
+              <a:t>Support ACF2 and TSS with the </a:t>
+            </a:r>
+            <a:r>
+              <a:rPr lang="en-GB" dirty="0" err="1">
+                <a:solidFill>
+                  <a:srgbClr val="222222"/>
+                </a:solidFill>
+                <a:effectLst/>
+                <a:latin typeface="Lato"/>
+              </a:rPr>
+              <a:t>Zowe</a:t>
+            </a:r>
+            <a:r>
+              <a:rPr lang="en-GB" dirty="0">
+                <a:solidFill>
+                  <a:srgbClr val="222222"/>
+                </a:solidFill>
+                <a:effectLst/>
+                <a:latin typeface="Lato"/>
+              </a:rPr>
+              <a:t> security set up</a:t>
+            </a:r>
+            <a:endParaRPr lang="en-US" spc="-1" dirty="0">
+              <a:latin typeface="Gill Sans"/>
+              <a:ea typeface="Gill Sans"/>
+            </a:endParaRPr>
+          </a:p>
+        </p:txBody>
+      </p:sp>
+    </p:spTree>
+    <p:extLst>
+      <p:ext uri="{BB962C8B-B14F-4D97-AF65-F5344CB8AC3E}">
+        <p14:creationId xmlns:p14="http://schemas.microsoft.com/office/powerpoint/2010/main" val="442466579"/>
+      </p:ext>
+    </p:extLst>
+  </p:cSld>
+  <p:clrMapOvr>
+    <a:masterClrMapping/>
+  </p:clrMapOvr>
+  <p:transition spd="med">
+    <p:fade thruBlk="1"/>
+  </p:transition>
+  <p:timing>
+    <p:tnLst>
+      <p:par>
+        <p:cTn id="1" dur="indefinite" restart="never" nodeType="tmRoot">
+          <p:childTnLst>
+            <p:seq>
+              <p:cTn id="2" dur="indefinite" nodeType="mainSeq"/>
+              <p:prevCondLst>
+                <p:cond evt="onPrev" delay="0">
+                  <p:tgtEl>
+                    <p:sldTgt/>
+                  </p:tgtEl>
+                </p:cond>
+              </p:prevCondLst>
+              <p:nextCondLst>
+                <p:cond evt="onNext" delay="0">
+                  <p:tgtEl>
+                    <p:sldTgt/>
+                  </p:tgtEl>
+                </p:cond>
+              </p:nextCondLst>
+            </p:seq>
+          </p:childTnLst>
+        </p:cTn>
+      </p:par>
+    </p:tnLst>
+  </p:timing>
+</p:sld>
+</file>
+
+<file path=ppt/slides/slide11.xml><?xml version="1.0" encoding="utf-8"?>
+<p:sld xmlns:a="http://schemas.openxmlformats.org/drawingml/2006/main" xmlns:r="http://schemas.openxmlformats.org/officeDocument/2006/relationships" xmlns:p="http://schemas.openxmlformats.org/presentationml/2006/main">
+  <p:cSld>
+    <p:spTree>
+      <p:nvGrpSpPr>
+        <p:cNvPr id="1" name=""/>
+        <p:cNvGrpSpPr/>
+        <p:nvPr/>
+      </p:nvGrpSpPr>
+      <p:grpSpPr>
+        <a:xfrm>
+          <a:off x="0" y="0"/>
+          <a:ext cx="0" cy="0"/>
+          <a:chOff x="0" y="0"/>
+          <a:chExt cx="0" cy="0"/>
+        </a:xfrm>
+      </p:grpSpPr>
+      <p:sp>
+        <p:nvSpPr>
+          <p:cNvPr id="182" name="TextShape 1"/>
+          <p:cNvSpPr txBox="1"/>
+          <p:nvPr/>
+        </p:nvSpPr>
+        <p:spPr>
+          <a:xfrm>
+            <a:off x="334080" y="159480"/>
+            <a:ext cx="7893720" cy="447120"/>
+          </a:xfrm>
+          <a:prstGeom prst="rect">
+            <a:avLst/>
+          </a:prstGeom>
+          <a:noFill/>
+          <a:ln>
+            <a:noFill/>
+          </a:ln>
+        </p:spPr>
+        <p:txBody>
+          <a:bodyPr tIns="91440" bIns="91440" anchor="ctr">
+            <a:noAutofit/>
+          </a:bodyPr>
+          <a:lstStyle/>
+          <a:p>
+            <a:pPr>
+              <a:lnSpc>
+                <a:spcPct val="100000"/>
+              </a:lnSpc>
+            </a:pPr>
+            <a:r>
+              <a:rPr lang="en-US" sz="3000" spc="-1" dirty="0">
+                <a:solidFill>
+                  <a:srgbClr val="262626"/>
+                </a:solidFill>
+                <a:latin typeface="Gill Sans"/>
+                <a:ea typeface="Gill Sans"/>
+              </a:rPr>
+              <a:t>CI/CD – </a:t>
+            </a:r>
+            <a:r>
+              <a:rPr lang="en-GB" sz="3200" dirty="0">
+                <a:solidFill>
+                  <a:srgbClr val="222222"/>
+                </a:solidFill>
+                <a:effectLst/>
+                <a:latin typeface="Lato"/>
+              </a:rPr>
+              <a:t>Monitoring of infrastructure</a:t>
+            </a:r>
+            <a:endParaRPr lang="en-US" sz="3000" b="0" strike="noStrike" spc="-1" dirty="0">
+              <a:solidFill>
+                <a:srgbClr val="000000"/>
+              </a:solidFill>
+              <a:latin typeface="Arial"/>
+            </a:endParaRPr>
+          </a:p>
+        </p:txBody>
+      </p:sp>
+      <p:sp>
+        <p:nvSpPr>
+          <p:cNvPr id="183" name="TextShape 2"/>
+          <p:cNvSpPr txBox="1"/>
+          <p:nvPr/>
+        </p:nvSpPr>
+        <p:spPr>
+          <a:xfrm>
+            <a:off x="405518" y="993913"/>
+            <a:ext cx="8269762" cy="3808676"/>
+          </a:xfrm>
+          <a:prstGeom prst="rect">
+            <a:avLst/>
+          </a:prstGeom>
+          <a:noFill/>
+          <a:ln>
+            <a:noFill/>
+          </a:ln>
+        </p:spPr>
+        <p:txBody>
+          <a:bodyPr tIns="91440" bIns="91440">
+            <a:noAutofit/>
+          </a:bodyPr>
+          <a:lstStyle/>
+          <a:p>
+            <a:pPr marL="387270" indent="-285750">
+              <a:spcBef>
+                <a:spcPts val="400"/>
+              </a:spcBef>
+              <a:buFont typeface="Wingdings" pitchFamily="2" charset="2"/>
+              <a:buChar char="Ø"/>
+            </a:pPr>
+            <a:r>
+              <a:rPr lang="en-GB" sz="1400" dirty="0">
+                <a:solidFill>
+                  <a:srgbClr val="222222"/>
+                </a:solidFill>
+                <a:effectLst/>
+                <a:latin typeface="Lato"/>
+              </a:rPr>
+              <a:t>Discussed on a call - already set up more monitoring in IBM Cloud, can't track performance.</a:t>
+            </a:r>
+          </a:p>
+          <a:p>
+            <a:pPr marL="387270" indent="-285750">
+              <a:spcBef>
+                <a:spcPts val="400"/>
+              </a:spcBef>
+              <a:buFont typeface="Wingdings" pitchFamily="2" charset="2"/>
+              <a:buChar char="Ø"/>
+            </a:pPr>
+            <a:endParaRPr lang="en-GB" sz="1400" dirty="0">
+              <a:solidFill>
+                <a:srgbClr val="222222"/>
+              </a:solidFill>
+              <a:latin typeface="Lato"/>
+            </a:endParaRPr>
+          </a:p>
+          <a:p>
+            <a:pPr marL="387270" indent="-285750">
+              <a:spcBef>
+                <a:spcPts val="400"/>
+              </a:spcBef>
+              <a:buFont typeface="Wingdings" pitchFamily="2" charset="2"/>
+              <a:buChar char="Ø"/>
+            </a:pPr>
+            <a:r>
+              <a:rPr lang="en-GB" sz="1400" dirty="0">
+                <a:solidFill>
+                  <a:srgbClr val="222222"/>
+                </a:solidFill>
+                <a:effectLst/>
+                <a:latin typeface="Lato"/>
+              </a:rPr>
+              <a:t>Want to be able to measure performance and catch potential issues in advance</a:t>
+            </a:r>
+          </a:p>
+          <a:p>
+            <a:pPr marL="387270" indent="-285750">
+              <a:spcBef>
+                <a:spcPts val="400"/>
+              </a:spcBef>
+              <a:buFont typeface="Wingdings" pitchFamily="2" charset="2"/>
+              <a:buChar char="Ø"/>
+            </a:pPr>
+            <a:endParaRPr lang="en-GB" sz="1400" spc="-1" dirty="0">
+              <a:solidFill>
+                <a:srgbClr val="222222"/>
+              </a:solidFill>
+              <a:latin typeface="Lato"/>
+              <a:ea typeface="Gill Sans"/>
+            </a:endParaRPr>
+          </a:p>
+          <a:p>
+            <a:pPr marL="387270" indent="-285750">
+              <a:spcBef>
+                <a:spcPts val="400"/>
+              </a:spcBef>
+              <a:buFont typeface="Wingdings" pitchFamily="2" charset="2"/>
+              <a:buChar char="Ø"/>
+            </a:pPr>
+            <a:r>
+              <a:rPr lang="en-GB" sz="1400" spc="-1" dirty="0">
+                <a:solidFill>
+                  <a:srgbClr val="222222"/>
+                </a:solidFill>
+                <a:latin typeface="Lato"/>
+                <a:ea typeface="Gill Sans"/>
+              </a:rPr>
+              <a:t>Using Zabbix tool to stand up server and agents on all infrastructure machines:</a:t>
+            </a:r>
+          </a:p>
+          <a:p>
+            <a:pPr marL="844470" lvl="1" indent="-285750">
+              <a:spcBef>
+                <a:spcPts val="400"/>
+              </a:spcBef>
+              <a:buFont typeface="Arial" panose="020B0604020202020204" pitchFamily="34" charset="0"/>
+              <a:buChar char="•"/>
+            </a:pPr>
+            <a:r>
+              <a:rPr lang="en-GB" sz="1200" spc="-1" dirty="0">
+                <a:solidFill>
+                  <a:srgbClr val="222222"/>
+                </a:solidFill>
+                <a:latin typeface="Lato"/>
+                <a:ea typeface="Gill Sans"/>
+              </a:rPr>
+              <a:t>Marist-1</a:t>
+            </a:r>
+          </a:p>
+          <a:p>
+            <a:pPr marL="844470" lvl="1" indent="-285750">
+              <a:spcBef>
+                <a:spcPts val="400"/>
+              </a:spcBef>
+              <a:buFont typeface="Arial" panose="020B0604020202020204" pitchFamily="34" charset="0"/>
+              <a:buChar char="•"/>
+            </a:pPr>
+            <a:r>
+              <a:rPr lang="en-GB" sz="1200" spc="-1" dirty="0">
+                <a:solidFill>
+                  <a:srgbClr val="222222"/>
+                </a:solidFill>
+                <a:latin typeface="Lato"/>
+                <a:ea typeface="Gill Sans"/>
+              </a:rPr>
+              <a:t>Marist-2</a:t>
+            </a:r>
+          </a:p>
+          <a:p>
+            <a:pPr marL="844470" lvl="1" indent="-285750">
+              <a:spcBef>
+                <a:spcPts val="400"/>
+              </a:spcBef>
+              <a:buFont typeface="Arial" panose="020B0604020202020204" pitchFamily="34" charset="0"/>
+              <a:buChar char="•"/>
+            </a:pPr>
+            <a:r>
+              <a:rPr lang="en-GB" sz="1200" spc="-1" dirty="0">
+                <a:solidFill>
+                  <a:srgbClr val="222222"/>
+                </a:solidFill>
+                <a:latin typeface="Lato"/>
+                <a:ea typeface="Gill Sans"/>
+              </a:rPr>
+              <a:t>Marist-3</a:t>
+            </a:r>
+          </a:p>
+          <a:p>
+            <a:pPr marL="844470" lvl="1" indent="-285750">
+              <a:spcBef>
+                <a:spcPts val="400"/>
+              </a:spcBef>
+              <a:buFont typeface="Arial" panose="020B0604020202020204" pitchFamily="34" charset="0"/>
+              <a:buChar char="•"/>
+            </a:pPr>
+            <a:r>
+              <a:rPr lang="en-GB" sz="1200" spc="-1" dirty="0">
+                <a:solidFill>
+                  <a:srgbClr val="222222"/>
+                </a:solidFill>
+                <a:latin typeface="Lato"/>
+                <a:ea typeface="Gill Sans"/>
+              </a:rPr>
+              <a:t>Wash</a:t>
+            </a:r>
+          </a:p>
+          <a:p>
+            <a:pPr marL="844470" lvl="1" indent="-285750">
+              <a:spcBef>
+                <a:spcPts val="400"/>
+              </a:spcBef>
+              <a:buFont typeface="Arial" panose="020B0604020202020204" pitchFamily="34" charset="0"/>
+              <a:buChar char="•"/>
+            </a:pPr>
+            <a:r>
+              <a:rPr lang="en-GB" sz="1200" spc="-1" dirty="0">
+                <a:solidFill>
+                  <a:srgbClr val="222222"/>
+                </a:solidFill>
+                <a:latin typeface="Lato"/>
+                <a:ea typeface="Gill Sans"/>
+              </a:rPr>
+              <a:t>River</a:t>
+            </a:r>
+          </a:p>
+          <a:p>
+            <a:pPr marL="844470" lvl="1" indent="-285750">
+              <a:spcBef>
+                <a:spcPts val="400"/>
+              </a:spcBef>
+              <a:buFont typeface="Arial" panose="020B0604020202020204" pitchFamily="34" charset="0"/>
+              <a:buChar char="•"/>
+            </a:pPr>
+            <a:r>
+              <a:rPr lang="en-GB" sz="1200" spc="-1" dirty="0">
+                <a:solidFill>
+                  <a:srgbClr val="222222"/>
+                </a:solidFill>
+                <a:latin typeface="Lato"/>
+                <a:ea typeface="Gill Sans"/>
+              </a:rPr>
+              <a:t>Jayne</a:t>
+            </a:r>
+          </a:p>
+          <a:p>
+            <a:pPr marL="844470" lvl="1" indent="-285750">
+              <a:spcBef>
+                <a:spcPts val="400"/>
+              </a:spcBef>
+              <a:buFont typeface="Arial" panose="020B0604020202020204" pitchFamily="34" charset="0"/>
+              <a:buChar char="•"/>
+            </a:pPr>
+            <a:endParaRPr lang="en-GB" sz="1400" spc="-1" dirty="0">
+              <a:solidFill>
+                <a:srgbClr val="222222"/>
+              </a:solidFill>
+              <a:latin typeface="Lato"/>
+              <a:ea typeface="Gill Sans"/>
+            </a:endParaRPr>
+          </a:p>
+          <a:p>
+            <a:pPr marL="387270" indent="-285750">
+              <a:spcBef>
+                <a:spcPts val="400"/>
+              </a:spcBef>
+              <a:buFont typeface="Wingdings" pitchFamily="2" charset="2"/>
+              <a:buChar char="Ø"/>
+            </a:pPr>
+            <a:r>
+              <a:rPr lang="en-GB" sz="1400" spc="-1" dirty="0">
+                <a:solidFill>
+                  <a:srgbClr val="222222"/>
+                </a:solidFill>
+                <a:latin typeface="Lato"/>
+                <a:ea typeface="Gill Sans"/>
+              </a:rPr>
+              <a:t>Currently appear to be missing packages on IBM Cloud systems that won’t allow server install</a:t>
+            </a:r>
+          </a:p>
+          <a:p>
+            <a:pPr marL="387270" indent="-285750">
+              <a:spcBef>
+                <a:spcPts val="400"/>
+              </a:spcBef>
+              <a:buFont typeface="Wingdings" pitchFamily="2" charset="2"/>
+              <a:buChar char="Ø"/>
+            </a:pPr>
+            <a:endParaRPr lang="en-GB" sz="1600" spc="-1" dirty="0">
+              <a:solidFill>
+                <a:srgbClr val="222222"/>
+              </a:solidFill>
+              <a:latin typeface="Lato"/>
+              <a:ea typeface="Gill Sans"/>
+            </a:endParaRPr>
+          </a:p>
+          <a:p>
+            <a:pPr marL="387270" indent="-285750">
+              <a:spcBef>
+                <a:spcPts val="400"/>
+              </a:spcBef>
+              <a:buFont typeface="Arial" panose="020B0604020202020204" pitchFamily="34" charset="0"/>
+              <a:buChar char="•"/>
+            </a:pPr>
+            <a:endParaRPr lang="en-GB" sz="1400" spc="-1" dirty="0">
+              <a:solidFill>
+                <a:srgbClr val="222222"/>
+              </a:solidFill>
+              <a:latin typeface="Lato"/>
+              <a:ea typeface="Gill Sans"/>
+            </a:endParaRPr>
+          </a:p>
+          <a:p>
+            <a:pPr marL="101520">
+              <a:spcBef>
+                <a:spcPts val="400"/>
+              </a:spcBef>
+            </a:pPr>
+            <a:endParaRPr lang="en-GB" sz="1400" spc="-1" dirty="0">
+              <a:solidFill>
+                <a:srgbClr val="222222"/>
+              </a:solidFill>
+              <a:latin typeface="Lato"/>
+              <a:ea typeface="Gill Sans"/>
+            </a:endParaRPr>
+          </a:p>
+          <a:p>
+            <a:pPr marL="844470" lvl="1" indent="-285750">
+              <a:spcBef>
+                <a:spcPts val="400"/>
+              </a:spcBef>
+              <a:buFont typeface="Arial" panose="020B0604020202020204" pitchFamily="34" charset="0"/>
+              <a:buChar char="•"/>
+            </a:pPr>
+            <a:endParaRPr lang="en-GB" sz="1400" spc="-1" dirty="0">
+              <a:solidFill>
+                <a:srgbClr val="222222"/>
+              </a:solidFill>
+              <a:latin typeface="Lato"/>
+              <a:ea typeface="Gill Sans"/>
+            </a:endParaRPr>
+          </a:p>
+          <a:p>
+            <a:pPr marL="387270" indent="-285750">
+              <a:spcBef>
+                <a:spcPts val="400"/>
+              </a:spcBef>
+              <a:buFont typeface="Wingdings" pitchFamily="2" charset="2"/>
+              <a:buChar char="Ø"/>
+            </a:pPr>
+            <a:endParaRPr lang="en-GB" spc="-1" dirty="0">
+              <a:solidFill>
+                <a:srgbClr val="222222"/>
+              </a:solidFill>
+              <a:latin typeface="Lato"/>
+              <a:ea typeface="Gill Sans"/>
+            </a:endParaRPr>
+          </a:p>
+          <a:p>
+            <a:pPr marL="387270" indent="-285750">
+              <a:spcBef>
+                <a:spcPts val="400"/>
+              </a:spcBef>
+              <a:buFont typeface="Wingdings" pitchFamily="2" charset="2"/>
+              <a:buChar char="Ø"/>
+            </a:pPr>
+            <a:endParaRPr lang="en-US" spc="-1" dirty="0">
+              <a:latin typeface="Gill Sans"/>
+              <a:ea typeface="Gill Sans"/>
+            </a:endParaRPr>
+          </a:p>
+        </p:txBody>
+      </p:sp>
+    </p:spTree>
+    <p:extLst>
+      <p:ext uri="{BB962C8B-B14F-4D97-AF65-F5344CB8AC3E}">
+        <p14:creationId xmlns:p14="http://schemas.microsoft.com/office/powerpoint/2010/main" val="275701246"/>
+      </p:ext>
+    </p:extLst>
+  </p:cSld>
+  <p:clrMapOvr>
+    <a:masterClrMapping/>
+  </p:clrMapOvr>
+  <p:transition spd="med">
+    <p:fade thruBlk="1"/>
+  </p:transition>
+  <p:timing>
+    <p:tnLst>
+      <p:par>
+        <p:cTn id="1" dur="indefinite" restart="never" nodeType="tmRoot">
+          <p:childTnLst>
+            <p:seq>
+              <p:cTn id="2" dur="indefinite" nodeType="mainSeq"/>
+              <p:prevCondLst>
+                <p:cond evt="onPrev" delay="0">
+                  <p:tgtEl>
+                    <p:sldTgt/>
+                  </p:tgtEl>
+                </p:cond>
+              </p:prevCondLst>
+              <p:nextCondLst>
+                <p:cond evt="onNext" delay="0">
+                  <p:tgtEl>
+                    <p:sldTgt/>
+                  </p:tgtEl>
+                </p:cond>
+              </p:nextCondLst>
+            </p:seq>
+          </p:childTnLst>
+        </p:cTn>
+      </p:par>
+    </p:tnLst>
+  </p:timing>
+</p:sld>
+</file>
+
+<file path=ppt/slides/slide12.xml><?xml version="1.0" encoding="utf-8"?>
+<p:sld xmlns:a="http://schemas.openxmlformats.org/drawingml/2006/main" xmlns:r="http://schemas.openxmlformats.org/officeDocument/2006/relationships" xmlns:p="http://schemas.openxmlformats.org/presentationml/2006/main">
+  <p:cSld>
+    <p:spTree>
+      <p:nvGrpSpPr>
+        <p:cNvPr id="1" name=""/>
+        <p:cNvGrpSpPr/>
+        <p:nvPr/>
+      </p:nvGrpSpPr>
+      <p:grpSpPr>
+        <a:xfrm>
+          <a:off x="0" y="0"/>
+          <a:ext cx="0" cy="0"/>
+          <a:chOff x="0" y="0"/>
+          <a:chExt cx="0" cy="0"/>
+        </a:xfrm>
+      </p:grpSpPr>
+      <p:sp>
+        <p:nvSpPr>
+          <p:cNvPr id="182" name="TextShape 1"/>
+          <p:cNvSpPr txBox="1"/>
+          <p:nvPr/>
+        </p:nvSpPr>
+        <p:spPr>
+          <a:xfrm>
+            <a:off x="334080" y="159480"/>
+            <a:ext cx="7893720" cy="447120"/>
+          </a:xfrm>
+          <a:prstGeom prst="rect">
+            <a:avLst/>
+          </a:prstGeom>
+          <a:noFill/>
+          <a:ln>
+            <a:noFill/>
+          </a:ln>
+        </p:spPr>
+        <p:txBody>
+          <a:bodyPr tIns="91440" bIns="91440" anchor="ctr">
+            <a:noAutofit/>
+          </a:bodyPr>
+          <a:lstStyle/>
+          <a:p>
+            <a:pPr>
+              <a:lnSpc>
+                <a:spcPct val="100000"/>
+              </a:lnSpc>
+            </a:pPr>
+            <a:r>
+              <a:rPr lang="en-US" sz="3000" spc="-1" dirty="0">
+                <a:solidFill>
+                  <a:srgbClr val="262626"/>
+                </a:solidFill>
+                <a:latin typeface="Gill Sans"/>
+                <a:ea typeface="Gill Sans"/>
+              </a:rPr>
+              <a:t>CI/CD – </a:t>
+            </a:r>
+            <a:r>
+              <a:rPr lang="en-GB" sz="3000" spc="-1" dirty="0">
+                <a:solidFill>
+                  <a:srgbClr val="262626"/>
+                </a:solidFill>
+                <a:latin typeface="Gill Sans"/>
+                <a:ea typeface="Gill Sans"/>
+              </a:rPr>
+              <a:t>Stand up more subsystems on Marist</a:t>
+            </a:r>
+            <a:endParaRPr lang="en-US" sz="3000" b="0" strike="noStrike" spc="-1" dirty="0">
+              <a:solidFill>
+                <a:srgbClr val="000000"/>
+              </a:solidFill>
+              <a:latin typeface="Arial"/>
+            </a:endParaRPr>
+          </a:p>
+        </p:txBody>
+      </p:sp>
+      <p:sp>
+        <p:nvSpPr>
+          <p:cNvPr id="183" name="TextShape 2"/>
+          <p:cNvSpPr txBox="1"/>
+          <p:nvPr/>
+        </p:nvSpPr>
+        <p:spPr>
+          <a:xfrm>
+            <a:off x="405518" y="993913"/>
+            <a:ext cx="8269762" cy="3808676"/>
+          </a:xfrm>
+          <a:prstGeom prst="rect">
+            <a:avLst/>
+          </a:prstGeom>
+          <a:noFill/>
+          <a:ln>
+            <a:noFill/>
+          </a:ln>
+        </p:spPr>
+        <p:txBody>
+          <a:bodyPr tIns="91440" bIns="91440">
+            <a:noAutofit/>
+          </a:bodyPr>
+          <a:lstStyle/>
+          <a:p>
+            <a:pPr marL="387270" indent="-285750">
+              <a:spcBef>
+                <a:spcPts val="400"/>
+              </a:spcBef>
+              <a:buFont typeface="Wingdings" pitchFamily="2" charset="2"/>
+              <a:buChar char="Ø"/>
+            </a:pPr>
+            <a:r>
+              <a:rPr lang="en-GB" sz="1600" dirty="0">
+                <a:solidFill>
+                  <a:srgbClr val="222222"/>
+                </a:solidFill>
+                <a:effectLst/>
+                <a:latin typeface="Lato"/>
+              </a:rPr>
+              <a:t>We would aim to add CICS, IMS, MQ and DB2 as well to allow </a:t>
+            </a:r>
+            <a:r>
+              <a:rPr lang="en-GB" sz="1600" dirty="0" err="1">
+                <a:solidFill>
+                  <a:srgbClr val="222222"/>
+                </a:solidFill>
+                <a:effectLst/>
+                <a:latin typeface="Lato"/>
+              </a:rPr>
+              <a:t>Zowe</a:t>
+            </a:r>
+            <a:r>
+              <a:rPr lang="en-GB" sz="1600" dirty="0">
+                <a:solidFill>
+                  <a:srgbClr val="222222"/>
+                </a:solidFill>
+                <a:effectLst/>
+                <a:latin typeface="Lato"/>
+              </a:rPr>
+              <a:t> CLI extension packages to be tested</a:t>
+            </a:r>
+          </a:p>
+          <a:p>
+            <a:pPr marL="387270" indent="-285750">
+              <a:spcBef>
+                <a:spcPts val="400"/>
+              </a:spcBef>
+              <a:buFont typeface="Wingdings" pitchFamily="2" charset="2"/>
+              <a:buChar char="Ø"/>
+            </a:pPr>
+            <a:endParaRPr lang="en-GB" sz="1600" spc="-1" dirty="0">
+              <a:solidFill>
+                <a:srgbClr val="222222"/>
+              </a:solidFill>
+              <a:latin typeface="Lato"/>
+              <a:ea typeface="Gill Sans"/>
+            </a:endParaRPr>
+          </a:p>
+          <a:p>
+            <a:pPr marL="387270" indent="-285750">
+              <a:spcBef>
+                <a:spcPts val="400"/>
+              </a:spcBef>
+              <a:buFont typeface="Wingdings" pitchFamily="2" charset="2"/>
+              <a:buChar char="Ø"/>
+            </a:pPr>
+            <a:r>
+              <a:rPr lang="en-GB" sz="1600" spc="-1" dirty="0">
+                <a:solidFill>
+                  <a:srgbClr val="222222"/>
+                </a:solidFill>
+                <a:latin typeface="Lato"/>
+                <a:ea typeface="Gill Sans"/>
+              </a:rPr>
+              <a:t>Would need co-ordination with other squads to find out exact requirements</a:t>
+            </a:r>
+            <a:endParaRPr lang="en-GB" sz="1400" spc="-1" dirty="0">
+              <a:solidFill>
+                <a:srgbClr val="222222"/>
+              </a:solidFill>
+              <a:latin typeface="Lato"/>
+              <a:ea typeface="Gill Sans"/>
+            </a:endParaRPr>
+          </a:p>
+          <a:p>
+            <a:pPr marL="387270" indent="-285750">
+              <a:spcBef>
+                <a:spcPts val="400"/>
+              </a:spcBef>
+              <a:buFont typeface="Wingdings" pitchFamily="2" charset="2"/>
+              <a:buChar char="Ø"/>
+            </a:pPr>
+            <a:endParaRPr lang="en-GB" spc="-1" dirty="0">
+              <a:solidFill>
+                <a:srgbClr val="222222"/>
+              </a:solidFill>
+              <a:latin typeface="Lato"/>
+              <a:ea typeface="Gill Sans"/>
+            </a:endParaRPr>
+          </a:p>
+          <a:p>
+            <a:pPr marL="387270" indent="-285750">
+              <a:spcBef>
+                <a:spcPts val="400"/>
+              </a:spcBef>
+              <a:buFont typeface="Wingdings" pitchFamily="2" charset="2"/>
+              <a:buChar char="Ø"/>
+            </a:pPr>
+            <a:endParaRPr lang="en-US" spc="-1" dirty="0">
+              <a:latin typeface="Gill Sans"/>
+              <a:ea typeface="Gill Sans"/>
+            </a:endParaRPr>
+          </a:p>
+        </p:txBody>
+      </p:sp>
+    </p:spTree>
+    <p:extLst>
+      <p:ext uri="{BB962C8B-B14F-4D97-AF65-F5344CB8AC3E}">
+        <p14:creationId xmlns:p14="http://schemas.microsoft.com/office/powerpoint/2010/main" val="100391921"/>
+      </p:ext>
+    </p:extLst>
+  </p:cSld>
+  <p:clrMapOvr>
+    <a:masterClrMapping/>
+  </p:clrMapOvr>
+  <p:transition spd="med">
+    <p:fade thruBlk="1"/>
+  </p:transition>
+  <p:timing>
+    <p:tnLst>
+      <p:par>
+        <p:cTn id="1" dur="indefinite" restart="never" nodeType="tmRoot">
+          <p:childTnLst>
+            <p:seq>
+              <p:cTn id="2" dur="indefinite" nodeType="mainSeq"/>
+              <p:prevCondLst>
+                <p:cond evt="onPrev" delay="0">
+                  <p:tgtEl>
+                    <p:sldTgt/>
+                  </p:tgtEl>
+                </p:cond>
+              </p:prevCondLst>
+              <p:nextCondLst>
+                <p:cond evt="onNext" delay="0">
+                  <p:tgtEl>
+                    <p:sldTgt/>
+                  </p:tgtEl>
+                </p:cond>
+              </p:nextCondLst>
+            </p:seq>
+          </p:childTnLst>
+        </p:cTn>
+      </p:par>
+    </p:tnLst>
+  </p:timing>
+</p:sld>
+</file>
+
+<file path=ppt/slides/slide13.xml><?xml version="1.0" encoding="utf-8"?>
+<p:sld xmlns:a="http://schemas.openxmlformats.org/drawingml/2006/main" xmlns:r="http://schemas.openxmlformats.org/officeDocument/2006/relationships" xmlns:p="http://schemas.openxmlformats.org/presentationml/2006/main">
+  <p:cSld>
+    <p:spTree>
+      <p:nvGrpSpPr>
+        <p:cNvPr id="1" name=""/>
+        <p:cNvGrpSpPr/>
+        <p:nvPr/>
+      </p:nvGrpSpPr>
+      <p:grpSpPr>
+        <a:xfrm>
+          <a:off x="0" y="0"/>
+          <a:ext cx="0" cy="0"/>
+          <a:chOff x="0" y="0"/>
+          <a:chExt cx="0" cy="0"/>
+        </a:xfrm>
+      </p:grpSpPr>
+      <p:sp>
+        <p:nvSpPr>
+          <p:cNvPr id="182" name="TextShape 1"/>
+          <p:cNvSpPr txBox="1"/>
+          <p:nvPr/>
+        </p:nvSpPr>
+        <p:spPr>
+          <a:xfrm>
+            <a:off x="334080" y="159480"/>
+            <a:ext cx="7893720" cy="447120"/>
+          </a:xfrm>
+          <a:prstGeom prst="rect">
+            <a:avLst/>
+          </a:prstGeom>
+          <a:noFill/>
+          <a:ln>
+            <a:noFill/>
+          </a:ln>
+        </p:spPr>
+        <p:txBody>
+          <a:bodyPr tIns="91440" bIns="91440" anchor="ctr">
+            <a:noAutofit/>
+          </a:bodyPr>
+          <a:lstStyle/>
+          <a:p>
+            <a:pPr>
+              <a:lnSpc>
+                <a:spcPct val="100000"/>
+              </a:lnSpc>
+            </a:pPr>
+            <a:r>
+              <a:rPr lang="en-US" sz="3000" spc="-1" dirty="0">
+                <a:solidFill>
+                  <a:srgbClr val="262626"/>
+                </a:solidFill>
+                <a:latin typeface="Gill Sans"/>
+                <a:ea typeface="Gill Sans"/>
+              </a:rPr>
+              <a:t>CI/CD – </a:t>
+            </a:r>
+            <a:r>
+              <a:rPr lang="en-GB" sz="3000" spc="-1" dirty="0">
+                <a:solidFill>
+                  <a:srgbClr val="262626"/>
+                </a:solidFill>
+                <a:latin typeface="Gill Sans"/>
+                <a:ea typeface="Gill Sans"/>
+              </a:rPr>
+              <a:t>Pipeline improvements</a:t>
+            </a:r>
+            <a:endParaRPr lang="en-US" sz="3000" b="0" strike="noStrike" spc="-1" dirty="0">
+              <a:solidFill>
+                <a:srgbClr val="000000"/>
+              </a:solidFill>
+              <a:latin typeface="Arial"/>
+            </a:endParaRPr>
+          </a:p>
+        </p:txBody>
+      </p:sp>
+      <p:sp>
+        <p:nvSpPr>
+          <p:cNvPr id="183" name="TextShape 2"/>
+          <p:cNvSpPr txBox="1"/>
+          <p:nvPr/>
+        </p:nvSpPr>
+        <p:spPr>
+          <a:xfrm>
+            <a:off x="405518" y="993913"/>
+            <a:ext cx="8269762" cy="3808676"/>
+          </a:xfrm>
+          <a:prstGeom prst="rect">
+            <a:avLst/>
+          </a:prstGeom>
+          <a:noFill/>
+          <a:ln>
+            <a:noFill/>
+          </a:ln>
+        </p:spPr>
+        <p:txBody>
+          <a:bodyPr tIns="91440" bIns="91440">
+            <a:noAutofit/>
+          </a:bodyPr>
+          <a:lstStyle/>
+          <a:p>
+            <a:pPr marL="387270" indent="-285750">
+              <a:spcBef>
+                <a:spcPts val="400"/>
+              </a:spcBef>
+              <a:buFont typeface="Wingdings" pitchFamily="2" charset="2"/>
+              <a:buChar char="Ø"/>
+            </a:pPr>
+            <a:r>
+              <a:rPr lang="en-GB" sz="1600" dirty="0">
+                <a:solidFill>
+                  <a:srgbClr val="222222"/>
+                </a:solidFill>
+                <a:effectLst/>
+                <a:latin typeface="Lato"/>
+                <a:hlinkClick r:id="rId3"/>
+              </a:rPr>
+              <a:t>Fix reporting of false positives in nightly builds and new RC pipeline build</a:t>
+            </a:r>
+            <a:endParaRPr lang="en-GB" sz="1600" dirty="0">
+              <a:solidFill>
+                <a:srgbClr val="222222"/>
+              </a:solidFill>
+              <a:effectLst/>
+              <a:latin typeface="Lato"/>
+            </a:endParaRPr>
+          </a:p>
+          <a:p>
+            <a:pPr marL="101520">
+              <a:spcBef>
+                <a:spcPts val="400"/>
+              </a:spcBef>
+            </a:pPr>
+            <a:endParaRPr lang="en-GB" sz="1600" dirty="0">
+              <a:solidFill>
+                <a:srgbClr val="222222"/>
+              </a:solidFill>
+              <a:latin typeface="Lato"/>
+            </a:endParaRPr>
+          </a:p>
+          <a:p>
+            <a:pPr marL="387270" indent="-285750">
+              <a:spcBef>
+                <a:spcPts val="400"/>
+              </a:spcBef>
+              <a:buFont typeface="Wingdings" pitchFamily="2" charset="2"/>
+              <a:buChar char="Ø"/>
+            </a:pPr>
+            <a:r>
+              <a:rPr lang="en-GB" sz="1600" dirty="0">
+                <a:solidFill>
+                  <a:srgbClr val="222222"/>
+                </a:solidFill>
+                <a:effectLst/>
+                <a:latin typeface="Lato"/>
+              </a:rPr>
+              <a:t>Possibly create a similar pipeline for GA but not as much</a:t>
+            </a:r>
+          </a:p>
+          <a:p>
+            <a:pPr marL="387270" indent="-285750">
+              <a:spcBef>
+                <a:spcPts val="400"/>
+              </a:spcBef>
+              <a:buFont typeface="Wingdings" pitchFamily="2" charset="2"/>
+              <a:buChar char="Ø"/>
+            </a:pPr>
+            <a:endParaRPr lang="en-GB" sz="1600" dirty="0">
+              <a:solidFill>
+                <a:srgbClr val="222222"/>
+              </a:solidFill>
+              <a:latin typeface="Lato"/>
+            </a:endParaRPr>
+          </a:p>
+          <a:p>
+            <a:pPr marL="387270" indent="-285750">
+              <a:spcBef>
+                <a:spcPts val="400"/>
+              </a:spcBef>
+              <a:buFont typeface="Wingdings" pitchFamily="2" charset="2"/>
+              <a:buChar char="Ø"/>
+            </a:pPr>
+            <a:r>
+              <a:rPr lang="en-GB" sz="1600" dirty="0">
+                <a:solidFill>
+                  <a:srgbClr val="222222"/>
+                </a:solidFill>
+                <a:effectLst/>
+                <a:latin typeface="Lato"/>
+              </a:rPr>
+              <a:t>Want to look into possibilities for automating update of </a:t>
+            </a:r>
+            <a:r>
+              <a:rPr lang="en-GB" sz="1600" dirty="0" err="1">
+                <a:solidFill>
+                  <a:srgbClr val="222222"/>
+                </a:solidFill>
+                <a:effectLst/>
+                <a:latin typeface="Lato"/>
+              </a:rPr>
+              <a:t>manifest.json</a:t>
+            </a:r>
+            <a:r>
+              <a:rPr lang="en-GB" sz="1600" dirty="0">
+                <a:solidFill>
+                  <a:srgbClr val="222222"/>
+                </a:solidFill>
+                <a:effectLst/>
+                <a:latin typeface="Lato"/>
+              </a:rPr>
+              <a:t> as a lot of these changes are the same every time </a:t>
+            </a:r>
+          </a:p>
+          <a:p>
+            <a:pPr marL="387270" indent="-285750">
+              <a:spcBef>
+                <a:spcPts val="400"/>
+              </a:spcBef>
+              <a:buFont typeface="Wingdings" pitchFamily="2" charset="2"/>
+              <a:buChar char="Ø"/>
+            </a:pPr>
+            <a:endParaRPr lang="en-GB" sz="1600" spc="-1" dirty="0">
+              <a:solidFill>
+                <a:srgbClr val="222222"/>
+              </a:solidFill>
+              <a:latin typeface="Lato"/>
+              <a:ea typeface="Gill Sans"/>
+            </a:endParaRPr>
+          </a:p>
+          <a:p>
+            <a:pPr marL="387270" indent="-285750">
+              <a:spcBef>
+                <a:spcPts val="400"/>
+              </a:spcBef>
+              <a:buFont typeface="Wingdings" pitchFamily="2" charset="2"/>
+              <a:buChar char="Ø"/>
+            </a:pPr>
+            <a:endParaRPr lang="en-GB" sz="1400" spc="-1" dirty="0">
+              <a:solidFill>
+                <a:srgbClr val="222222"/>
+              </a:solidFill>
+              <a:latin typeface="Lato"/>
+              <a:ea typeface="Gill Sans"/>
+            </a:endParaRPr>
+          </a:p>
+          <a:p>
+            <a:pPr marL="387270" indent="-285750">
+              <a:spcBef>
+                <a:spcPts val="400"/>
+              </a:spcBef>
+              <a:buFont typeface="Wingdings" pitchFamily="2" charset="2"/>
+              <a:buChar char="Ø"/>
+            </a:pPr>
+            <a:endParaRPr lang="en-GB" spc="-1" dirty="0">
+              <a:solidFill>
+                <a:srgbClr val="222222"/>
+              </a:solidFill>
+              <a:latin typeface="Lato"/>
+              <a:ea typeface="Gill Sans"/>
+            </a:endParaRPr>
+          </a:p>
+          <a:p>
+            <a:pPr marL="387270" indent="-285750">
+              <a:spcBef>
+                <a:spcPts val="400"/>
+              </a:spcBef>
+              <a:buFont typeface="Wingdings" pitchFamily="2" charset="2"/>
+              <a:buChar char="Ø"/>
+            </a:pPr>
+            <a:endParaRPr lang="en-US" spc="-1" dirty="0">
+              <a:latin typeface="Gill Sans"/>
+              <a:ea typeface="Gill Sans"/>
+            </a:endParaRPr>
+          </a:p>
+        </p:txBody>
+      </p:sp>
+    </p:spTree>
+    <p:extLst>
+      <p:ext uri="{BB962C8B-B14F-4D97-AF65-F5344CB8AC3E}">
+        <p14:creationId xmlns:p14="http://schemas.microsoft.com/office/powerpoint/2010/main" val="4176309130"/>
+      </p:ext>
+    </p:extLst>
+  </p:cSld>
+  <p:clrMapOvr>
+    <a:masterClrMapping/>
+  </p:clrMapOvr>
+  <p:transition spd="med">
+    <p:fade thruBlk="1"/>
+  </p:transition>
+  <p:timing>
+    <p:tnLst>
+      <p:par>
+        <p:cTn id="1" dur="indefinite" restart="never" nodeType="tmRoot">
+          <p:childTnLst>
+            <p:seq>
+              <p:cTn id="2" dur="indefinite" nodeType="mainSeq"/>
+              <p:prevCondLst>
+                <p:cond evt="onPrev" delay="0">
+                  <p:tgtEl>
+                    <p:sldTgt/>
+                  </p:tgtEl>
+                </p:cond>
+              </p:prevCondLst>
+              <p:nextCondLst>
+                <p:cond evt="onNext" delay="0">
+                  <p:tgtEl>
+                    <p:sldTgt/>
+                  </p:tgtEl>
+                </p:cond>
+              </p:nextCondLst>
+            </p:seq>
+          </p:childTnLst>
+        </p:cTn>
+      </p:par>
+    </p:tnLst>
+  </p:timing>
+</p:sld>
+</file>
+
+<file path=ppt/slides/slide14.xml><?xml version="1.0" encoding="utf-8"?>
+<p:sld xmlns:a="http://schemas.openxmlformats.org/drawingml/2006/main" xmlns:r="http://schemas.openxmlformats.org/officeDocument/2006/relationships" xmlns:p="http://schemas.openxmlformats.org/presentationml/2006/main">
+  <p:cSld>
+    <p:spTree>
+      <p:nvGrpSpPr>
+        <p:cNvPr id="1" name=""/>
+        <p:cNvGrpSpPr/>
+        <p:nvPr/>
+      </p:nvGrpSpPr>
+      <p:grpSpPr>
+        <a:xfrm>
+          <a:off x="0" y="0"/>
+          <a:ext cx="0" cy="0"/>
+          <a:chOff x="0" y="0"/>
+          <a:chExt cx="0" cy="0"/>
+        </a:xfrm>
+      </p:grpSpPr>
+      <p:sp>
+        <p:nvSpPr>
           <p:cNvPr id="188" name="TextShape 1"/>
           <p:cNvSpPr txBox="1"/>
           <p:nvPr/>
@@ -10242,7 +12284,7 @@
 </p:sld>
 </file>
 
-<file path=ppt/slides/slide11.xml><?xml version="1.0" encoding="utf-8"?>
+<file path=ppt/slides/slide15.xml><?xml version="1.0" encoding="utf-8"?>
 <p:sld xmlns:a="http://schemas.openxmlformats.org/drawingml/2006/main" xmlns:r="http://schemas.openxmlformats.org/officeDocument/2006/relationships" xmlns:p="http://schemas.openxmlformats.org/presentationml/2006/main">
   <p:cSld>
     <p:spTree>

</xml_diff>

<commit_message>
Add CLI and Onboarding Squad Proposed Objectives
Signed-off-by: MikeBauerCA <35504792+MikeBauerCA@users.noreply.github.com>
</commit_message>
<xml_diff>
--- a/Project Management/PI Planning/20PI4 Planning/Zowe Community Squad Focus for 20PI4.pptx
+++ b/Project Management/PI Planning/20PI4 Planning/Zowe Community Squad Focus for 20PI4.pptx
@@ -8,7 +8,7 @@
     <p:sldMasterId id="2147483687" r:id="rId4"/>
   </p:sldMasterIdLst>
   <p:notesMasterIdLst>
-    <p:notesMasterId r:id="rId20"/>
+    <p:notesMasterId r:id="rId29"/>
   </p:notesMasterIdLst>
   <p:sldIdLst>
     <p:sldId id="256" r:id="rId5"/>
@@ -24,8 +24,17 @@
     <p:sldId id="271" r:id="rId15"/>
     <p:sldId id="272" r:id="rId16"/>
     <p:sldId id="273" r:id="rId17"/>
-    <p:sldId id="264" r:id="rId18"/>
-    <p:sldId id="265" r:id="rId19"/>
+    <p:sldId id="274" r:id="rId18"/>
+    <p:sldId id="276" r:id="rId19"/>
+    <p:sldId id="278" r:id="rId20"/>
+    <p:sldId id="275" r:id="rId21"/>
+    <p:sldId id="279" r:id="rId22"/>
+    <p:sldId id="280" r:id="rId23"/>
+    <p:sldId id="281" r:id="rId24"/>
+    <p:sldId id="282" r:id="rId25"/>
+    <p:sldId id="283" r:id="rId26"/>
+    <p:sldId id="264" r:id="rId27"/>
+    <p:sldId id="265" r:id="rId28"/>
   </p:sldIdLst>
   <p:sldSz cx="9144000" cy="5143500" type="screen16x9"/>
   <p:notesSz cx="6858000" cy="9144000"/>
@@ -549,6 +558,897 @@
     <p:extLst>
       <p:ext uri="{BB962C8B-B14F-4D97-AF65-F5344CB8AC3E}">
         <p14:creationId xmlns:p14="http://schemas.microsoft.com/office/powerpoint/2010/main" val="3725876168"/>
+      </p:ext>
+    </p:extLst>
+  </p:cSld>
+  <p:clrMapOvr>
+    <a:masterClrMapping/>
+  </p:clrMapOvr>
+</p:notes>
+</file>
+
+<file path=ppt/notesSlides/notesSlide10.xml><?xml version="1.0" encoding="utf-8"?>
+<p:notes xmlns:a="http://schemas.openxmlformats.org/drawingml/2006/main" xmlns:r="http://schemas.openxmlformats.org/officeDocument/2006/relationships" xmlns:p="http://schemas.openxmlformats.org/presentationml/2006/main">
+  <p:cSld>
+    <p:spTree>
+      <p:nvGrpSpPr>
+        <p:cNvPr id="1" name=""/>
+        <p:cNvGrpSpPr/>
+        <p:nvPr/>
+      </p:nvGrpSpPr>
+      <p:grpSpPr>
+        <a:xfrm>
+          <a:off x="0" y="0"/>
+          <a:ext cx="0" cy="0"/>
+          <a:chOff x="0" y="0"/>
+          <a:chExt cx="0" cy="0"/>
+        </a:xfrm>
+      </p:grpSpPr>
+      <p:sp>
+        <p:nvSpPr>
+          <p:cNvPr id="243" name="PlaceHolder 1"/>
+          <p:cNvSpPr>
+            <a:spLocks noGrp="1" noRot="1" noChangeAspect="1"/>
+          </p:cNvSpPr>
+          <p:nvPr>
+            <p:ph type="sldImg"/>
+          </p:nvPr>
+        </p:nvSpPr>
+        <p:spPr>
+          <a:xfrm>
+            <a:off x="381000" y="685800"/>
+            <a:ext cx="6096000" cy="3429000"/>
+          </a:xfrm>
+          <a:prstGeom prst="rect">
+            <a:avLst/>
+          </a:prstGeom>
+        </p:spPr>
+      </p:sp>
+      <p:sp>
+        <p:nvSpPr>
+          <p:cNvPr id="244" name="PlaceHolder 2"/>
+          <p:cNvSpPr>
+            <a:spLocks noGrp="1"/>
+          </p:cNvSpPr>
+          <p:nvPr>
+            <p:ph type="body"/>
+          </p:nvPr>
+        </p:nvSpPr>
+        <p:spPr>
+          <a:xfrm>
+            <a:off x="685800" y="4343400"/>
+            <a:ext cx="5486040" cy="4114440"/>
+          </a:xfrm>
+          <a:prstGeom prst="rect">
+            <a:avLst/>
+          </a:prstGeom>
+        </p:spPr>
+        <p:txBody>
+          <a:bodyPr tIns="91440" bIns="91440">
+            <a:noAutofit/>
+          </a:bodyPr>
+          <a:lstStyle/>
+          <a:p>
+            <a:pPr marL="158760">
+              <a:lnSpc>
+                <a:spcPct val="100000"/>
+              </a:lnSpc>
+            </a:pPr>
+            <a:endParaRPr lang="en-US" sz="1100" b="0" strike="noStrike" spc="-1" dirty="0">
+              <a:latin typeface="Arial"/>
+            </a:endParaRPr>
+          </a:p>
+        </p:txBody>
+      </p:sp>
+    </p:spTree>
+    <p:extLst>
+      <p:ext uri="{BB962C8B-B14F-4D97-AF65-F5344CB8AC3E}">
+        <p14:creationId xmlns:p14="http://schemas.microsoft.com/office/powerpoint/2010/main" val="1510042104"/>
+      </p:ext>
+    </p:extLst>
+  </p:cSld>
+  <p:clrMapOvr>
+    <a:masterClrMapping/>
+  </p:clrMapOvr>
+</p:notes>
+</file>
+
+<file path=ppt/notesSlides/notesSlide11.xml><?xml version="1.0" encoding="utf-8"?>
+<p:notes xmlns:a="http://schemas.openxmlformats.org/drawingml/2006/main" xmlns:r="http://schemas.openxmlformats.org/officeDocument/2006/relationships" xmlns:p="http://schemas.openxmlformats.org/presentationml/2006/main">
+  <p:cSld>
+    <p:spTree>
+      <p:nvGrpSpPr>
+        <p:cNvPr id="1" name=""/>
+        <p:cNvGrpSpPr/>
+        <p:nvPr/>
+      </p:nvGrpSpPr>
+      <p:grpSpPr>
+        <a:xfrm>
+          <a:off x="0" y="0"/>
+          <a:ext cx="0" cy="0"/>
+          <a:chOff x="0" y="0"/>
+          <a:chExt cx="0" cy="0"/>
+        </a:xfrm>
+      </p:grpSpPr>
+      <p:sp>
+        <p:nvSpPr>
+          <p:cNvPr id="243" name="PlaceHolder 1"/>
+          <p:cNvSpPr>
+            <a:spLocks noGrp="1" noRot="1" noChangeAspect="1"/>
+          </p:cNvSpPr>
+          <p:nvPr>
+            <p:ph type="sldImg"/>
+          </p:nvPr>
+        </p:nvSpPr>
+        <p:spPr>
+          <a:xfrm>
+            <a:off x="381000" y="685800"/>
+            <a:ext cx="6096000" cy="3429000"/>
+          </a:xfrm>
+          <a:prstGeom prst="rect">
+            <a:avLst/>
+          </a:prstGeom>
+        </p:spPr>
+      </p:sp>
+      <p:sp>
+        <p:nvSpPr>
+          <p:cNvPr id="244" name="PlaceHolder 2"/>
+          <p:cNvSpPr>
+            <a:spLocks noGrp="1"/>
+          </p:cNvSpPr>
+          <p:nvPr>
+            <p:ph type="body"/>
+          </p:nvPr>
+        </p:nvSpPr>
+        <p:spPr>
+          <a:xfrm>
+            <a:off x="685800" y="4343400"/>
+            <a:ext cx="5486040" cy="4114440"/>
+          </a:xfrm>
+          <a:prstGeom prst="rect">
+            <a:avLst/>
+          </a:prstGeom>
+        </p:spPr>
+        <p:txBody>
+          <a:bodyPr tIns="91440" bIns="91440">
+            <a:noAutofit/>
+          </a:bodyPr>
+          <a:lstStyle/>
+          <a:p>
+            <a:pPr marL="387270" indent="-285750">
+              <a:spcBef>
+                <a:spcPts val="400"/>
+              </a:spcBef>
+              <a:buFont typeface="Wingdings" pitchFamily="2" charset="2"/>
+              <a:buChar char="Ø"/>
+            </a:pPr>
+            <a:r>
+              <a:rPr lang="en-US" sz="1100" b="0" strike="noStrike" spc="-1" dirty="0" smtClean="0">
+                <a:latin typeface="Arial"/>
+              </a:rPr>
+              <a:t>Notes:</a:t>
+            </a:r>
+            <a:br>
+              <a:rPr lang="en-US" sz="1100" b="0" strike="noStrike" spc="-1" dirty="0" smtClean="0">
+                <a:latin typeface="Arial"/>
+              </a:rPr>
+            </a:br>
+            <a:r>
+              <a:rPr lang="en-US" dirty="0" smtClean="0"/>
+              <a:t>Address growing number of community enhancement requests</a:t>
+            </a:r>
+          </a:p>
+          <a:p>
+            <a:pPr marL="844470" lvl="1" indent="-285750">
+              <a:spcBef>
+                <a:spcPts val="400"/>
+              </a:spcBef>
+              <a:buFont typeface="Wingdings" pitchFamily="2" charset="2"/>
+              <a:buChar char="Ø"/>
+            </a:pPr>
+            <a:r>
+              <a:rPr lang="en-US" u="sng" dirty="0" err="1" smtClean="0">
+                <a:hlinkClick r:id="rId3"/>
+              </a:rPr>
+              <a:t>zowe</a:t>
+            </a:r>
+            <a:r>
+              <a:rPr lang="en-US" u="sng" dirty="0" smtClean="0">
+                <a:hlinkClick r:id="rId3"/>
+              </a:rPr>
+              <a:t> zos-files copy data-set : no replace option #808</a:t>
+            </a:r>
+            <a:endParaRPr lang="en-US" u="sng" dirty="0" smtClean="0"/>
+          </a:p>
+          <a:p>
+            <a:pPr marL="844470" lvl="1" indent="-285750">
+              <a:spcBef>
+                <a:spcPts val="400"/>
+              </a:spcBef>
+              <a:buFont typeface="Wingdings" pitchFamily="2" charset="2"/>
+              <a:buChar char="Ø"/>
+            </a:pPr>
+            <a:r>
+              <a:rPr lang="en-US" u="sng" dirty="0" smtClean="0">
+                <a:hlinkClick r:id="rId4"/>
+              </a:rPr>
+              <a:t>Question : how to "nullify" an option in a profile #797</a:t>
+            </a:r>
+            <a:r>
+              <a:rPr lang="en-US" dirty="0" smtClean="0"/>
+              <a:t> </a:t>
+            </a:r>
+          </a:p>
+          <a:p>
+            <a:pPr marL="844470" lvl="1" indent="-285750">
+              <a:spcBef>
+                <a:spcPts val="400"/>
+              </a:spcBef>
+              <a:buFont typeface="Wingdings" pitchFamily="2" charset="2"/>
+              <a:buChar char="Ø"/>
+            </a:pPr>
+            <a:r>
+              <a:rPr lang="en-US" u="sng" dirty="0" smtClean="0">
+                <a:hlinkClick r:id="rId5"/>
+              </a:rPr>
+              <a:t>copy data-set option should have replace option and list of members #789</a:t>
+            </a:r>
+            <a:endParaRPr lang="en-US" dirty="0" smtClean="0"/>
+          </a:p>
+          <a:p>
+            <a:pPr marL="844470" lvl="1" indent="-285750">
+              <a:spcBef>
+                <a:spcPts val="400"/>
+              </a:spcBef>
+              <a:buFont typeface="Wingdings" pitchFamily="2" charset="2"/>
+              <a:buChar char="Ø"/>
+            </a:pPr>
+            <a:r>
+              <a:rPr lang="en-US" u="sng" dirty="0" smtClean="0">
+                <a:hlinkClick r:id="rId6"/>
+              </a:rPr>
+              <a:t>Create PDS member option to </a:t>
+            </a:r>
+            <a:r>
+              <a:rPr lang="en-US" u="sng" dirty="0" err="1" smtClean="0">
+                <a:hlinkClick r:id="rId6"/>
+              </a:rPr>
+              <a:t>zowe</a:t>
+            </a:r>
+            <a:r>
+              <a:rPr lang="en-US" u="sng" dirty="0" smtClean="0">
+                <a:hlinkClick r:id="rId6"/>
+              </a:rPr>
+              <a:t> zos-files create data-set- function #773</a:t>
+            </a:r>
+            <a:endParaRPr lang="en-US" dirty="0" smtClean="0"/>
+          </a:p>
+          <a:p>
+            <a:pPr marL="844470" lvl="1" indent="-285750">
+              <a:spcBef>
+                <a:spcPts val="400"/>
+              </a:spcBef>
+              <a:buFont typeface="Wingdings" pitchFamily="2" charset="2"/>
+              <a:buChar char="Ø"/>
+            </a:pPr>
+            <a:r>
+              <a:rPr lang="en-US" u="sng" dirty="0" smtClean="0">
+                <a:hlinkClick r:id="rId7"/>
+              </a:rPr>
+              <a:t>LIKE parameter for </a:t>
+            </a:r>
+            <a:r>
+              <a:rPr lang="en-US" u="sng" dirty="0" err="1" smtClean="0">
+                <a:hlinkClick r:id="rId7"/>
+              </a:rPr>
+              <a:t>zowe</a:t>
+            </a:r>
+            <a:r>
+              <a:rPr lang="en-US" u="sng" dirty="0" smtClean="0">
+                <a:hlinkClick r:id="rId7"/>
+              </a:rPr>
+              <a:t> zos-files create data-set-* #771</a:t>
+            </a:r>
+            <a:endParaRPr lang="en-US" dirty="0" smtClean="0"/>
+          </a:p>
+          <a:p>
+            <a:pPr marL="844470" lvl="1" indent="-285750">
+              <a:spcBef>
+                <a:spcPts val="400"/>
+              </a:spcBef>
+              <a:buFont typeface="Wingdings" pitchFamily="2" charset="2"/>
+              <a:buChar char="Ø"/>
+            </a:pPr>
+            <a:r>
+              <a:rPr lang="en-US" u="sng" dirty="0" smtClean="0">
+                <a:hlinkClick r:id="rId8"/>
+              </a:rPr>
+              <a:t>Enable use of a pattern to restrict what member names are returned from listing of PDS members #810</a:t>
+            </a:r>
+            <a:endParaRPr lang="en-US" dirty="0" smtClean="0"/>
+          </a:p>
+          <a:p>
+            <a:pPr marL="844470" lvl="1" indent="-285750">
+              <a:spcBef>
+                <a:spcPts val="400"/>
+              </a:spcBef>
+              <a:buFont typeface="Wingdings" pitchFamily="2" charset="2"/>
+              <a:buChar char="Ø"/>
+            </a:pPr>
+            <a:r>
+              <a:rPr lang="en-US" u="sng" dirty="0" smtClean="0">
+                <a:hlinkClick r:id="rId9"/>
+              </a:rPr>
+              <a:t>Support the IBM z/OSMF header that allows record (support for VB binary) #539</a:t>
+            </a:r>
+            <a:endParaRPr lang="en-US" dirty="0" smtClean="0"/>
+          </a:p>
+          <a:p>
+            <a:pPr marL="101520">
+              <a:spcBef>
+                <a:spcPts val="400"/>
+              </a:spcBef>
+            </a:pPr>
+            <a:endParaRPr lang="en-US" sz="1100" b="0" strike="noStrike" spc="-1" dirty="0" smtClean="0">
+              <a:latin typeface="Arial"/>
+            </a:endParaRPr>
+          </a:p>
+          <a:p>
+            <a:pPr marL="387270" indent="-285750">
+              <a:spcBef>
+                <a:spcPts val="400"/>
+              </a:spcBef>
+              <a:buFont typeface="Wingdings" pitchFamily="2" charset="2"/>
+              <a:buChar char="Ø"/>
+            </a:pPr>
+            <a:r>
+              <a:rPr lang="en-US" sz="1100" dirty="0" smtClean="0"/>
+              <a:t>Ensure successful installation of the </a:t>
+            </a:r>
+            <a:r>
+              <a:rPr lang="en-US" sz="1100" dirty="0" err="1" smtClean="0"/>
+              <a:t>Zowe</a:t>
+            </a:r>
+            <a:r>
+              <a:rPr lang="en-US" sz="1100" dirty="0" smtClean="0"/>
+              <a:t> CLI in environments with proxies. Provide guidance on installing from public NPM via proxy but also suggest installing from the local package hosted on zowe.org as an alternative. </a:t>
+            </a:r>
+            <a:br>
+              <a:rPr lang="en-US" sz="1100" dirty="0" smtClean="0"/>
+            </a:br>
+            <a:r>
+              <a:rPr lang="en-US" sz="1100" dirty="0" smtClean="0"/>
+              <a:t>Also, address issue with using CLI to access mainframe environment over http proxy: </a:t>
+            </a:r>
+            <a:r>
+              <a:rPr lang="en-US" sz="1100" dirty="0" smtClean="0">
+                <a:hlinkClick r:id="rId10"/>
+              </a:rPr>
+              <a:t>https://github.com/zowe/zowe-cli/issues/498</a:t>
+            </a:r>
+            <a:r>
+              <a:rPr lang="en-US" sz="1100" dirty="0" smtClean="0"/>
+              <a:t/>
+            </a:r>
+            <a:br>
+              <a:rPr lang="en-US" sz="1100" dirty="0" smtClean="0"/>
+            </a:br>
+            <a:endParaRPr lang="en-US" sz="1100" dirty="0" smtClean="0"/>
+          </a:p>
+          <a:p>
+            <a:pPr marL="387270" indent="-285750">
+              <a:spcBef>
+                <a:spcPts val="400"/>
+              </a:spcBef>
+              <a:buFont typeface="Wingdings" pitchFamily="2" charset="2"/>
+              <a:buChar char="Ø"/>
+            </a:pPr>
+            <a:r>
+              <a:rPr lang="en-US" sz="1100" dirty="0" smtClean="0"/>
+              <a:t>Allow for recently run commands to be easily recalled. Recalling commands today tends to be difficult especially when switching terminals and mistyping commands is common.</a:t>
+            </a:r>
+            <a:br>
+              <a:rPr lang="en-US" sz="1100" dirty="0" smtClean="0"/>
+            </a:br>
+            <a:endParaRPr lang="en-US" sz="1100" dirty="0" smtClean="0"/>
+          </a:p>
+          <a:p>
+            <a:pPr marL="387270" indent="-285750">
+              <a:spcBef>
+                <a:spcPts val="400"/>
+              </a:spcBef>
+              <a:buFont typeface="Wingdings" pitchFamily="2" charset="2"/>
+              <a:buChar char="Ø"/>
+            </a:pPr>
+            <a:r>
+              <a:rPr lang="en-US" sz="1100" dirty="0" smtClean="0"/>
+              <a:t>Ensure </a:t>
+            </a:r>
+            <a:r>
+              <a:rPr lang="en-US" sz="1100" dirty="0" err="1" smtClean="0"/>
+              <a:t>Zowe</a:t>
+            </a:r>
+            <a:r>
+              <a:rPr lang="en-US" sz="1100" dirty="0" smtClean="0"/>
+              <a:t> CLI functions properly in a </a:t>
+            </a:r>
+            <a:r>
+              <a:rPr lang="en-US" sz="1100" dirty="0" err="1" smtClean="0"/>
+              <a:t>CodeReady</a:t>
+            </a:r>
+            <a:r>
+              <a:rPr lang="en-US" sz="1100" dirty="0" smtClean="0"/>
+              <a:t> Workspace. Open question: would IBM be able to provide a </a:t>
+            </a:r>
+            <a:r>
+              <a:rPr lang="en-US" sz="1100" dirty="0" err="1" smtClean="0"/>
+              <a:t>CodeReady</a:t>
+            </a:r>
+            <a:r>
+              <a:rPr lang="en-US" sz="1100" dirty="0" smtClean="0"/>
+              <a:t> Workspace to the community that the squad could leverage to validate </a:t>
+            </a:r>
+            <a:r>
+              <a:rPr lang="en-US" sz="1100" dirty="0" err="1" smtClean="0"/>
+              <a:t>Zowe</a:t>
+            </a:r>
+            <a:r>
+              <a:rPr lang="en-US" sz="1100" dirty="0" smtClean="0"/>
+              <a:t> CLI (possible </a:t>
+            </a:r>
+            <a:r>
+              <a:rPr lang="en-US" sz="1100" dirty="0" err="1" smtClean="0"/>
+              <a:t>Zowe</a:t>
+            </a:r>
+            <a:r>
+              <a:rPr lang="en-US" sz="1100" dirty="0" smtClean="0"/>
+              <a:t> Explorer in the future?)</a:t>
+            </a:r>
+          </a:p>
+          <a:p>
+            <a:pPr marL="101520">
+              <a:spcBef>
+                <a:spcPts val="400"/>
+              </a:spcBef>
+            </a:pPr>
+            <a:endParaRPr lang="en-US" sz="1100" dirty="0"/>
+          </a:p>
+        </p:txBody>
+      </p:sp>
+    </p:spTree>
+    <p:extLst>
+      <p:ext uri="{BB962C8B-B14F-4D97-AF65-F5344CB8AC3E}">
+        <p14:creationId xmlns:p14="http://schemas.microsoft.com/office/powerpoint/2010/main" val="335182321"/>
+      </p:ext>
+    </p:extLst>
+  </p:cSld>
+  <p:clrMapOvr>
+    <a:masterClrMapping/>
+  </p:clrMapOvr>
+</p:notes>
+</file>
+
+<file path=ppt/notesSlides/notesSlide12.xml><?xml version="1.0" encoding="utf-8"?>
+<p:notes xmlns:a="http://schemas.openxmlformats.org/drawingml/2006/main" xmlns:r="http://schemas.openxmlformats.org/officeDocument/2006/relationships" xmlns:p="http://schemas.openxmlformats.org/presentationml/2006/main">
+  <p:cSld>
+    <p:spTree>
+      <p:nvGrpSpPr>
+        <p:cNvPr id="1" name=""/>
+        <p:cNvGrpSpPr/>
+        <p:nvPr/>
+      </p:nvGrpSpPr>
+      <p:grpSpPr>
+        <a:xfrm>
+          <a:off x="0" y="0"/>
+          <a:ext cx="0" cy="0"/>
+          <a:chOff x="0" y="0"/>
+          <a:chExt cx="0" cy="0"/>
+        </a:xfrm>
+      </p:grpSpPr>
+      <p:sp>
+        <p:nvSpPr>
+          <p:cNvPr id="243" name="PlaceHolder 1"/>
+          <p:cNvSpPr>
+            <a:spLocks noGrp="1" noRot="1" noChangeAspect="1"/>
+          </p:cNvSpPr>
+          <p:nvPr>
+            <p:ph type="sldImg"/>
+          </p:nvPr>
+        </p:nvSpPr>
+        <p:spPr>
+          <a:xfrm>
+            <a:off x="381000" y="685800"/>
+            <a:ext cx="6096000" cy="3429000"/>
+          </a:xfrm>
+          <a:prstGeom prst="rect">
+            <a:avLst/>
+          </a:prstGeom>
+        </p:spPr>
+      </p:sp>
+      <p:sp>
+        <p:nvSpPr>
+          <p:cNvPr id="244" name="PlaceHolder 2"/>
+          <p:cNvSpPr>
+            <a:spLocks noGrp="1"/>
+          </p:cNvSpPr>
+          <p:nvPr>
+            <p:ph type="body"/>
+          </p:nvPr>
+        </p:nvSpPr>
+        <p:spPr>
+          <a:xfrm>
+            <a:off x="685800" y="4343400"/>
+            <a:ext cx="5486040" cy="4114440"/>
+          </a:xfrm>
+          <a:prstGeom prst="rect">
+            <a:avLst/>
+          </a:prstGeom>
+        </p:spPr>
+        <p:txBody>
+          <a:bodyPr tIns="91440" bIns="91440">
+            <a:noAutofit/>
+          </a:bodyPr>
+          <a:lstStyle/>
+          <a:p>
+            <a:pPr marL="101520">
+              <a:spcBef>
+                <a:spcPts val="400"/>
+              </a:spcBef>
+            </a:pPr>
+            <a:endParaRPr lang="en-US" sz="1100" dirty="0"/>
+          </a:p>
+        </p:txBody>
+      </p:sp>
+    </p:spTree>
+    <p:extLst>
+      <p:ext uri="{BB962C8B-B14F-4D97-AF65-F5344CB8AC3E}">
+        <p14:creationId xmlns:p14="http://schemas.microsoft.com/office/powerpoint/2010/main" val="4161502945"/>
+      </p:ext>
+    </p:extLst>
+  </p:cSld>
+  <p:clrMapOvr>
+    <a:masterClrMapping/>
+  </p:clrMapOvr>
+</p:notes>
+</file>
+
+<file path=ppt/notesSlides/notesSlide13.xml><?xml version="1.0" encoding="utf-8"?>
+<p:notes xmlns:a="http://schemas.openxmlformats.org/drawingml/2006/main" xmlns:r="http://schemas.openxmlformats.org/officeDocument/2006/relationships" xmlns:p="http://schemas.openxmlformats.org/presentationml/2006/main">
+  <p:cSld>
+    <p:spTree>
+      <p:nvGrpSpPr>
+        <p:cNvPr id="1" name=""/>
+        <p:cNvGrpSpPr/>
+        <p:nvPr/>
+      </p:nvGrpSpPr>
+      <p:grpSpPr>
+        <a:xfrm>
+          <a:off x="0" y="0"/>
+          <a:ext cx="0" cy="0"/>
+          <a:chOff x="0" y="0"/>
+          <a:chExt cx="0" cy="0"/>
+        </a:xfrm>
+      </p:grpSpPr>
+      <p:sp>
+        <p:nvSpPr>
+          <p:cNvPr id="243" name="PlaceHolder 1"/>
+          <p:cNvSpPr>
+            <a:spLocks noGrp="1" noRot="1" noChangeAspect="1"/>
+          </p:cNvSpPr>
+          <p:nvPr>
+            <p:ph type="sldImg"/>
+          </p:nvPr>
+        </p:nvSpPr>
+        <p:spPr>
+          <a:xfrm>
+            <a:off x="381000" y="685800"/>
+            <a:ext cx="6096000" cy="3429000"/>
+          </a:xfrm>
+          <a:prstGeom prst="rect">
+            <a:avLst/>
+          </a:prstGeom>
+        </p:spPr>
+      </p:sp>
+      <p:sp>
+        <p:nvSpPr>
+          <p:cNvPr id="244" name="PlaceHolder 2"/>
+          <p:cNvSpPr>
+            <a:spLocks noGrp="1"/>
+          </p:cNvSpPr>
+          <p:nvPr>
+            <p:ph type="body"/>
+          </p:nvPr>
+        </p:nvSpPr>
+        <p:spPr>
+          <a:xfrm>
+            <a:off x="685800" y="4343400"/>
+            <a:ext cx="5486040" cy="4114440"/>
+          </a:xfrm>
+          <a:prstGeom prst="rect">
+            <a:avLst/>
+          </a:prstGeom>
+        </p:spPr>
+        <p:txBody>
+          <a:bodyPr tIns="91440" bIns="91440">
+            <a:noAutofit/>
+          </a:bodyPr>
+          <a:lstStyle/>
+          <a:p>
+            <a:pPr marL="101520">
+              <a:spcBef>
+                <a:spcPts val="400"/>
+              </a:spcBef>
+            </a:pPr>
+            <a:endParaRPr lang="en-US" sz="1100" dirty="0"/>
+          </a:p>
+        </p:txBody>
+      </p:sp>
+    </p:spTree>
+    <p:extLst>
+      <p:ext uri="{BB962C8B-B14F-4D97-AF65-F5344CB8AC3E}">
+        <p14:creationId xmlns:p14="http://schemas.microsoft.com/office/powerpoint/2010/main" val="408879043"/>
+      </p:ext>
+    </p:extLst>
+  </p:cSld>
+  <p:clrMapOvr>
+    <a:masterClrMapping/>
+  </p:clrMapOvr>
+</p:notes>
+</file>
+
+<file path=ppt/notesSlides/notesSlide14.xml><?xml version="1.0" encoding="utf-8"?>
+<p:notes xmlns:a="http://schemas.openxmlformats.org/drawingml/2006/main" xmlns:r="http://schemas.openxmlformats.org/officeDocument/2006/relationships" xmlns:p="http://schemas.openxmlformats.org/presentationml/2006/main">
+  <p:cSld>
+    <p:spTree>
+      <p:nvGrpSpPr>
+        <p:cNvPr id="1" name=""/>
+        <p:cNvGrpSpPr/>
+        <p:nvPr/>
+      </p:nvGrpSpPr>
+      <p:grpSpPr>
+        <a:xfrm>
+          <a:off x="0" y="0"/>
+          <a:ext cx="0" cy="0"/>
+          <a:chOff x="0" y="0"/>
+          <a:chExt cx="0" cy="0"/>
+        </a:xfrm>
+      </p:grpSpPr>
+      <p:sp>
+        <p:nvSpPr>
+          <p:cNvPr id="243" name="PlaceHolder 1"/>
+          <p:cNvSpPr>
+            <a:spLocks noGrp="1" noRot="1" noChangeAspect="1"/>
+          </p:cNvSpPr>
+          <p:nvPr>
+            <p:ph type="sldImg"/>
+          </p:nvPr>
+        </p:nvSpPr>
+        <p:spPr>
+          <a:xfrm>
+            <a:off x="381000" y="685800"/>
+            <a:ext cx="6096000" cy="3429000"/>
+          </a:xfrm>
+          <a:prstGeom prst="rect">
+            <a:avLst/>
+          </a:prstGeom>
+        </p:spPr>
+      </p:sp>
+      <p:sp>
+        <p:nvSpPr>
+          <p:cNvPr id="244" name="PlaceHolder 2"/>
+          <p:cNvSpPr>
+            <a:spLocks noGrp="1"/>
+          </p:cNvSpPr>
+          <p:nvPr>
+            <p:ph type="body"/>
+          </p:nvPr>
+        </p:nvSpPr>
+        <p:spPr>
+          <a:xfrm>
+            <a:off x="685800" y="4343400"/>
+            <a:ext cx="5486040" cy="4114440"/>
+          </a:xfrm>
+          <a:prstGeom prst="rect">
+            <a:avLst/>
+          </a:prstGeom>
+        </p:spPr>
+        <p:txBody>
+          <a:bodyPr tIns="91440" bIns="91440">
+            <a:noAutofit/>
+          </a:bodyPr>
+          <a:lstStyle/>
+          <a:p>
+            <a:pPr marL="101520">
+              <a:spcBef>
+                <a:spcPts val="400"/>
+              </a:spcBef>
+            </a:pPr>
+            <a:endParaRPr lang="en-US" sz="1100" dirty="0"/>
+          </a:p>
+        </p:txBody>
+      </p:sp>
+    </p:spTree>
+    <p:extLst>
+      <p:ext uri="{BB962C8B-B14F-4D97-AF65-F5344CB8AC3E}">
+        <p14:creationId xmlns:p14="http://schemas.microsoft.com/office/powerpoint/2010/main" val="2903952489"/>
+      </p:ext>
+    </p:extLst>
+  </p:cSld>
+  <p:clrMapOvr>
+    <a:masterClrMapping/>
+  </p:clrMapOvr>
+</p:notes>
+</file>
+
+<file path=ppt/notesSlides/notesSlide15.xml><?xml version="1.0" encoding="utf-8"?>
+<p:notes xmlns:a="http://schemas.openxmlformats.org/drawingml/2006/main" xmlns:r="http://schemas.openxmlformats.org/officeDocument/2006/relationships" xmlns:p="http://schemas.openxmlformats.org/presentationml/2006/main">
+  <p:cSld>
+    <p:spTree>
+      <p:nvGrpSpPr>
+        <p:cNvPr id="1" name=""/>
+        <p:cNvGrpSpPr/>
+        <p:nvPr/>
+      </p:nvGrpSpPr>
+      <p:grpSpPr>
+        <a:xfrm>
+          <a:off x="0" y="0"/>
+          <a:ext cx="0" cy="0"/>
+          <a:chOff x="0" y="0"/>
+          <a:chExt cx="0" cy="0"/>
+        </a:xfrm>
+      </p:grpSpPr>
+      <p:sp>
+        <p:nvSpPr>
+          <p:cNvPr id="243" name="PlaceHolder 1"/>
+          <p:cNvSpPr>
+            <a:spLocks noGrp="1" noRot="1" noChangeAspect="1"/>
+          </p:cNvSpPr>
+          <p:nvPr>
+            <p:ph type="sldImg"/>
+          </p:nvPr>
+        </p:nvSpPr>
+        <p:spPr>
+          <a:xfrm>
+            <a:off x="381000" y="685800"/>
+            <a:ext cx="6096000" cy="3429000"/>
+          </a:xfrm>
+          <a:prstGeom prst="rect">
+            <a:avLst/>
+          </a:prstGeom>
+        </p:spPr>
+      </p:sp>
+      <p:sp>
+        <p:nvSpPr>
+          <p:cNvPr id="244" name="PlaceHolder 2"/>
+          <p:cNvSpPr>
+            <a:spLocks noGrp="1"/>
+          </p:cNvSpPr>
+          <p:nvPr>
+            <p:ph type="body"/>
+          </p:nvPr>
+        </p:nvSpPr>
+        <p:spPr>
+          <a:xfrm>
+            <a:off x="685800" y="4343400"/>
+            <a:ext cx="5486040" cy="4114440"/>
+          </a:xfrm>
+          <a:prstGeom prst="rect">
+            <a:avLst/>
+          </a:prstGeom>
+        </p:spPr>
+        <p:txBody>
+          <a:bodyPr tIns="91440" bIns="91440">
+            <a:noAutofit/>
+          </a:bodyPr>
+          <a:lstStyle/>
+          <a:p>
+            <a:pPr marL="101520">
+              <a:spcBef>
+                <a:spcPts val="400"/>
+              </a:spcBef>
+            </a:pPr>
+            <a:endParaRPr lang="en-US" sz="1100" dirty="0"/>
+          </a:p>
+        </p:txBody>
+      </p:sp>
+    </p:spTree>
+    <p:extLst>
+      <p:ext uri="{BB962C8B-B14F-4D97-AF65-F5344CB8AC3E}">
+        <p14:creationId xmlns:p14="http://schemas.microsoft.com/office/powerpoint/2010/main" val="1291355002"/>
+      </p:ext>
+    </p:extLst>
+  </p:cSld>
+  <p:clrMapOvr>
+    <a:masterClrMapping/>
+  </p:clrMapOvr>
+</p:notes>
+</file>
+
+<file path=ppt/notesSlides/notesSlide16.xml><?xml version="1.0" encoding="utf-8"?>
+<p:notes xmlns:a="http://schemas.openxmlformats.org/drawingml/2006/main" xmlns:r="http://schemas.openxmlformats.org/officeDocument/2006/relationships" xmlns:p="http://schemas.openxmlformats.org/presentationml/2006/main">
+  <p:cSld>
+    <p:spTree>
+      <p:nvGrpSpPr>
+        <p:cNvPr id="1" name=""/>
+        <p:cNvGrpSpPr/>
+        <p:nvPr/>
+      </p:nvGrpSpPr>
+      <p:grpSpPr>
+        <a:xfrm>
+          <a:off x="0" y="0"/>
+          <a:ext cx="0" cy="0"/>
+          <a:chOff x="0" y="0"/>
+          <a:chExt cx="0" cy="0"/>
+        </a:xfrm>
+      </p:grpSpPr>
+      <p:sp>
+        <p:nvSpPr>
+          <p:cNvPr id="2" name="Slide Image Placeholder 1"/>
+          <p:cNvSpPr>
+            <a:spLocks noGrp="1" noRot="1" noChangeAspect="1"/>
+          </p:cNvSpPr>
+          <p:nvPr>
+            <p:ph type="sldImg"/>
+          </p:nvPr>
+        </p:nvSpPr>
+        <p:spPr>
+          <a:xfrm>
+            <a:off x="533400" y="763588"/>
+            <a:ext cx="6704013" cy="3771900"/>
+          </a:xfrm>
+        </p:spPr>
+      </p:sp>
+      <p:sp>
+        <p:nvSpPr>
+          <p:cNvPr id="3" name="Notes Placeholder 2"/>
+          <p:cNvSpPr>
+            <a:spLocks noGrp="1"/>
+          </p:cNvSpPr>
+          <p:nvPr>
+            <p:ph type="body" idx="1"/>
+          </p:nvPr>
+        </p:nvSpPr>
+        <p:spPr/>
+        <p:txBody>
+          <a:bodyPr/>
+          <a:lstStyle/>
+          <a:p>
+            <a:endParaRPr lang="en-US" dirty="0"/>
+          </a:p>
+        </p:txBody>
+      </p:sp>
+      <p:sp>
+        <p:nvSpPr>
+          <p:cNvPr id="4" name="Slide Number Placeholder 3"/>
+          <p:cNvSpPr>
+            <a:spLocks noGrp="1"/>
+          </p:cNvSpPr>
+          <p:nvPr>
+            <p:ph type="sldNum"/>
+          </p:nvPr>
+        </p:nvSpPr>
+        <p:spPr/>
+        <p:txBody>
+          <a:bodyPr/>
+          <a:lstStyle/>
+          <a:p>
+            <a:pPr algn="r"/>
+            <a:fld id="{BA3CDCDB-E9EF-4257-93B9-33682187AA79}" type="slidenum">
+              <a:rPr lang="en-US" sz="1400" b="0" strike="noStrike" spc="-1" smtClean="0">
+                <a:latin typeface="Times New Roman"/>
+              </a:rPr>
+              <a:t>22</a:t>
+            </a:fld>
+            <a:endParaRPr lang="en-US" sz="1400" b="0" strike="noStrike" spc="-1">
+              <a:latin typeface="Times New Roman"/>
+            </a:endParaRPr>
+          </a:p>
+        </p:txBody>
+      </p:sp>
+    </p:spTree>
+    <p:extLst>
+      <p:ext uri="{BB962C8B-B14F-4D97-AF65-F5344CB8AC3E}">
+        <p14:creationId xmlns:p14="http://schemas.microsoft.com/office/powerpoint/2010/main" val="3521497249"/>
       </p:ext>
     </p:extLst>
   </p:cSld>
@@ -10692,10 +11592,13 @@
                 <a:solidFill>
                   <a:srgbClr val="3664AD"/>
                 </a:solidFill>
-                <a:latin typeface="Gill Sans"/>
                 <a:ea typeface="Gill Sans"/>
               </a:rPr>
               <a:t>Zowe Community 20PI4 </a:t>
+            </a:r>
+            <a:r>
+              <a:rPr dirty="0"/>
+              <a:t/>
             </a:r>
             <a:br>
               <a:rPr dirty="0"/>
@@ -10705,7 +11608,6 @@
                 <a:solidFill>
                   <a:srgbClr val="3664AD"/>
                 </a:solidFill>
-                <a:latin typeface="Gill Sans"/>
                 <a:ea typeface="Gill Sans"/>
               </a:rPr>
               <a:t>Squad Focus</a:t>
@@ -10714,7 +11616,6 @@
               <a:solidFill>
                 <a:srgbClr val="000000"/>
               </a:solidFill>
-              <a:latin typeface="Arial"/>
             </a:endParaRPr>
           </a:p>
         </p:txBody>
@@ -10829,7 +11730,7 @@
                 <a:solidFill>
                   <a:srgbClr val="262626"/>
                 </a:solidFill>
-                <a:latin typeface="Gill Sans"/>
+                <a:latin typeface="+mj-lt"/>
                 <a:ea typeface="Gill Sans"/>
               </a:rPr>
               <a:t>CI/CD – </a:t>
@@ -10840,7 +11741,7 @@
                   <a:srgbClr val="222222"/>
                 </a:solidFill>
                 <a:effectLst/>
-                <a:latin typeface="Lato"/>
+                <a:latin typeface="+mj-lt"/>
               </a:rPr>
               <a:t>Automated testing catch-up</a:t>
             </a:r>
@@ -10848,7 +11749,7 @@
               <a:solidFill>
                 <a:srgbClr val="000000"/>
               </a:solidFill>
-              <a:latin typeface="Arial"/>
+              <a:latin typeface="+mj-lt"/>
             </a:endParaRPr>
           </a:p>
         </p:txBody>
@@ -10891,7 +11792,7 @@
                   <a:srgbClr val="222222"/>
                 </a:solidFill>
                 <a:effectLst/>
-                <a:latin typeface="Lato"/>
+                <a:latin typeface="+mj-lt"/>
               </a:rPr>
               <a:t>Decide on and complete what testing we require for keyrings and </a:t>
             </a:r>
@@ -10901,7 +11802,7 @@
                   <a:srgbClr val="222222"/>
                 </a:solidFill>
                 <a:effectLst/>
-                <a:latin typeface="Lato"/>
+                <a:latin typeface="+mj-lt"/>
               </a:rPr>
               <a:t>uss</a:t>
             </a:r>
@@ -10911,7 +11812,7 @@
                   <a:srgbClr val="222222"/>
                 </a:solidFill>
                 <a:effectLst/>
-                <a:latin typeface="Lato"/>
+                <a:latin typeface="+mj-lt"/>
               </a:rPr>
               <a:t> certificates </a:t>
             </a:r>
@@ -10930,7 +11831,7 @@
                   <a:srgbClr val="222222"/>
                 </a:solidFill>
                 <a:effectLst/>
-                <a:latin typeface="Lato"/>
+                <a:latin typeface="+mj-lt"/>
               </a:rPr>
               <a:t>(eg better TSS and ACF2 support for keyrings, more certificate scenarios like importing external certificates)</a:t>
             </a:r>
@@ -10947,7 +11848,7 @@
               <a:solidFill>
                 <a:srgbClr val="222222"/>
               </a:solidFill>
-              <a:latin typeface="Lato"/>
+              <a:latin typeface="+mj-lt"/>
               <a:ea typeface="Gill Sans"/>
             </a:endParaRPr>
           </a:p>
@@ -10965,7 +11866,7 @@
                   <a:srgbClr val="222222"/>
                 </a:solidFill>
                 <a:effectLst/>
-                <a:latin typeface="Lato"/>
+                <a:latin typeface="+mj-lt"/>
               </a:rPr>
               <a:t>zlux</a:t>
             </a:r>
@@ -10975,7 +11876,7 @@
                   <a:srgbClr val="222222"/>
                 </a:solidFill>
                 <a:effectLst/>
-                <a:latin typeface="Lato"/>
+                <a:latin typeface="+mj-lt"/>
               </a:rPr>
               <a:t> and </a:t>
             </a:r>
@@ -10985,7 +11886,7 @@
                   <a:srgbClr val="222222"/>
                 </a:solidFill>
                 <a:effectLst/>
-                <a:latin typeface="Lato"/>
+                <a:latin typeface="+mj-lt"/>
               </a:rPr>
               <a:t>apiml</a:t>
             </a:r>
@@ -10995,7 +11896,7 @@
                   <a:srgbClr val="222222"/>
                 </a:solidFill>
                 <a:effectLst/>
-                <a:latin typeface="Lato"/>
+                <a:latin typeface="+mj-lt"/>
               </a:rPr>
               <a:t> component testing into open source</a:t>
             </a:r>
@@ -11012,7 +11913,7 @@
               <a:solidFill>
                 <a:srgbClr val="222222"/>
               </a:solidFill>
-              <a:latin typeface="Lato"/>
+              <a:latin typeface="+mj-lt"/>
               <a:ea typeface="Gill Sans"/>
             </a:endParaRPr>
           </a:p>
@@ -11030,7 +11931,7 @@
                   <a:srgbClr val="222222"/>
                 </a:solidFill>
                 <a:effectLst/>
-                <a:latin typeface="Lato"/>
+                <a:latin typeface="+mj-lt"/>
               </a:rPr>
               <a:t>Support ACF2 and TSS with the </a:t>
             </a:r>
@@ -11040,7 +11941,7 @@
                   <a:srgbClr val="222222"/>
                 </a:solidFill>
                 <a:effectLst/>
-                <a:latin typeface="Lato"/>
+                <a:latin typeface="+mj-lt"/>
               </a:rPr>
               <a:t>Zowe</a:t>
             </a:r>
@@ -11050,12 +11951,12 @@
                   <a:srgbClr val="222222"/>
                 </a:solidFill>
                 <a:effectLst/>
-                <a:latin typeface="Lato"/>
+                <a:latin typeface="+mj-lt"/>
               </a:rPr>
               <a:t> security set up</a:t>
             </a:r>
             <a:endParaRPr lang="en-US" spc="-1" dirty="0">
-              <a:latin typeface="Gill Sans"/>
+              <a:latin typeface="+mj-lt"/>
               <a:ea typeface="Gill Sans"/>
             </a:endParaRPr>
           </a:p>
@@ -11156,7 +12057,7 @@
                 <a:solidFill>
                   <a:srgbClr val="262626"/>
                 </a:solidFill>
-                <a:latin typeface="Gill Sans"/>
+                <a:latin typeface="+mj-lt"/>
                 <a:ea typeface="Gill Sans"/>
               </a:rPr>
               <a:t>CI/CD – </a:t>
@@ -11167,7 +12068,7 @@
                   <a:srgbClr val="222222"/>
                 </a:solidFill>
                 <a:effectLst/>
-                <a:latin typeface="Lato"/>
+                <a:latin typeface="+mj-lt"/>
               </a:rPr>
               <a:t>Monitoring of infrastructure</a:t>
             </a:r>
@@ -11175,7 +12076,7 @@
               <a:solidFill>
                 <a:srgbClr val="000000"/>
               </a:solidFill>
-              <a:latin typeface="Arial"/>
+              <a:latin typeface="+mj-lt"/>
             </a:endParaRPr>
           </a:p>
         </p:txBody>
@@ -11218,7 +12119,7 @@
                   <a:srgbClr val="222222"/>
                 </a:solidFill>
                 <a:effectLst/>
-                <a:latin typeface="Lato"/>
+                <a:latin typeface="+mj-lt"/>
               </a:rPr>
               <a:t>Discussed on a call - already set up more monitoring in IBM Cloud, can't track performance.</a:t>
             </a:r>
@@ -11235,7 +12136,7 @@
               <a:solidFill>
                 <a:srgbClr val="222222"/>
               </a:solidFill>
-              <a:latin typeface="Lato"/>
+              <a:latin typeface="+mj-lt"/>
             </a:endParaRPr>
           </a:p>
           <a:p>
@@ -11252,7 +12153,7 @@
                   <a:srgbClr val="222222"/>
                 </a:solidFill>
                 <a:effectLst/>
-                <a:latin typeface="Lato"/>
+                <a:latin typeface="+mj-lt"/>
               </a:rPr>
               <a:t>Want to be able to measure performance and catch potential issues in advance</a:t>
             </a:r>
@@ -11269,7 +12170,7 @@
               <a:solidFill>
                 <a:srgbClr val="222222"/>
               </a:solidFill>
-              <a:latin typeface="Lato"/>
+              <a:latin typeface="+mj-lt"/>
               <a:ea typeface="Gill Sans"/>
             </a:endParaRPr>
           </a:p>
@@ -11286,7 +12187,7 @@
                 <a:solidFill>
                   <a:srgbClr val="222222"/>
                 </a:solidFill>
-                <a:latin typeface="Lato"/>
+                <a:latin typeface="+mj-lt"/>
                 <a:ea typeface="Gill Sans"/>
               </a:rPr>
               <a:t>Using Zabbix tool to stand up server and agents on all infrastructure machines:</a:t>
@@ -11305,7 +12206,7 @@
                 <a:solidFill>
                   <a:srgbClr val="222222"/>
                 </a:solidFill>
-                <a:latin typeface="Lato"/>
+                <a:latin typeface="+mj-lt"/>
                 <a:ea typeface="Gill Sans"/>
               </a:rPr>
               <a:t>Marist-1</a:t>
@@ -11324,7 +12225,7 @@
                 <a:solidFill>
                   <a:srgbClr val="222222"/>
                 </a:solidFill>
-                <a:latin typeface="Lato"/>
+                <a:latin typeface="+mj-lt"/>
                 <a:ea typeface="Gill Sans"/>
               </a:rPr>
               <a:t>Marist-2</a:t>
@@ -11343,7 +12244,7 @@
                 <a:solidFill>
                   <a:srgbClr val="222222"/>
                 </a:solidFill>
-                <a:latin typeface="Lato"/>
+                <a:latin typeface="+mj-lt"/>
                 <a:ea typeface="Gill Sans"/>
               </a:rPr>
               <a:t>Marist-3</a:t>
@@ -11362,7 +12263,7 @@
                 <a:solidFill>
                   <a:srgbClr val="222222"/>
                 </a:solidFill>
-                <a:latin typeface="Lato"/>
+                <a:latin typeface="+mj-lt"/>
                 <a:ea typeface="Gill Sans"/>
               </a:rPr>
               <a:t>Wash</a:t>
@@ -11381,7 +12282,7 @@
                 <a:solidFill>
                   <a:srgbClr val="222222"/>
                 </a:solidFill>
-                <a:latin typeface="Lato"/>
+                <a:latin typeface="+mj-lt"/>
                 <a:ea typeface="Gill Sans"/>
               </a:rPr>
               <a:t>River</a:t>
@@ -11400,7 +12301,7 @@
                 <a:solidFill>
                   <a:srgbClr val="222222"/>
                 </a:solidFill>
-                <a:latin typeface="Lato"/>
+                <a:latin typeface="+mj-lt"/>
                 <a:ea typeface="Gill Sans"/>
               </a:rPr>
               <a:t>Jayne</a:t>
@@ -11418,7 +12319,7 @@
               <a:solidFill>
                 <a:srgbClr val="222222"/>
               </a:solidFill>
-              <a:latin typeface="Lato"/>
+              <a:latin typeface="+mj-lt"/>
               <a:ea typeface="Gill Sans"/>
             </a:endParaRPr>
           </a:p>
@@ -11435,7 +12336,7 @@
                 <a:solidFill>
                   <a:srgbClr val="222222"/>
                 </a:solidFill>
-                <a:latin typeface="Lato"/>
+                <a:latin typeface="+mj-lt"/>
                 <a:ea typeface="Gill Sans"/>
               </a:rPr>
               <a:t>Currently appear to be missing packages on IBM Cloud systems that won’t allow server install</a:t>
@@ -11453,7 +12354,7 @@
               <a:solidFill>
                 <a:srgbClr val="222222"/>
               </a:solidFill>
-              <a:latin typeface="Lato"/>
+              <a:latin typeface="+mj-lt"/>
               <a:ea typeface="Gill Sans"/>
             </a:endParaRPr>
           </a:p>
@@ -11469,7 +12370,7 @@
               <a:solidFill>
                 <a:srgbClr val="222222"/>
               </a:solidFill>
-              <a:latin typeface="Lato"/>
+              <a:latin typeface="+mj-lt"/>
               <a:ea typeface="Gill Sans"/>
             </a:endParaRPr>
           </a:p>
@@ -11483,7 +12384,7 @@
               <a:solidFill>
                 <a:srgbClr val="222222"/>
               </a:solidFill>
-              <a:latin typeface="Lato"/>
+              <a:latin typeface="+mj-lt"/>
               <a:ea typeface="Gill Sans"/>
             </a:endParaRPr>
           </a:p>
@@ -11499,7 +12400,7 @@
               <a:solidFill>
                 <a:srgbClr val="222222"/>
               </a:solidFill>
-              <a:latin typeface="Lato"/>
+              <a:latin typeface="+mj-lt"/>
               <a:ea typeface="Gill Sans"/>
             </a:endParaRPr>
           </a:p>
@@ -11515,7 +12416,7 @@
               <a:solidFill>
                 <a:srgbClr val="222222"/>
               </a:solidFill>
-              <a:latin typeface="Lato"/>
+              <a:latin typeface="+mj-lt"/>
               <a:ea typeface="Gill Sans"/>
             </a:endParaRPr>
           </a:p>
@@ -11528,7 +12429,7 @@
               <a:buChar char="Ø"/>
             </a:pPr>
             <a:endParaRPr lang="en-US" spc="-1" dirty="0">
-              <a:latin typeface="Gill Sans"/>
+              <a:latin typeface="+mj-lt"/>
               <a:ea typeface="Gill Sans"/>
             </a:endParaRPr>
           </a:p>
@@ -11629,7 +12530,7 @@
                 <a:solidFill>
                   <a:srgbClr val="262626"/>
                 </a:solidFill>
-                <a:latin typeface="Gill Sans"/>
+                <a:latin typeface="+mj-lt"/>
                 <a:ea typeface="Gill Sans"/>
               </a:rPr>
               <a:t>CI/CD – </a:t>
@@ -11639,7 +12540,7 @@
                 <a:solidFill>
                   <a:srgbClr val="262626"/>
                 </a:solidFill>
-                <a:latin typeface="Gill Sans"/>
+                <a:latin typeface="+mj-lt"/>
                 <a:ea typeface="Gill Sans"/>
               </a:rPr>
               <a:t>Stand up more subsystems on Marist</a:t>
@@ -11648,7 +12549,7 @@
               <a:solidFill>
                 <a:srgbClr val="000000"/>
               </a:solidFill>
-              <a:latin typeface="Arial"/>
+              <a:latin typeface="+mj-lt"/>
             </a:endParaRPr>
           </a:p>
         </p:txBody>
@@ -11691,7 +12592,7 @@
                   <a:srgbClr val="222222"/>
                 </a:solidFill>
                 <a:effectLst/>
-                <a:latin typeface="Lato"/>
+                <a:latin typeface="+mj-lt"/>
               </a:rPr>
               <a:t>We would aim to add CICS, IMS, MQ and DB2 as well to allow </a:t>
             </a:r>
@@ -11701,7 +12602,7 @@
                   <a:srgbClr val="222222"/>
                 </a:solidFill>
                 <a:effectLst/>
-                <a:latin typeface="Lato"/>
+                <a:latin typeface="+mj-lt"/>
               </a:rPr>
               <a:t>Zowe</a:t>
             </a:r>
@@ -11711,7 +12612,7 @@
                   <a:srgbClr val="222222"/>
                 </a:solidFill>
                 <a:effectLst/>
-                <a:latin typeface="Lato"/>
+                <a:latin typeface="+mj-lt"/>
               </a:rPr>
               <a:t> CLI extension packages to be tested</a:t>
             </a:r>
@@ -11728,7 +12629,7 @@
               <a:solidFill>
                 <a:srgbClr val="222222"/>
               </a:solidFill>
-              <a:latin typeface="Lato"/>
+              <a:latin typeface="+mj-lt"/>
               <a:ea typeface="Gill Sans"/>
             </a:endParaRPr>
           </a:p>
@@ -11745,7 +12646,7 @@
                 <a:solidFill>
                   <a:srgbClr val="222222"/>
                 </a:solidFill>
-                <a:latin typeface="Lato"/>
+                <a:latin typeface="+mj-lt"/>
                 <a:ea typeface="Gill Sans"/>
               </a:rPr>
               <a:t>Would need co-ordination with other squads to find out exact requirements</a:t>
@@ -11754,7 +12655,7 @@
               <a:solidFill>
                 <a:srgbClr val="222222"/>
               </a:solidFill>
-              <a:latin typeface="Lato"/>
+              <a:latin typeface="+mj-lt"/>
               <a:ea typeface="Gill Sans"/>
             </a:endParaRPr>
           </a:p>
@@ -11770,7 +12671,7 @@
               <a:solidFill>
                 <a:srgbClr val="222222"/>
               </a:solidFill>
-              <a:latin typeface="Lato"/>
+              <a:latin typeface="+mj-lt"/>
               <a:ea typeface="Gill Sans"/>
             </a:endParaRPr>
           </a:p>
@@ -11783,7 +12684,7 @@
               <a:buChar char="Ø"/>
             </a:pPr>
             <a:endParaRPr lang="en-US" spc="-1" dirty="0">
-              <a:latin typeface="Gill Sans"/>
+              <a:latin typeface="+mj-lt"/>
               <a:ea typeface="Gill Sans"/>
             </a:endParaRPr>
           </a:p>
@@ -11884,7 +12785,7 @@
                 <a:solidFill>
                   <a:srgbClr val="262626"/>
                 </a:solidFill>
-                <a:latin typeface="Gill Sans"/>
+                <a:latin typeface="+mj-lt"/>
                 <a:ea typeface="Gill Sans"/>
               </a:rPr>
               <a:t>CI/CD – </a:t>
@@ -11894,7 +12795,7 @@
                 <a:solidFill>
                   <a:srgbClr val="262626"/>
                 </a:solidFill>
-                <a:latin typeface="Gill Sans"/>
+                <a:latin typeface="+mj-lt"/>
                 <a:ea typeface="Gill Sans"/>
               </a:rPr>
               <a:t>Pipeline improvements</a:t>
@@ -11903,7 +12804,7 @@
               <a:solidFill>
                 <a:srgbClr val="000000"/>
               </a:solidFill>
-              <a:latin typeface="Arial"/>
+              <a:latin typeface="+mj-lt"/>
             </a:endParaRPr>
           </a:p>
         </p:txBody>
@@ -11946,7 +12847,7 @@
                   <a:srgbClr val="222222"/>
                 </a:solidFill>
                 <a:effectLst/>
-                <a:latin typeface="Lato"/>
+                <a:latin typeface="+mj-lt"/>
                 <a:hlinkClick r:id="rId3"/>
               </a:rPr>
               <a:t>Fix reporting of false positives in nightly builds and new RC pipeline build</a:t>
@@ -11956,7 +12857,7 @@
                 <a:srgbClr val="222222"/>
               </a:solidFill>
               <a:effectLst/>
-              <a:latin typeface="Lato"/>
+              <a:latin typeface="+mj-lt"/>
             </a:endParaRPr>
           </a:p>
           <a:p>
@@ -11969,7 +12870,7 @@
               <a:solidFill>
                 <a:srgbClr val="222222"/>
               </a:solidFill>
-              <a:latin typeface="Lato"/>
+              <a:latin typeface="+mj-lt"/>
             </a:endParaRPr>
           </a:p>
           <a:p>
@@ -11986,7 +12887,7 @@
                   <a:srgbClr val="222222"/>
                 </a:solidFill>
                 <a:effectLst/>
-                <a:latin typeface="Lato"/>
+                <a:latin typeface="+mj-lt"/>
               </a:rPr>
               <a:t>Possibly create a similar pipeline for GA but not as much</a:t>
             </a:r>
@@ -12003,7 +12904,7 @@
               <a:solidFill>
                 <a:srgbClr val="222222"/>
               </a:solidFill>
-              <a:latin typeface="Lato"/>
+              <a:latin typeface="+mj-lt"/>
             </a:endParaRPr>
           </a:p>
           <a:p>
@@ -12020,7 +12921,7 @@
                   <a:srgbClr val="222222"/>
                 </a:solidFill>
                 <a:effectLst/>
-                <a:latin typeface="Lato"/>
+                <a:latin typeface="+mj-lt"/>
               </a:rPr>
               <a:t>Want to look into possibilities for automating update of </a:t>
             </a:r>
@@ -12030,7 +12931,7 @@
                   <a:srgbClr val="222222"/>
                 </a:solidFill>
                 <a:effectLst/>
-                <a:latin typeface="Lato"/>
+                <a:latin typeface="+mj-lt"/>
               </a:rPr>
               <a:t>manifest.json</a:t>
             </a:r>
@@ -12040,7 +12941,7 @@
                   <a:srgbClr val="222222"/>
                 </a:solidFill>
                 <a:effectLst/>
-                <a:latin typeface="Lato"/>
+                <a:latin typeface="+mj-lt"/>
               </a:rPr>
               <a:t> as a lot of these changes are the same every time </a:t>
             </a:r>
@@ -12057,7 +12958,7 @@
               <a:solidFill>
                 <a:srgbClr val="222222"/>
               </a:solidFill>
-              <a:latin typeface="Lato"/>
+              <a:latin typeface="+mj-lt"/>
               <a:ea typeface="Gill Sans"/>
             </a:endParaRPr>
           </a:p>
@@ -12073,7 +12974,7 @@
               <a:solidFill>
                 <a:srgbClr val="222222"/>
               </a:solidFill>
-              <a:latin typeface="Lato"/>
+              <a:latin typeface="+mj-lt"/>
               <a:ea typeface="Gill Sans"/>
             </a:endParaRPr>
           </a:p>
@@ -12089,7 +12990,7 @@
               <a:solidFill>
                 <a:srgbClr val="222222"/>
               </a:solidFill>
-              <a:latin typeface="Lato"/>
+              <a:latin typeface="+mj-lt"/>
               <a:ea typeface="Gill Sans"/>
             </a:endParaRPr>
           </a:p>
@@ -12102,7 +13003,7 @@
               <a:buChar char="Ø"/>
             </a:pPr>
             <a:endParaRPr lang="en-US" spc="-1" dirty="0">
-              <a:latin typeface="Gill Sans"/>
+              <a:latin typeface="+mj-lt"/>
               <a:ea typeface="Gill Sans"/>
             </a:endParaRPr>
           </a:p>
@@ -12170,7 +13071,7 @@
       </p:grpSpPr>
       <p:sp>
         <p:nvSpPr>
-          <p:cNvPr id="188" name="TextShape 1"/>
+          <p:cNvPr id="179" name="TextShape 1"/>
           <p:cNvSpPr txBox="1"/>
           <p:nvPr/>
         </p:nvSpPr>
@@ -12202,6 +13103,26 @@
               </a:spcBef>
             </a:pPr>
             <a:r>
+              <a:rPr lang="en-US" sz="3000" b="1" strike="noStrike" spc="-1" dirty="0" err="1" smtClean="0">
+                <a:solidFill>
+                  <a:srgbClr val="000000"/>
+                </a:solidFill>
+                <a:latin typeface="Arial"/>
+                <a:ea typeface="Arial"/>
+              </a:rPr>
+              <a:t>Zowe</a:t>
+            </a:r>
+            <a:r>
+              <a:rPr lang="en-US" sz="3000" b="1" strike="noStrike" spc="-1" dirty="0" smtClean="0">
+                <a:solidFill>
+                  <a:srgbClr val="000000"/>
+                </a:solidFill>
+                <a:latin typeface="Arial"/>
+                <a:ea typeface="Arial"/>
+              </a:rPr>
+              <a:t> CLI </a:t>
+            </a:r>
+            <a:r>
               <a:rPr lang="en-US" sz="3000" b="1" strike="noStrike" spc="-1" dirty="0">
                 <a:solidFill>
                   <a:srgbClr val="000000"/>
@@ -12209,7 +13130,7 @@
                 <a:latin typeface="Arial"/>
                 <a:ea typeface="Arial"/>
               </a:rPr>
-              <a:t>TBD Squad Focus</a:t>
+              <a:t>Squad Focus</a:t>
             </a:r>
             <a:endParaRPr lang="en-US" sz="3000" b="0" strike="noStrike" spc="-1" dirty="0">
               <a:solidFill>
@@ -12228,14 +13149,14 @@
               </a:spcBef>
             </a:pPr>
             <a:r>
-              <a:rPr lang="en-US" sz="2000" b="1" strike="noStrike" spc="-1" dirty="0">
+              <a:rPr lang="en-US" sz="2000" b="1" spc="-1" dirty="0" smtClean="0">
                 <a:solidFill>
                   <a:srgbClr val="000000"/>
                 </a:solidFill>
                 <a:latin typeface="Arial"/>
                 <a:ea typeface="Arial"/>
               </a:rPr>
-              <a:t>TBD (Squad Lead)</a:t>
+              <a:t>Michael Bauer</a:t>
             </a:r>
             <a:endParaRPr lang="en-US" sz="2000" b="0" strike="noStrike" spc="-1" dirty="0">
               <a:solidFill>
@@ -12247,6 +13168,11 @@
         </p:txBody>
       </p:sp>
     </p:spTree>
+    <p:extLst>
+      <p:ext uri="{BB962C8B-B14F-4D97-AF65-F5344CB8AC3E}">
+        <p14:creationId xmlns:p14="http://schemas.microsoft.com/office/powerpoint/2010/main" val="3144363835"/>
+      </p:ext>
+    </p:extLst>
   </p:cSld>
   <p:clrMapOvr>
     <a:masterClrMapping/>
@@ -12303,7 +13229,7 @@
       </p:grpSpPr>
       <p:sp>
         <p:nvSpPr>
-          <p:cNvPr id="189" name="TextShape 1"/>
+          <p:cNvPr id="182" name="TextShape 1"/>
           <p:cNvSpPr txBox="1"/>
           <p:nvPr/>
         </p:nvSpPr>
@@ -12332,34 +13258,41 @@
               </a:lnSpc>
             </a:pPr>
             <a:r>
-              <a:rPr lang="en-US" sz="2600" b="0" strike="noStrike" spc="-1" dirty="0">
+              <a:rPr lang="en-US" sz="3000" spc="-1" dirty="0" err="1" smtClean="0">
                 <a:solidFill>
                   <a:srgbClr val="262626"/>
                 </a:solidFill>
-                <a:latin typeface="Gill Sans"/>
                 <a:ea typeface="Gill Sans"/>
               </a:rPr>
-              <a:t>Title</a:t>
-            </a:r>
-            <a:endParaRPr lang="en-US" sz="2600" b="0" strike="noStrike" spc="-1" dirty="0">
-              <a:solidFill>
-                <a:srgbClr val="000000"/>
-              </a:solidFill>
-              <a:latin typeface="Arial"/>
-            </a:endParaRPr>
-          </a:p>
-        </p:txBody>
-      </p:sp>
-      <p:sp>
-        <p:nvSpPr>
-          <p:cNvPr id="190" name="TextShape 2"/>
+              <a:t>Zowe</a:t>
+            </a:r>
+            <a:r>
+              <a:rPr lang="en-US" sz="3000" spc="-1" dirty="0" smtClean="0">
+                <a:solidFill>
+                  <a:srgbClr val="262626"/>
+                </a:solidFill>
+                <a:ea typeface="Gill Sans"/>
+              </a:rPr>
+              <a:t> CLI Squad</a:t>
+            </a:r>
+            <a:endParaRPr lang="en-US" sz="3000" b="0" strike="noStrike" spc="-1" dirty="0">
+              <a:solidFill>
+                <a:srgbClr val="000000"/>
+              </a:solidFill>
+            </a:endParaRPr>
+          </a:p>
+        </p:txBody>
+      </p:sp>
+      <p:sp>
+        <p:nvSpPr>
+          <p:cNvPr id="183" name="TextShape 2"/>
           <p:cNvSpPr txBox="1"/>
           <p:nvPr/>
         </p:nvSpPr>
         <p:spPr>
           <a:xfrm>
-            <a:off x="336600" y="682920"/>
-            <a:ext cx="8349840" cy="4177800"/>
+            <a:off x="405518" y="993913"/>
+            <a:ext cx="8269762" cy="3808676"/>
           </a:xfrm>
           <a:prstGeom prst="rect">
             <a:avLst/>
@@ -12375,39 +13308,1071 @@
           </a:bodyPr>
           <a:lstStyle/>
           <a:p>
-            <a:pPr marL="457200" indent="-355320">
+            <a:pPr marL="387270" indent="-285750">
+              <a:spcBef>
+                <a:spcPts val="400"/>
+              </a:spcBef>
+              <a:buFont typeface="Wingdings" pitchFamily="2" charset="2"/>
+              <a:buChar char="Ø"/>
+            </a:pPr>
+            <a:r>
+              <a:rPr lang="en-US" dirty="0" smtClean="0"/>
+              <a:t>Validate </a:t>
+            </a:r>
+            <a:r>
+              <a:rPr lang="en-US" dirty="0" err="1"/>
+              <a:t>Zowe</a:t>
+            </a:r>
+            <a:r>
+              <a:rPr lang="en-US" dirty="0"/>
+              <a:t> CLI on Node v14. Node v14 becomes LTS on </a:t>
+            </a:r>
+            <a:r>
+              <a:rPr lang="en-US" dirty="0" smtClean="0"/>
+              <a:t>10/27.</a:t>
+            </a:r>
+            <a:br>
+              <a:rPr lang="en-US" dirty="0" smtClean="0"/>
+            </a:br>
+            <a:endParaRPr lang="en-US" dirty="0" smtClean="0"/>
+          </a:p>
+          <a:p>
+            <a:pPr marL="387270" indent="-285750">
+              <a:spcBef>
+                <a:spcPts val="400"/>
+              </a:spcBef>
+              <a:buFont typeface="Wingdings" pitchFamily="2" charset="2"/>
+              <a:buChar char="Ø"/>
+            </a:pPr>
+            <a:r>
+              <a:rPr lang="en-US" dirty="0" smtClean="0"/>
+              <a:t>Project </a:t>
+            </a:r>
+            <a:r>
+              <a:rPr lang="en-US" dirty="0"/>
+              <a:t>based CLI profiles. Implement design determined in </a:t>
+            </a:r>
+            <a:r>
+              <a:rPr lang="en-US" dirty="0">
+                <a:hlinkClick r:id="rId3"/>
+              </a:rPr>
+              <a:t>https://github.com/zowe/zowe-cli/issues/749</a:t>
+            </a:r>
+            <a:r>
+              <a:rPr lang="en-US" dirty="0"/>
+              <a:t> to allow for a single profile that stores information commonly needed for core + plug-ins. The goal is to allow for users to more easily store profiles in source control, share profiles with others, and update profile </a:t>
+            </a:r>
+            <a:r>
+              <a:rPr lang="en-US" dirty="0" smtClean="0"/>
+              <a:t>settings.</a:t>
+            </a:r>
+            <a:br>
+              <a:rPr lang="en-US" dirty="0" smtClean="0"/>
+            </a:br>
+            <a:endParaRPr lang="en-US" dirty="0" smtClean="0"/>
+          </a:p>
+          <a:p>
+            <a:pPr marL="387270" indent="-285750">
+              <a:spcBef>
+                <a:spcPts val="400"/>
+              </a:spcBef>
+              <a:buFont typeface="Wingdings" pitchFamily="2" charset="2"/>
+              <a:buChar char="Ø"/>
+            </a:pPr>
+            <a:r>
+              <a:rPr lang="en-US" dirty="0" smtClean="0"/>
+              <a:t>Validate </a:t>
+            </a:r>
+            <a:r>
+              <a:rPr lang="en-US" dirty="0"/>
+              <a:t>daemon mode </a:t>
+            </a:r>
+            <a:r>
+              <a:rPr lang="en-US" dirty="0" err="1"/>
+              <a:t>PoC</a:t>
+            </a:r>
+            <a:r>
+              <a:rPr lang="en-US" dirty="0"/>
+              <a:t> (</a:t>
+            </a:r>
+            <a:r>
+              <a:rPr lang="en-US" dirty="0">
+                <a:hlinkClick r:id="rId4"/>
+              </a:rPr>
+              <a:t>https://github.com/zowe/zowe-cli/pull/825</a:t>
+            </a:r>
+            <a:r>
+              <a:rPr lang="en-US" dirty="0"/>
+              <a:t>). The goal is to improve </a:t>
+            </a:r>
+            <a:r>
+              <a:rPr lang="en-US" dirty="0" err="1"/>
+              <a:t>Zowe</a:t>
+            </a:r>
+            <a:r>
+              <a:rPr lang="en-US" dirty="0"/>
+              <a:t> CLI performance for all commands. Local command operations like help should take less than one second to run.</a:t>
+            </a:r>
+          </a:p>
+        </p:txBody>
+      </p:sp>
+    </p:spTree>
+    <p:extLst>
+      <p:ext uri="{BB962C8B-B14F-4D97-AF65-F5344CB8AC3E}">
+        <p14:creationId xmlns:p14="http://schemas.microsoft.com/office/powerpoint/2010/main" val="1761493807"/>
+      </p:ext>
+    </p:extLst>
+  </p:cSld>
+  <p:clrMapOvr>
+    <a:masterClrMapping/>
+  </p:clrMapOvr>
+  <p:transition spd="med">
+    <p:fade thruBlk="1"/>
+  </p:transition>
+  <p:timing>
+    <p:tnLst>
+      <p:par>
+        <p:cTn id="1" dur="indefinite" restart="never" nodeType="tmRoot">
+          <p:childTnLst>
+            <p:seq>
+              <p:cTn id="2" dur="indefinite" nodeType="mainSeq"/>
+              <p:prevCondLst>
+                <p:cond evt="onPrev" delay="0">
+                  <p:tgtEl>
+                    <p:sldTgt/>
+                  </p:tgtEl>
+                </p:cond>
+              </p:prevCondLst>
+              <p:nextCondLst>
+                <p:cond evt="onNext" delay="0">
+                  <p:tgtEl>
+                    <p:sldTgt/>
+                  </p:tgtEl>
+                </p:cond>
+              </p:nextCondLst>
+            </p:seq>
+          </p:childTnLst>
+        </p:cTn>
+      </p:par>
+    </p:tnLst>
+  </p:timing>
+</p:sld>
+</file>
+
+<file path=ppt/slides/slide16.xml><?xml version="1.0" encoding="utf-8"?>
+<p:sld xmlns:a="http://schemas.openxmlformats.org/drawingml/2006/main" xmlns:r="http://schemas.openxmlformats.org/officeDocument/2006/relationships" xmlns:p="http://schemas.openxmlformats.org/presentationml/2006/main">
+  <p:cSld>
+    <p:spTree>
+      <p:nvGrpSpPr>
+        <p:cNvPr id="1" name=""/>
+        <p:cNvGrpSpPr/>
+        <p:nvPr/>
+      </p:nvGrpSpPr>
+      <p:grpSpPr>
+        <a:xfrm>
+          <a:off x="0" y="0"/>
+          <a:ext cx="0" cy="0"/>
+          <a:chOff x="0" y="0"/>
+          <a:chExt cx="0" cy="0"/>
+        </a:xfrm>
+      </p:grpSpPr>
+      <p:sp>
+        <p:nvSpPr>
+          <p:cNvPr id="182" name="TextShape 1"/>
+          <p:cNvSpPr txBox="1"/>
+          <p:nvPr/>
+        </p:nvSpPr>
+        <p:spPr>
+          <a:xfrm>
+            <a:off x="334080" y="159480"/>
+            <a:ext cx="7893720" cy="447120"/>
+          </a:xfrm>
+          <a:prstGeom prst="rect">
+            <a:avLst/>
+          </a:prstGeom>
+          <a:noFill/>
+          <a:ln>
+            <a:noFill/>
+          </a:ln>
+        </p:spPr>
+        <p:txBody>
+          <a:bodyPr tIns="91440" bIns="91440" anchor="ctr">
+            <a:noAutofit/>
+          </a:bodyPr>
+          <a:lstStyle/>
+          <a:p>
+            <a:pPr>
               <a:lnSpc>
                 <a:spcPct val="100000"/>
               </a:lnSpc>
+            </a:pPr>
+            <a:r>
+              <a:rPr lang="en-US" sz="3000" spc="-1" dirty="0" err="1" smtClean="0">
+                <a:solidFill>
+                  <a:srgbClr val="262626"/>
+                </a:solidFill>
+                <a:latin typeface="+mj-lt"/>
+                <a:ea typeface="Gill Sans"/>
+              </a:rPr>
+              <a:t>Zowe</a:t>
+            </a:r>
+            <a:r>
+              <a:rPr lang="en-US" sz="3000" spc="-1" dirty="0" smtClean="0">
+                <a:solidFill>
+                  <a:srgbClr val="262626"/>
+                </a:solidFill>
+                <a:latin typeface="+mj-lt"/>
+                <a:ea typeface="Gill Sans"/>
+              </a:rPr>
+              <a:t> CLI Squad</a:t>
+            </a:r>
+            <a:endParaRPr lang="en-US" sz="3000" b="0" strike="noStrike" spc="-1" dirty="0">
+              <a:solidFill>
+                <a:srgbClr val="000000"/>
+              </a:solidFill>
+              <a:latin typeface="+mj-lt"/>
+            </a:endParaRPr>
+          </a:p>
+        </p:txBody>
+      </p:sp>
+      <p:sp>
+        <p:nvSpPr>
+          <p:cNvPr id="183" name="TextShape 2"/>
+          <p:cNvSpPr txBox="1"/>
+          <p:nvPr/>
+        </p:nvSpPr>
+        <p:spPr>
+          <a:xfrm>
+            <a:off x="405518" y="993913"/>
+            <a:ext cx="8269762" cy="3808676"/>
+          </a:xfrm>
+          <a:prstGeom prst="rect">
+            <a:avLst/>
+          </a:prstGeom>
+          <a:noFill/>
+          <a:ln>
+            <a:noFill/>
+          </a:ln>
+        </p:spPr>
+        <p:txBody>
+          <a:bodyPr tIns="91440" bIns="91440">
+            <a:noAutofit/>
+          </a:bodyPr>
+          <a:lstStyle/>
+          <a:p>
+            <a:pPr marL="387270" indent="-285750">
               <a:spcBef>
                 <a:spcPts val="400"/>
               </a:spcBef>
-              <a:buClr>
-                <a:srgbClr val="000000"/>
-              </a:buClr>
-              <a:buFont typeface="Arial"/>
-              <a:buChar char="•"/>
-            </a:pPr>
-            <a:r>
-              <a:rPr lang="en-US" sz="1800" b="0" strike="noStrike" spc="-1" dirty="0">
+              <a:buFont typeface="Wingdings" pitchFamily="2" charset="2"/>
+              <a:buChar char="Ø"/>
+            </a:pPr>
+            <a:r>
+              <a:rPr lang="en-US" dirty="0"/>
+              <a:t>Address growing number of community enhancement </a:t>
+            </a:r>
+            <a:r>
+              <a:rPr lang="en-US" dirty="0" smtClean="0"/>
+              <a:t>requests</a:t>
+            </a:r>
+          </a:p>
+          <a:p>
+            <a:pPr marL="387270" indent="-285750">
+              <a:spcBef>
+                <a:spcPts val="400"/>
+              </a:spcBef>
+              <a:buFont typeface="Wingdings" pitchFamily="2" charset="2"/>
+              <a:buChar char="Ø"/>
+            </a:pPr>
+            <a:endParaRPr lang="en-US" dirty="0" smtClean="0"/>
+          </a:p>
+          <a:p>
+            <a:pPr marL="387270" indent="-285750">
+              <a:spcBef>
+                <a:spcPts val="400"/>
+              </a:spcBef>
+              <a:buFont typeface="Wingdings" pitchFamily="2" charset="2"/>
+              <a:buChar char="Ø"/>
+            </a:pPr>
+            <a:r>
+              <a:rPr lang="en-US" dirty="0" smtClean="0"/>
+              <a:t>Ensure </a:t>
+            </a:r>
+            <a:r>
+              <a:rPr lang="en-US" dirty="0"/>
+              <a:t>successful </a:t>
+            </a:r>
+            <a:r>
+              <a:rPr lang="en-US" dirty="0" smtClean="0"/>
+              <a:t>installation and use </a:t>
+            </a:r>
+            <a:r>
+              <a:rPr lang="en-US" dirty="0"/>
+              <a:t>of the </a:t>
+            </a:r>
+            <a:r>
+              <a:rPr lang="en-US" dirty="0" err="1"/>
+              <a:t>Zowe</a:t>
+            </a:r>
+            <a:r>
+              <a:rPr lang="en-US" dirty="0"/>
+              <a:t> CLI in environments with proxies. </a:t>
+            </a:r>
+            <a:r>
+              <a:rPr lang="en-US" dirty="0" smtClean="0"/>
+              <a:t/>
+            </a:r>
+            <a:br>
+              <a:rPr lang="en-US" dirty="0" smtClean="0"/>
+            </a:br>
+            <a:endParaRPr lang="en-US" dirty="0" smtClean="0"/>
+          </a:p>
+          <a:p>
+            <a:pPr marL="387270" indent="-285750">
+              <a:spcBef>
+                <a:spcPts val="400"/>
+              </a:spcBef>
+              <a:buFont typeface="Wingdings" pitchFamily="2" charset="2"/>
+              <a:buChar char="Ø"/>
+            </a:pPr>
+            <a:r>
+              <a:rPr lang="en-US" dirty="0" smtClean="0"/>
+              <a:t>Allow </a:t>
+            </a:r>
+            <a:r>
+              <a:rPr lang="en-US" dirty="0"/>
+              <a:t>for recently run commands to be easily recalled</a:t>
+            </a:r>
+            <a:r>
+              <a:rPr lang="en-US" dirty="0" smtClean="0"/>
+              <a:t>.</a:t>
+            </a:r>
+            <a:br>
+              <a:rPr lang="en-US" dirty="0" smtClean="0"/>
+            </a:br>
+            <a:endParaRPr lang="en-US" dirty="0"/>
+          </a:p>
+          <a:p>
+            <a:pPr marL="387270" indent="-285750">
+              <a:spcBef>
+                <a:spcPts val="400"/>
+              </a:spcBef>
+              <a:buFont typeface="Wingdings" pitchFamily="2" charset="2"/>
+              <a:buChar char="Ø"/>
+            </a:pPr>
+            <a:r>
+              <a:rPr lang="en-US" dirty="0"/>
+              <a:t>Ensure </a:t>
+            </a:r>
+            <a:r>
+              <a:rPr lang="en-US" dirty="0" err="1"/>
+              <a:t>Zowe</a:t>
+            </a:r>
+            <a:r>
+              <a:rPr lang="en-US" dirty="0"/>
+              <a:t> CLI functions properly in a </a:t>
+            </a:r>
+            <a:r>
+              <a:rPr lang="en-US" dirty="0" err="1"/>
+              <a:t>CodeReady</a:t>
+            </a:r>
+            <a:r>
+              <a:rPr lang="en-US" dirty="0"/>
+              <a:t> Workspace. </a:t>
+            </a:r>
+          </a:p>
+        </p:txBody>
+      </p:sp>
+    </p:spTree>
+    <p:extLst>
+      <p:ext uri="{BB962C8B-B14F-4D97-AF65-F5344CB8AC3E}">
+        <p14:creationId xmlns:p14="http://schemas.microsoft.com/office/powerpoint/2010/main" val="587560883"/>
+      </p:ext>
+    </p:extLst>
+  </p:cSld>
+  <p:clrMapOvr>
+    <a:masterClrMapping/>
+  </p:clrMapOvr>
+  <p:transition spd="med">
+    <p:fade thruBlk="1"/>
+  </p:transition>
+  <p:timing>
+    <p:tnLst>
+      <p:par>
+        <p:cTn id="1" dur="indefinite" restart="never" nodeType="tmRoot">
+          <p:childTnLst>
+            <p:seq>
+              <p:cTn id="2" dur="indefinite" nodeType="mainSeq"/>
+              <p:prevCondLst>
+                <p:cond evt="onPrev" delay="0">
+                  <p:tgtEl>
+                    <p:sldTgt/>
+                  </p:tgtEl>
+                </p:cond>
+              </p:prevCondLst>
+              <p:nextCondLst>
+                <p:cond evt="onNext" delay="0">
+                  <p:tgtEl>
+                    <p:sldTgt/>
+                  </p:tgtEl>
+                </p:cond>
+              </p:nextCondLst>
+            </p:seq>
+          </p:childTnLst>
+        </p:cTn>
+      </p:par>
+    </p:tnLst>
+  </p:timing>
+</p:sld>
+</file>
+
+<file path=ppt/slides/slide17.xml><?xml version="1.0" encoding="utf-8"?>
+<p:sld xmlns:a="http://schemas.openxmlformats.org/drawingml/2006/main" xmlns:r="http://schemas.openxmlformats.org/officeDocument/2006/relationships" xmlns:p="http://schemas.openxmlformats.org/presentationml/2006/main">
+  <p:cSld>
+    <p:spTree>
+      <p:nvGrpSpPr>
+        <p:cNvPr id="1" name=""/>
+        <p:cNvGrpSpPr/>
+        <p:nvPr/>
+      </p:nvGrpSpPr>
+      <p:grpSpPr>
+        <a:xfrm>
+          <a:off x="0" y="0"/>
+          <a:ext cx="0" cy="0"/>
+          <a:chOff x="0" y="0"/>
+          <a:chExt cx="0" cy="0"/>
+        </a:xfrm>
+      </p:grpSpPr>
+      <p:sp>
+        <p:nvSpPr>
+          <p:cNvPr id="179" name="TextShape 1"/>
+          <p:cNvSpPr txBox="1"/>
+          <p:nvPr/>
+        </p:nvSpPr>
+        <p:spPr>
+          <a:xfrm>
+            <a:off x="308520" y="3525840"/>
+            <a:ext cx="6446160" cy="392040"/>
+          </a:xfrm>
+          <a:prstGeom prst="rect">
+            <a:avLst/>
+          </a:prstGeom>
+          <a:noFill/>
+          <a:ln>
+            <a:noFill/>
+          </a:ln>
+        </p:spPr>
+        <p:txBody>
+          <a:bodyPr lIns="0" tIns="0" rIns="0" bIns="0" anchor="b">
+            <a:noAutofit/>
+          </a:bodyPr>
+          <a:lstStyle/>
+          <a:p>
+            <a:pPr marL="457200" indent="-228240">
+              <a:lnSpc>
+                <a:spcPct val="85000"/>
+              </a:lnSpc>
+              <a:spcBef>
+                <a:spcPts val="901"/>
+              </a:spcBef>
+            </a:pPr>
+            <a:r>
+              <a:rPr lang="en-US" sz="3000" b="1" strike="noStrike" spc="-1" dirty="0" err="1" smtClean="0">
                 <a:solidFill>
                   <a:srgbClr val="000000"/>
                 </a:solidFill>
-                <a:latin typeface="Gill Sans"/>
+                <a:latin typeface="Arial"/>
+                <a:ea typeface="Arial"/>
+              </a:rPr>
+              <a:t>Zowe</a:t>
+            </a:r>
+            <a:r>
+              <a:rPr lang="en-US" sz="3000" b="1" strike="noStrike" spc="-1" dirty="0" smtClean="0">
+                <a:solidFill>
+                  <a:srgbClr val="000000"/>
+                </a:solidFill>
+                <a:latin typeface="Arial"/>
+                <a:ea typeface="Arial"/>
+              </a:rPr>
+              <a:t> Onboarding </a:t>
+            </a:r>
+            <a:r>
+              <a:rPr lang="en-US" sz="3000" b="1" strike="noStrike" spc="-1" dirty="0">
+                <a:solidFill>
+                  <a:srgbClr val="000000"/>
+                </a:solidFill>
+                <a:latin typeface="Arial"/>
+                <a:ea typeface="Arial"/>
+              </a:rPr>
+              <a:t>Squad Focus</a:t>
+            </a:r>
+            <a:endParaRPr lang="en-US" sz="3000" b="0" strike="noStrike" spc="-1" dirty="0">
+              <a:solidFill>
+                <a:srgbClr val="000000"/>
+              </a:solidFill>
+              <a:latin typeface="Arial"/>
+            </a:endParaRPr>
+          </a:p>
+          <a:p>
+            <a:pPr marL="457200" indent="-228240">
+              <a:lnSpc>
+                <a:spcPct val="85000"/>
+              </a:lnSpc>
+              <a:spcBef>
+                <a:spcPts val="901"/>
+              </a:spcBef>
+            </a:pPr>
+            <a:r>
+              <a:rPr lang="en-US" sz="2000" b="1" spc="-1" dirty="0" smtClean="0">
+                <a:solidFill>
+                  <a:srgbClr val="000000"/>
+                </a:solidFill>
+                <a:latin typeface="Arial"/>
+                <a:ea typeface="Arial"/>
+              </a:rPr>
+              <a:t>Rose </a:t>
+            </a:r>
+            <a:r>
+              <a:rPr lang="en-US" sz="2000" b="1" spc="-1" dirty="0" err="1" smtClean="0">
+                <a:solidFill>
+                  <a:srgbClr val="000000"/>
+                </a:solidFill>
+                <a:latin typeface="Arial"/>
+                <a:ea typeface="Arial"/>
+              </a:rPr>
+              <a:t>Sakach</a:t>
+            </a:r>
+            <a:endParaRPr lang="en-US" sz="2000" b="0" strike="noStrike" spc="-1" dirty="0">
+              <a:solidFill>
+                <a:srgbClr val="000000"/>
+              </a:solidFill>
+              <a:latin typeface="Arial"/>
+            </a:endParaRPr>
+          </a:p>
+        </p:txBody>
+      </p:sp>
+    </p:spTree>
+    <p:extLst>
+      <p:ext uri="{BB962C8B-B14F-4D97-AF65-F5344CB8AC3E}">
+        <p14:creationId xmlns:p14="http://schemas.microsoft.com/office/powerpoint/2010/main" val="1803504193"/>
+      </p:ext>
+    </p:extLst>
+  </p:cSld>
+  <p:clrMapOvr>
+    <a:masterClrMapping/>
+  </p:clrMapOvr>
+  <p:transition spd="med">
+    <p:fade/>
+  </p:transition>
+  <p:timing>
+    <p:tnLst>
+      <p:par>
+        <p:cTn id="1" dur="indefinite" restart="never" nodeType="tmRoot">
+          <p:childTnLst>
+            <p:seq>
+              <p:cTn id="2" dur="indefinite" nodeType="mainSeq"/>
+              <p:prevCondLst>
+                <p:cond evt="onPrev" delay="0">
+                  <p:tgtEl>
+                    <p:sldTgt/>
+                  </p:tgtEl>
+                </p:cond>
+              </p:prevCondLst>
+              <p:nextCondLst>
+                <p:cond evt="onNext" delay="0">
+                  <p:tgtEl>
+                    <p:sldTgt/>
+                  </p:tgtEl>
+                </p:cond>
+              </p:nextCondLst>
+            </p:seq>
+          </p:childTnLst>
+        </p:cTn>
+      </p:par>
+    </p:tnLst>
+  </p:timing>
+</p:sld>
+</file>
+
+<file path=ppt/slides/slide18.xml><?xml version="1.0" encoding="utf-8"?>
+<p:sld xmlns:a="http://schemas.openxmlformats.org/drawingml/2006/main" xmlns:r="http://schemas.openxmlformats.org/officeDocument/2006/relationships" xmlns:p="http://schemas.openxmlformats.org/presentationml/2006/main">
+  <p:cSld>
+    <p:spTree>
+      <p:nvGrpSpPr>
+        <p:cNvPr id="1" name=""/>
+        <p:cNvGrpSpPr/>
+        <p:nvPr/>
+      </p:nvGrpSpPr>
+      <p:grpSpPr>
+        <a:xfrm>
+          <a:off x="0" y="0"/>
+          <a:ext cx="0" cy="0"/>
+          <a:chOff x="0" y="0"/>
+          <a:chExt cx="0" cy="0"/>
+        </a:xfrm>
+      </p:grpSpPr>
+      <p:sp>
+        <p:nvSpPr>
+          <p:cNvPr id="182" name="TextShape 1"/>
+          <p:cNvSpPr txBox="1"/>
+          <p:nvPr/>
+        </p:nvSpPr>
+        <p:spPr>
+          <a:xfrm>
+            <a:off x="334080" y="159480"/>
+            <a:ext cx="7893720" cy="447120"/>
+          </a:xfrm>
+          <a:prstGeom prst="rect">
+            <a:avLst/>
+          </a:prstGeom>
+          <a:noFill/>
+          <a:ln>
+            <a:noFill/>
+          </a:ln>
+        </p:spPr>
+        <p:txBody>
+          <a:bodyPr tIns="91440" bIns="91440" anchor="ctr">
+            <a:noAutofit/>
+          </a:bodyPr>
+          <a:lstStyle/>
+          <a:p>
+            <a:pPr>
+              <a:lnSpc>
+                <a:spcPct val="100000"/>
+              </a:lnSpc>
+            </a:pPr>
+            <a:r>
+              <a:rPr lang="en-US" sz="3000" spc="-1" dirty="0" err="1" smtClean="0">
+                <a:solidFill>
+                  <a:srgbClr val="262626"/>
+                </a:solidFill>
+                <a:latin typeface="+mj-lt"/>
                 <a:ea typeface="Gill Sans"/>
               </a:rPr>
-              <a:t>TBD</a:t>
-            </a:r>
-            <a:endParaRPr lang="en-US" sz="1600" b="0" strike="noStrike" spc="-1" dirty="0">
-              <a:solidFill>
-                <a:srgbClr val="000000"/>
-              </a:solidFill>
-              <a:latin typeface="Arial"/>
-            </a:endParaRPr>
+              <a:t>Zowe</a:t>
+            </a:r>
+            <a:r>
+              <a:rPr lang="en-US" sz="3000" spc="-1" dirty="0" smtClean="0">
+                <a:solidFill>
+                  <a:srgbClr val="262626"/>
+                </a:solidFill>
+                <a:latin typeface="+mj-lt"/>
+                <a:ea typeface="Gill Sans"/>
+              </a:rPr>
+              <a:t> Onboarding Squad</a:t>
+            </a:r>
+            <a:endParaRPr lang="en-US" sz="3000" b="0" strike="noStrike" spc="-1" dirty="0">
+              <a:solidFill>
+                <a:srgbClr val="000000"/>
+              </a:solidFill>
+              <a:latin typeface="+mj-lt"/>
+            </a:endParaRPr>
+          </a:p>
+        </p:txBody>
+      </p:sp>
+      <p:sp>
+        <p:nvSpPr>
+          <p:cNvPr id="183" name="TextShape 2"/>
+          <p:cNvSpPr txBox="1"/>
+          <p:nvPr/>
+        </p:nvSpPr>
+        <p:spPr>
+          <a:xfrm>
+            <a:off x="405518" y="993913"/>
+            <a:ext cx="8269762" cy="3808676"/>
+          </a:xfrm>
+          <a:prstGeom prst="rect">
+            <a:avLst/>
+          </a:prstGeom>
+          <a:noFill/>
+          <a:ln>
+            <a:noFill/>
+          </a:ln>
+        </p:spPr>
+        <p:txBody>
+          <a:bodyPr tIns="91440" bIns="91440">
+            <a:noAutofit/>
+          </a:bodyPr>
+          <a:lstStyle/>
+          <a:p>
+            <a:pPr marL="387270" indent="-285750">
+              <a:spcBef>
+                <a:spcPts val="400"/>
+              </a:spcBef>
+              <a:buFont typeface="Wingdings" pitchFamily="2" charset="2"/>
+              <a:buChar char="Ø"/>
+            </a:pPr>
+            <a:r>
+              <a:rPr lang="en-US" b="1" dirty="0"/>
+              <a:t>Conformance Process </a:t>
+            </a:r>
+            <a:r>
+              <a:rPr lang="en-US" b="1" dirty="0" smtClean="0"/>
+              <a:t>Maturity</a:t>
+            </a:r>
+          </a:p>
+          <a:p>
+            <a:pPr marL="844470" lvl="1" indent="-285750">
+              <a:spcBef>
+                <a:spcPts val="400"/>
+              </a:spcBef>
+              <a:buFont typeface="Wingdings" pitchFamily="2" charset="2"/>
+              <a:buChar char="Ø"/>
+            </a:pPr>
+            <a:r>
+              <a:rPr lang="en-US" dirty="0" smtClean="0"/>
+              <a:t>Develop </a:t>
+            </a:r>
+            <a:r>
+              <a:rPr lang="en-US" dirty="0"/>
+              <a:t>a process for updating the Conformance Criteria for all components during ACTIVE LTS, Resolve the incremental Badge debate, and research </a:t>
+            </a:r>
+            <a:r>
+              <a:rPr lang="en-US" dirty="0" smtClean="0"/>
+              <a:t>App-Store</a:t>
+            </a:r>
+          </a:p>
+          <a:p>
+            <a:pPr marL="1301670" lvl="2" indent="-285750">
+              <a:spcBef>
+                <a:spcPts val="400"/>
+              </a:spcBef>
+              <a:buFont typeface="Wingdings" pitchFamily="2" charset="2"/>
+              <a:buChar char="Ø"/>
+            </a:pPr>
+            <a:r>
+              <a:rPr lang="en-US" dirty="0" smtClean="0"/>
+              <a:t>Implement </a:t>
+            </a:r>
+            <a:r>
+              <a:rPr lang="en-US" dirty="0"/>
+              <a:t>ACTIVE LTS Conformance Criteria Update process (target </a:t>
+            </a:r>
+            <a:r>
+              <a:rPr lang="en-US" dirty="0" smtClean="0"/>
+              <a:t>11/1)</a:t>
+            </a:r>
+          </a:p>
+          <a:p>
+            <a:pPr marL="1301670" lvl="2" indent="-285750">
+              <a:spcBef>
+                <a:spcPts val="400"/>
+              </a:spcBef>
+              <a:buFont typeface="Wingdings" pitchFamily="2" charset="2"/>
+              <a:buChar char="Ø"/>
+            </a:pPr>
+            <a:r>
+              <a:rPr lang="en-US" dirty="0" smtClean="0"/>
+              <a:t>Draft </a:t>
+            </a:r>
+            <a:r>
+              <a:rPr lang="en-US" dirty="0"/>
+              <a:t>Incremental Badging T&amp;Cs (target </a:t>
+            </a:r>
+            <a:r>
+              <a:rPr lang="en-US" dirty="0" smtClean="0"/>
+              <a:t>11/30)</a:t>
+            </a:r>
+          </a:p>
+          <a:p>
+            <a:pPr marL="1301670" lvl="2" indent="-285750">
+              <a:spcBef>
+                <a:spcPts val="400"/>
+              </a:spcBef>
+              <a:buFont typeface="Wingdings" pitchFamily="2" charset="2"/>
+              <a:buChar char="Ø"/>
+            </a:pPr>
+            <a:r>
+              <a:rPr lang="en-US" dirty="0" smtClean="0"/>
+              <a:t>Draft </a:t>
+            </a:r>
+            <a:r>
+              <a:rPr lang="en-US" dirty="0"/>
+              <a:t>recommendations for App-Store look-and-feel Web Page (stretch)</a:t>
+            </a:r>
           </a:p>
         </p:txBody>
       </p:sp>
     </p:spTree>
+    <p:extLst>
+      <p:ext uri="{BB962C8B-B14F-4D97-AF65-F5344CB8AC3E}">
+        <p14:creationId xmlns:p14="http://schemas.microsoft.com/office/powerpoint/2010/main" val="170913203"/>
+      </p:ext>
+    </p:extLst>
+  </p:cSld>
+  <p:clrMapOvr>
+    <a:masterClrMapping/>
+  </p:clrMapOvr>
+  <p:transition spd="med">
+    <p:fade thruBlk="1"/>
+  </p:transition>
+  <p:timing>
+    <p:tnLst>
+      <p:par>
+        <p:cTn id="1" dur="indefinite" restart="never" nodeType="tmRoot">
+          <p:childTnLst>
+            <p:seq>
+              <p:cTn id="2" dur="indefinite" nodeType="mainSeq"/>
+              <p:prevCondLst>
+                <p:cond evt="onPrev" delay="0">
+                  <p:tgtEl>
+                    <p:sldTgt/>
+                  </p:tgtEl>
+                </p:cond>
+              </p:prevCondLst>
+              <p:nextCondLst>
+                <p:cond evt="onNext" delay="0">
+                  <p:tgtEl>
+                    <p:sldTgt/>
+                  </p:tgtEl>
+                </p:cond>
+              </p:nextCondLst>
+            </p:seq>
+          </p:childTnLst>
+        </p:cTn>
+      </p:par>
+    </p:tnLst>
+  </p:timing>
+</p:sld>
+</file>
+
+<file path=ppt/slides/slide19.xml><?xml version="1.0" encoding="utf-8"?>
+<p:sld xmlns:a="http://schemas.openxmlformats.org/drawingml/2006/main" xmlns:r="http://schemas.openxmlformats.org/officeDocument/2006/relationships" xmlns:p="http://schemas.openxmlformats.org/presentationml/2006/main">
+  <p:cSld>
+    <p:spTree>
+      <p:nvGrpSpPr>
+        <p:cNvPr id="1" name=""/>
+        <p:cNvGrpSpPr/>
+        <p:nvPr/>
+      </p:nvGrpSpPr>
+      <p:grpSpPr>
+        <a:xfrm>
+          <a:off x="0" y="0"/>
+          <a:ext cx="0" cy="0"/>
+          <a:chOff x="0" y="0"/>
+          <a:chExt cx="0" cy="0"/>
+        </a:xfrm>
+      </p:grpSpPr>
+      <p:sp>
+        <p:nvSpPr>
+          <p:cNvPr id="182" name="TextShape 1"/>
+          <p:cNvSpPr txBox="1"/>
+          <p:nvPr/>
+        </p:nvSpPr>
+        <p:spPr>
+          <a:xfrm>
+            <a:off x="334080" y="159480"/>
+            <a:ext cx="7893720" cy="447120"/>
+          </a:xfrm>
+          <a:prstGeom prst="rect">
+            <a:avLst/>
+          </a:prstGeom>
+          <a:noFill/>
+          <a:ln>
+            <a:noFill/>
+          </a:ln>
+        </p:spPr>
+        <p:txBody>
+          <a:bodyPr tIns="91440" bIns="91440" anchor="ctr">
+            <a:noAutofit/>
+          </a:bodyPr>
+          <a:lstStyle/>
+          <a:p>
+            <a:pPr>
+              <a:lnSpc>
+                <a:spcPct val="100000"/>
+              </a:lnSpc>
+            </a:pPr>
+            <a:r>
+              <a:rPr lang="en-US" sz="3000" spc="-1" dirty="0" err="1" smtClean="0">
+                <a:solidFill>
+                  <a:srgbClr val="262626"/>
+                </a:solidFill>
+                <a:latin typeface="+mj-lt"/>
+                <a:ea typeface="Gill Sans"/>
+              </a:rPr>
+              <a:t>Zowe</a:t>
+            </a:r>
+            <a:r>
+              <a:rPr lang="en-US" sz="3000" spc="-1" dirty="0" smtClean="0">
+                <a:solidFill>
+                  <a:srgbClr val="262626"/>
+                </a:solidFill>
+                <a:latin typeface="+mj-lt"/>
+                <a:ea typeface="Gill Sans"/>
+              </a:rPr>
+              <a:t> Onboarding Squad</a:t>
+            </a:r>
+            <a:endParaRPr lang="en-US" sz="3000" b="0" strike="noStrike" spc="-1" dirty="0">
+              <a:solidFill>
+                <a:srgbClr val="000000"/>
+              </a:solidFill>
+              <a:latin typeface="+mj-lt"/>
+            </a:endParaRPr>
+          </a:p>
+        </p:txBody>
+      </p:sp>
+      <p:sp>
+        <p:nvSpPr>
+          <p:cNvPr id="183" name="TextShape 2"/>
+          <p:cNvSpPr txBox="1"/>
+          <p:nvPr/>
+        </p:nvSpPr>
+        <p:spPr>
+          <a:xfrm>
+            <a:off x="405518" y="993913"/>
+            <a:ext cx="8269762" cy="3808676"/>
+          </a:xfrm>
+          <a:prstGeom prst="rect">
+            <a:avLst/>
+          </a:prstGeom>
+          <a:noFill/>
+          <a:ln>
+            <a:noFill/>
+          </a:ln>
+        </p:spPr>
+        <p:txBody>
+          <a:bodyPr tIns="91440" bIns="91440">
+            <a:noAutofit/>
+          </a:bodyPr>
+          <a:lstStyle/>
+          <a:p>
+            <a:pPr marL="387270" indent="-285750">
+              <a:spcBef>
+                <a:spcPts val="400"/>
+              </a:spcBef>
+              <a:buFont typeface="Wingdings" pitchFamily="2" charset="2"/>
+              <a:buChar char="Ø"/>
+            </a:pPr>
+            <a:r>
+              <a:rPr lang="en-US" b="1" dirty="0" smtClean="0"/>
+              <a:t>Improve </a:t>
+            </a:r>
+            <a:r>
+              <a:rPr lang="en-US" b="1" dirty="0"/>
+              <a:t>Initial Onboarding </a:t>
+            </a:r>
+            <a:r>
+              <a:rPr lang="en-US" b="1" dirty="0" smtClean="0"/>
+              <a:t>Experience</a:t>
+            </a:r>
+          </a:p>
+          <a:p>
+            <a:pPr marL="844470" lvl="1" indent="-285750">
+              <a:spcBef>
+                <a:spcPts val="400"/>
+              </a:spcBef>
+              <a:buFont typeface="Wingdings" pitchFamily="2" charset="2"/>
+              <a:buChar char="Ø"/>
+            </a:pPr>
+            <a:r>
+              <a:rPr lang="en-US" dirty="0"/>
+              <a:t>Better direct </a:t>
+            </a:r>
+            <a:r>
+              <a:rPr lang="en-US" dirty="0" err="1"/>
+              <a:t>Onboarders</a:t>
+            </a:r>
+            <a:r>
+              <a:rPr lang="en-US" dirty="0"/>
+              <a:t> to appropriate areas within the </a:t>
+            </a:r>
+            <a:r>
+              <a:rPr lang="en-US" dirty="0" err="1"/>
+              <a:t>Zowe</a:t>
+            </a:r>
+            <a:r>
+              <a:rPr lang="en-US" dirty="0"/>
+              <a:t> Community to ensure their first experience with </a:t>
+            </a:r>
+            <a:r>
+              <a:rPr lang="en-US" dirty="0" err="1"/>
+              <a:t>Zowe</a:t>
+            </a:r>
+            <a:r>
+              <a:rPr lang="en-US" dirty="0"/>
+              <a:t> is beneficial to them and effective in making them a part of the </a:t>
+            </a:r>
+            <a:r>
+              <a:rPr lang="en-US" dirty="0" smtClean="0"/>
+              <a:t>Community</a:t>
+            </a:r>
+          </a:p>
+          <a:p>
+            <a:pPr marL="1301670" lvl="2" indent="-285750">
+              <a:spcBef>
+                <a:spcPts val="400"/>
+              </a:spcBef>
+              <a:buFont typeface="Wingdings" pitchFamily="2" charset="2"/>
+              <a:buChar char="Ø"/>
+            </a:pPr>
+            <a:r>
+              <a:rPr lang="en-US" dirty="0" smtClean="0"/>
+              <a:t>Complete </a:t>
+            </a:r>
+            <a:r>
+              <a:rPr lang="en-US" dirty="0"/>
+              <a:t>Persona research / interviews (target </a:t>
+            </a:r>
+            <a:r>
+              <a:rPr lang="en-US" dirty="0" smtClean="0"/>
+              <a:t>11/1)</a:t>
+            </a:r>
+          </a:p>
+          <a:p>
+            <a:pPr marL="1301670" lvl="2" indent="-285750">
+              <a:spcBef>
+                <a:spcPts val="400"/>
+              </a:spcBef>
+              <a:buFont typeface="Wingdings" pitchFamily="2" charset="2"/>
+              <a:buChar char="Ø"/>
+            </a:pPr>
+            <a:r>
+              <a:rPr lang="en-US" dirty="0" smtClean="0"/>
+              <a:t>Present </a:t>
+            </a:r>
+            <a:r>
+              <a:rPr lang="en-US" dirty="0"/>
+              <a:t>recommendations for UX and UI Website navigation improvements (target </a:t>
+            </a:r>
+            <a:r>
+              <a:rPr lang="en-US" dirty="0" smtClean="0"/>
+              <a:t>11/30)</a:t>
+            </a:r>
+          </a:p>
+          <a:p>
+            <a:pPr marL="1301670" lvl="2" indent="-285750">
+              <a:spcBef>
+                <a:spcPts val="400"/>
+              </a:spcBef>
+              <a:buFont typeface="Wingdings" pitchFamily="2" charset="2"/>
+              <a:buChar char="Ø"/>
+            </a:pPr>
+            <a:r>
+              <a:rPr lang="en-US" dirty="0" smtClean="0"/>
+              <a:t>Begin </a:t>
+            </a:r>
+            <a:r>
+              <a:rPr lang="en-US" dirty="0"/>
+              <a:t>Website modifications [stretch] -- Revise Webpages to better direct </a:t>
+            </a:r>
+            <a:r>
+              <a:rPr lang="en-US" dirty="0" err="1"/>
+              <a:t>Onboarders</a:t>
+            </a:r>
+            <a:r>
+              <a:rPr lang="en-US" dirty="0"/>
+              <a:t> to appropriate areas based on their "persona" (stretch)</a:t>
+            </a:r>
+          </a:p>
+        </p:txBody>
+      </p:sp>
+    </p:spTree>
+    <p:extLst>
+      <p:ext uri="{BB962C8B-B14F-4D97-AF65-F5344CB8AC3E}">
+        <p14:creationId xmlns:p14="http://schemas.microsoft.com/office/powerpoint/2010/main" val="2522186796"/>
+      </p:ext>
+    </p:extLst>
   </p:cSld>
   <p:clrMapOvr>
     <a:masterClrMapping/>
@@ -12562,16 +14527,36 @@
               <a:buChar char="•"/>
             </a:pPr>
             <a:r>
-              <a:rPr lang="en-US" sz="1600" b="0" strike="noStrike" spc="-1">
+              <a:rPr lang="en-US" sz="1600" b="0" strike="noStrike" spc="-1" dirty="0">
                 <a:solidFill>
                   <a:srgbClr val="000000"/>
                 </a:solidFill>
                 <a:latin typeface="Arial"/>
                 <a:ea typeface="Arial"/>
               </a:rPr>
-              <a:t>Before this presentation ZLC will present Zowe achievements from last PI and context/vision at a hill-level for the upcoming PI</a:t>
-            </a:r>
-            <a:endParaRPr lang="en-US" sz="1600" b="0" strike="noStrike" spc="-1">
+              <a:t>Before this presentation ZLC will present </a:t>
+            </a:r>
+            <a:r>
+              <a:rPr lang="en-US" sz="1600" b="0" strike="noStrike" spc="-1" dirty="0" err="1">
+                <a:solidFill>
+                  <a:srgbClr val="000000"/>
+                </a:solidFill>
+                <a:latin typeface="Arial"/>
+                <a:ea typeface="Arial"/>
+              </a:rPr>
+              <a:t>Zowe</a:t>
+            </a:r>
+            <a:r>
+              <a:rPr lang="en-US" sz="1600" b="0" strike="noStrike" spc="-1" dirty="0">
+                <a:solidFill>
+                  <a:srgbClr val="000000"/>
+                </a:solidFill>
+                <a:latin typeface="Arial"/>
+                <a:ea typeface="Arial"/>
+              </a:rPr>
+              <a:t> achievements from last PI and context/vision at a hill-level for the upcoming PI</a:t>
+            </a:r>
+            <a:endParaRPr lang="en-US" sz="1600" b="0" strike="noStrike" spc="-1" dirty="0">
               <a:latin typeface="Arial"/>
             </a:endParaRPr>
           </a:p>
@@ -12587,7 +14572,7 @@
               <a:buChar char="•"/>
             </a:pPr>
             <a:r>
-              <a:rPr lang="en-US" sz="1600" b="0" strike="noStrike" spc="-1">
+              <a:rPr lang="en-US" sz="1600" b="0" strike="noStrike" spc="-1" dirty="0">
                 <a:solidFill>
                   <a:srgbClr val="000000"/>
                 </a:solidFill>
@@ -12596,7 +14581,7 @@
               </a:rPr>
               <a:t>Following this presentation, the squads will disperse into breakouts to plan their PI in more detail</a:t>
             </a:r>
-            <a:endParaRPr lang="en-US" sz="1600" b="0" strike="noStrike" spc="-1">
+            <a:endParaRPr lang="en-US" sz="1600" b="0" strike="noStrike" spc="-1" dirty="0">
               <a:latin typeface="Arial"/>
             </a:endParaRPr>
           </a:p>
@@ -12609,6 +14594,1060 @@
   </p:clrMapOvr>
   <p:transition spd="med">
     <p:fade/>
+  </p:transition>
+  <p:timing>
+    <p:tnLst>
+      <p:par>
+        <p:cTn id="1" dur="indefinite" restart="never" nodeType="tmRoot">
+          <p:childTnLst>
+            <p:seq>
+              <p:cTn id="2" dur="indefinite" nodeType="mainSeq"/>
+              <p:prevCondLst>
+                <p:cond evt="onPrev" delay="0">
+                  <p:tgtEl>
+                    <p:sldTgt/>
+                  </p:tgtEl>
+                </p:cond>
+              </p:prevCondLst>
+              <p:nextCondLst>
+                <p:cond evt="onNext" delay="0">
+                  <p:tgtEl>
+                    <p:sldTgt/>
+                  </p:tgtEl>
+                </p:cond>
+              </p:nextCondLst>
+            </p:seq>
+          </p:childTnLst>
+        </p:cTn>
+      </p:par>
+    </p:tnLst>
+  </p:timing>
+</p:sld>
+</file>
+
+<file path=ppt/slides/slide20.xml><?xml version="1.0" encoding="utf-8"?>
+<p:sld xmlns:a="http://schemas.openxmlformats.org/drawingml/2006/main" xmlns:r="http://schemas.openxmlformats.org/officeDocument/2006/relationships" xmlns:p="http://schemas.openxmlformats.org/presentationml/2006/main">
+  <p:cSld>
+    <p:spTree>
+      <p:nvGrpSpPr>
+        <p:cNvPr id="1" name=""/>
+        <p:cNvGrpSpPr/>
+        <p:nvPr/>
+      </p:nvGrpSpPr>
+      <p:grpSpPr>
+        <a:xfrm>
+          <a:off x="0" y="0"/>
+          <a:ext cx="0" cy="0"/>
+          <a:chOff x="0" y="0"/>
+          <a:chExt cx="0" cy="0"/>
+        </a:xfrm>
+      </p:grpSpPr>
+      <p:sp>
+        <p:nvSpPr>
+          <p:cNvPr id="182" name="TextShape 1"/>
+          <p:cNvSpPr txBox="1"/>
+          <p:nvPr/>
+        </p:nvSpPr>
+        <p:spPr>
+          <a:xfrm>
+            <a:off x="334080" y="159480"/>
+            <a:ext cx="7893720" cy="447120"/>
+          </a:xfrm>
+          <a:prstGeom prst="rect">
+            <a:avLst/>
+          </a:prstGeom>
+          <a:noFill/>
+          <a:ln>
+            <a:noFill/>
+          </a:ln>
+        </p:spPr>
+        <p:txBody>
+          <a:bodyPr tIns="91440" bIns="91440" anchor="ctr">
+            <a:noAutofit/>
+          </a:bodyPr>
+          <a:lstStyle/>
+          <a:p>
+            <a:pPr>
+              <a:lnSpc>
+                <a:spcPct val="100000"/>
+              </a:lnSpc>
+            </a:pPr>
+            <a:r>
+              <a:rPr lang="en-US" sz="3000" spc="-1" dirty="0" err="1" smtClean="0">
+                <a:solidFill>
+                  <a:srgbClr val="262626"/>
+                </a:solidFill>
+                <a:latin typeface="+mj-lt"/>
+                <a:ea typeface="Gill Sans"/>
+              </a:rPr>
+              <a:t>Zowe</a:t>
+            </a:r>
+            <a:r>
+              <a:rPr lang="en-US" sz="3000" spc="-1" dirty="0" smtClean="0">
+                <a:solidFill>
+                  <a:srgbClr val="262626"/>
+                </a:solidFill>
+                <a:latin typeface="+mj-lt"/>
+                <a:ea typeface="Gill Sans"/>
+              </a:rPr>
+              <a:t> Onboarding Squad</a:t>
+            </a:r>
+            <a:endParaRPr lang="en-US" sz="3000" b="0" strike="noStrike" spc="-1" dirty="0">
+              <a:solidFill>
+                <a:srgbClr val="000000"/>
+              </a:solidFill>
+              <a:latin typeface="+mj-lt"/>
+            </a:endParaRPr>
+          </a:p>
+        </p:txBody>
+      </p:sp>
+      <p:sp>
+        <p:nvSpPr>
+          <p:cNvPr id="183" name="TextShape 2"/>
+          <p:cNvSpPr txBox="1"/>
+          <p:nvPr/>
+        </p:nvSpPr>
+        <p:spPr>
+          <a:xfrm>
+            <a:off x="405518" y="993913"/>
+            <a:ext cx="8269762" cy="3808676"/>
+          </a:xfrm>
+          <a:prstGeom prst="rect">
+            <a:avLst/>
+          </a:prstGeom>
+          <a:noFill/>
+          <a:ln>
+            <a:noFill/>
+          </a:ln>
+        </p:spPr>
+        <p:txBody>
+          <a:bodyPr tIns="91440" bIns="91440">
+            <a:noAutofit/>
+          </a:bodyPr>
+          <a:lstStyle/>
+          <a:p>
+            <a:pPr marL="387270" indent="-285750">
+              <a:spcBef>
+                <a:spcPts val="400"/>
+              </a:spcBef>
+              <a:buFont typeface="Wingdings" pitchFamily="2" charset="2"/>
+              <a:buChar char="Ø"/>
+            </a:pPr>
+            <a:r>
+              <a:rPr lang="en-US" b="1" dirty="0" smtClean="0"/>
+              <a:t>Extend </a:t>
+            </a:r>
+            <a:r>
+              <a:rPr lang="en-US" b="1" dirty="0"/>
+              <a:t>OUTREACH </a:t>
+            </a:r>
+            <a:r>
+              <a:rPr lang="en-US" b="1" dirty="0" smtClean="0"/>
+              <a:t>Efforts</a:t>
+            </a:r>
+          </a:p>
+          <a:p>
+            <a:pPr marL="844470" lvl="1" indent="-285750">
+              <a:spcBef>
+                <a:spcPts val="400"/>
+              </a:spcBef>
+              <a:buFont typeface="Wingdings" pitchFamily="2" charset="2"/>
+              <a:buChar char="Ø"/>
+            </a:pPr>
+            <a:r>
+              <a:rPr lang="en-US" dirty="0" smtClean="0"/>
+              <a:t>Increase </a:t>
+            </a:r>
+            <a:r>
+              <a:rPr lang="en-US" dirty="0"/>
+              <a:t>focus on OUTREACH efforts to Onboard more ISVs and Community members in </a:t>
+            </a:r>
+            <a:r>
+              <a:rPr lang="en-US" dirty="0" smtClean="0"/>
+              <a:t>general</a:t>
+            </a:r>
+          </a:p>
+          <a:p>
+            <a:pPr marL="1301670" lvl="2" indent="-285750">
+              <a:spcBef>
+                <a:spcPts val="400"/>
+              </a:spcBef>
+              <a:buFont typeface="Wingdings" pitchFamily="2" charset="2"/>
+              <a:buChar char="Ø"/>
+            </a:pPr>
+            <a:r>
+              <a:rPr lang="en-US" dirty="0" smtClean="0"/>
+              <a:t>Draft </a:t>
+            </a:r>
+            <a:r>
+              <a:rPr lang="en-US" dirty="0"/>
+              <a:t>a new Webpage to house Onboarding-centric collateral (</a:t>
+            </a:r>
+            <a:r>
+              <a:rPr lang="en-US" dirty="0" err="1"/>
+              <a:t>Zowe</a:t>
+            </a:r>
+            <a:r>
+              <a:rPr lang="en-US" dirty="0"/>
+              <a:t> intro videos etc.) (target </a:t>
+            </a:r>
+            <a:r>
+              <a:rPr lang="en-US" dirty="0" smtClean="0"/>
+              <a:t>12/31)</a:t>
+            </a:r>
+          </a:p>
+          <a:p>
+            <a:pPr marL="1301670" lvl="2" indent="-285750">
+              <a:spcBef>
+                <a:spcPts val="400"/>
+              </a:spcBef>
+              <a:buFont typeface="Wingdings" pitchFamily="2" charset="2"/>
+              <a:buChar char="Ø"/>
+            </a:pPr>
+            <a:r>
+              <a:rPr lang="en-US" dirty="0" smtClean="0"/>
+              <a:t>Research </a:t>
+            </a:r>
+            <a:r>
+              <a:rPr lang="en-US" dirty="0"/>
+              <a:t>how we can deliver a "request for Demo" capability at the new Zowe.org webpage (#2) where </a:t>
+            </a:r>
+            <a:r>
+              <a:rPr lang="en-US" dirty="0" err="1"/>
+              <a:t>Onboarders</a:t>
+            </a:r>
+            <a:r>
+              <a:rPr lang="en-US" dirty="0"/>
+              <a:t> can request a "live" demo (target </a:t>
+            </a:r>
+            <a:r>
+              <a:rPr lang="en-US" dirty="0" smtClean="0"/>
+              <a:t>11/30)</a:t>
+            </a:r>
+          </a:p>
+          <a:p>
+            <a:pPr marL="1301670" lvl="2" indent="-285750">
+              <a:spcBef>
+                <a:spcPts val="400"/>
+              </a:spcBef>
+              <a:buFont typeface="Wingdings" pitchFamily="2" charset="2"/>
+              <a:buChar char="Ø"/>
+            </a:pPr>
+            <a:r>
+              <a:rPr lang="en-US" dirty="0" smtClean="0"/>
+              <a:t>Deliver </a:t>
+            </a:r>
+            <a:r>
+              <a:rPr lang="en-US" dirty="0"/>
+              <a:t>1 Onboarding-focused blog at Medium.com (target </a:t>
+            </a:r>
+            <a:r>
+              <a:rPr lang="en-US" dirty="0" smtClean="0"/>
+              <a:t>12/31)</a:t>
+            </a:r>
+          </a:p>
+          <a:p>
+            <a:pPr marL="1301670" lvl="2" indent="-285750">
+              <a:spcBef>
+                <a:spcPts val="400"/>
+              </a:spcBef>
+              <a:buFont typeface="Wingdings" pitchFamily="2" charset="2"/>
+              <a:buChar char="Ø"/>
+            </a:pPr>
+            <a:r>
+              <a:rPr lang="en-US" dirty="0" smtClean="0"/>
+              <a:t>Communicate </a:t>
+            </a:r>
+            <a:r>
+              <a:rPr lang="en-US" dirty="0"/>
+              <a:t>with and present at (2)  WW </a:t>
+            </a:r>
+            <a:r>
+              <a:rPr lang="en-US" dirty="0" err="1"/>
+              <a:t>zMeetup</a:t>
+            </a:r>
+            <a:r>
+              <a:rPr lang="en-US" dirty="0"/>
+              <a:t> (Communities) (target 12/31)</a:t>
+            </a:r>
+          </a:p>
+        </p:txBody>
+      </p:sp>
+    </p:spTree>
+    <p:extLst>
+      <p:ext uri="{BB962C8B-B14F-4D97-AF65-F5344CB8AC3E}">
+        <p14:creationId xmlns:p14="http://schemas.microsoft.com/office/powerpoint/2010/main" val="940490073"/>
+      </p:ext>
+    </p:extLst>
+  </p:cSld>
+  <p:clrMapOvr>
+    <a:masterClrMapping/>
+  </p:clrMapOvr>
+  <p:transition spd="med">
+    <p:fade thruBlk="1"/>
+  </p:transition>
+  <p:timing>
+    <p:tnLst>
+      <p:par>
+        <p:cTn id="1" dur="indefinite" restart="never" nodeType="tmRoot">
+          <p:childTnLst>
+            <p:seq>
+              <p:cTn id="2" dur="indefinite" nodeType="mainSeq"/>
+              <p:prevCondLst>
+                <p:cond evt="onPrev" delay="0">
+                  <p:tgtEl>
+                    <p:sldTgt/>
+                  </p:tgtEl>
+                </p:cond>
+              </p:prevCondLst>
+              <p:nextCondLst>
+                <p:cond evt="onNext" delay="0">
+                  <p:tgtEl>
+                    <p:sldTgt/>
+                  </p:tgtEl>
+                </p:cond>
+              </p:nextCondLst>
+            </p:seq>
+          </p:childTnLst>
+        </p:cTn>
+      </p:par>
+    </p:tnLst>
+  </p:timing>
+</p:sld>
+</file>
+
+<file path=ppt/slides/slide21.xml><?xml version="1.0" encoding="utf-8"?>
+<p:sld xmlns:a="http://schemas.openxmlformats.org/drawingml/2006/main" xmlns:r="http://schemas.openxmlformats.org/officeDocument/2006/relationships" xmlns:p="http://schemas.openxmlformats.org/presentationml/2006/main">
+  <p:cSld>
+    <p:spTree>
+      <p:nvGrpSpPr>
+        <p:cNvPr id="1" name=""/>
+        <p:cNvGrpSpPr/>
+        <p:nvPr/>
+      </p:nvGrpSpPr>
+      <p:grpSpPr>
+        <a:xfrm>
+          <a:off x="0" y="0"/>
+          <a:ext cx="0" cy="0"/>
+          <a:chOff x="0" y="0"/>
+          <a:chExt cx="0" cy="0"/>
+        </a:xfrm>
+      </p:grpSpPr>
+      <p:sp>
+        <p:nvSpPr>
+          <p:cNvPr id="182" name="TextShape 1"/>
+          <p:cNvSpPr txBox="1"/>
+          <p:nvPr/>
+        </p:nvSpPr>
+        <p:spPr>
+          <a:xfrm>
+            <a:off x="334080" y="159480"/>
+            <a:ext cx="7893720" cy="447120"/>
+          </a:xfrm>
+          <a:prstGeom prst="rect">
+            <a:avLst/>
+          </a:prstGeom>
+          <a:noFill/>
+          <a:ln>
+            <a:noFill/>
+          </a:ln>
+        </p:spPr>
+        <p:txBody>
+          <a:bodyPr tIns="91440" bIns="91440" anchor="ctr">
+            <a:noAutofit/>
+          </a:bodyPr>
+          <a:lstStyle/>
+          <a:p>
+            <a:pPr>
+              <a:lnSpc>
+                <a:spcPct val="100000"/>
+              </a:lnSpc>
+            </a:pPr>
+            <a:r>
+              <a:rPr lang="en-US" sz="3000" spc="-1" dirty="0" err="1" smtClean="0">
+                <a:solidFill>
+                  <a:srgbClr val="262626"/>
+                </a:solidFill>
+                <a:latin typeface="+mj-lt"/>
+                <a:ea typeface="Gill Sans"/>
+              </a:rPr>
+              <a:t>Zowe</a:t>
+            </a:r>
+            <a:r>
+              <a:rPr lang="en-US" sz="3000" spc="-1" dirty="0" smtClean="0">
+                <a:solidFill>
+                  <a:srgbClr val="262626"/>
+                </a:solidFill>
+                <a:latin typeface="+mj-lt"/>
+                <a:ea typeface="Gill Sans"/>
+              </a:rPr>
+              <a:t> Onboarding Squad</a:t>
+            </a:r>
+            <a:endParaRPr lang="en-US" sz="3000" b="0" strike="noStrike" spc="-1" dirty="0">
+              <a:solidFill>
+                <a:srgbClr val="000000"/>
+              </a:solidFill>
+              <a:latin typeface="+mj-lt"/>
+            </a:endParaRPr>
+          </a:p>
+        </p:txBody>
+      </p:sp>
+      <p:sp>
+        <p:nvSpPr>
+          <p:cNvPr id="183" name="TextShape 2"/>
+          <p:cNvSpPr txBox="1"/>
+          <p:nvPr/>
+        </p:nvSpPr>
+        <p:spPr>
+          <a:xfrm>
+            <a:off x="405518" y="993913"/>
+            <a:ext cx="8269762" cy="3808676"/>
+          </a:xfrm>
+          <a:prstGeom prst="rect">
+            <a:avLst/>
+          </a:prstGeom>
+          <a:noFill/>
+          <a:ln>
+            <a:noFill/>
+          </a:ln>
+        </p:spPr>
+        <p:txBody>
+          <a:bodyPr tIns="91440" bIns="91440">
+            <a:noAutofit/>
+          </a:bodyPr>
+          <a:lstStyle/>
+          <a:p>
+            <a:pPr marL="387270" indent="-285750">
+              <a:spcBef>
+                <a:spcPts val="400"/>
+              </a:spcBef>
+              <a:buFont typeface="Wingdings" pitchFamily="2" charset="2"/>
+              <a:buChar char="Ø"/>
+            </a:pPr>
+            <a:r>
+              <a:rPr lang="en-US" b="1" dirty="0" smtClean="0"/>
+              <a:t>Manage </a:t>
+            </a:r>
+            <a:r>
+              <a:rPr lang="en-US" b="1" dirty="0"/>
+              <a:t>Production of and Leverage Statistics to Help All Squads to Identify </a:t>
+            </a:r>
+            <a:r>
+              <a:rPr lang="en-US" b="1" dirty="0" err="1"/>
+              <a:t>Zowe</a:t>
+            </a:r>
+            <a:r>
+              <a:rPr lang="en-US" b="1" dirty="0"/>
+              <a:t> Interest, Experimentation, and </a:t>
+            </a:r>
+            <a:r>
+              <a:rPr lang="en-US" b="1" dirty="0" smtClean="0"/>
+              <a:t>Challenges</a:t>
+            </a:r>
+          </a:p>
+          <a:p>
+            <a:pPr marL="844470" lvl="1" indent="-285750">
+              <a:spcBef>
+                <a:spcPts val="400"/>
+              </a:spcBef>
+              <a:buFont typeface="Wingdings" pitchFamily="2" charset="2"/>
+              <a:buChar char="Ø"/>
+            </a:pPr>
+            <a:r>
+              <a:rPr lang="en-US" dirty="0" smtClean="0"/>
+              <a:t>Continue </a:t>
+            </a:r>
+            <a:r>
+              <a:rPr lang="en-US" dirty="0"/>
+              <a:t>maturing statistics process and </a:t>
+            </a:r>
+            <a:r>
+              <a:rPr lang="en-US" dirty="0" smtClean="0"/>
+              <a:t>reporting</a:t>
+            </a:r>
+          </a:p>
+          <a:p>
+            <a:pPr marL="1301670" lvl="2" indent="-285750">
+              <a:spcBef>
+                <a:spcPts val="400"/>
+              </a:spcBef>
+              <a:buFont typeface="Wingdings" pitchFamily="2" charset="2"/>
+              <a:buChar char="Ø"/>
+            </a:pPr>
+            <a:r>
+              <a:rPr lang="en-US" dirty="0" smtClean="0"/>
+              <a:t>Automate </a:t>
+            </a:r>
+            <a:r>
+              <a:rPr lang="en-US" dirty="0"/>
+              <a:t>the monthly statistics report (target </a:t>
+            </a:r>
+            <a:r>
+              <a:rPr lang="en-US" dirty="0" smtClean="0"/>
+              <a:t>12/31)</a:t>
+            </a:r>
+          </a:p>
+          <a:p>
+            <a:pPr marL="1301670" lvl="2" indent="-285750">
+              <a:spcBef>
+                <a:spcPts val="400"/>
+              </a:spcBef>
+              <a:buFont typeface="Wingdings" pitchFamily="2" charset="2"/>
+              <a:buChar char="Ø"/>
+            </a:pPr>
+            <a:r>
+              <a:rPr lang="en-US" dirty="0" smtClean="0"/>
+              <a:t>Brainstorm </a:t>
+            </a:r>
+            <a:r>
+              <a:rPr lang="en-US" dirty="0"/>
+              <a:t>&amp; draft </a:t>
+            </a:r>
+            <a:r>
+              <a:rPr lang="en-US" dirty="0" err="1"/>
+              <a:t>Zowe</a:t>
+            </a:r>
+            <a:r>
+              <a:rPr lang="en-US" dirty="0"/>
+              <a:t> KPIs to help identify trends and  influential activities (target 12/31)</a:t>
+            </a:r>
+          </a:p>
+        </p:txBody>
+      </p:sp>
+    </p:spTree>
+    <p:extLst>
+      <p:ext uri="{BB962C8B-B14F-4D97-AF65-F5344CB8AC3E}">
+        <p14:creationId xmlns:p14="http://schemas.microsoft.com/office/powerpoint/2010/main" val="478070579"/>
+      </p:ext>
+    </p:extLst>
+  </p:cSld>
+  <p:clrMapOvr>
+    <a:masterClrMapping/>
+  </p:clrMapOvr>
+  <p:transition spd="med">
+    <p:fade thruBlk="1"/>
+  </p:transition>
+  <p:timing>
+    <p:tnLst>
+      <p:par>
+        <p:cTn id="1" dur="indefinite" restart="never" nodeType="tmRoot">
+          <p:childTnLst>
+            <p:seq>
+              <p:cTn id="2" dur="indefinite" nodeType="mainSeq"/>
+              <p:prevCondLst>
+                <p:cond evt="onPrev" delay="0">
+                  <p:tgtEl>
+                    <p:sldTgt/>
+                  </p:tgtEl>
+                </p:cond>
+              </p:prevCondLst>
+              <p:nextCondLst>
+                <p:cond evt="onNext" delay="0">
+                  <p:tgtEl>
+                    <p:sldTgt/>
+                  </p:tgtEl>
+                </p:cond>
+              </p:nextCondLst>
+            </p:seq>
+          </p:childTnLst>
+        </p:cTn>
+      </p:par>
+    </p:tnLst>
+  </p:timing>
+</p:sld>
+</file>
+
+<file path=ppt/slides/slide22.xml><?xml version="1.0" encoding="utf-8"?>
+<p:sld xmlns:a="http://schemas.openxmlformats.org/drawingml/2006/main" xmlns:r="http://schemas.openxmlformats.org/officeDocument/2006/relationships" xmlns:p="http://schemas.openxmlformats.org/presentationml/2006/main">
+  <p:cSld>
+    <p:spTree>
+      <p:nvGrpSpPr>
+        <p:cNvPr id="1" name=""/>
+        <p:cNvGrpSpPr/>
+        <p:nvPr/>
+      </p:nvGrpSpPr>
+      <p:grpSpPr>
+        <a:xfrm>
+          <a:off x="0" y="0"/>
+          <a:ext cx="0" cy="0"/>
+          <a:chOff x="0" y="0"/>
+          <a:chExt cx="0" cy="0"/>
+        </a:xfrm>
+      </p:grpSpPr>
+      <p:sp>
+        <p:nvSpPr>
+          <p:cNvPr id="180" name="TextShape 1"/>
+          <p:cNvSpPr txBox="1"/>
+          <p:nvPr/>
+        </p:nvSpPr>
+        <p:spPr>
+          <a:xfrm>
+            <a:off x="334080" y="159480"/>
+            <a:ext cx="7893720" cy="447120"/>
+          </a:xfrm>
+          <a:prstGeom prst="rect">
+            <a:avLst/>
+          </a:prstGeom>
+          <a:noFill/>
+          <a:ln>
+            <a:noFill/>
+          </a:ln>
+        </p:spPr>
+        <p:txBody>
+          <a:bodyPr tIns="91440" bIns="91440" anchor="ctr">
+            <a:noAutofit/>
+          </a:bodyPr>
+          <a:lstStyle/>
+          <a:p>
+            <a:pPr>
+              <a:lnSpc>
+                <a:spcPct val="100000"/>
+              </a:lnSpc>
+            </a:pPr>
+            <a:r>
+              <a:rPr lang="en-US" sz="3000" b="0" strike="noStrike" spc="-1" dirty="0">
+                <a:solidFill>
+                  <a:srgbClr val="262626"/>
+                </a:solidFill>
+                <a:latin typeface="+mj-lt"/>
+                <a:ea typeface="Gill Sans"/>
+              </a:rPr>
+              <a:t>Dependencies</a:t>
+            </a:r>
+            <a:endParaRPr lang="en-US" sz="3000" b="0" strike="noStrike" spc="-1" dirty="0">
+              <a:solidFill>
+                <a:srgbClr val="000000"/>
+              </a:solidFill>
+              <a:latin typeface="+mj-lt"/>
+            </a:endParaRPr>
+          </a:p>
+        </p:txBody>
+      </p:sp>
+      <p:sp>
+        <p:nvSpPr>
+          <p:cNvPr id="181" name="TextShape 2"/>
+          <p:cNvSpPr txBox="1"/>
+          <p:nvPr/>
+        </p:nvSpPr>
+        <p:spPr>
+          <a:xfrm>
+            <a:off x="306360" y="774000"/>
+            <a:ext cx="8368920" cy="4147560"/>
+          </a:xfrm>
+          <a:prstGeom prst="rect">
+            <a:avLst/>
+          </a:prstGeom>
+          <a:noFill/>
+          <a:ln>
+            <a:noFill/>
+          </a:ln>
+        </p:spPr>
+        <p:txBody>
+          <a:bodyPr tIns="91440" bIns="91440">
+            <a:noAutofit/>
+          </a:bodyPr>
+          <a:lstStyle/>
+          <a:p>
+            <a:pPr marL="457200" indent="-355320">
+              <a:lnSpc>
+                <a:spcPct val="100000"/>
+              </a:lnSpc>
+              <a:spcBef>
+                <a:spcPts val="400"/>
+              </a:spcBef>
+              <a:buClr>
+                <a:srgbClr val="000000"/>
+              </a:buClr>
+              <a:buFont typeface="Arial"/>
+              <a:buChar char="•"/>
+            </a:pPr>
+            <a:r>
+              <a:rPr lang="en-US" dirty="0" smtClean="0"/>
+              <a:t>DOC </a:t>
+            </a:r>
+            <a:r>
+              <a:rPr lang="en-US" dirty="0"/>
+              <a:t>Squad: will probably need to collaborate on Web Page </a:t>
+            </a:r>
+            <a:r>
+              <a:rPr lang="en-US" dirty="0" smtClean="0"/>
+              <a:t>modifications</a:t>
+            </a:r>
+            <a:br>
+              <a:rPr lang="en-US" dirty="0" smtClean="0"/>
+            </a:br>
+            <a:endParaRPr lang="en-US" dirty="0" smtClean="0"/>
+          </a:p>
+          <a:p>
+            <a:pPr marL="457200" indent="-355320">
+              <a:lnSpc>
+                <a:spcPct val="100000"/>
+              </a:lnSpc>
+              <a:spcBef>
+                <a:spcPts val="400"/>
+              </a:spcBef>
+              <a:buClr>
+                <a:srgbClr val="000000"/>
+              </a:buClr>
+              <a:buFont typeface="Arial"/>
+              <a:buChar char="•"/>
+            </a:pPr>
+            <a:r>
+              <a:rPr lang="en-US" dirty="0" smtClean="0"/>
+              <a:t>UX </a:t>
+            </a:r>
+            <a:r>
+              <a:rPr lang="en-US" dirty="0"/>
+              <a:t>Designers: welcome their input on web page </a:t>
+            </a:r>
+            <a:r>
+              <a:rPr lang="en-US" dirty="0" smtClean="0"/>
+              <a:t>design</a:t>
+            </a:r>
+            <a:br>
+              <a:rPr lang="en-US" dirty="0" smtClean="0"/>
+            </a:br>
+            <a:endParaRPr lang="en-US" dirty="0" smtClean="0"/>
+          </a:p>
+          <a:p>
+            <a:pPr marL="457200" indent="-355320">
+              <a:lnSpc>
+                <a:spcPct val="100000"/>
+              </a:lnSpc>
+              <a:spcBef>
+                <a:spcPts val="400"/>
+              </a:spcBef>
+              <a:buClr>
+                <a:srgbClr val="000000"/>
+              </a:buClr>
+              <a:buFont typeface="Arial"/>
+              <a:buChar char="•"/>
+            </a:pPr>
+            <a:r>
+              <a:rPr lang="en-US" dirty="0" smtClean="0"/>
+              <a:t>CLI</a:t>
+            </a:r>
+            <a:r>
+              <a:rPr lang="en-US" dirty="0"/>
+              <a:t>, API, Web UI, </a:t>
+            </a:r>
+            <a:r>
+              <a:rPr lang="en-US" dirty="0" err="1"/>
+              <a:t>etc</a:t>
+            </a:r>
+            <a:r>
+              <a:rPr lang="en-US" dirty="0"/>
+              <a:t>: Squad leads for their input on the "request for demo" deliverable</a:t>
+            </a:r>
+          </a:p>
+        </p:txBody>
+      </p:sp>
+    </p:spTree>
+    <p:extLst>
+      <p:ext uri="{BB962C8B-B14F-4D97-AF65-F5344CB8AC3E}">
+        <p14:creationId xmlns:p14="http://schemas.microsoft.com/office/powerpoint/2010/main" val="3546241616"/>
+      </p:ext>
+    </p:extLst>
+  </p:cSld>
+  <p:clrMapOvr>
+    <a:masterClrMapping/>
+  </p:clrMapOvr>
+  <p:transition spd="med">
+    <p:fade thruBlk="1"/>
+  </p:transition>
+  <p:timing>
+    <p:tnLst>
+      <p:par>
+        <p:cTn id="1" dur="indefinite" restart="never" nodeType="tmRoot">
+          <p:childTnLst>
+            <p:seq>
+              <p:cTn id="2" dur="indefinite" nodeType="mainSeq"/>
+              <p:prevCondLst>
+                <p:cond evt="onPrev" delay="0">
+                  <p:tgtEl>
+                    <p:sldTgt/>
+                  </p:tgtEl>
+                </p:cond>
+              </p:prevCondLst>
+              <p:nextCondLst>
+                <p:cond evt="onNext" delay="0">
+                  <p:tgtEl>
+                    <p:sldTgt/>
+                  </p:tgtEl>
+                </p:cond>
+              </p:nextCondLst>
+            </p:seq>
+          </p:childTnLst>
+        </p:cTn>
+      </p:par>
+    </p:tnLst>
+  </p:timing>
+</p:sld>
+</file>
+
+<file path=ppt/slides/slide23.xml><?xml version="1.0" encoding="utf-8"?>
+<p:sld xmlns:a="http://schemas.openxmlformats.org/drawingml/2006/main" xmlns:r="http://schemas.openxmlformats.org/officeDocument/2006/relationships" xmlns:p="http://schemas.openxmlformats.org/presentationml/2006/main">
+  <p:cSld>
+    <p:spTree>
+      <p:nvGrpSpPr>
+        <p:cNvPr id="1" name=""/>
+        <p:cNvGrpSpPr/>
+        <p:nvPr/>
+      </p:nvGrpSpPr>
+      <p:grpSpPr>
+        <a:xfrm>
+          <a:off x="0" y="0"/>
+          <a:ext cx="0" cy="0"/>
+          <a:chOff x="0" y="0"/>
+          <a:chExt cx="0" cy="0"/>
+        </a:xfrm>
+      </p:grpSpPr>
+      <p:sp>
+        <p:nvSpPr>
+          <p:cNvPr id="188" name="TextShape 1"/>
+          <p:cNvSpPr txBox="1"/>
+          <p:nvPr/>
+        </p:nvSpPr>
+        <p:spPr>
+          <a:xfrm>
+            <a:off x="308520" y="3525840"/>
+            <a:ext cx="6446160" cy="392040"/>
+          </a:xfrm>
+          <a:prstGeom prst="rect">
+            <a:avLst/>
+          </a:prstGeom>
+          <a:noFill/>
+          <a:ln>
+            <a:noFill/>
+          </a:ln>
+        </p:spPr>
+        <p:txBody>
+          <a:bodyPr lIns="0" tIns="0" rIns="0" bIns="0" anchor="b">
+            <a:noAutofit/>
+          </a:bodyPr>
+          <a:lstStyle/>
+          <a:p>
+            <a:pPr marL="457200" indent="-228240">
+              <a:lnSpc>
+                <a:spcPct val="85000"/>
+              </a:lnSpc>
+              <a:spcBef>
+                <a:spcPts val="901"/>
+              </a:spcBef>
+            </a:pPr>
+            <a:r>
+              <a:rPr lang="en-US" sz="3000" b="1" strike="noStrike" spc="-1" dirty="0">
+                <a:solidFill>
+                  <a:srgbClr val="000000"/>
+                </a:solidFill>
+                <a:latin typeface="Arial"/>
+                <a:ea typeface="Arial"/>
+              </a:rPr>
+              <a:t>TBD Squad Focus</a:t>
+            </a:r>
+            <a:endParaRPr lang="en-US" sz="3000" b="0" strike="noStrike" spc="-1" dirty="0">
+              <a:solidFill>
+                <a:srgbClr val="000000"/>
+              </a:solidFill>
+              <a:latin typeface="Arial"/>
+            </a:endParaRPr>
+          </a:p>
+          <a:p>
+            <a:pPr marL="457200" indent="-228240">
+              <a:lnSpc>
+                <a:spcPct val="85000"/>
+              </a:lnSpc>
+              <a:spcBef>
+                <a:spcPts val="901"/>
+              </a:spcBef>
+            </a:pPr>
+            <a:r>
+              <a:rPr lang="en-US" sz="2000" b="1" strike="noStrike" spc="-1" dirty="0">
+                <a:solidFill>
+                  <a:srgbClr val="000000"/>
+                </a:solidFill>
+                <a:latin typeface="Arial"/>
+                <a:ea typeface="Arial"/>
+              </a:rPr>
+              <a:t>TBD (Squad Lead)</a:t>
+            </a:r>
+            <a:endParaRPr lang="en-US" sz="2000" b="0" strike="noStrike" spc="-1" dirty="0">
+              <a:solidFill>
+                <a:srgbClr val="000000"/>
+              </a:solidFill>
+              <a:latin typeface="Arial"/>
+            </a:endParaRPr>
+          </a:p>
+        </p:txBody>
+      </p:sp>
+    </p:spTree>
+  </p:cSld>
+  <p:clrMapOvr>
+    <a:masterClrMapping/>
+  </p:clrMapOvr>
+  <p:transition spd="med">
+    <p:fade/>
+  </p:transition>
+  <p:timing>
+    <p:tnLst>
+      <p:par>
+        <p:cTn id="1" dur="indefinite" restart="never" nodeType="tmRoot">
+          <p:childTnLst>
+            <p:seq>
+              <p:cTn id="2" dur="indefinite" nodeType="mainSeq"/>
+              <p:prevCondLst>
+                <p:cond evt="onPrev" delay="0">
+                  <p:tgtEl>
+                    <p:sldTgt/>
+                  </p:tgtEl>
+                </p:cond>
+              </p:prevCondLst>
+              <p:nextCondLst>
+                <p:cond evt="onNext" delay="0">
+                  <p:tgtEl>
+                    <p:sldTgt/>
+                  </p:tgtEl>
+                </p:cond>
+              </p:nextCondLst>
+            </p:seq>
+          </p:childTnLst>
+        </p:cTn>
+      </p:par>
+    </p:tnLst>
+  </p:timing>
+</p:sld>
+</file>
+
+<file path=ppt/slides/slide24.xml><?xml version="1.0" encoding="utf-8"?>
+<p:sld xmlns:a="http://schemas.openxmlformats.org/drawingml/2006/main" xmlns:r="http://schemas.openxmlformats.org/officeDocument/2006/relationships" xmlns:p="http://schemas.openxmlformats.org/presentationml/2006/main">
+  <p:cSld>
+    <p:spTree>
+      <p:nvGrpSpPr>
+        <p:cNvPr id="1" name=""/>
+        <p:cNvGrpSpPr/>
+        <p:nvPr/>
+      </p:nvGrpSpPr>
+      <p:grpSpPr>
+        <a:xfrm>
+          <a:off x="0" y="0"/>
+          <a:ext cx="0" cy="0"/>
+          <a:chOff x="0" y="0"/>
+          <a:chExt cx="0" cy="0"/>
+        </a:xfrm>
+      </p:grpSpPr>
+      <p:sp>
+        <p:nvSpPr>
+          <p:cNvPr id="189" name="TextShape 1"/>
+          <p:cNvSpPr txBox="1"/>
+          <p:nvPr/>
+        </p:nvSpPr>
+        <p:spPr>
+          <a:xfrm>
+            <a:off x="334080" y="159480"/>
+            <a:ext cx="7893720" cy="447120"/>
+          </a:xfrm>
+          <a:prstGeom prst="rect">
+            <a:avLst/>
+          </a:prstGeom>
+          <a:noFill/>
+          <a:ln>
+            <a:noFill/>
+          </a:ln>
+        </p:spPr>
+        <p:txBody>
+          <a:bodyPr tIns="91440" bIns="91440" anchor="ctr">
+            <a:noAutofit/>
+          </a:bodyPr>
+          <a:lstStyle/>
+          <a:p>
+            <a:pPr>
+              <a:lnSpc>
+                <a:spcPct val="100000"/>
+              </a:lnSpc>
+            </a:pPr>
+            <a:r>
+              <a:rPr lang="en-US" sz="2600" b="0" strike="noStrike" spc="-1" dirty="0">
+                <a:solidFill>
+                  <a:srgbClr val="262626"/>
+                </a:solidFill>
+                <a:latin typeface="Gill Sans"/>
+                <a:ea typeface="Gill Sans"/>
+              </a:rPr>
+              <a:t>Title</a:t>
+            </a:r>
+            <a:endParaRPr lang="en-US" sz="2600" b="0" strike="noStrike" spc="-1" dirty="0">
+              <a:solidFill>
+                <a:srgbClr val="000000"/>
+              </a:solidFill>
+              <a:latin typeface="Arial"/>
+            </a:endParaRPr>
+          </a:p>
+        </p:txBody>
+      </p:sp>
+      <p:sp>
+        <p:nvSpPr>
+          <p:cNvPr id="190" name="TextShape 2"/>
+          <p:cNvSpPr txBox="1"/>
+          <p:nvPr/>
+        </p:nvSpPr>
+        <p:spPr>
+          <a:xfrm>
+            <a:off x="336600" y="682920"/>
+            <a:ext cx="8349840" cy="4177800"/>
+          </a:xfrm>
+          <a:prstGeom prst="rect">
+            <a:avLst/>
+          </a:prstGeom>
+          <a:noFill/>
+          <a:ln>
+            <a:noFill/>
+          </a:ln>
+        </p:spPr>
+        <p:txBody>
+          <a:bodyPr tIns="91440" bIns="91440">
+            <a:noAutofit/>
+          </a:bodyPr>
+          <a:lstStyle/>
+          <a:p>
+            <a:pPr marL="457200" indent="-355320">
+              <a:lnSpc>
+                <a:spcPct val="100000"/>
+              </a:lnSpc>
+              <a:spcBef>
+                <a:spcPts val="400"/>
+              </a:spcBef>
+              <a:buClr>
+                <a:srgbClr val="000000"/>
+              </a:buClr>
+              <a:buFont typeface="Arial"/>
+              <a:buChar char="•"/>
+            </a:pPr>
+            <a:r>
+              <a:rPr lang="en-US" sz="1800" b="0" strike="noStrike" spc="-1" dirty="0">
+                <a:solidFill>
+                  <a:srgbClr val="000000"/>
+                </a:solidFill>
+                <a:latin typeface="Gill Sans"/>
+                <a:ea typeface="Gill Sans"/>
+              </a:rPr>
+              <a:t>TBD</a:t>
+            </a:r>
+            <a:endParaRPr lang="en-US" sz="1600" b="0" strike="noStrike" spc="-1" dirty="0">
+              <a:solidFill>
+                <a:srgbClr val="000000"/>
+              </a:solidFill>
+              <a:latin typeface="Arial"/>
+            </a:endParaRPr>
+          </a:p>
+        </p:txBody>
+      </p:sp>
+    </p:spTree>
+  </p:cSld>
+  <p:clrMapOvr>
+    <a:masterClrMapping/>
+  </p:clrMapOvr>
+  <p:transition spd="med">
+    <p:fade thruBlk="1"/>
   </p:transition>
   <p:timing>
     <p:tnLst>
@@ -12688,20 +15727,20 @@
               </a:lnSpc>
             </a:pPr>
             <a:r>
-              <a:rPr lang="en-US" sz="3000" b="0" strike="noStrike" spc="-1">
+              <a:rPr lang="en-US" sz="3000" b="0" strike="noStrike" spc="-1" dirty="0">
                 <a:solidFill>
                   <a:srgbClr val="262626"/>
                 </a:solidFill>
-                <a:latin typeface="Gill Sans"/>
+                <a:latin typeface="+mj-lt"/>
                 <a:ea typeface="Gill Sans"/>
               </a:rPr>
               <a:t>Agenda</a:t>
             </a:r>
-            <a:endParaRPr lang="en-US" sz="3000" b="0" strike="noStrike" spc="-1">
-              <a:solidFill>
-                <a:srgbClr val="000000"/>
-              </a:solidFill>
-              <a:latin typeface="Arial"/>
+            <a:endParaRPr lang="en-US" sz="3000" b="0" strike="noStrike" spc="-1" dirty="0">
+              <a:solidFill>
+                <a:srgbClr val="000000"/>
+              </a:solidFill>
+              <a:latin typeface="+mj-lt"/>
             </a:endParaRPr>
           </a:p>
         </p:txBody>
@@ -12745,20 +15784,20 @@
               <a:buChar char="•"/>
             </a:pPr>
             <a:r>
-              <a:rPr lang="en-US" sz="2000" b="0" strike="noStrike" spc="-1" dirty="0">
+              <a:rPr lang="en-US" sz="2000" b="0" strike="noStrike" spc="-1" dirty="0" smtClean="0">
                 <a:solidFill>
                   <a:srgbClr val="000000"/>
                 </a:solidFill>
-                <a:latin typeface="Gill Sans"/>
+                <a:latin typeface="+mj-lt"/>
                 <a:ea typeface="Gill Sans"/>
               </a:rPr>
-              <a:t>Squad 1 Focus</a:t>
+              <a:t>System Squad Focus</a:t>
             </a:r>
             <a:endParaRPr lang="en-US" sz="2000" b="0" strike="noStrike" spc="-1" dirty="0">
               <a:solidFill>
                 <a:srgbClr val="000000"/>
               </a:solidFill>
-              <a:latin typeface="Arial"/>
+              <a:latin typeface="+mj-lt"/>
             </a:endParaRPr>
           </a:p>
           <a:p>
@@ -12776,20 +15815,61 @@
               <a:buChar char="•"/>
             </a:pPr>
             <a:r>
-              <a:rPr lang="en-US" sz="2000" b="0" strike="noStrike" spc="-1" dirty="0">
+              <a:rPr lang="en-US" sz="2000" spc="-1" dirty="0" err="1" smtClean="0">
                 <a:solidFill>
                   <a:srgbClr val="000000"/>
                 </a:solidFill>
-                <a:latin typeface="Gill Sans"/>
-                <a:ea typeface="Gill Sans"/>
-              </a:rPr>
-              <a:t>Squad 2 Focus</a:t>
+                <a:latin typeface="+mj-lt"/>
+              </a:rPr>
+              <a:t>Zowe</a:t>
+            </a:r>
+            <a:r>
+              <a:rPr lang="en-US" sz="2000" spc="-1" dirty="0" smtClean="0">
+                <a:solidFill>
+                  <a:srgbClr val="000000"/>
+                </a:solidFill>
+                <a:latin typeface="+mj-lt"/>
+              </a:rPr>
+              <a:t> CLI Squad Focus</a:t>
+            </a:r>
+          </a:p>
+          <a:p>
+            <a:pPr marL="457200" indent="-355320">
+              <a:lnSpc>
+                <a:spcPct val="100000"/>
+              </a:lnSpc>
+              <a:spcBef>
+                <a:spcPts val="400"/>
+              </a:spcBef>
+              <a:buClr>
+                <a:srgbClr val="000000"/>
+              </a:buClr>
+              <a:buFont typeface="Arial"/>
+              <a:buChar char="•"/>
+            </a:pPr>
+            <a:r>
+              <a:rPr lang="en-US" sz="2000" b="0" strike="noStrike" spc="-1" dirty="0" err="1" smtClean="0">
+                <a:solidFill>
+                  <a:srgbClr val="000000"/>
+                </a:solidFill>
+                <a:latin typeface="+mj-lt"/>
+              </a:rPr>
+              <a:t>Zowe</a:t>
+            </a:r>
+            <a:r>
+              <a:rPr lang="en-US" sz="2000" b="0" strike="noStrike" spc="-1" dirty="0" smtClean="0">
+                <a:solidFill>
+                  <a:srgbClr val="000000"/>
+                </a:solidFill>
+                <a:latin typeface="+mj-lt"/>
+              </a:rPr>
+              <a:t> Onboarding Squad Focus</a:t>
             </a:r>
             <a:endParaRPr lang="en-US" sz="2000" b="0" strike="noStrike" spc="-1" dirty="0">
               <a:solidFill>
                 <a:srgbClr val="000000"/>
               </a:solidFill>
-              <a:latin typeface="Arial"/>
+              <a:latin typeface="+mj-lt"/>
             </a:endParaRPr>
           </a:p>
           <a:p>
@@ -13103,20 +16183,20 @@
               </a:lnSpc>
             </a:pPr>
             <a:r>
-              <a:rPr lang="en-US" sz="3000" b="0" strike="noStrike" spc="-1">
+              <a:rPr lang="en-US" sz="3000" b="0" strike="noStrike" spc="-1" dirty="0">
                 <a:solidFill>
                   <a:srgbClr val="262626"/>
                 </a:solidFill>
-                <a:latin typeface="Gill Sans"/>
+                <a:latin typeface="+mj-lt"/>
                 <a:ea typeface="Gill Sans"/>
               </a:rPr>
               <a:t>Dependencies</a:t>
             </a:r>
-            <a:endParaRPr lang="en-US" sz="3000" b="0" strike="noStrike" spc="-1">
-              <a:solidFill>
-                <a:srgbClr val="000000"/>
-              </a:solidFill>
-              <a:latin typeface="Arial"/>
+            <a:endParaRPr lang="en-US" sz="3000" b="0" strike="noStrike" spc="-1" dirty="0">
+              <a:solidFill>
+                <a:srgbClr val="000000"/>
+              </a:solidFill>
+              <a:latin typeface="+mj-lt"/>
             </a:endParaRPr>
           </a:p>
         </p:txBody>
@@ -13164,7 +16244,7 @@
                 <a:solidFill>
                   <a:srgbClr val="000000"/>
                 </a:solidFill>
-                <a:latin typeface="Gill Sans" panose="020B0502020104020203" pitchFamily="34" charset="-79"/>
+                <a:latin typeface="+mj-lt"/>
                 <a:ea typeface="Gill Sans"/>
                 <a:cs typeface="Gill Sans" panose="020B0502020104020203" pitchFamily="34" charset="-79"/>
               </a:rPr>
@@ -13175,7 +16255,7 @@
                 <a:solidFill>
                   <a:srgbClr val="000000"/>
                 </a:solidFill>
-                <a:latin typeface="Gill Sans" panose="020B0502020104020203" pitchFamily="34" charset="-79"/>
+                <a:latin typeface="+mj-lt"/>
                 <a:ea typeface="Gill Sans"/>
                 <a:cs typeface="Gill Sans" panose="020B0502020104020203" pitchFamily="34" charset="-79"/>
               </a:rPr>
@@ -13198,7 +16278,7 @@
                 <a:solidFill>
                   <a:srgbClr val="000000"/>
                 </a:solidFill>
-                <a:latin typeface="Gill Sans" panose="020B0502020104020203" pitchFamily="34" charset="-79"/>
+                <a:latin typeface="+mj-lt"/>
                 <a:cs typeface="Gill Sans" panose="020B0502020104020203" pitchFamily="34" charset="-79"/>
               </a:rPr>
               <a:t>API ML Squad </a:t>
@@ -13208,7 +16288,7 @@
                 <a:solidFill>
                   <a:srgbClr val="000000"/>
                 </a:solidFill>
-                <a:latin typeface="Gill Sans" panose="020B0502020104020203" pitchFamily="34" charset="-79"/>
+                <a:latin typeface="+mj-lt"/>
                 <a:cs typeface="Gill Sans" panose="020B0502020104020203" pitchFamily="34" charset="-79"/>
               </a:rPr>
               <a:t>–</a:t>
@@ -13218,7 +16298,7 @@
                 <a:solidFill>
                   <a:srgbClr val="000000"/>
                 </a:solidFill>
-                <a:latin typeface="Gill Sans" panose="020B0502020104020203" pitchFamily="34" charset="-79"/>
+                <a:latin typeface="+mj-lt"/>
                 <a:cs typeface="Gill Sans" panose="020B0502020104020203" pitchFamily="34" charset="-79"/>
               </a:rPr>
               <a:t> Caching API,  APIML packaging, certificates, </a:t>
@@ -13228,7 +16308,7 @@
                 <a:solidFill>
                   <a:srgbClr val="000000"/>
                 </a:solidFill>
-                <a:latin typeface="Gill Sans" panose="020B0502020104020203" pitchFamily="34" charset="-79"/>
+                <a:latin typeface="+mj-lt"/>
                 <a:cs typeface="Gill Sans" panose="020B0502020104020203" pitchFamily="34" charset="-79"/>
               </a:rPr>
               <a:t>etc</a:t>
@@ -13237,7 +16317,7 @@
               <a:solidFill>
                 <a:srgbClr val="000000"/>
               </a:solidFill>
-              <a:latin typeface="Gill Sans" panose="020B0502020104020203" pitchFamily="34" charset="-79"/>
+              <a:latin typeface="+mj-lt"/>
               <a:cs typeface="Gill Sans" panose="020B0502020104020203" pitchFamily="34" charset="-79"/>
             </a:endParaRPr>
           </a:p>
@@ -13257,7 +16337,7 @@
                 <a:solidFill>
                   <a:srgbClr val="000000"/>
                 </a:solidFill>
-                <a:latin typeface="Gill Sans" panose="020B0502020104020203" pitchFamily="34" charset="-79"/>
+                <a:latin typeface="+mj-lt"/>
                 <a:cs typeface="Gill Sans" panose="020B0502020104020203" pitchFamily="34" charset="-79"/>
               </a:rPr>
               <a:t>Web UI Squad – Zowe Launcher, ZSS/ZIS improvements</a:t>
@@ -13279,7 +16359,7 @@
                 <a:solidFill>
                   <a:srgbClr val="000000"/>
                 </a:solidFill>
-                <a:latin typeface="Gill Sans" panose="020B0502020104020203" pitchFamily="34" charset="-79"/>
+                <a:latin typeface="+mj-lt"/>
                 <a:cs typeface="Gill Sans" panose="020B0502020104020203" pitchFamily="34" charset="-79"/>
               </a:rPr>
               <a:t>Docs Squad </a:t>
@@ -13289,7 +16369,7 @@
                 <a:solidFill>
                   <a:srgbClr val="000000"/>
                 </a:solidFill>
-                <a:latin typeface="Gill Sans" panose="020B0502020104020203" pitchFamily="34" charset="-79"/>
+                <a:latin typeface="+mj-lt"/>
                 <a:cs typeface="Gill Sans" panose="020B0502020104020203" pitchFamily="34" charset="-79"/>
               </a:rPr>
               <a:t>–</a:t>
@@ -13299,7 +16379,7 @@
                 <a:solidFill>
                   <a:srgbClr val="000000"/>
                 </a:solidFill>
-                <a:latin typeface="Gill Sans" panose="020B0502020104020203" pitchFamily="34" charset="-79"/>
+                <a:latin typeface="+mj-lt"/>
                 <a:cs typeface="Gill Sans" panose="020B0502020104020203" pitchFamily="34" charset="-79"/>
               </a:rPr>
               <a:t> improve documentation</a:t>
@@ -13320,7 +16400,7 @@
               <a:solidFill>
                 <a:srgbClr val="000000"/>
               </a:solidFill>
-              <a:latin typeface="Gill Sans" panose="020B0502020104020203" pitchFamily="34" charset="-79"/>
+              <a:latin typeface="+mj-lt"/>
               <a:cs typeface="Gill Sans" panose="020B0502020104020203" pitchFamily="34" charset="-79"/>
             </a:endParaRPr>
           </a:p>
@@ -13340,7 +16420,7 @@
                 <a:solidFill>
                   <a:srgbClr val="000000"/>
                 </a:solidFill>
-                <a:latin typeface="Gill Sans" panose="020B0502020104020203" pitchFamily="34" charset="-79"/>
+                <a:latin typeface="+mj-lt"/>
                 <a:cs typeface="Gill Sans" panose="020B0502020104020203" pitchFamily="34" charset="-79"/>
               </a:rPr>
               <a:t>Risks </a:t>
@@ -13350,7 +16430,7 @@
                 <a:solidFill>
                   <a:srgbClr val="000000"/>
                 </a:solidFill>
-                <a:latin typeface="Gill Sans" panose="020B0502020104020203" pitchFamily="34" charset="-79"/>
+                <a:latin typeface="+mj-lt"/>
                 <a:cs typeface="Gill Sans" panose="020B0502020104020203" pitchFamily="34" charset="-79"/>
               </a:rPr>
               <a:t>on </a:t>
@@ -13360,7 +16440,7 @@
                 <a:solidFill>
                   <a:srgbClr val="000000"/>
                 </a:solidFill>
-                <a:latin typeface="Gill Sans" panose="020B0502020104020203" pitchFamily="34" charset="-79"/>
+                <a:latin typeface="+mj-lt"/>
                 <a:cs typeface="Gill Sans" panose="020B0502020104020203" pitchFamily="34" charset="-79"/>
               </a:rPr>
               <a:t>Infrastructure</a:t>
@@ -13382,7 +16462,7 @@
                 <a:solidFill>
                   <a:srgbClr val="000000"/>
                 </a:solidFill>
-                <a:latin typeface="Gill Sans" panose="020B0502020104020203" pitchFamily="34" charset="-79"/>
+                <a:latin typeface="+mj-lt"/>
                 <a:cs typeface="Gill Sans" panose="020B0502020104020203" pitchFamily="34" charset="-79"/>
               </a:rPr>
               <a:t>We don’t have open infrastructure to </a:t>
@@ -13392,7 +16472,7 @@
                 <a:solidFill>
                   <a:srgbClr val="000000"/>
                 </a:solidFill>
-                <a:latin typeface="Gill Sans" panose="020B0502020104020203" pitchFamily="34" charset="-79"/>
+                <a:latin typeface="+mj-lt"/>
                 <a:cs typeface="Gill Sans" panose="020B0502020104020203" pitchFamily="34" charset="-79"/>
               </a:rPr>
               <a:t>test deployment on Sysplex.</a:t>
@@ -13401,7 +16481,7 @@
               <a:solidFill>
                 <a:srgbClr val="000000"/>
               </a:solidFill>
-              <a:latin typeface="Gill Sans" panose="020B0502020104020203" pitchFamily="34" charset="-79"/>
+              <a:latin typeface="+mj-lt"/>
               <a:cs typeface="Gill Sans" panose="020B0502020104020203" pitchFamily="34" charset="-79"/>
             </a:endParaRPr>
           </a:p>
@@ -13421,7 +16501,7 @@
                 <a:solidFill>
                   <a:srgbClr val="000000"/>
                 </a:solidFill>
-                <a:latin typeface="Gill Sans" panose="020B0502020104020203" pitchFamily="34" charset="-79"/>
+                <a:latin typeface="+mj-lt"/>
                 <a:cs typeface="Gill Sans" panose="020B0502020104020203" pitchFamily="34" charset="-79"/>
               </a:rPr>
               <a:t>Will rely on Broadcom’s experts and supports to verify deployment  on Sysplex with ACF2 and Top Secret.</a:t>
@@ -13430,7 +16510,7 @@
               <a:solidFill>
                 <a:srgbClr val="000000"/>
               </a:solidFill>
-              <a:latin typeface="Gill Sans" panose="020B0502020104020203" pitchFamily="34" charset="-79"/>
+              <a:latin typeface="+mj-lt"/>
               <a:cs typeface="Gill Sans" panose="020B0502020104020203" pitchFamily="34" charset="-79"/>
             </a:endParaRPr>
           </a:p>
@@ -13526,7 +16606,7 @@
                 <a:solidFill>
                   <a:srgbClr val="262626"/>
                 </a:solidFill>
-                <a:latin typeface="Gill Sans"/>
+                <a:latin typeface="+mj-lt"/>
                 <a:ea typeface="Gill Sans"/>
               </a:rPr>
               <a:t>Performance - Enhance Test Coverage</a:t>
@@ -13535,7 +16615,7 @@
               <a:solidFill>
                 <a:srgbClr val="000000"/>
               </a:solidFill>
-              <a:latin typeface="Arial"/>
+              <a:latin typeface="+mj-lt"/>
             </a:endParaRPr>
           </a:p>
         </p:txBody>
@@ -13575,14 +16655,14 @@
             </a:pPr>
             <a:r>
               <a:rPr lang="en-US" spc="-1" dirty="0">
-                <a:latin typeface="Gill Sans"/>
+                <a:latin typeface="+mj-lt"/>
                 <a:ea typeface="Gill Sans"/>
                 <a:hlinkClick r:id="rId3"/>
               </a:rPr>
               <a:t>Epic: Zowe Performance Test - Stage 2 - Enhance Test Coverage (2020PI4)</a:t>
             </a:r>
             <a:endParaRPr lang="en-US" spc="-1" dirty="0">
-              <a:latin typeface="Gill Sans"/>
+              <a:latin typeface="+mj-lt"/>
               <a:ea typeface="Gill Sans"/>
             </a:endParaRPr>
           </a:p>
@@ -13596,7 +16676,7 @@
               </a:spcBef>
             </a:pPr>
             <a:endParaRPr lang="en-US" spc="-1" dirty="0">
-              <a:latin typeface="Gill Sans"/>
+              <a:latin typeface="+mj-lt"/>
               <a:ea typeface="Gill Sans"/>
             </a:endParaRPr>
           </a:p>
@@ -13613,7 +16693,7 @@
             </a:pPr>
             <a:r>
               <a:rPr lang="en-US" spc="-1" dirty="0">
-                <a:latin typeface="Gill Sans"/>
+                <a:latin typeface="+mj-lt"/>
                 <a:ea typeface="Gill Sans"/>
               </a:rPr>
               <a:t>Finalize primary and component-level test suites </a:t>
@@ -13626,7 +16706,7 @@
                     <a:lumOff val="50000"/>
                   </a:schemeClr>
                 </a:solidFill>
-                <a:latin typeface="Gill Sans"/>
+                <a:latin typeface="+mj-lt"/>
                 <a:ea typeface="Gill Sans"/>
               </a:rPr>
               <a:t>Continue item from PI3</a:t>
@@ -13638,7 +16718,7 @@
                   <a:lumOff val="50000"/>
                 </a:schemeClr>
               </a:solidFill>
-              <a:latin typeface="Gill Sans"/>
+              <a:latin typeface="+mj-lt"/>
               <a:ea typeface="Gill Sans"/>
             </a:endParaRPr>
           </a:p>
@@ -13652,14 +16732,14 @@
             </a:pPr>
             <a:r>
               <a:rPr lang="en-US" spc="-1" dirty="0">
-                <a:latin typeface="Gill Sans"/>
+                <a:latin typeface="+mj-lt"/>
                 <a:ea typeface="Gill Sans"/>
                 <a:hlinkClick r:id="rId4"/>
               </a:rPr>
               <a:t>Create primary performance test suite</a:t>
             </a:r>
             <a:endParaRPr lang="en-US" spc="-1" dirty="0">
-              <a:latin typeface="Gill Sans"/>
+              <a:latin typeface="+mj-lt"/>
               <a:ea typeface="Gill Sans"/>
             </a:endParaRPr>
           </a:p>
@@ -13673,14 +16753,14 @@
             </a:pPr>
             <a:r>
               <a:rPr lang="en-US" spc="-1" dirty="0">
-                <a:latin typeface="Gill Sans"/>
+                <a:latin typeface="+mj-lt"/>
                 <a:ea typeface="Gill Sans"/>
                 <a:hlinkClick r:id="rId5"/>
               </a:rPr>
               <a:t>Create dedicated performance test suite for APIML</a:t>
             </a:r>
             <a:endParaRPr lang="en-US" spc="-1" dirty="0">
-              <a:latin typeface="Gill Sans"/>
+              <a:latin typeface="+mj-lt"/>
               <a:ea typeface="Gill Sans"/>
             </a:endParaRPr>
           </a:p>
@@ -13694,14 +16774,14 @@
             </a:pPr>
             <a:r>
               <a:rPr lang="en-US" spc="-1" dirty="0">
-                <a:latin typeface="Gill Sans"/>
+                <a:latin typeface="+mj-lt"/>
                 <a:ea typeface="Gill Sans"/>
                 <a:hlinkClick r:id="rId6"/>
               </a:rPr>
               <a:t>Create dedicated performance test suite for Explorer APIs</a:t>
             </a:r>
             <a:endParaRPr lang="en-US" spc="-1" dirty="0">
-              <a:latin typeface="Gill Sans"/>
+              <a:latin typeface="+mj-lt"/>
               <a:ea typeface="Gill Sans"/>
             </a:endParaRPr>
           </a:p>
@@ -13715,14 +16795,14 @@
             </a:pPr>
             <a:r>
               <a:rPr lang="en-US" spc="-1" dirty="0">
-                <a:latin typeface="Gill Sans"/>
+                <a:latin typeface="+mj-lt"/>
                 <a:ea typeface="Gill Sans"/>
                 <a:hlinkClick r:id="rId7"/>
               </a:rPr>
               <a:t>Create dedicated performance test suite for Desktop</a:t>
             </a:r>
             <a:endParaRPr lang="en-US" spc="-1" dirty="0">
-              <a:latin typeface="Gill Sans"/>
+              <a:latin typeface="+mj-lt"/>
               <a:ea typeface="Gill Sans"/>
             </a:endParaRPr>
           </a:p>
@@ -13739,14 +16819,14 @@
             </a:pPr>
             <a:r>
               <a:rPr lang="en-US" spc="-1" dirty="0">
-                <a:latin typeface="Gill Sans"/>
+                <a:latin typeface="+mj-lt"/>
                 <a:ea typeface="Gill Sans"/>
                 <a:hlinkClick r:id="rId8"/>
               </a:rPr>
               <a:t>Create dummy server for APIML testing</a:t>
             </a:r>
             <a:endParaRPr lang="en-US" spc="-1" dirty="0">
-              <a:latin typeface="Gill Sans"/>
+              <a:latin typeface="+mj-lt"/>
               <a:ea typeface="Gill Sans"/>
             </a:endParaRPr>
           </a:p>
@@ -13763,7 +16843,7 @@
             </a:pPr>
             <a:r>
               <a:rPr lang="en-US" spc="-1" dirty="0">
-                <a:latin typeface="Gill Sans"/>
+                <a:latin typeface="+mj-lt"/>
                 <a:ea typeface="Gill Sans"/>
                 <a:hlinkClick r:id="rId9"/>
               </a:rPr>
@@ -13771,14 +16851,14 @@
             </a:r>
             <a:r>
               <a:rPr lang="en-US" spc="-1" dirty="0" err="1">
-                <a:latin typeface="Gill Sans"/>
+                <a:latin typeface="+mj-lt"/>
                 <a:ea typeface="Gill Sans"/>
                 <a:hlinkClick r:id="rId9"/>
               </a:rPr>
               <a:t>zOS</a:t>
             </a:r>
             <a:endParaRPr lang="en-US" spc="-1" dirty="0">
-              <a:latin typeface="Gill Sans"/>
+              <a:latin typeface="+mj-lt"/>
               <a:ea typeface="Gill Sans"/>
             </a:endParaRPr>
           </a:p>
@@ -13795,14 +16875,14 @@
             </a:pPr>
             <a:r>
               <a:rPr lang="en-US" spc="-1" dirty="0">
-                <a:latin typeface="Gill Sans"/>
+                <a:latin typeface="+mj-lt"/>
                 <a:ea typeface="Gill Sans"/>
                 <a:hlinkClick r:id="rId10"/>
               </a:rPr>
               <a:t>Add ability to test performance of different endpoints in parallel</a:t>
             </a:r>
             <a:endParaRPr lang="en-US" spc="-1" dirty="0">
-              <a:latin typeface="Gill Sans"/>
+              <a:latin typeface="+mj-lt"/>
               <a:ea typeface="Gill Sans"/>
             </a:endParaRPr>
           </a:p>
@@ -13819,14 +16899,14 @@
             </a:pPr>
             <a:r>
               <a:rPr lang="en-US" spc="-1" dirty="0">
-                <a:latin typeface="Gill Sans"/>
+                <a:latin typeface="+mj-lt"/>
                 <a:ea typeface="Gill Sans"/>
                 <a:hlinkClick r:id="rId11"/>
               </a:rPr>
               <a:t>Validate test report with other methods</a:t>
             </a:r>
             <a:endParaRPr lang="en-US" spc="-1" dirty="0">
-              <a:latin typeface="Gill Sans"/>
+              <a:latin typeface="+mj-lt"/>
               <a:ea typeface="Gill Sans"/>
             </a:endParaRPr>
           </a:p>
@@ -13922,7 +17002,7 @@
                 <a:solidFill>
                   <a:srgbClr val="262626"/>
                 </a:solidFill>
-                <a:latin typeface="Gill Sans"/>
+                <a:latin typeface="+mj-lt"/>
                 <a:ea typeface="Gill Sans"/>
               </a:rPr>
               <a:t>High Availability – New Components &amp; Sysplex</a:t>
@@ -13931,7 +17011,7 @@
               <a:solidFill>
                 <a:srgbClr val="000000"/>
               </a:solidFill>
-              <a:latin typeface="Arial"/>
+              <a:latin typeface="+mj-lt"/>
             </a:endParaRPr>
           </a:p>
         </p:txBody>
@@ -13971,14 +17051,14 @@
             </a:pPr>
             <a:r>
               <a:rPr lang="en-US" spc="-1" dirty="0">
-                <a:latin typeface="Gill Sans"/>
+                <a:latin typeface="+mj-lt"/>
                 <a:ea typeface="Gill Sans"/>
                 <a:hlinkClick r:id="rId3"/>
               </a:rPr>
               <a:t>Epic – High Availability</a:t>
             </a:r>
             <a:endParaRPr lang="en-US" spc="-1" dirty="0">
-              <a:latin typeface="Gill Sans"/>
+              <a:latin typeface="+mj-lt"/>
               <a:ea typeface="Gill Sans"/>
             </a:endParaRPr>
           </a:p>
@@ -13992,7 +17072,7 @@
               </a:spcBef>
             </a:pPr>
             <a:endParaRPr lang="en-US" spc="-1" dirty="0">
-              <a:latin typeface="Gill Sans"/>
+              <a:latin typeface="+mj-lt"/>
               <a:ea typeface="Gill Sans"/>
             </a:endParaRPr>
           </a:p>
@@ -14006,14 +17086,14 @@
             </a:pPr>
             <a:r>
               <a:rPr lang="en-US" spc="-1" dirty="0">
-                <a:latin typeface="Gill Sans"/>
+                <a:latin typeface="+mj-lt"/>
                 <a:ea typeface="Gill Sans"/>
                 <a:hlinkClick r:id="rId4"/>
               </a:rPr>
               <a:t>Create Caching API with VSAM support</a:t>
             </a:r>
             <a:endParaRPr lang="en-US" spc="-1" dirty="0">
-              <a:latin typeface="Gill Sans"/>
+              <a:latin typeface="+mj-lt"/>
               <a:ea typeface="Gill Sans"/>
             </a:endParaRPr>
           </a:p>
@@ -14027,7 +17107,7 @@
             </a:pPr>
             <a:r>
               <a:rPr lang="en-US" spc="-1" dirty="0">
-                <a:latin typeface="Gill Sans"/>
+                <a:latin typeface="+mj-lt"/>
                 <a:ea typeface="Gill Sans"/>
                 <a:hlinkClick r:id="rId5"/>
               </a:rPr>
@@ -14035,7 +17115,7 @@
             </a:r>
             <a:r>
               <a:rPr lang="en-US" spc="-1" dirty="0">
-                <a:latin typeface="Gill Sans"/>
+                <a:latin typeface="+mj-lt"/>
                 <a:ea typeface="Gill Sans"/>
               </a:rPr>
               <a:t> (Stage 1)</a:t>
@@ -14050,7 +17130,7 @@
               <a:buChar char="Ø"/>
             </a:pPr>
             <a:endParaRPr lang="en-US" spc="-1" dirty="0">
-              <a:latin typeface="Gill Sans"/>
+              <a:latin typeface="+mj-lt"/>
               <a:ea typeface="Gill Sans"/>
             </a:endParaRPr>
           </a:p>
@@ -14064,7 +17144,7 @@
             </a:pPr>
             <a:r>
               <a:rPr lang="en-US" spc="-1" dirty="0">
-                <a:latin typeface="Gill Sans"/>
+                <a:latin typeface="+mj-lt"/>
                 <a:ea typeface="Gill Sans"/>
               </a:rPr>
               <a:t>Starting Zowe in Sysplex</a:t>
@@ -14080,7 +17160,7 @@
             </a:pPr>
             <a:r>
               <a:rPr lang="en-US" sz="1600" spc="-1" dirty="0">
-                <a:latin typeface="Gill Sans"/>
+                <a:latin typeface="+mj-lt"/>
                 <a:ea typeface="Gill Sans"/>
                 <a:hlinkClick r:id="rId6"/>
               </a:rPr>
@@ -14088,7 +17168,7 @@
             </a:r>
             <a:r>
               <a:rPr lang="en-US" sz="1600" spc="-1" dirty="0">
-                <a:latin typeface="Gill Sans"/>
+                <a:latin typeface="+mj-lt"/>
                 <a:ea typeface="Gill Sans"/>
               </a:rPr>
               <a:t> (shared SAF user registry</a:t>
@@ -14104,14 +17184,14 @@
             </a:pPr>
             <a:r>
               <a:rPr lang="en-US" sz="1600" spc="-1" dirty="0">
-                <a:latin typeface="Gill Sans"/>
+                <a:latin typeface="+mj-lt"/>
                 <a:ea typeface="Gill Sans"/>
               </a:rPr>
               <a:t>Document how to configure </a:t>
             </a:r>
             <a:r>
               <a:rPr lang="en-US" sz="1600" spc="-1" dirty="0">
-                <a:latin typeface="Gill Sans"/>
+                <a:latin typeface="+mj-lt"/>
                 <a:ea typeface="Gill Sans"/>
                 <a:hlinkClick r:id="rId7"/>
               </a:rPr>
@@ -14119,14 +17199,14 @@
             </a:r>
             <a:r>
               <a:rPr lang="en-US" sz="1600" spc="-1" dirty="0">
-                <a:latin typeface="Gill Sans"/>
+                <a:latin typeface="+mj-lt"/>
                 <a:ea typeface="Gill Sans"/>
               </a:rPr>
               <a:t> and </a:t>
             </a:r>
             <a:r>
               <a:rPr lang="en-US" sz="1600" spc="-1" dirty="0">
-                <a:latin typeface="Gill Sans"/>
+                <a:latin typeface="+mj-lt"/>
                 <a:ea typeface="Gill Sans"/>
                 <a:hlinkClick r:id="rId8"/>
               </a:rPr>
@@ -14134,7 +17214,7 @@
             </a:r>
             <a:r>
               <a:rPr lang="en-US" sz="1600" spc="-1" dirty="0">
-                <a:latin typeface="Gill Sans"/>
+                <a:latin typeface="+mj-lt"/>
                 <a:ea typeface="Gill Sans"/>
               </a:rPr>
               <a:t> for API Gateway</a:t>
@@ -14150,14 +17230,14 @@
             </a:pPr>
             <a:r>
               <a:rPr lang="en-US" sz="1600" spc="-1" dirty="0">
-                <a:latin typeface="Gill Sans"/>
+                <a:latin typeface="+mj-lt"/>
                 <a:ea typeface="Gill Sans"/>
                 <a:hlinkClick r:id="rId9"/>
               </a:rPr>
               <a:t>Verify and document requirement on shared USS file system, and shared VSAM data set</a:t>
             </a:r>
             <a:endParaRPr lang="en-US" sz="1600" spc="-1" dirty="0">
-              <a:latin typeface="Gill Sans"/>
+              <a:latin typeface="+mj-lt"/>
               <a:ea typeface="Gill Sans"/>
             </a:endParaRPr>
           </a:p>
@@ -14171,14 +17251,14 @@
             </a:pPr>
             <a:r>
               <a:rPr lang="en-US" sz="1600" spc="-1" dirty="0">
-                <a:latin typeface="Gill Sans"/>
+                <a:latin typeface="+mj-lt"/>
                 <a:ea typeface="Gill Sans"/>
                 <a:hlinkClick r:id="rId10"/>
               </a:rPr>
               <a:t>Test and implement ARM policy</a:t>
             </a:r>
             <a:endParaRPr lang="en-US" sz="1600" spc="-1" dirty="0">
-              <a:latin typeface="Gill Sans"/>
+              <a:latin typeface="+mj-lt"/>
               <a:ea typeface="Gill Sans"/>
             </a:endParaRPr>
           </a:p>
@@ -14192,14 +17272,14 @@
             </a:pPr>
             <a:r>
               <a:rPr lang="en-US" sz="1600" spc="-1" dirty="0">
-                <a:latin typeface="Gill Sans"/>
+                <a:latin typeface="+mj-lt"/>
                 <a:ea typeface="Gill Sans"/>
                 <a:hlinkClick r:id="rId11"/>
               </a:rPr>
               <a:t>Validate Apiml &amp; zOSMF HA with ACF2 and Top Secret Enabled Sysplex</a:t>
             </a:r>
             <a:endParaRPr lang="en-US" sz="1600" spc="-1" dirty="0">
-              <a:latin typeface="Gill Sans"/>
+              <a:latin typeface="+mj-lt"/>
               <a:ea typeface="Gill Sans"/>
             </a:endParaRPr>
           </a:p>
@@ -14213,14 +17293,14 @@
             </a:pPr>
             <a:r>
               <a:rPr lang="en-US" sz="1600" spc="-1" dirty="0">
-                <a:latin typeface="Gill Sans"/>
+                <a:latin typeface="+mj-lt"/>
                 <a:ea typeface="Gill Sans"/>
                 <a:hlinkClick r:id="rId12"/>
               </a:rPr>
               <a:t>Verify how CLI works with Sysplex</a:t>
             </a:r>
             <a:endParaRPr lang="en-US" sz="1600" spc="-1" dirty="0">
-              <a:latin typeface="Gill Sans"/>
+              <a:latin typeface="+mj-lt"/>
               <a:ea typeface="Gill Sans"/>
             </a:endParaRPr>
           </a:p>
@@ -14321,7 +17401,7 @@
                 <a:solidFill>
                   <a:srgbClr val="262626"/>
                 </a:solidFill>
-                <a:latin typeface="Gill Sans"/>
+                <a:latin typeface="+mj-lt"/>
                 <a:ea typeface="Gill Sans"/>
               </a:rPr>
               <a:t>High Availability – Existing Components &amp; Certificates</a:t>
@@ -14330,7 +17410,7 @@
               <a:solidFill>
                 <a:srgbClr val="000000"/>
               </a:solidFill>
-              <a:latin typeface="Arial"/>
+              <a:latin typeface="+mj-lt"/>
             </a:endParaRPr>
           </a:p>
         </p:txBody>
@@ -14369,7 +17449,7 @@
             </a:pPr>
             <a:r>
               <a:rPr lang="en-US" spc="-1" dirty="0">
-                <a:latin typeface="Gill Sans"/>
+                <a:latin typeface="+mj-lt"/>
                 <a:ea typeface="Gill Sans"/>
               </a:rPr>
               <a:t>Preparing Zowe and Components for HA</a:t>
@@ -14385,14 +17465,14 @@
             </a:pPr>
             <a:r>
               <a:rPr lang="en-US" sz="1600" spc="-1" dirty="0">
-                <a:latin typeface="Gill Sans"/>
+                <a:latin typeface="+mj-lt"/>
                 <a:ea typeface="Gill Sans"/>
                 <a:hlinkClick r:id="rId3"/>
               </a:rPr>
               <a:t>Break down apiml package into 3 individual components</a:t>
             </a:r>
             <a:endParaRPr lang="en-US" sz="1600" spc="-1" dirty="0">
-              <a:latin typeface="Gill Sans"/>
+              <a:latin typeface="+mj-lt"/>
               <a:ea typeface="Gill Sans"/>
             </a:endParaRPr>
           </a:p>
@@ -14406,14 +17486,14 @@
             </a:pPr>
             <a:r>
               <a:rPr lang="en-US" sz="1600" spc="-1" dirty="0">
-                <a:latin typeface="Gill Sans"/>
+                <a:latin typeface="+mj-lt"/>
                 <a:ea typeface="Gill Sans"/>
                 <a:hlinkClick r:id="rId4"/>
               </a:rPr>
               <a:t>Define manifest file for Zowe packages to simplify Zowe Launcher configurations</a:t>
             </a:r>
             <a:endParaRPr lang="en-US" sz="1600" spc="-1" dirty="0">
-              <a:latin typeface="Gill Sans"/>
+              <a:latin typeface="+mj-lt"/>
               <a:ea typeface="Gill Sans"/>
             </a:endParaRPr>
           </a:p>
@@ -14427,14 +17507,14 @@
             </a:pPr>
             <a:r>
               <a:rPr lang="en-US" sz="1600" spc="-1" dirty="0">
-                <a:latin typeface="Gill Sans"/>
+                <a:latin typeface="+mj-lt"/>
                 <a:ea typeface="Gill Sans"/>
                 <a:hlinkClick r:id="rId5"/>
               </a:rPr>
               <a:t>Add new configuration entries in instance.env to support multiple instances of components</a:t>
             </a:r>
             <a:endParaRPr lang="en-US" sz="1600" spc="-1" dirty="0">
-              <a:latin typeface="Gill Sans"/>
+              <a:latin typeface="+mj-lt"/>
               <a:ea typeface="Gill Sans"/>
             </a:endParaRPr>
           </a:p>
@@ -14448,14 +17528,14 @@
             </a:pPr>
             <a:r>
               <a:rPr lang="en-US" sz="1600" spc="-1" dirty="0">
-                <a:latin typeface="Gill Sans"/>
+                <a:latin typeface="+mj-lt"/>
                 <a:ea typeface="Gill Sans"/>
                 <a:hlinkClick r:id="rId6"/>
               </a:rPr>
               <a:t>Automatically configure ARM policy for Zowe Launcher</a:t>
             </a:r>
             <a:endParaRPr lang="en-US" sz="1600" spc="-1" dirty="0">
-              <a:latin typeface="Gill Sans"/>
+              <a:latin typeface="+mj-lt"/>
               <a:ea typeface="Gill Sans"/>
             </a:endParaRPr>
           </a:p>
@@ -14469,7 +17549,7 @@
             </a:pPr>
             <a:r>
               <a:rPr lang="en-US" sz="1600" spc="-1" dirty="0">
-                <a:latin typeface="Gill Sans"/>
+                <a:latin typeface="+mj-lt"/>
                 <a:ea typeface="Gill Sans"/>
                 <a:hlinkClick r:id="rId7"/>
               </a:rPr>
@@ -14477,7 +17557,7 @@
             </a:r>
             <a:r>
               <a:rPr lang="en-US" sz="1600" spc="-1" dirty="0" err="1">
-                <a:latin typeface="Gill Sans"/>
+                <a:latin typeface="+mj-lt"/>
                 <a:ea typeface="Gill Sans"/>
                 <a:hlinkClick r:id="rId7"/>
               </a:rPr>
@@ -14485,14 +17565,14 @@
             </a:r>
             <a:r>
               <a:rPr lang="en-US" sz="1600" spc="-1" dirty="0">
-                <a:latin typeface="Gill Sans"/>
+                <a:latin typeface="+mj-lt"/>
                 <a:ea typeface="Gill Sans"/>
                 <a:hlinkClick r:id="rId7"/>
               </a:rPr>
               <a:t> to properly trap termination signals and kill child processes</a:t>
             </a:r>
             <a:endParaRPr lang="en-US" sz="1600" spc="-1" dirty="0">
-              <a:latin typeface="Gill Sans"/>
+              <a:latin typeface="+mj-lt"/>
               <a:ea typeface="Gill Sans"/>
             </a:endParaRPr>
           </a:p>
@@ -14506,14 +17586,14 @@
             </a:pPr>
             <a:r>
               <a:rPr lang="en-US" sz="1600" spc="-1" dirty="0">
-                <a:latin typeface="Gill Sans"/>
+                <a:latin typeface="+mj-lt"/>
                 <a:ea typeface="Gill Sans"/>
                 <a:hlinkClick r:id="rId8"/>
               </a:rPr>
               <a:t>Change ZSS to be registered under API Discovery Service</a:t>
             </a:r>
             <a:endParaRPr lang="en-US" sz="1600" spc="-1" dirty="0">
-              <a:latin typeface="Gill Sans"/>
+              <a:latin typeface="+mj-lt"/>
               <a:ea typeface="Gill Sans"/>
             </a:endParaRPr>
           </a:p>
@@ -14526,7 +17606,7 @@
               <a:buChar char="Ø"/>
             </a:pPr>
             <a:endParaRPr lang="en-US" spc="-1" dirty="0">
-              <a:latin typeface="Gill Sans"/>
+              <a:latin typeface="+mj-lt"/>
               <a:ea typeface="Gill Sans"/>
             </a:endParaRPr>
           </a:p>
@@ -14540,7 +17620,7 @@
             </a:pPr>
             <a:r>
               <a:rPr lang="en-US" spc="-1" dirty="0">
-                <a:latin typeface="Gill Sans"/>
+                <a:latin typeface="+mj-lt"/>
                 <a:ea typeface="Gill Sans"/>
               </a:rPr>
               <a:t>Certificate Configuration Improvement</a:t>
@@ -14556,14 +17636,14 @@
             </a:pPr>
             <a:r>
               <a:rPr lang="en-US" sz="1600" spc="-1" dirty="0">
-                <a:latin typeface="Gill Sans"/>
+                <a:latin typeface="+mj-lt"/>
                 <a:ea typeface="Gill Sans"/>
                 <a:hlinkClick r:id="rId9"/>
               </a:rPr>
               <a:t>Add flexibility to define certificate for internal and external usage</a:t>
             </a:r>
             <a:endParaRPr lang="en-US" sz="1600" spc="-1" dirty="0">
-              <a:latin typeface="Gill Sans"/>
+              <a:latin typeface="+mj-lt"/>
               <a:ea typeface="Gill Sans"/>
             </a:endParaRPr>
           </a:p>
@@ -14577,14 +17657,14 @@
             </a:pPr>
             <a:r>
               <a:rPr lang="en-US" sz="1600" spc="-1" dirty="0">
-                <a:latin typeface="Gill Sans"/>
+                <a:latin typeface="+mj-lt"/>
                 <a:ea typeface="Gill Sans"/>
                 <a:hlinkClick r:id="rId10"/>
               </a:rPr>
               <a:t>Allow to define multiple domains / IPs as Subject Alternative Name (SAN) when storing certificate(s) in Keyring</a:t>
             </a:r>
             <a:endParaRPr lang="en-US" sz="1600" spc="-1" dirty="0">
-              <a:latin typeface="Gill Sans"/>
+              <a:latin typeface="+mj-lt"/>
               <a:ea typeface="Gill Sans"/>
             </a:endParaRPr>
           </a:p>
@@ -14685,7 +17765,7 @@
                 <a:solidFill>
                   <a:srgbClr val="262626"/>
                 </a:solidFill>
-                <a:latin typeface="Gill Sans"/>
+                <a:latin typeface="+mj-lt"/>
                 <a:ea typeface="Gill Sans"/>
               </a:rPr>
               <a:t>CI/CD – Extension Installation</a:t>
@@ -14694,7 +17774,7 @@
               <a:solidFill>
                 <a:srgbClr val="000000"/>
               </a:solidFill>
-              <a:latin typeface="Arial"/>
+              <a:latin typeface="+mj-lt"/>
             </a:endParaRPr>
           </a:p>
         </p:txBody>
@@ -14733,14 +17813,14 @@
             </a:pPr>
             <a:r>
               <a:rPr lang="en-US" spc="-1" dirty="0">
-                <a:latin typeface="Gill Sans"/>
+                <a:latin typeface="+mj-lt"/>
                 <a:ea typeface="Gill Sans"/>
                 <a:hlinkClick r:id="rId3"/>
               </a:rPr>
               <a:t>Create extension installation script, playbook and test cases to validate installation</a:t>
             </a:r>
             <a:endParaRPr lang="en-US" spc="-1" dirty="0">
-              <a:latin typeface="Gill Sans"/>
+              <a:latin typeface="+mj-lt"/>
               <a:ea typeface="Gill Sans"/>
             </a:endParaRPr>
           </a:p>
@@ -14753,7 +17833,7 @@
               <a:buChar char="Ø"/>
             </a:pPr>
             <a:endParaRPr lang="en-US" spc="-1" dirty="0">
-              <a:latin typeface="Gill Sans"/>
+              <a:latin typeface="+mj-lt"/>
               <a:ea typeface="Gill Sans"/>
             </a:endParaRPr>
           </a:p>
@@ -14767,7 +17847,7 @@
             </a:pPr>
             <a:r>
               <a:rPr lang="en-US" spc="-1" dirty="0">
-                <a:latin typeface="Gill Sans"/>
+                <a:latin typeface="+mj-lt"/>
                 <a:ea typeface="Gill Sans"/>
               </a:rPr>
               <a:t>Create extension installation script</a:t>
@@ -14783,7 +17863,7 @@
             </a:pPr>
             <a:r>
               <a:rPr lang="en-US" spc="-1" dirty="0">
-                <a:latin typeface="Gill Sans"/>
+                <a:latin typeface="+mj-lt"/>
                 <a:ea typeface="Gill Sans"/>
               </a:rPr>
               <a:t>Create new Ansible playbook to install extension</a:t>
@@ -14799,7 +17879,7 @@
             </a:pPr>
             <a:r>
               <a:rPr lang="en-US" spc="-1" dirty="0">
-                <a:latin typeface="Gill Sans"/>
+                <a:latin typeface="+mj-lt"/>
                 <a:ea typeface="Gill Sans"/>
               </a:rPr>
               <a:t>Create new test cases which will validate extension installation</a:t>

</xml_diff>

<commit_message>
Add doc squad focus
Signed-off-by: nannanli <nannanli@cn.ibm.com>
</commit_message>
<xml_diff>
--- a/Project Management/PI Planning/20PI4 Planning/Zowe Community Squad Focus for 20PI4.pptx
+++ b/Project Management/PI Planning/20PI4 Planning/Zowe Community Squad Focus for 20PI4.pptx
@@ -8,7 +8,7 @@
     <p:sldMasterId id="2147483687" r:id="rId4"/>
   </p:sldMasterIdLst>
   <p:notesMasterIdLst>
-    <p:notesMasterId r:id="rId30"/>
+    <p:notesMasterId r:id="rId35"/>
   </p:notesMasterIdLst>
   <p:sldIdLst>
     <p:sldId id="256" r:id="rId5"/>
@@ -34,8 +34,13 @@
     <p:sldId id="281" r:id="rId25"/>
     <p:sldId id="282" r:id="rId26"/>
     <p:sldId id="283" r:id="rId27"/>
-    <p:sldId id="284" r:id="rId28"/>
-    <p:sldId id="285" r:id="rId29"/>
+    <p:sldId id="292" r:id="rId28"/>
+    <p:sldId id="284" r:id="rId29"/>
+    <p:sldId id="296" r:id="rId30"/>
+    <p:sldId id="294" r:id="rId31"/>
+    <p:sldId id="297" r:id="rId32"/>
+    <p:sldId id="293" r:id="rId33"/>
+    <p:sldId id="285" r:id="rId34"/>
   </p:sldIdLst>
   <p:sldSz cx="9144000" cy="5143500" type="screen16x9"/>
   <p:notesSz cx="6858000" cy="9144000"/>
@@ -981,6 +986,502 @@
     <p:extLst>
       <p:ext uri="{BB962C8B-B14F-4D97-AF65-F5344CB8AC3E}">
         <p14:creationId xmlns:p14="http://schemas.microsoft.com/office/powerpoint/2010/main" val="3521497249"/>
+      </p:ext>
+    </p:extLst>
+  </p:cSld>
+  <p:clrMapOvr>
+    <a:masterClrMapping/>
+  </p:clrMapOvr>
+</p:notes>
+</file>
+
+<file path=ppt/notesSlides/notesSlide15.xml><?xml version="1.0" encoding="utf-8"?>
+<p:notes xmlns:a="http://schemas.openxmlformats.org/drawingml/2006/main" xmlns:r="http://schemas.openxmlformats.org/officeDocument/2006/relationships" xmlns:p="http://schemas.openxmlformats.org/presentationml/2006/main">
+  <p:cSld>
+    <p:spTree>
+      <p:nvGrpSpPr>
+        <p:cNvPr id="1" name=""/>
+        <p:cNvGrpSpPr/>
+        <p:nvPr/>
+      </p:nvGrpSpPr>
+      <p:grpSpPr>
+        <a:xfrm>
+          <a:off x="0" y="0"/>
+          <a:ext cx="0" cy="0"/>
+          <a:chOff x="0" y="0"/>
+          <a:chExt cx="0" cy="0"/>
+        </a:xfrm>
+      </p:grpSpPr>
+      <p:sp>
+        <p:nvSpPr>
+          <p:cNvPr id="2" name="Slide Image Placeholder 1"/>
+          <p:cNvSpPr>
+            <a:spLocks noGrp="1" noRot="1" noChangeAspect="1"/>
+          </p:cNvSpPr>
+          <p:nvPr>
+            <p:ph type="sldImg"/>
+          </p:nvPr>
+        </p:nvSpPr>
+        <p:spPr>
+          <a:xfrm>
+            <a:off x="533400" y="763588"/>
+            <a:ext cx="6704013" cy="3771900"/>
+          </a:xfrm>
+        </p:spPr>
+      </p:sp>
+      <p:sp>
+        <p:nvSpPr>
+          <p:cNvPr id="3" name="Notes Placeholder 2"/>
+          <p:cNvSpPr>
+            <a:spLocks noGrp="1"/>
+          </p:cNvSpPr>
+          <p:nvPr>
+            <p:ph type="body" idx="1"/>
+          </p:nvPr>
+        </p:nvSpPr>
+        <p:spPr/>
+        <p:txBody>
+          <a:bodyPr/>
+          <a:lstStyle/>
+          <a:p>
+            <a:endParaRPr lang="en-CN" dirty="0"/>
+          </a:p>
+        </p:txBody>
+      </p:sp>
+      <p:sp>
+        <p:nvSpPr>
+          <p:cNvPr id="4" name="Slide Number Placeholder 3"/>
+          <p:cNvSpPr>
+            <a:spLocks noGrp="1"/>
+          </p:cNvSpPr>
+          <p:nvPr>
+            <p:ph type="sldNum"/>
+          </p:nvPr>
+        </p:nvSpPr>
+        <p:spPr/>
+        <p:txBody>
+          <a:bodyPr/>
+          <a:lstStyle/>
+          <a:p>
+            <a:pPr algn="r"/>
+            <a:fld id="{BA3CDCDB-E9EF-4257-93B9-33682187AA79}" type="slidenum">
+              <a:rPr lang="en-US" sz="1400" b="0" strike="noStrike" spc="-1" smtClean="0">
+                <a:latin typeface="Times New Roman"/>
+              </a:rPr>
+              <a:t>25</a:t>
+            </a:fld>
+            <a:endParaRPr lang="en-US" sz="1400" b="0" strike="noStrike" spc="-1">
+              <a:latin typeface="Times New Roman"/>
+            </a:endParaRPr>
+          </a:p>
+        </p:txBody>
+      </p:sp>
+    </p:spTree>
+    <p:extLst>
+      <p:ext uri="{BB962C8B-B14F-4D97-AF65-F5344CB8AC3E}">
+        <p14:creationId xmlns:p14="http://schemas.microsoft.com/office/powerpoint/2010/main" val="3560383589"/>
+      </p:ext>
+    </p:extLst>
+  </p:cSld>
+  <p:clrMapOvr>
+    <a:masterClrMapping/>
+  </p:clrMapOvr>
+</p:notes>
+</file>
+
+<file path=ppt/notesSlides/notesSlide16.xml><?xml version="1.0" encoding="utf-8"?>
+<p:notes xmlns:a="http://schemas.openxmlformats.org/drawingml/2006/main" xmlns:r="http://schemas.openxmlformats.org/officeDocument/2006/relationships" xmlns:p="http://schemas.openxmlformats.org/presentationml/2006/main">
+  <p:cSld>
+    <p:spTree>
+      <p:nvGrpSpPr>
+        <p:cNvPr id="1" name=""/>
+        <p:cNvGrpSpPr/>
+        <p:nvPr/>
+      </p:nvGrpSpPr>
+      <p:grpSpPr>
+        <a:xfrm>
+          <a:off x="0" y="0"/>
+          <a:ext cx="0" cy="0"/>
+          <a:chOff x="0" y="0"/>
+          <a:chExt cx="0" cy="0"/>
+        </a:xfrm>
+      </p:grpSpPr>
+      <p:sp>
+        <p:nvSpPr>
+          <p:cNvPr id="2" name="Slide Image Placeholder 1"/>
+          <p:cNvSpPr>
+            <a:spLocks noGrp="1" noRot="1" noChangeAspect="1"/>
+          </p:cNvSpPr>
+          <p:nvPr>
+            <p:ph type="sldImg"/>
+          </p:nvPr>
+        </p:nvSpPr>
+        <p:spPr>
+          <a:xfrm>
+            <a:off x="533400" y="763588"/>
+            <a:ext cx="6704013" cy="3771900"/>
+          </a:xfrm>
+        </p:spPr>
+      </p:sp>
+      <p:sp>
+        <p:nvSpPr>
+          <p:cNvPr id="3" name="Notes Placeholder 2"/>
+          <p:cNvSpPr>
+            <a:spLocks noGrp="1"/>
+          </p:cNvSpPr>
+          <p:nvPr>
+            <p:ph type="body" idx="1"/>
+          </p:nvPr>
+        </p:nvSpPr>
+        <p:spPr/>
+        <p:txBody>
+          <a:bodyPr/>
+          <a:lstStyle/>
+          <a:p>
+            <a:pPr marL="0" marR="0" lvl="0" indent="0" algn="l" defTabSz="914400" rtl="0" eaLnBrk="1" fontAlgn="auto" latinLnBrk="0" hangingPunct="1">
+              <a:lnSpc>
+                <a:spcPct val="100000"/>
+              </a:lnSpc>
+              <a:spcBef>
+                <a:spcPts val="0"/>
+              </a:spcBef>
+              <a:spcAft>
+                <a:spcPts val="0"/>
+              </a:spcAft>
+              <a:buClrTx/>
+              <a:buSzTx/>
+              <a:buFontTx/>
+              <a:buNone/>
+              <a:tabLst/>
+              <a:defRPr/>
+            </a:pPr>
+            <a:r>
+              <a:rPr lang="en-US" sz="1200" dirty="0"/>
+              <a:t>Address a list of GitHub doc enhancement issues and user feedback to provide better content experience and help users work with </a:t>
+            </a:r>
+            <a:r>
+              <a:rPr lang="en-US" sz="1200" dirty="0" err="1"/>
+              <a:t>Zowe</a:t>
+            </a:r>
+            <a:r>
+              <a:rPr lang="en-US" sz="1200" dirty="0"/>
+              <a:t>.</a:t>
+            </a:r>
+          </a:p>
+          <a:p>
+            <a:endParaRPr lang="en-CN" dirty="0"/>
+          </a:p>
+        </p:txBody>
+      </p:sp>
+      <p:sp>
+        <p:nvSpPr>
+          <p:cNvPr id="4" name="Slide Number Placeholder 3"/>
+          <p:cNvSpPr>
+            <a:spLocks noGrp="1"/>
+          </p:cNvSpPr>
+          <p:nvPr>
+            <p:ph type="sldNum"/>
+          </p:nvPr>
+        </p:nvSpPr>
+        <p:spPr/>
+        <p:txBody>
+          <a:bodyPr/>
+          <a:lstStyle/>
+          <a:p>
+            <a:pPr algn="r"/>
+            <a:fld id="{BA3CDCDB-E9EF-4257-93B9-33682187AA79}" type="slidenum">
+              <a:rPr lang="en-US" sz="1400" b="0" strike="noStrike" spc="-1" smtClean="0">
+                <a:latin typeface="Times New Roman"/>
+              </a:rPr>
+              <a:t>26</a:t>
+            </a:fld>
+            <a:endParaRPr lang="en-US" sz="1400" b="0" strike="noStrike" spc="-1">
+              <a:latin typeface="Times New Roman"/>
+            </a:endParaRPr>
+          </a:p>
+        </p:txBody>
+      </p:sp>
+    </p:spTree>
+    <p:extLst>
+      <p:ext uri="{BB962C8B-B14F-4D97-AF65-F5344CB8AC3E}">
+        <p14:creationId xmlns:p14="http://schemas.microsoft.com/office/powerpoint/2010/main" val="3005006635"/>
+      </p:ext>
+    </p:extLst>
+  </p:cSld>
+  <p:clrMapOvr>
+    <a:masterClrMapping/>
+  </p:clrMapOvr>
+</p:notes>
+</file>
+
+<file path=ppt/notesSlides/notesSlide17.xml><?xml version="1.0" encoding="utf-8"?>
+<p:notes xmlns:a="http://schemas.openxmlformats.org/drawingml/2006/main" xmlns:r="http://schemas.openxmlformats.org/officeDocument/2006/relationships" xmlns:p="http://schemas.openxmlformats.org/presentationml/2006/main">
+  <p:cSld>
+    <p:spTree>
+      <p:nvGrpSpPr>
+        <p:cNvPr id="1" name=""/>
+        <p:cNvGrpSpPr/>
+        <p:nvPr/>
+      </p:nvGrpSpPr>
+      <p:grpSpPr>
+        <a:xfrm>
+          <a:off x="0" y="0"/>
+          <a:ext cx="0" cy="0"/>
+          <a:chOff x="0" y="0"/>
+          <a:chExt cx="0" cy="0"/>
+        </a:xfrm>
+      </p:grpSpPr>
+      <p:sp>
+        <p:nvSpPr>
+          <p:cNvPr id="2" name="Slide Image Placeholder 1"/>
+          <p:cNvSpPr>
+            <a:spLocks noGrp="1" noRot="1" noChangeAspect="1"/>
+          </p:cNvSpPr>
+          <p:nvPr>
+            <p:ph type="sldImg"/>
+          </p:nvPr>
+        </p:nvSpPr>
+        <p:spPr>
+          <a:xfrm>
+            <a:off x="533400" y="763588"/>
+            <a:ext cx="6704013" cy="3771900"/>
+          </a:xfrm>
+        </p:spPr>
+      </p:sp>
+      <p:sp>
+        <p:nvSpPr>
+          <p:cNvPr id="3" name="Notes Placeholder 2"/>
+          <p:cNvSpPr>
+            <a:spLocks noGrp="1"/>
+          </p:cNvSpPr>
+          <p:nvPr>
+            <p:ph type="body" idx="1"/>
+          </p:nvPr>
+        </p:nvSpPr>
+        <p:spPr/>
+        <p:txBody>
+          <a:bodyPr/>
+          <a:lstStyle/>
+          <a:p>
+            <a:endParaRPr lang="en-CN" dirty="0"/>
+          </a:p>
+        </p:txBody>
+      </p:sp>
+      <p:sp>
+        <p:nvSpPr>
+          <p:cNvPr id="4" name="Slide Number Placeholder 3"/>
+          <p:cNvSpPr>
+            <a:spLocks noGrp="1"/>
+          </p:cNvSpPr>
+          <p:nvPr>
+            <p:ph type="sldNum"/>
+          </p:nvPr>
+        </p:nvSpPr>
+        <p:spPr/>
+        <p:txBody>
+          <a:bodyPr/>
+          <a:lstStyle/>
+          <a:p>
+            <a:pPr algn="r"/>
+            <a:fld id="{BA3CDCDB-E9EF-4257-93B9-33682187AA79}" type="slidenum">
+              <a:rPr lang="en-US" sz="1400" b="0" strike="noStrike" spc="-1" smtClean="0">
+                <a:latin typeface="Times New Roman"/>
+              </a:rPr>
+              <a:t>27</a:t>
+            </a:fld>
+            <a:endParaRPr lang="en-US" sz="1400" b="0" strike="noStrike" spc="-1">
+              <a:latin typeface="Times New Roman"/>
+            </a:endParaRPr>
+          </a:p>
+        </p:txBody>
+      </p:sp>
+    </p:spTree>
+    <p:extLst>
+      <p:ext uri="{BB962C8B-B14F-4D97-AF65-F5344CB8AC3E}">
+        <p14:creationId xmlns:p14="http://schemas.microsoft.com/office/powerpoint/2010/main" val="1715069154"/>
+      </p:ext>
+    </p:extLst>
+  </p:cSld>
+  <p:clrMapOvr>
+    <a:masterClrMapping/>
+  </p:clrMapOvr>
+</p:notes>
+</file>
+
+<file path=ppt/notesSlides/notesSlide18.xml><?xml version="1.0" encoding="utf-8"?>
+<p:notes xmlns:a="http://schemas.openxmlformats.org/drawingml/2006/main" xmlns:r="http://schemas.openxmlformats.org/officeDocument/2006/relationships" xmlns:p="http://schemas.openxmlformats.org/presentationml/2006/main">
+  <p:cSld>
+    <p:spTree>
+      <p:nvGrpSpPr>
+        <p:cNvPr id="1" name=""/>
+        <p:cNvGrpSpPr/>
+        <p:nvPr/>
+      </p:nvGrpSpPr>
+      <p:grpSpPr>
+        <a:xfrm>
+          <a:off x="0" y="0"/>
+          <a:ext cx="0" cy="0"/>
+          <a:chOff x="0" y="0"/>
+          <a:chExt cx="0" cy="0"/>
+        </a:xfrm>
+      </p:grpSpPr>
+      <p:sp>
+        <p:nvSpPr>
+          <p:cNvPr id="2" name="Slide Image Placeholder 1"/>
+          <p:cNvSpPr>
+            <a:spLocks noGrp="1" noRot="1" noChangeAspect="1"/>
+          </p:cNvSpPr>
+          <p:nvPr>
+            <p:ph type="sldImg"/>
+          </p:nvPr>
+        </p:nvSpPr>
+        <p:spPr>
+          <a:xfrm>
+            <a:off x="533400" y="763588"/>
+            <a:ext cx="6704013" cy="3771900"/>
+          </a:xfrm>
+        </p:spPr>
+      </p:sp>
+      <p:sp>
+        <p:nvSpPr>
+          <p:cNvPr id="3" name="Notes Placeholder 2"/>
+          <p:cNvSpPr>
+            <a:spLocks noGrp="1"/>
+          </p:cNvSpPr>
+          <p:nvPr>
+            <p:ph type="body" idx="1"/>
+          </p:nvPr>
+        </p:nvSpPr>
+        <p:spPr/>
+        <p:txBody>
+          <a:bodyPr/>
+          <a:lstStyle/>
+          <a:p>
+            <a:endParaRPr lang="en-US" dirty="0"/>
+          </a:p>
+        </p:txBody>
+      </p:sp>
+      <p:sp>
+        <p:nvSpPr>
+          <p:cNvPr id="4" name="Slide Number Placeholder 3"/>
+          <p:cNvSpPr>
+            <a:spLocks noGrp="1"/>
+          </p:cNvSpPr>
+          <p:nvPr>
+            <p:ph type="sldNum"/>
+          </p:nvPr>
+        </p:nvSpPr>
+        <p:spPr/>
+        <p:txBody>
+          <a:bodyPr/>
+          <a:lstStyle/>
+          <a:p>
+            <a:pPr algn="r"/>
+            <a:fld id="{BA3CDCDB-E9EF-4257-93B9-33682187AA79}" type="slidenum">
+              <a:rPr lang="en-US" sz="1400" b="0" strike="noStrike" spc="-1" smtClean="0">
+                <a:latin typeface="Times New Roman"/>
+              </a:rPr>
+              <a:t>28</a:t>
+            </a:fld>
+            <a:endParaRPr lang="en-US" sz="1400" b="0" strike="noStrike" spc="-1">
+              <a:latin typeface="Times New Roman"/>
+            </a:endParaRPr>
+          </a:p>
+        </p:txBody>
+      </p:sp>
+    </p:spTree>
+    <p:extLst>
+      <p:ext uri="{BB962C8B-B14F-4D97-AF65-F5344CB8AC3E}">
+        <p14:creationId xmlns:p14="http://schemas.microsoft.com/office/powerpoint/2010/main" val="1410742269"/>
+      </p:ext>
+    </p:extLst>
+  </p:cSld>
+  <p:clrMapOvr>
+    <a:masterClrMapping/>
+  </p:clrMapOvr>
+</p:notes>
+</file>
+
+<file path=ppt/notesSlides/notesSlide19.xml><?xml version="1.0" encoding="utf-8"?>
+<p:notes xmlns:a="http://schemas.openxmlformats.org/drawingml/2006/main" xmlns:r="http://schemas.openxmlformats.org/officeDocument/2006/relationships" xmlns:p="http://schemas.openxmlformats.org/presentationml/2006/main">
+  <p:cSld>
+    <p:spTree>
+      <p:nvGrpSpPr>
+        <p:cNvPr id="1" name=""/>
+        <p:cNvGrpSpPr/>
+        <p:nvPr/>
+      </p:nvGrpSpPr>
+      <p:grpSpPr>
+        <a:xfrm>
+          <a:off x="0" y="0"/>
+          <a:ext cx="0" cy="0"/>
+          <a:chOff x="0" y="0"/>
+          <a:chExt cx="0" cy="0"/>
+        </a:xfrm>
+      </p:grpSpPr>
+      <p:sp>
+        <p:nvSpPr>
+          <p:cNvPr id="2" name="Slide Image Placeholder 1"/>
+          <p:cNvSpPr>
+            <a:spLocks noGrp="1" noRot="1" noChangeAspect="1"/>
+          </p:cNvSpPr>
+          <p:nvPr>
+            <p:ph type="sldImg"/>
+          </p:nvPr>
+        </p:nvSpPr>
+        <p:spPr/>
+      </p:sp>
+      <p:sp>
+        <p:nvSpPr>
+          <p:cNvPr id="3" name="Notes Placeholder 2"/>
+          <p:cNvSpPr>
+            <a:spLocks noGrp="1"/>
+          </p:cNvSpPr>
+          <p:nvPr>
+            <p:ph type="body" idx="1"/>
+          </p:nvPr>
+        </p:nvSpPr>
+        <p:spPr/>
+        <p:txBody>
+          <a:bodyPr/>
+          <a:lstStyle/>
+          <a:p>
+            <a:endParaRPr lang="en-CN" dirty="0"/>
+          </a:p>
+        </p:txBody>
+      </p:sp>
+      <p:sp>
+        <p:nvSpPr>
+          <p:cNvPr id="4" name="Slide Number Placeholder 3"/>
+          <p:cNvSpPr>
+            <a:spLocks noGrp="1"/>
+          </p:cNvSpPr>
+          <p:nvPr>
+            <p:ph type="sldNum"/>
+          </p:nvPr>
+        </p:nvSpPr>
+        <p:spPr/>
+        <p:txBody>
+          <a:bodyPr/>
+          <a:lstStyle/>
+          <a:p>
+            <a:pPr algn="r"/>
+            <a:fld id="{BA3CDCDB-E9EF-4257-93B9-33682187AA79}" type="slidenum">
+              <a:rPr lang="en-US" sz="1400" b="0" strike="noStrike" spc="-1" smtClean="0">
+                <a:latin typeface="Times New Roman"/>
+              </a:rPr>
+              <a:t>29</a:t>
+            </a:fld>
+            <a:endParaRPr lang="en-US" sz="1400" b="0" strike="noStrike" spc="-1">
+              <a:latin typeface="Times New Roman"/>
+            </a:endParaRPr>
+          </a:p>
+        </p:txBody>
+      </p:sp>
+    </p:spTree>
+    <p:extLst>
+      <p:ext uri="{BB962C8B-B14F-4D97-AF65-F5344CB8AC3E}">
+        <p14:creationId xmlns:p14="http://schemas.microsoft.com/office/powerpoint/2010/main" val="3846263569"/>
       </p:ext>
     </p:extLst>
   </p:cSld>
@@ -15941,77 +16442,141 @@
       </p:grpSpPr>
       <p:sp>
         <p:nvSpPr>
-          <p:cNvPr id="188" name="TextShape 1"/>
-          <p:cNvSpPr txBox="1"/>
+          <p:cNvPr id="2" name="Rectangle 1"/>
+          <p:cNvSpPr/>
           <p:nvPr/>
         </p:nvSpPr>
         <p:spPr>
           <a:xfrm>
-            <a:off x="308520" y="3525840"/>
-            <a:ext cx="6446160" cy="392040"/>
-          </a:xfrm>
-          <a:prstGeom prst="rect">
-            <a:avLst/>
-          </a:prstGeom>
-          <a:noFill/>
-          <a:ln>
-            <a:noFill/>
-          </a:ln>
-        </p:spPr>
-        <p:txBody>
-          <a:bodyPr lIns="0" tIns="0" rIns="0" bIns="0" anchor="b">
-            <a:noAutofit/>
-          </a:bodyPr>
-          <a:lstStyle/>
-          <a:p>
-            <a:pPr marL="457200" indent="-228240">
+            <a:off x="352839" y="3180521"/>
+            <a:ext cx="7404652" cy="940257"/>
+          </a:xfrm>
+          <a:prstGeom prst="rect">
+            <a:avLst/>
+          </a:prstGeom>
+        </p:spPr>
+        <p:txBody>
+          <a:bodyPr wrap="square">
+            <a:spAutoFit/>
+          </a:bodyPr>
+          <a:lstStyle/>
+          <a:p>
+            <a:pPr marL="457200" marR="0" lvl="0" indent="-228240" algn="l" defTabSz="914400" rtl="0" eaLnBrk="1" fontAlgn="auto" latinLnBrk="0" hangingPunct="1">
               <a:lnSpc>
                 <a:spcPct val="85000"/>
               </a:lnSpc>
               <a:spcBef>
                 <a:spcPts val="901"/>
               </a:spcBef>
-            </a:pPr>
-            <a:r>
-              <a:rPr lang="en-US" sz="3000" b="1" strike="noStrike" spc="-1" dirty="0">
+              <a:spcAft>
+                <a:spcPts val="0"/>
+              </a:spcAft>
+              <a:buClrTx/>
+              <a:buSzTx/>
+              <a:buFontTx/>
+              <a:buNone/>
+              <a:tabLst/>
+              <a:defRPr/>
+            </a:pPr>
+            <a:r>
+              <a:rPr kumimoji="0" lang="en-US" sz="3200" b="1" i="0" u="none" strike="noStrike" kern="1200" cap="none" spc="-1" normalizeH="0" baseline="0" noProof="0" dirty="0" err="1">
+                <a:ln>
+                  <a:noFill/>
+                </a:ln>
                 <a:solidFill>
                   <a:srgbClr val="000000"/>
                 </a:solidFill>
+                <a:effectLst/>
+                <a:uLnTx/>
+                <a:uFillTx/>
                 <a:latin typeface="Arial"/>
                 <a:ea typeface="Arial"/>
               </a:rPr>
-              <a:t>TBD Squad Focus</a:t>
-            </a:r>
-            <a:endParaRPr lang="en-US" sz="3000" b="0" strike="noStrike" spc="-1" dirty="0">
+              <a:t>Zowe</a:t>
+            </a:r>
+            <a:r>
+              <a:rPr kumimoji="0" lang="en-US" sz="3200" b="1" i="0" u="none" strike="noStrike" kern="1200" cap="none" spc="-1" normalizeH="0" baseline="0" noProof="0" dirty="0">
+                <a:ln>
+                  <a:noFill/>
+                </a:ln>
+                <a:solidFill>
+                  <a:srgbClr val="000000"/>
+                </a:solidFill>
+                <a:effectLst/>
+                <a:uLnTx/>
+                <a:uFillTx/>
+                <a:latin typeface="Arial"/>
+                <a:ea typeface="Arial"/>
+              </a:rPr>
+              <a:t> Doc Squad Focus</a:t>
+            </a:r>
+            <a:endParaRPr kumimoji="0" lang="en-US" sz="3200" b="0" i="0" u="none" strike="noStrike" kern="1200" cap="none" spc="-1" normalizeH="0" baseline="0" noProof="0" dirty="0">
+              <a:ln>
+                <a:noFill/>
+              </a:ln>
               <a:solidFill>
                 <a:srgbClr val="000000"/>
               </a:solidFill>
+              <a:effectLst/>
+              <a:uLnTx/>
+              <a:uFillTx/>
               <a:latin typeface="Arial"/>
             </a:endParaRPr>
           </a:p>
           <a:p>
-            <a:pPr marL="457200" indent="-228240">
+            <a:pPr marL="457200" marR="0" lvl="0" indent="-228240" algn="l" defTabSz="914400" rtl="0" eaLnBrk="1" fontAlgn="auto" latinLnBrk="0" hangingPunct="1">
               <a:lnSpc>
                 <a:spcPct val="85000"/>
               </a:lnSpc>
               <a:spcBef>
                 <a:spcPts val="901"/>
               </a:spcBef>
-            </a:pPr>
-            <a:r>
-              <a:rPr lang="en-US" sz="2000" b="1" strike="noStrike" spc="-1" dirty="0">
+              <a:spcAft>
+                <a:spcPts val="0"/>
+              </a:spcAft>
+              <a:buClrTx/>
+              <a:buSzTx/>
+              <a:buFontTx/>
+              <a:buNone/>
+              <a:tabLst/>
+              <a:defRPr/>
+            </a:pPr>
+            <a:r>
+              <a:rPr kumimoji="0" lang="en-US" sz="2400" b="1" i="0" u="none" strike="noStrike" kern="1200" cap="none" spc="-1" normalizeH="0" baseline="0" noProof="0" dirty="0" err="1">
+                <a:ln>
+                  <a:noFill/>
+                </a:ln>
                 <a:solidFill>
                   <a:srgbClr val="000000"/>
                 </a:solidFill>
+                <a:effectLst/>
+                <a:uLnTx/>
+                <a:uFillTx/>
                 <a:latin typeface="Arial"/>
                 <a:ea typeface="Arial"/>
               </a:rPr>
-              <a:t>TBD (Squad Lead)</a:t>
-            </a:r>
-            <a:endParaRPr lang="en-US" sz="2000" b="0" strike="noStrike" spc="-1" dirty="0">
+              <a:t>Ashle</a:t>
+            </a:r>
+            <a:r>
+              <a:rPr lang="en-US" sz="2400" b="1" spc="-1" dirty="0">
+                <a:solidFill>
+                  <a:srgbClr val="000000"/>
+                </a:solidFill>
+                <a:latin typeface="Arial"/>
+                <a:ea typeface="Arial"/>
+              </a:rPr>
+              <a:t>y Li</a:t>
+            </a:r>
+            <a:endParaRPr kumimoji="0" lang="en-US" sz="2000" b="0" i="0" u="none" strike="noStrike" kern="1200" cap="none" spc="-1" normalizeH="0" baseline="0" noProof="0" dirty="0">
+              <a:ln>
+                <a:noFill/>
+              </a:ln>
               <a:solidFill>
                 <a:srgbClr val="000000"/>
               </a:solidFill>
+              <a:effectLst/>
+              <a:uLnTx/>
+              <a:uFillTx/>
               <a:latin typeface="Arial"/>
             </a:endParaRPr>
           </a:p>
@@ -16020,7 +16585,7 @@
     </p:spTree>
     <p:extLst>
       <p:ext uri="{BB962C8B-B14F-4D97-AF65-F5344CB8AC3E}">
-        <p14:creationId xmlns:p14="http://schemas.microsoft.com/office/powerpoint/2010/main" val="1515099386"/>
+        <p14:creationId xmlns:p14="http://schemas.microsoft.com/office/powerpoint/2010/main" val="3592707614"/>
       </p:ext>
     </p:extLst>
   </p:cSld>
@@ -16079,7 +16644,13 @@
       </p:grpSpPr>
       <p:sp>
         <p:nvSpPr>
-          <p:cNvPr id="189" name="TextShape 1"/>
+          <p:cNvPr id="3" name="TextShape 1">
+            <a:extLst>
+              <a:ext uri="{FF2B5EF4-FFF2-40B4-BE49-F238E27FC236}">
+                <a16:creationId xmlns:a16="http://schemas.microsoft.com/office/drawing/2014/main" id="{B8E8C5E1-9A2F-8E46-B0C3-2597185A9B7F}"/>
+              </a:ext>
+            </a:extLst>
+          </p:cNvPr>
           <p:cNvSpPr txBox="1"/>
           <p:nvPr/>
         </p:nvSpPr>
@@ -16108,34 +16679,50 @@
               </a:lnSpc>
             </a:pPr>
             <a:r>
-              <a:rPr lang="en-US" sz="2600" b="0" strike="noStrike" spc="-1" dirty="0">
+              <a:rPr lang="en-US" sz="3000" spc="-1" dirty="0" err="1">
                 <a:solidFill>
                   <a:srgbClr val="262626"/>
                 </a:solidFill>
-                <a:latin typeface="Gill Sans"/>
+                <a:latin typeface="+mj-lt"/>
                 <a:ea typeface="Gill Sans"/>
               </a:rPr>
-              <a:t>Title</a:t>
-            </a:r>
-            <a:endParaRPr lang="en-US" sz="2600" b="0" strike="noStrike" spc="-1" dirty="0">
+              <a:t>Zowe</a:t>
+            </a:r>
+            <a:r>
+              <a:rPr lang="en-US" sz="3000" spc="-1" dirty="0">
+                <a:solidFill>
+                  <a:srgbClr val="262626"/>
+                </a:solidFill>
+                <a:latin typeface="+mj-lt"/>
+                <a:ea typeface="Gill Sans"/>
+              </a:rPr>
+              <a:t> Doc Squad</a:t>
+            </a:r>
+            <a:endParaRPr lang="en-US" sz="3000" b="0" strike="noStrike" spc="-1" dirty="0">
               <a:solidFill>
                 <a:srgbClr val="000000"/>
               </a:solidFill>
-              <a:latin typeface="Arial"/>
-            </a:endParaRPr>
-          </a:p>
-        </p:txBody>
-      </p:sp>
-      <p:sp>
-        <p:nvSpPr>
-          <p:cNvPr id="190" name="TextShape 2"/>
+              <a:latin typeface="+mj-lt"/>
+            </a:endParaRPr>
+          </a:p>
+        </p:txBody>
+      </p:sp>
+      <p:sp>
+        <p:nvSpPr>
+          <p:cNvPr id="4" name="TextShape 2">
+            <a:extLst>
+              <a:ext uri="{FF2B5EF4-FFF2-40B4-BE49-F238E27FC236}">
+                <a16:creationId xmlns:a16="http://schemas.microsoft.com/office/drawing/2014/main" id="{16E3B48C-0643-244A-8DA1-7DC8253189C5}"/>
+              </a:ext>
+            </a:extLst>
+          </p:cNvPr>
           <p:cNvSpPr txBox="1"/>
           <p:nvPr/>
         </p:nvSpPr>
         <p:spPr>
           <a:xfrm>
-            <a:off x="336600" y="682920"/>
-            <a:ext cx="8349840" cy="4177800"/>
+            <a:off x="334080" y="813291"/>
+            <a:ext cx="8809920" cy="4170729"/>
           </a:xfrm>
           <a:prstGeom prst="rect">
             <a:avLst/>
@@ -16151,42 +16738,1125 @@
           </a:bodyPr>
           <a:lstStyle/>
           <a:p>
-            <a:pPr marL="457200" indent="-355320">
+            <a:pPr marL="444420" indent="-342900">
+              <a:spcBef>
+                <a:spcPts val="400"/>
+              </a:spcBef>
+              <a:buFont typeface="Arial" panose="020B0604020202020204" pitchFamily="34" charset="0"/>
+              <a:buChar char="•"/>
+            </a:pPr>
+            <a:r>
+              <a:rPr lang="en-US" sz="2000" dirty="0"/>
+              <a:t>Doc delivery for enhancements in </a:t>
+            </a:r>
+            <a:r>
+              <a:rPr lang="en-US" sz="2000" dirty="0" err="1"/>
+              <a:t>Zowe</a:t>
+            </a:r>
+            <a:r>
+              <a:rPr lang="en-US" sz="2000" dirty="0"/>
+              <a:t> releases.</a:t>
+            </a:r>
+          </a:p>
+          <a:p>
+            <a:pPr marL="800100" lvl="1" indent="-342900">
+              <a:buFont typeface="Courier New" panose="02070309020205020404" pitchFamily="49" charset="0"/>
+              <a:buChar char="o"/>
+            </a:pPr>
+            <a:r>
+              <a:rPr lang="en-US" sz="1400" dirty="0"/>
+              <a:t>Document </a:t>
+            </a:r>
+            <a:r>
+              <a:rPr lang="en-US" sz="1400" dirty="0" err="1"/>
+              <a:t>Zowe</a:t>
+            </a:r>
+            <a:r>
+              <a:rPr lang="en-US" sz="1400" dirty="0"/>
+              <a:t> Docker support.</a:t>
+            </a:r>
+          </a:p>
+          <a:p>
+            <a:pPr marL="800100" lvl="1" indent="-342900">
+              <a:buFont typeface="Courier New" panose="02070309020205020404" pitchFamily="49" charset="0"/>
+              <a:buChar char="o"/>
+            </a:pPr>
+            <a:r>
+              <a:rPr lang="en-US" sz="1400" dirty="0"/>
+              <a:t>Document a project-based approach to configuring the CLI.</a:t>
+            </a:r>
+          </a:p>
+          <a:p>
+            <a:pPr marL="800100" lvl="1" indent="-342900">
+              <a:buFont typeface="Courier New" panose="02070309020205020404" pitchFamily="49" charset="0"/>
+              <a:buChar char="o"/>
+            </a:pPr>
+            <a:r>
+              <a:rPr lang="en-US" sz="1400" dirty="0"/>
+              <a:t>Add instructions for installing CLI from </a:t>
+            </a:r>
+            <a:r>
+              <a:rPr lang="en-US" sz="1400" dirty="0" err="1"/>
+              <a:t>npm</a:t>
+            </a:r>
+            <a:r>
+              <a:rPr lang="en-US" sz="1400" dirty="0"/>
+              <a:t> via proxy.</a:t>
+            </a:r>
+          </a:p>
+          <a:p>
+            <a:pPr marL="800100" lvl="1" indent="-342900">
+              <a:buFont typeface="Courier New" panose="02070309020205020404" pitchFamily="49" charset="0"/>
+              <a:buChar char="o"/>
+            </a:pPr>
+            <a:r>
+              <a:rPr lang="en-US" sz="1400" dirty="0"/>
+              <a:t>Document running CLI in Daemon mode.</a:t>
+            </a:r>
+          </a:p>
+          <a:p>
+            <a:pPr marL="800100" lvl="1" indent="-342900">
+              <a:buFont typeface="Courier New" panose="02070309020205020404" pitchFamily="49" charset="0"/>
+              <a:buChar char="o"/>
+            </a:pPr>
+            <a:r>
+              <a:rPr lang="en-US" sz="1400" dirty="0"/>
+              <a:t>Add documentation for Swift Client SDK (in addition to the Python and Node SDKs).</a:t>
+            </a:r>
+          </a:p>
+          <a:p>
+            <a:pPr marL="800100" lvl="1" indent="-342900">
+              <a:buFont typeface="Courier New" panose="02070309020205020404" pitchFamily="49" charset="0"/>
+              <a:buChar char="o"/>
+            </a:pPr>
+            <a:r>
+              <a:rPr lang="en-US" sz="1400" dirty="0"/>
+              <a:t>Document Node v14 support for CLI.</a:t>
+            </a:r>
+          </a:p>
+          <a:p>
+            <a:pPr marL="800100" lvl="1" indent="-342900">
+              <a:buFont typeface="Courier New" panose="02070309020205020404" pitchFamily="49" charset="0"/>
+              <a:buChar char="o"/>
+            </a:pPr>
+            <a:r>
+              <a:rPr lang="en-US" sz="1400" dirty="0"/>
+              <a:t>Document x.509 client certificate support for API ML</a:t>
+            </a:r>
+          </a:p>
+          <a:p>
+            <a:pPr marL="800100" lvl="1" indent="-342900">
+              <a:buFont typeface="Courier New" panose="02070309020205020404" pitchFamily="49" charset="0"/>
+              <a:buChar char="o"/>
+            </a:pPr>
+            <a:r>
+              <a:rPr lang="en-US" sz="1400" dirty="0"/>
+              <a:t>Document API ML as a standalone component</a:t>
+            </a:r>
+          </a:p>
+          <a:p>
+            <a:pPr marL="800100" lvl="1" indent="-342900">
+              <a:buFont typeface="Courier New" panose="02070309020205020404" pitchFamily="49" charset="0"/>
+              <a:buChar char="o"/>
+            </a:pPr>
+            <a:r>
+              <a:rPr lang="en-US" sz="1400" dirty="0"/>
+              <a:t>Document AT-TLS aware </a:t>
+            </a:r>
+            <a:r>
+              <a:rPr lang="en-US" sz="1400" dirty="0" err="1"/>
+              <a:t>Zowe</a:t>
+            </a:r>
+            <a:r>
+              <a:rPr lang="en-US" sz="1400" dirty="0"/>
+              <a:t> API ML</a:t>
+            </a:r>
+          </a:p>
+          <a:p>
+            <a:pPr marL="800100" lvl="1" indent="-342900">
+              <a:buFont typeface="Courier New" panose="02070309020205020404" pitchFamily="49" charset="0"/>
+              <a:buChar char="o"/>
+            </a:pPr>
+            <a:r>
+              <a:rPr lang="en-US" sz="1400" dirty="0"/>
+              <a:t>User guide to </a:t>
+            </a:r>
+            <a:r>
+              <a:rPr lang="en-US" sz="1400" dirty="0" err="1"/>
+              <a:t>Zowe</a:t>
+            </a:r>
+            <a:r>
+              <a:rPr lang="en-US" sz="1400" dirty="0"/>
+              <a:t> API ML Metrics dashboard</a:t>
+            </a:r>
+          </a:p>
+          <a:p>
+            <a:pPr marL="800100" lvl="1" indent="-342900">
+              <a:buFont typeface="Courier New" panose="02070309020205020404" pitchFamily="49" charset="0"/>
+              <a:buChar char="o"/>
+            </a:pPr>
+            <a:endParaRPr lang="en-US" sz="1600" dirty="0"/>
+          </a:p>
+          <a:p>
+            <a:pPr marL="342900" indent="-342900">
+              <a:buFont typeface="Arial" panose="020B0604020202020204" pitchFamily="34" charset="0"/>
+              <a:buChar char="•"/>
+            </a:pPr>
+            <a:r>
+              <a:rPr lang="en-US" sz="2000" dirty="0"/>
+              <a:t>Personalize doc filtering</a:t>
+            </a:r>
+          </a:p>
+          <a:p>
+            <a:pPr lvl="1"/>
+            <a:r>
+              <a:rPr lang="en-US" sz="1600" dirty="0"/>
+              <a:t>Allow </a:t>
+            </a:r>
+            <a:r>
+              <a:rPr lang="en-US" sz="1600" dirty="0" err="1"/>
+              <a:t>Zowe</a:t>
+            </a:r>
+            <a:r>
+              <a:rPr lang="en-US" sz="1600" dirty="0"/>
+              <a:t> users to browse doc by selecting an area of interest or component, role, and skill level. </a:t>
+            </a:r>
+            <a:r>
+              <a:rPr lang="en-US" sz="1600" dirty="0">
+                <a:hlinkClick r:id="rId3"/>
+              </a:rPr>
+              <a:t>#1257</a:t>
+            </a:r>
+            <a:endParaRPr lang="en-US" sz="1600" dirty="0"/>
+          </a:p>
+          <a:p>
+            <a:pPr lvl="1"/>
+            <a:endParaRPr lang="en-US" sz="1600" dirty="0"/>
+          </a:p>
+          <a:p>
+            <a:pPr marL="342900" indent="-342900">
+              <a:buFont typeface="Courier New" panose="02070309020205020404" pitchFamily="49" charset="0"/>
+              <a:buChar char="o"/>
+            </a:pPr>
+            <a:endParaRPr lang="en-US" sz="1600" dirty="0"/>
+          </a:p>
+          <a:p>
+            <a:pPr marL="444420" indent="-342900">
+              <a:spcBef>
+                <a:spcPts val="400"/>
+              </a:spcBef>
+              <a:buFont typeface="Arial" panose="020B0604020202020204" pitchFamily="34" charset="0"/>
+              <a:buChar char="•"/>
+            </a:pPr>
+            <a:endParaRPr lang="en-US" sz="2000" dirty="0"/>
+          </a:p>
+          <a:p>
+            <a:pPr marL="444420" indent="-342900">
+              <a:spcBef>
+                <a:spcPts val="400"/>
+              </a:spcBef>
+              <a:buFont typeface="Arial" panose="020B0604020202020204" pitchFamily="34" charset="0"/>
+              <a:buChar char="•"/>
+            </a:pPr>
+            <a:endParaRPr lang="en-US" sz="2000" spc="-1" dirty="0">
+              <a:solidFill>
+                <a:srgbClr val="000000"/>
+              </a:solidFill>
+            </a:endParaRPr>
+          </a:p>
+          <a:p>
+            <a:pPr marL="444420" indent="-342900">
+              <a:spcBef>
+                <a:spcPts val="400"/>
+              </a:spcBef>
+              <a:buFont typeface="Arial" panose="020B0604020202020204" pitchFamily="34" charset="0"/>
+              <a:buChar char="•"/>
+            </a:pPr>
+            <a:endParaRPr lang="en-US" sz="2000" dirty="0"/>
+          </a:p>
+        </p:txBody>
+      </p:sp>
+    </p:spTree>
+    <p:extLst>
+      <p:ext uri="{BB962C8B-B14F-4D97-AF65-F5344CB8AC3E}">
+        <p14:creationId xmlns:p14="http://schemas.microsoft.com/office/powerpoint/2010/main" val="1515099386"/>
+      </p:ext>
+    </p:extLst>
+  </p:cSld>
+  <p:clrMapOvr>
+    <a:masterClrMapping/>
+  </p:clrMapOvr>
+  <p:transition spd="med">
+    <p:fade/>
+  </p:transition>
+  <p:timing>
+    <p:tnLst>
+      <p:par>
+        <p:cTn id="1" dur="indefinite" restart="never" nodeType="tmRoot">
+          <p:childTnLst>
+            <p:seq>
+              <p:cTn id="2" dur="indefinite" nodeType="mainSeq"/>
+              <p:prevCondLst>
+                <p:cond evt="onPrev" delay="0">
+                  <p:tgtEl>
+                    <p:sldTgt/>
+                  </p:tgtEl>
+                </p:cond>
+              </p:prevCondLst>
+              <p:nextCondLst>
+                <p:cond evt="onNext" delay="0">
+                  <p:tgtEl>
+                    <p:sldTgt/>
+                  </p:tgtEl>
+                </p:cond>
+              </p:nextCondLst>
+            </p:seq>
+          </p:childTnLst>
+        </p:cTn>
+      </p:par>
+    </p:tnLst>
+  </p:timing>
+</p:sld>
+</file>
+
+<file path=ppt/slides/slide26.xml><?xml version="1.0" encoding="utf-8"?>
+<p:sld xmlns:a="http://schemas.openxmlformats.org/drawingml/2006/main" xmlns:r="http://schemas.openxmlformats.org/officeDocument/2006/relationships" xmlns:p="http://schemas.openxmlformats.org/presentationml/2006/main">
+  <p:cSld>
+    <p:spTree>
+      <p:nvGrpSpPr>
+        <p:cNvPr id="1" name=""/>
+        <p:cNvGrpSpPr/>
+        <p:nvPr/>
+      </p:nvGrpSpPr>
+      <p:grpSpPr>
+        <a:xfrm>
+          <a:off x="0" y="0"/>
+          <a:ext cx="0" cy="0"/>
+          <a:chOff x="0" y="0"/>
+          <a:chExt cx="0" cy="0"/>
+        </a:xfrm>
+      </p:grpSpPr>
+      <p:sp>
+        <p:nvSpPr>
+          <p:cNvPr id="3" name="TextShape 1">
+            <a:extLst>
+              <a:ext uri="{FF2B5EF4-FFF2-40B4-BE49-F238E27FC236}">
+                <a16:creationId xmlns:a16="http://schemas.microsoft.com/office/drawing/2014/main" id="{B8E8C5E1-9A2F-8E46-B0C3-2597185A9B7F}"/>
+              </a:ext>
+            </a:extLst>
+          </p:cNvPr>
+          <p:cNvSpPr txBox="1"/>
+          <p:nvPr/>
+        </p:nvSpPr>
+        <p:spPr>
+          <a:xfrm>
+            <a:off x="334080" y="159480"/>
+            <a:ext cx="7893720" cy="447120"/>
+          </a:xfrm>
+          <a:prstGeom prst="rect">
+            <a:avLst/>
+          </a:prstGeom>
+          <a:noFill/>
+          <a:ln>
+            <a:noFill/>
+          </a:ln>
+        </p:spPr>
+        <p:txBody>
+          <a:bodyPr tIns="91440" bIns="91440" anchor="ctr">
+            <a:noAutofit/>
+          </a:bodyPr>
+          <a:lstStyle/>
+          <a:p>
+            <a:pPr>
               <a:lnSpc>
                 <a:spcPct val="100000"/>
               </a:lnSpc>
+            </a:pPr>
+            <a:r>
+              <a:rPr lang="en-US" sz="3000" spc="-1" dirty="0" err="1">
+                <a:solidFill>
+                  <a:srgbClr val="262626"/>
+                </a:solidFill>
+                <a:latin typeface="+mj-lt"/>
+                <a:ea typeface="Gill Sans"/>
+              </a:rPr>
+              <a:t>Zowe</a:t>
+            </a:r>
+            <a:r>
+              <a:rPr lang="en-US" sz="3000" spc="-1" dirty="0">
+                <a:solidFill>
+                  <a:srgbClr val="262626"/>
+                </a:solidFill>
+                <a:latin typeface="+mj-lt"/>
+                <a:ea typeface="Gill Sans"/>
+              </a:rPr>
+              <a:t> Doc Squad</a:t>
+            </a:r>
+            <a:endParaRPr lang="en-US" sz="3000" b="0" strike="noStrike" spc="-1" dirty="0">
+              <a:solidFill>
+                <a:srgbClr val="000000"/>
+              </a:solidFill>
+              <a:latin typeface="+mj-lt"/>
+            </a:endParaRPr>
+          </a:p>
+        </p:txBody>
+      </p:sp>
+      <p:sp>
+        <p:nvSpPr>
+          <p:cNvPr id="4" name="TextShape 2">
+            <a:extLst>
+              <a:ext uri="{FF2B5EF4-FFF2-40B4-BE49-F238E27FC236}">
+                <a16:creationId xmlns:a16="http://schemas.microsoft.com/office/drawing/2014/main" id="{16E3B48C-0643-244A-8DA1-7DC8253189C5}"/>
+              </a:ext>
+            </a:extLst>
+          </p:cNvPr>
+          <p:cNvSpPr txBox="1"/>
+          <p:nvPr/>
+        </p:nvSpPr>
+        <p:spPr>
+          <a:xfrm>
+            <a:off x="334080" y="813291"/>
+            <a:ext cx="8087431" cy="4170729"/>
+          </a:xfrm>
+          <a:prstGeom prst="rect">
+            <a:avLst/>
+          </a:prstGeom>
+          <a:noFill/>
+          <a:ln>
+            <a:noFill/>
+          </a:ln>
+        </p:spPr>
+        <p:txBody>
+          <a:bodyPr tIns="91440" bIns="91440">
+            <a:noAutofit/>
+          </a:bodyPr>
+          <a:lstStyle/>
+          <a:p>
+            <a:pPr marL="444420" lvl="0" indent="-342900">
               <a:spcBef>
                 <a:spcPts val="400"/>
               </a:spcBef>
-              <a:buClr>
-                <a:srgbClr val="000000"/>
-              </a:buClr>
-              <a:buFont typeface="Arial"/>
+              <a:buFont typeface="Arial" panose="020B0604020202020204" pitchFamily="34" charset="0"/>
               <a:buChar char="•"/>
             </a:pPr>
             <a:r>
-              <a:rPr lang="en-US" sz="1800" b="0" strike="noStrike" spc="-1" dirty="0">
-                <a:solidFill>
-                  <a:srgbClr val="000000"/>
-                </a:solidFill>
-                <a:latin typeface="Gill Sans"/>
-                <a:ea typeface="Gill Sans"/>
-              </a:rPr>
-              <a:t>TBD</a:t>
-            </a:r>
-            <a:endParaRPr lang="en-US" sz="1600" b="0" strike="noStrike" spc="-1" dirty="0">
+              <a:rPr lang="en-US" sz="2000" dirty="0">
+                <a:solidFill>
+                  <a:prstClr val="black"/>
+                </a:solidFill>
+              </a:rPr>
+              <a:t>Provide better contribution doc</a:t>
+            </a:r>
+          </a:p>
+          <a:p>
+            <a:pPr lvl="1"/>
+            <a:r>
+              <a:rPr lang="en-US" sz="1600" dirty="0"/>
+              <a:t>Enrich and improve contribution documentation and guidelines on the </a:t>
+            </a:r>
+            <a:r>
+              <a:rPr lang="en-US" sz="1600" dirty="0" err="1"/>
+              <a:t>Zowe</a:t>
+            </a:r>
+            <a:r>
+              <a:rPr lang="en-US" sz="1600" dirty="0"/>
+              <a:t> docs site to provide clear process, links to related education, examples, and demos where necessary.</a:t>
+            </a:r>
+          </a:p>
+          <a:p>
+            <a:pPr lvl="1"/>
+            <a:endParaRPr lang="en-US" sz="1600" dirty="0"/>
+          </a:p>
+          <a:p>
+            <a:pPr marL="444420" indent="-342900">
+              <a:spcBef>
+                <a:spcPts val="400"/>
+              </a:spcBef>
+              <a:buFont typeface="Arial" panose="020B0604020202020204" pitchFamily="34" charset="0"/>
+              <a:buChar char="•"/>
+            </a:pPr>
+            <a:r>
+              <a:rPr lang="en-US" sz="2000" dirty="0"/>
+              <a:t>Improve content experience</a:t>
+            </a:r>
+          </a:p>
+          <a:p>
+            <a:pPr marL="800100" lvl="1" indent="-342900">
+              <a:buFont typeface="Courier New" panose="02070309020205020404" pitchFamily="49" charset="0"/>
+              <a:buChar char="o"/>
+            </a:pPr>
+            <a:r>
+              <a:rPr lang="en-US" sz="1400" dirty="0"/>
+              <a:t>CLI - More tips/examples about issuing commands. </a:t>
+            </a:r>
+            <a:r>
+              <a:rPr lang="en-US" sz="1400" dirty="0">
+                <a:hlinkClick r:id="rId3"/>
+              </a:rPr>
+              <a:t>#487</a:t>
+            </a:r>
+            <a:endParaRPr lang="en-US" sz="1400" dirty="0"/>
+          </a:p>
+          <a:p>
+            <a:pPr marL="800100" lvl="1" indent="-342900">
+              <a:buFont typeface="Courier New" panose="02070309020205020404" pitchFamily="49" charset="0"/>
+              <a:buChar char="o"/>
+            </a:pPr>
+            <a:r>
+              <a:rPr lang="en-US" sz="1400" dirty="0"/>
+              <a:t>CLI - Document the plugin profile types </a:t>
+            </a:r>
+            <a:r>
+              <a:rPr lang="en-US" sz="1400" dirty="0">
+                <a:hlinkClick r:id="rId3"/>
+              </a:rPr>
+              <a:t>#487</a:t>
+            </a:r>
+            <a:endParaRPr lang="en-US" sz="1400" dirty="0"/>
+          </a:p>
+          <a:p>
+            <a:pPr marL="800100" lvl="1" indent="-342900">
+              <a:buFont typeface="Courier New" panose="02070309020205020404" pitchFamily="49" charset="0"/>
+              <a:buChar char="o"/>
+            </a:pPr>
+            <a:r>
+              <a:rPr lang="en-US" sz="1400" dirty="0"/>
+              <a:t>Create a key concepts chapter to educate users the basic concepts in </a:t>
+            </a:r>
+            <a:r>
+              <a:rPr lang="en-US" sz="1400" dirty="0" err="1"/>
+              <a:t>Zowe</a:t>
+            </a:r>
+            <a:r>
+              <a:rPr lang="en-US" sz="1400" dirty="0"/>
+              <a:t> </a:t>
+            </a:r>
+            <a:r>
+              <a:rPr lang="en-US" sz="1400" dirty="0">
+                <a:hlinkClick r:id="rId4"/>
+              </a:rPr>
+              <a:t>#1319</a:t>
+            </a:r>
+            <a:endParaRPr lang="en-US" sz="1400" dirty="0"/>
+          </a:p>
+          <a:p>
+            <a:pPr marL="800100" lvl="1" indent="-342900">
+              <a:buFont typeface="Courier New" panose="02070309020205020404" pitchFamily="49" charset="0"/>
+              <a:buChar char="o"/>
+            </a:pPr>
+            <a:r>
+              <a:rPr lang="en-US" sz="1400" dirty="0"/>
+              <a:t>Improve home page design </a:t>
+            </a:r>
+            <a:r>
+              <a:rPr lang="en-US" sz="1400" dirty="0">
+                <a:hlinkClick r:id="rId5"/>
+              </a:rPr>
+              <a:t>#532</a:t>
+            </a:r>
+            <a:endParaRPr lang="en-US" sz="1400" dirty="0"/>
+          </a:p>
+          <a:p>
+            <a:pPr marL="800100" lvl="1" indent="-342900">
+              <a:buFont typeface="Courier New" panose="02070309020205020404" pitchFamily="49" charset="0"/>
+              <a:buChar char="o"/>
+            </a:pPr>
+            <a:r>
+              <a:rPr lang="en-US" sz="1400" dirty="0"/>
+              <a:t>Clearly separate manual from workflow approach for customization </a:t>
+            </a:r>
+            <a:r>
+              <a:rPr lang="en-US" sz="1400" dirty="0">
+                <a:hlinkClick r:id="rId6"/>
+              </a:rPr>
+              <a:t>#1326</a:t>
+            </a:r>
+            <a:endParaRPr lang="en-US" sz="1400" dirty="0"/>
+          </a:p>
+          <a:p>
+            <a:pPr marL="800100" lvl="1" indent="-342900">
+              <a:buFont typeface="Courier New" panose="02070309020205020404" pitchFamily="49" charset="0"/>
+              <a:buChar char="o"/>
+            </a:pPr>
+            <a:r>
+              <a:rPr lang="en-US" sz="1400" dirty="0"/>
+              <a:t>Improve the API ML security doc to provide a coherent and consistent overview of the API ML security concepts and features </a:t>
+            </a:r>
+            <a:r>
+              <a:rPr lang="en-US" sz="1400" dirty="0">
+                <a:hlinkClick r:id="rId7"/>
+              </a:rPr>
+              <a:t>#1427</a:t>
+            </a:r>
+            <a:endParaRPr lang="en-US" sz="1600" dirty="0"/>
+          </a:p>
+          <a:p>
+            <a:pPr marL="444420" indent="-342900">
+              <a:spcBef>
+                <a:spcPts val="400"/>
+              </a:spcBef>
+              <a:buFont typeface="Arial" panose="020B0604020202020204" pitchFamily="34" charset="0"/>
+              <a:buChar char="•"/>
+            </a:pPr>
+            <a:endParaRPr lang="en-US" sz="2000" spc="-1" dirty="0">
               <a:solidFill>
                 <a:srgbClr val="000000"/>
               </a:solidFill>
-              <a:latin typeface="Arial"/>
-            </a:endParaRPr>
+            </a:endParaRPr>
+          </a:p>
+          <a:p>
+            <a:pPr marL="444420" indent="-342900">
+              <a:spcBef>
+                <a:spcPts val="400"/>
+              </a:spcBef>
+              <a:buFont typeface="Arial" panose="020B0604020202020204" pitchFamily="34" charset="0"/>
+              <a:buChar char="•"/>
+            </a:pPr>
+            <a:endParaRPr lang="en-US" sz="2000" dirty="0"/>
           </a:p>
         </p:txBody>
       </p:sp>
     </p:spTree>
     <p:extLst>
       <p:ext uri="{BB962C8B-B14F-4D97-AF65-F5344CB8AC3E}">
-        <p14:creationId xmlns:p14="http://schemas.microsoft.com/office/powerpoint/2010/main" val="2500032759"/>
+        <p14:creationId xmlns:p14="http://schemas.microsoft.com/office/powerpoint/2010/main" val="3872474735"/>
+      </p:ext>
+    </p:extLst>
+  </p:cSld>
+  <p:clrMapOvr>
+    <a:masterClrMapping/>
+  </p:clrMapOvr>
+  <p:transition spd="med">
+    <p:fade/>
+  </p:transition>
+  <p:timing>
+    <p:tnLst>
+      <p:par>
+        <p:cTn id="1" dur="indefinite" restart="never" nodeType="tmRoot">
+          <p:childTnLst>
+            <p:seq>
+              <p:cTn id="2" dur="indefinite" nodeType="mainSeq"/>
+              <p:prevCondLst>
+                <p:cond evt="onPrev" delay="0">
+                  <p:tgtEl>
+                    <p:sldTgt/>
+                  </p:tgtEl>
+                </p:cond>
+              </p:prevCondLst>
+              <p:nextCondLst>
+                <p:cond evt="onNext" delay="0">
+                  <p:tgtEl>
+                    <p:sldTgt/>
+                  </p:tgtEl>
+                </p:cond>
+              </p:nextCondLst>
+            </p:seq>
+          </p:childTnLst>
+        </p:cTn>
+      </p:par>
+    </p:tnLst>
+  </p:timing>
+</p:sld>
+</file>
+
+<file path=ppt/slides/slide27.xml><?xml version="1.0" encoding="utf-8"?>
+<p:sld xmlns:a="http://schemas.openxmlformats.org/drawingml/2006/main" xmlns:r="http://schemas.openxmlformats.org/officeDocument/2006/relationships" xmlns:p="http://schemas.openxmlformats.org/presentationml/2006/main">
+  <p:cSld>
+    <p:spTree>
+      <p:nvGrpSpPr>
+        <p:cNvPr id="1" name=""/>
+        <p:cNvGrpSpPr/>
+        <p:nvPr/>
+      </p:nvGrpSpPr>
+      <p:grpSpPr>
+        <a:xfrm>
+          <a:off x="0" y="0"/>
+          <a:ext cx="0" cy="0"/>
+          <a:chOff x="0" y="0"/>
+          <a:chExt cx="0" cy="0"/>
+        </a:xfrm>
+      </p:grpSpPr>
+      <p:sp>
+        <p:nvSpPr>
+          <p:cNvPr id="3" name="TextShape 1">
+            <a:extLst>
+              <a:ext uri="{FF2B5EF4-FFF2-40B4-BE49-F238E27FC236}">
+                <a16:creationId xmlns:a16="http://schemas.microsoft.com/office/drawing/2014/main" id="{B8E8C5E1-9A2F-8E46-B0C3-2597185A9B7F}"/>
+              </a:ext>
+            </a:extLst>
+          </p:cNvPr>
+          <p:cNvSpPr txBox="1"/>
+          <p:nvPr/>
+        </p:nvSpPr>
+        <p:spPr>
+          <a:xfrm>
+            <a:off x="334080" y="159480"/>
+            <a:ext cx="7893720" cy="447120"/>
+          </a:xfrm>
+          <a:prstGeom prst="rect">
+            <a:avLst/>
+          </a:prstGeom>
+          <a:noFill/>
+          <a:ln>
+            <a:noFill/>
+          </a:ln>
+        </p:spPr>
+        <p:txBody>
+          <a:bodyPr tIns="91440" bIns="91440" anchor="ctr">
+            <a:noAutofit/>
+          </a:bodyPr>
+          <a:lstStyle/>
+          <a:p>
+            <a:pPr>
+              <a:lnSpc>
+                <a:spcPct val="100000"/>
+              </a:lnSpc>
+            </a:pPr>
+            <a:r>
+              <a:rPr lang="en-US" sz="3000" spc="-1" dirty="0" err="1">
+                <a:solidFill>
+                  <a:srgbClr val="262626"/>
+                </a:solidFill>
+                <a:latin typeface="+mj-lt"/>
+                <a:ea typeface="Gill Sans"/>
+              </a:rPr>
+              <a:t>Zowe</a:t>
+            </a:r>
+            <a:r>
+              <a:rPr lang="en-US" sz="3000" spc="-1" dirty="0">
+                <a:solidFill>
+                  <a:srgbClr val="262626"/>
+                </a:solidFill>
+                <a:latin typeface="+mj-lt"/>
+                <a:ea typeface="Gill Sans"/>
+              </a:rPr>
+              <a:t> Doc Squad</a:t>
+            </a:r>
+            <a:endParaRPr lang="en-US" sz="3000" b="0" strike="noStrike" spc="-1" dirty="0">
+              <a:solidFill>
+                <a:srgbClr val="000000"/>
+              </a:solidFill>
+              <a:latin typeface="+mj-lt"/>
+            </a:endParaRPr>
+          </a:p>
+        </p:txBody>
+      </p:sp>
+      <p:sp>
+        <p:nvSpPr>
+          <p:cNvPr id="4" name="TextShape 2">
+            <a:extLst>
+              <a:ext uri="{FF2B5EF4-FFF2-40B4-BE49-F238E27FC236}">
+                <a16:creationId xmlns:a16="http://schemas.microsoft.com/office/drawing/2014/main" id="{16E3B48C-0643-244A-8DA1-7DC8253189C5}"/>
+              </a:ext>
+            </a:extLst>
+          </p:cNvPr>
+          <p:cNvSpPr txBox="1"/>
+          <p:nvPr/>
+        </p:nvSpPr>
+        <p:spPr>
+          <a:xfrm>
+            <a:off x="334080" y="813291"/>
+            <a:ext cx="8269762" cy="4170729"/>
+          </a:xfrm>
+          <a:prstGeom prst="rect">
+            <a:avLst/>
+          </a:prstGeom>
+          <a:noFill/>
+          <a:ln>
+            <a:noFill/>
+          </a:ln>
+        </p:spPr>
+        <p:txBody>
+          <a:bodyPr tIns="91440" bIns="91440">
+            <a:noAutofit/>
+          </a:bodyPr>
+          <a:lstStyle/>
+          <a:p>
+            <a:pPr marL="444420" indent="-342900">
+              <a:spcBef>
+                <a:spcPts val="400"/>
+              </a:spcBef>
+              <a:buFont typeface="Arial" panose="020B0604020202020204" pitchFamily="34" charset="0"/>
+              <a:buChar char="•"/>
+            </a:pPr>
+            <a:r>
+              <a:rPr lang="en-US" sz="2000" dirty="0" err="1"/>
+              <a:t>Github</a:t>
+            </a:r>
+            <a:r>
+              <a:rPr lang="en-US" sz="2000" dirty="0"/>
+              <a:t> wiki doc integration</a:t>
+            </a:r>
+          </a:p>
+          <a:p>
+            <a:pPr marL="558720" lvl="1">
+              <a:spcBef>
+                <a:spcPts val="400"/>
+              </a:spcBef>
+            </a:pPr>
+            <a:r>
+              <a:rPr lang="en-US" sz="1600" dirty="0"/>
+              <a:t>Migrate information being written on the wiki into the doc site. This consolidates scattered documentation in one central location and makes users access them more quickly, comfortably, and easily.</a:t>
+            </a:r>
+          </a:p>
+          <a:p>
+            <a:pPr marL="558720" lvl="1">
+              <a:spcBef>
+                <a:spcPts val="400"/>
+              </a:spcBef>
+            </a:pPr>
+            <a:endParaRPr lang="en-US" sz="1600" spc="-1" dirty="0">
+              <a:solidFill>
+                <a:srgbClr val="000000"/>
+              </a:solidFill>
+              <a:latin typeface="Gill Sans"/>
+              <a:ea typeface="Gill Sans"/>
+            </a:endParaRPr>
+          </a:p>
+          <a:p>
+            <a:pPr marL="558720" lvl="1">
+              <a:spcBef>
+                <a:spcPts val="400"/>
+              </a:spcBef>
+            </a:pPr>
+            <a:endParaRPr lang="en-US" sz="1600" spc="-1" dirty="0">
+              <a:solidFill>
+                <a:srgbClr val="000000"/>
+              </a:solidFill>
+              <a:latin typeface="Gill Sans"/>
+              <a:ea typeface="Gill Sans"/>
+            </a:endParaRPr>
+          </a:p>
+          <a:p>
+            <a:pPr marL="444420" indent="-342900">
+              <a:spcBef>
+                <a:spcPts val="400"/>
+              </a:spcBef>
+              <a:buFont typeface="Arial" panose="020B0604020202020204" pitchFamily="34" charset="0"/>
+              <a:buChar char="•"/>
+            </a:pPr>
+            <a:r>
+              <a:rPr lang="en-US" sz="2000" spc="-1" dirty="0">
+                <a:solidFill>
+                  <a:srgbClr val="000000"/>
+                </a:solidFill>
+                <a:latin typeface="+mj-lt"/>
+                <a:ea typeface="Gill Sans"/>
+              </a:rPr>
+              <a:t>Data-driven content gap analysis</a:t>
+            </a:r>
+          </a:p>
+          <a:p>
+            <a:pPr marL="558720" lvl="1">
+              <a:spcBef>
+                <a:spcPts val="400"/>
+              </a:spcBef>
+            </a:pPr>
+            <a:r>
+              <a:rPr lang="en-US" sz="1600" spc="-1" dirty="0">
+                <a:solidFill>
+                  <a:srgbClr val="000000"/>
+                </a:solidFill>
+                <a:latin typeface="+mj-lt"/>
+                <a:ea typeface="Gill Sans"/>
+              </a:rPr>
+              <a:t>Identify content gaps and improvement areas by analyzing metrics and </a:t>
+            </a:r>
+            <a:r>
+              <a:rPr lang="en-US" altLang="zh-CN" sz="1600" spc="-1" dirty="0">
+                <a:solidFill>
+                  <a:srgbClr val="000000"/>
+                </a:solidFill>
+                <a:latin typeface="+mj-lt"/>
+                <a:ea typeface="Gill Sans"/>
+              </a:rPr>
+              <a:t>user</a:t>
+            </a:r>
+            <a:r>
+              <a:rPr lang="zh-CN" altLang="en-US" sz="1600" spc="-1" dirty="0">
+                <a:solidFill>
+                  <a:srgbClr val="000000"/>
+                </a:solidFill>
+                <a:latin typeface="+mj-lt"/>
+                <a:ea typeface="Gill Sans"/>
+              </a:rPr>
+              <a:t> </a:t>
+            </a:r>
+            <a:r>
+              <a:rPr lang="en-US" altLang="zh-CN" sz="1600" spc="-1" dirty="0">
+                <a:solidFill>
+                  <a:srgbClr val="000000"/>
+                </a:solidFill>
+                <a:latin typeface="+mj-lt"/>
+                <a:ea typeface="Gill Sans"/>
+              </a:rPr>
+              <a:t>feedback </a:t>
+            </a:r>
+            <a:r>
+              <a:rPr lang="en-US" sz="1600" spc="-1" dirty="0">
+                <a:solidFill>
+                  <a:srgbClr val="000000"/>
+                </a:solidFill>
+                <a:latin typeface="+mj-lt"/>
+                <a:ea typeface="Gill Sans"/>
+              </a:rPr>
+              <a:t>for the docs site.</a:t>
+            </a:r>
+          </a:p>
+          <a:p>
+            <a:pPr marL="444420" indent="-342900">
+              <a:spcBef>
+                <a:spcPts val="400"/>
+              </a:spcBef>
+              <a:buFont typeface="Arial" panose="020B0604020202020204" pitchFamily="34" charset="0"/>
+              <a:buChar char="•"/>
+            </a:pPr>
+            <a:endParaRPr lang="en-US" sz="2000" spc="-1" dirty="0">
+              <a:solidFill>
+                <a:srgbClr val="000000"/>
+              </a:solidFill>
+            </a:endParaRPr>
+          </a:p>
+          <a:p>
+            <a:pPr marL="444420" indent="-342900">
+              <a:spcBef>
+                <a:spcPts val="400"/>
+              </a:spcBef>
+              <a:buFont typeface="Arial" panose="020B0604020202020204" pitchFamily="34" charset="0"/>
+              <a:buChar char="•"/>
+            </a:pPr>
+            <a:endParaRPr lang="en-US" sz="2000" dirty="0"/>
+          </a:p>
+        </p:txBody>
+      </p:sp>
+    </p:spTree>
+    <p:extLst>
+      <p:ext uri="{BB962C8B-B14F-4D97-AF65-F5344CB8AC3E}">
+        <p14:creationId xmlns:p14="http://schemas.microsoft.com/office/powerpoint/2010/main" val="1420107054"/>
+      </p:ext>
+    </p:extLst>
+  </p:cSld>
+  <p:clrMapOvr>
+    <a:masterClrMapping/>
+  </p:clrMapOvr>
+  <p:transition spd="med">
+    <p:fade/>
+  </p:transition>
+  <p:timing>
+    <p:tnLst>
+      <p:par>
+        <p:cTn id="1" dur="indefinite" restart="never" nodeType="tmRoot">
+          <p:childTnLst>
+            <p:seq>
+              <p:cTn id="2" dur="indefinite" nodeType="mainSeq"/>
+              <p:prevCondLst>
+                <p:cond evt="onPrev" delay="0">
+                  <p:tgtEl>
+                    <p:sldTgt/>
+                  </p:tgtEl>
+                </p:cond>
+              </p:prevCondLst>
+              <p:nextCondLst>
+                <p:cond evt="onNext" delay="0">
+                  <p:tgtEl>
+                    <p:sldTgt/>
+                  </p:tgtEl>
+                </p:cond>
+              </p:nextCondLst>
+            </p:seq>
+          </p:childTnLst>
+        </p:cTn>
+      </p:par>
+    </p:tnLst>
+  </p:timing>
+</p:sld>
+</file>
+
+<file path=ppt/slides/slide28.xml><?xml version="1.0" encoding="utf-8"?>
+<p:sld xmlns:a="http://schemas.openxmlformats.org/drawingml/2006/main" xmlns:r="http://schemas.openxmlformats.org/officeDocument/2006/relationships" xmlns:p="http://schemas.openxmlformats.org/presentationml/2006/main">
+  <p:cSld>
+    <p:spTree>
+      <p:nvGrpSpPr>
+        <p:cNvPr id="1" name=""/>
+        <p:cNvGrpSpPr/>
+        <p:nvPr/>
+      </p:nvGrpSpPr>
+      <p:grpSpPr>
+        <a:xfrm>
+          <a:off x="0" y="0"/>
+          <a:ext cx="0" cy="0"/>
+          <a:chOff x="0" y="0"/>
+          <a:chExt cx="0" cy="0"/>
+        </a:xfrm>
+      </p:grpSpPr>
+      <p:sp>
+        <p:nvSpPr>
+          <p:cNvPr id="180" name="TextShape 1"/>
+          <p:cNvSpPr txBox="1"/>
+          <p:nvPr/>
+        </p:nvSpPr>
+        <p:spPr>
+          <a:xfrm>
+            <a:off x="334080" y="159480"/>
+            <a:ext cx="7893720" cy="447120"/>
+          </a:xfrm>
+          <a:prstGeom prst="rect">
+            <a:avLst/>
+          </a:prstGeom>
+          <a:noFill/>
+          <a:ln>
+            <a:noFill/>
+          </a:ln>
+        </p:spPr>
+        <p:txBody>
+          <a:bodyPr tIns="91440" bIns="91440" anchor="ctr">
+            <a:noAutofit/>
+          </a:bodyPr>
+          <a:lstStyle/>
+          <a:p>
+            <a:pPr>
+              <a:lnSpc>
+                <a:spcPct val="100000"/>
+              </a:lnSpc>
+            </a:pPr>
+            <a:r>
+              <a:rPr lang="en-US" sz="3000" b="0" strike="noStrike" spc="-1" dirty="0">
+                <a:solidFill>
+                  <a:srgbClr val="262626"/>
+                </a:solidFill>
+                <a:latin typeface="+mj-lt"/>
+                <a:ea typeface="Gill Sans"/>
+              </a:rPr>
+              <a:t>Dependencies</a:t>
+            </a:r>
+            <a:endParaRPr lang="en-US" sz="3000" b="0" strike="noStrike" spc="-1" dirty="0">
+              <a:solidFill>
+                <a:srgbClr val="000000"/>
+              </a:solidFill>
+              <a:latin typeface="+mj-lt"/>
+            </a:endParaRPr>
+          </a:p>
+        </p:txBody>
+      </p:sp>
+      <p:sp>
+        <p:nvSpPr>
+          <p:cNvPr id="181" name="TextShape 2"/>
+          <p:cNvSpPr txBox="1"/>
+          <p:nvPr/>
+        </p:nvSpPr>
+        <p:spPr>
+          <a:xfrm>
+            <a:off x="306360" y="774000"/>
+            <a:ext cx="8368920" cy="4147560"/>
+          </a:xfrm>
+          <a:prstGeom prst="rect">
+            <a:avLst/>
+          </a:prstGeom>
+          <a:noFill/>
+          <a:ln>
+            <a:noFill/>
+          </a:ln>
+        </p:spPr>
+        <p:txBody>
+          <a:bodyPr tIns="91440" bIns="91440">
+            <a:noAutofit/>
+          </a:bodyPr>
+          <a:lstStyle/>
+          <a:p>
+            <a:pPr marL="444780" indent="-342900">
+              <a:lnSpc>
+                <a:spcPct val="100000"/>
+              </a:lnSpc>
+              <a:spcBef>
+                <a:spcPts val="400"/>
+              </a:spcBef>
+              <a:buClr>
+                <a:srgbClr val="000000"/>
+              </a:buClr>
+              <a:buFont typeface="Arial" panose="020B0604020202020204" pitchFamily="34" charset="0"/>
+              <a:buChar char="•"/>
+            </a:pPr>
+            <a:r>
+              <a:rPr lang="en-US" sz="2000" dirty="0"/>
+              <a:t>All squads: collaborate on creating new feature content and improving content experience.</a:t>
+            </a:r>
+          </a:p>
+          <a:p>
+            <a:pPr marL="444780" indent="-342900">
+              <a:lnSpc>
+                <a:spcPct val="100000"/>
+              </a:lnSpc>
+              <a:spcBef>
+                <a:spcPts val="400"/>
+              </a:spcBef>
+              <a:buClr>
+                <a:srgbClr val="000000"/>
+              </a:buClr>
+              <a:buFont typeface="Arial" panose="020B0604020202020204" pitchFamily="34" charset="0"/>
+              <a:buChar char="•"/>
+            </a:pPr>
+            <a:endParaRPr lang="en-US" sz="2000" dirty="0"/>
+          </a:p>
+          <a:p>
+            <a:pPr marL="444780" indent="-342900">
+              <a:lnSpc>
+                <a:spcPct val="100000"/>
+              </a:lnSpc>
+              <a:spcBef>
+                <a:spcPts val="400"/>
+              </a:spcBef>
+              <a:buClr>
+                <a:srgbClr val="000000"/>
+              </a:buClr>
+              <a:buFont typeface="Arial" panose="020B0604020202020204" pitchFamily="34" charset="0"/>
+              <a:buChar char="•"/>
+            </a:pPr>
+            <a:r>
+              <a:rPr lang="en-US" sz="2000" dirty="0"/>
+              <a:t>On-boarding squad: understand personas and resources.</a:t>
+            </a:r>
+          </a:p>
+          <a:p>
+            <a:pPr marL="444780" indent="-342900">
+              <a:lnSpc>
+                <a:spcPct val="100000"/>
+              </a:lnSpc>
+              <a:spcBef>
+                <a:spcPts val="400"/>
+              </a:spcBef>
+              <a:buClr>
+                <a:srgbClr val="000000"/>
+              </a:buClr>
+              <a:buFont typeface="Arial" panose="020B0604020202020204" pitchFamily="34" charset="0"/>
+              <a:buChar char="•"/>
+            </a:pPr>
+            <a:endParaRPr lang="en-US" sz="2000" dirty="0"/>
+          </a:p>
+          <a:p>
+            <a:pPr marL="444780" indent="-342900">
+              <a:lnSpc>
+                <a:spcPct val="100000"/>
+              </a:lnSpc>
+              <a:spcBef>
+                <a:spcPts val="400"/>
+              </a:spcBef>
+              <a:buClr>
+                <a:srgbClr val="000000"/>
+              </a:buClr>
+              <a:buFont typeface="Arial" panose="020B0604020202020204" pitchFamily="34" charset="0"/>
+              <a:buChar char="•"/>
+            </a:pPr>
+            <a:r>
+              <a:rPr lang="en-US" sz="2000" dirty="0"/>
+              <a:t>Systems, web UI squad: potential build support and UI review.</a:t>
+            </a:r>
+          </a:p>
+        </p:txBody>
+      </p:sp>
+    </p:spTree>
+    <p:extLst>
+      <p:ext uri="{BB962C8B-B14F-4D97-AF65-F5344CB8AC3E}">
+        <p14:creationId xmlns:p14="http://schemas.microsoft.com/office/powerpoint/2010/main" val="1812539045"/>
       </p:ext>
     </p:extLst>
   </p:cSld>
@@ -16195,6 +17865,198 @@
   </p:clrMapOvr>
   <p:transition spd="med">
     <p:fade thruBlk="1"/>
+  </p:transition>
+  <p:timing>
+    <p:tnLst>
+      <p:par>
+        <p:cTn id="1" dur="indefinite" restart="never" nodeType="tmRoot">
+          <p:childTnLst>
+            <p:seq>
+              <p:cTn id="2" dur="indefinite" nodeType="mainSeq"/>
+              <p:prevCondLst>
+                <p:cond evt="onPrev" delay="0">
+                  <p:tgtEl>
+                    <p:sldTgt/>
+                  </p:tgtEl>
+                </p:cond>
+              </p:prevCondLst>
+              <p:nextCondLst>
+                <p:cond evt="onNext" delay="0">
+                  <p:tgtEl>
+                    <p:sldTgt/>
+                  </p:tgtEl>
+                </p:cond>
+              </p:nextCondLst>
+            </p:seq>
+          </p:childTnLst>
+        </p:cTn>
+      </p:par>
+    </p:tnLst>
+  </p:timing>
+</p:sld>
+</file>
+
+<file path=ppt/slides/slide29.xml><?xml version="1.0" encoding="utf-8"?>
+<p:sld xmlns:a="http://schemas.openxmlformats.org/drawingml/2006/main" xmlns:r="http://schemas.openxmlformats.org/officeDocument/2006/relationships" xmlns:p="http://schemas.openxmlformats.org/presentationml/2006/main">
+  <p:cSld>
+    <p:spTree>
+      <p:nvGrpSpPr>
+        <p:cNvPr id="1" name=""/>
+        <p:cNvGrpSpPr/>
+        <p:nvPr/>
+      </p:nvGrpSpPr>
+      <p:grpSpPr>
+        <a:xfrm>
+          <a:off x="0" y="0"/>
+          <a:ext cx="0" cy="0"/>
+          <a:chOff x="0" y="0"/>
+          <a:chExt cx="0" cy="0"/>
+        </a:xfrm>
+      </p:grpSpPr>
+      <p:sp>
+        <p:nvSpPr>
+          <p:cNvPr id="2" name="Rectangle 1"/>
+          <p:cNvSpPr/>
+          <p:nvPr/>
+        </p:nvSpPr>
+        <p:spPr>
+          <a:xfrm>
+            <a:off x="352839" y="3180521"/>
+            <a:ext cx="7404652" cy="940257"/>
+          </a:xfrm>
+          <a:prstGeom prst="rect">
+            <a:avLst/>
+          </a:prstGeom>
+        </p:spPr>
+        <p:txBody>
+          <a:bodyPr wrap="square">
+            <a:spAutoFit/>
+          </a:bodyPr>
+          <a:lstStyle/>
+          <a:p>
+            <a:pPr marL="457200" marR="0" lvl="0" indent="-228240" algn="l" defTabSz="914400" rtl="0" eaLnBrk="1" fontAlgn="auto" latinLnBrk="0" hangingPunct="1">
+              <a:lnSpc>
+                <a:spcPct val="85000"/>
+              </a:lnSpc>
+              <a:spcBef>
+                <a:spcPts val="901"/>
+              </a:spcBef>
+              <a:spcAft>
+                <a:spcPts val="0"/>
+              </a:spcAft>
+              <a:buClrTx/>
+              <a:buSzTx/>
+              <a:buFontTx/>
+              <a:buNone/>
+              <a:tabLst/>
+              <a:defRPr/>
+            </a:pPr>
+            <a:r>
+              <a:rPr kumimoji="0" lang="en-US" sz="3200" b="1" i="0" u="none" strike="noStrike" kern="1200" cap="none" spc="-1" normalizeH="0" baseline="0" noProof="0" dirty="0" err="1">
+                <a:ln>
+                  <a:noFill/>
+                </a:ln>
+                <a:solidFill>
+                  <a:srgbClr val="000000"/>
+                </a:solidFill>
+                <a:effectLst/>
+                <a:uLnTx/>
+                <a:uFillTx/>
+                <a:latin typeface="Arial"/>
+                <a:ea typeface="Arial"/>
+              </a:rPr>
+              <a:t>Zowe</a:t>
+            </a:r>
+            <a:r>
+              <a:rPr kumimoji="0" lang="en-US" sz="3200" b="1" i="0" u="none" strike="noStrike" kern="1200" cap="none" spc="-1" normalizeH="0" baseline="0" noProof="0" dirty="0">
+                <a:ln>
+                  <a:noFill/>
+                </a:ln>
+                <a:solidFill>
+                  <a:srgbClr val="000000"/>
+                </a:solidFill>
+                <a:effectLst/>
+                <a:uLnTx/>
+                <a:uFillTx/>
+                <a:latin typeface="Arial"/>
+                <a:ea typeface="Arial"/>
+              </a:rPr>
+              <a:t> Squad Focus</a:t>
+            </a:r>
+            <a:endParaRPr kumimoji="0" lang="en-US" sz="3200" b="0" i="0" u="none" strike="noStrike" kern="1200" cap="none" spc="-1" normalizeH="0" baseline="0" noProof="0" dirty="0">
+              <a:ln>
+                <a:noFill/>
+              </a:ln>
+              <a:solidFill>
+                <a:srgbClr val="000000"/>
+              </a:solidFill>
+              <a:effectLst/>
+              <a:uLnTx/>
+              <a:uFillTx/>
+              <a:latin typeface="Arial"/>
+            </a:endParaRPr>
+          </a:p>
+          <a:p>
+            <a:pPr marL="457200" marR="0" lvl="0" indent="-228240" algn="l" defTabSz="914400" rtl="0" eaLnBrk="1" fontAlgn="auto" latinLnBrk="0" hangingPunct="1">
+              <a:lnSpc>
+                <a:spcPct val="85000"/>
+              </a:lnSpc>
+              <a:spcBef>
+                <a:spcPts val="901"/>
+              </a:spcBef>
+              <a:spcAft>
+                <a:spcPts val="0"/>
+              </a:spcAft>
+              <a:buClrTx/>
+              <a:buSzTx/>
+              <a:buFontTx/>
+              <a:buNone/>
+              <a:tabLst/>
+              <a:defRPr/>
+            </a:pPr>
+            <a:r>
+              <a:rPr kumimoji="0" lang="en-US" sz="2400" b="1" i="0" u="none" strike="noStrike" kern="1200" cap="none" spc="-1" normalizeH="0" baseline="0" noProof="0" dirty="0">
+                <a:ln>
+                  <a:noFill/>
+                </a:ln>
+                <a:solidFill>
+                  <a:srgbClr val="000000"/>
+                </a:solidFill>
+                <a:effectLst/>
+                <a:uLnTx/>
+                <a:uFillTx/>
+                <a:latin typeface="Arial"/>
+                <a:ea typeface="Arial"/>
+              </a:rPr>
+              <a:t>xxx</a:t>
+            </a:r>
+            <a:endParaRPr kumimoji="0" lang="en-US" sz="2000" b="0" i="0" u="none" strike="noStrike" kern="1200" cap="none" spc="-1" normalizeH="0" baseline="0" noProof="0" dirty="0">
+              <a:ln>
+                <a:noFill/>
+              </a:ln>
+              <a:solidFill>
+                <a:srgbClr val="000000"/>
+              </a:solidFill>
+              <a:effectLst/>
+              <a:uLnTx/>
+              <a:uFillTx/>
+              <a:latin typeface="Arial"/>
+            </a:endParaRPr>
+          </a:p>
+        </p:txBody>
+      </p:sp>
+    </p:spTree>
+    <p:extLst>
+      <p:ext uri="{BB962C8B-B14F-4D97-AF65-F5344CB8AC3E}">
+        <p14:creationId xmlns:p14="http://schemas.microsoft.com/office/powerpoint/2010/main" val="127585587"/>
+      </p:ext>
+    </p:extLst>
+  </p:cSld>
+  <p:clrMapOvr>
+    <a:masterClrMapping/>
+  </p:clrMapOvr>
+  <p:transition spd="med">
+    <p:fade/>
   </p:transition>
   <p:timing>
     <p:tnLst>
@@ -16444,6 +18306,55 @@
             </a:r>
           </a:p>
           <a:p>
+            <a:pPr marL="457200" indent="-355320">
+              <a:spcBef>
+                <a:spcPts val="400"/>
+              </a:spcBef>
+              <a:buClr>
+                <a:srgbClr val="000000"/>
+              </a:buClr>
+              <a:buFont typeface="Arial"/>
+              <a:buChar char="•"/>
+            </a:pPr>
+            <a:r>
+              <a:rPr lang="en-US" sz="2000" spc="-1" dirty="0" err="1">
+                <a:solidFill>
+                  <a:srgbClr val="000000"/>
+                </a:solidFill>
+              </a:rPr>
+              <a:t>Zowe</a:t>
+            </a:r>
+            <a:r>
+              <a:rPr lang="en-US" sz="2000" spc="-1" dirty="0">
+                <a:solidFill>
+                  <a:srgbClr val="000000"/>
+                </a:solidFill>
+              </a:rPr>
+              <a:t> Doc Squad Focus</a:t>
+            </a:r>
+          </a:p>
+          <a:p>
+            <a:pPr marL="457200" indent="-355320">
+              <a:lnSpc>
+                <a:spcPct val="100000"/>
+              </a:lnSpc>
+              <a:spcBef>
+                <a:spcPts val="400"/>
+              </a:spcBef>
+              <a:buClr>
+                <a:srgbClr val="000000"/>
+              </a:buClr>
+              <a:buFont typeface="Arial"/>
+              <a:buChar char="•"/>
+            </a:pPr>
+            <a:endParaRPr lang="en-US" sz="2000" b="0" strike="noStrike" spc="-1" dirty="0">
+              <a:solidFill>
+                <a:srgbClr val="000000"/>
+              </a:solidFill>
+              <a:latin typeface="+mj-lt"/>
+            </a:endParaRPr>
+          </a:p>
+          <a:p>
             <a:pPr>
               <a:lnSpc>
                 <a:spcPct val="100000"/>
@@ -16526,6 +18437,172 @@
         </p:txBody>
       </p:sp>
     </p:spTree>
+  </p:cSld>
+  <p:clrMapOvr>
+    <a:masterClrMapping/>
+  </p:clrMapOvr>
+  <p:transition spd="med">
+    <p:fade thruBlk="1"/>
+  </p:transition>
+  <p:timing>
+    <p:tnLst>
+      <p:par>
+        <p:cTn id="1" dur="indefinite" restart="never" nodeType="tmRoot">
+          <p:childTnLst>
+            <p:seq>
+              <p:cTn id="2" dur="indefinite" nodeType="mainSeq"/>
+              <p:prevCondLst>
+                <p:cond evt="onPrev" delay="0">
+                  <p:tgtEl>
+                    <p:sldTgt/>
+                  </p:tgtEl>
+                </p:cond>
+              </p:prevCondLst>
+              <p:nextCondLst>
+                <p:cond evt="onNext" delay="0">
+                  <p:tgtEl>
+                    <p:sldTgt/>
+                  </p:tgtEl>
+                </p:cond>
+              </p:nextCondLst>
+            </p:seq>
+          </p:childTnLst>
+        </p:cTn>
+      </p:par>
+    </p:tnLst>
+  </p:timing>
+</p:sld>
+</file>
+
+<file path=ppt/slides/slide30.xml><?xml version="1.0" encoding="utf-8"?>
+<p:sld xmlns:a="http://schemas.openxmlformats.org/drawingml/2006/main" xmlns:r="http://schemas.openxmlformats.org/officeDocument/2006/relationships" xmlns:p="http://schemas.openxmlformats.org/presentationml/2006/main">
+  <p:cSld>
+    <p:spTree>
+      <p:nvGrpSpPr>
+        <p:cNvPr id="1" name=""/>
+        <p:cNvGrpSpPr/>
+        <p:nvPr/>
+      </p:nvGrpSpPr>
+      <p:grpSpPr>
+        <a:xfrm>
+          <a:off x="0" y="0"/>
+          <a:ext cx="0" cy="0"/>
+          <a:chOff x="0" y="0"/>
+          <a:chExt cx="0" cy="0"/>
+        </a:xfrm>
+      </p:grpSpPr>
+      <p:sp>
+        <p:nvSpPr>
+          <p:cNvPr id="189" name="TextShape 1"/>
+          <p:cNvSpPr txBox="1"/>
+          <p:nvPr/>
+        </p:nvSpPr>
+        <p:spPr>
+          <a:xfrm>
+            <a:off x="334080" y="159480"/>
+            <a:ext cx="7893720" cy="447120"/>
+          </a:xfrm>
+          <a:prstGeom prst="rect">
+            <a:avLst/>
+          </a:prstGeom>
+          <a:noFill/>
+          <a:ln>
+            <a:noFill/>
+          </a:ln>
+        </p:spPr>
+        <p:txBody>
+          <a:bodyPr tIns="91440" bIns="91440" anchor="ctr">
+            <a:noAutofit/>
+          </a:bodyPr>
+          <a:lstStyle/>
+          <a:p>
+            <a:pPr>
+              <a:lnSpc>
+                <a:spcPct val="100000"/>
+              </a:lnSpc>
+            </a:pPr>
+            <a:r>
+              <a:rPr lang="en-US" sz="2600" b="0" strike="noStrike" spc="-1" dirty="0">
+                <a:solidFill>
+                  <a:srgbClr val="262626"/>
+                </a:solidFill>
+                <a:latin typeface="Gill Sans"/>
+                <a:ea typeface="Gill Sans"/>
+              </a:rPr>
+              <a:t>Title</a:t>
+            </a:r>
+            <a:endParaRPr lang="en-US" sz="2600" b="0" strike="noStrike" spc="-1" dirty="0">
+              <a:solidFill>
+                <a:srgbClr val="000000"/>
+              </a:solidFill>
+              <a:latin typeface="Arial"/>
+            </a:endParaRPr>
+          </a:p>
+        </p:txBody>
+      </p:sp>
+      <p:sp>
+        <p:nvSpPr>
+          <p:cNvPr id="190" name="TextShape 2"/>
+          <p:cNvSpPr txBox="1"/>
+          <p:nvPr/>
+        </p:nvSpPr>
+        <p:spPr>
+          <a:xfrm>
+            <a:off x="336600" y="682920"/>
+            <a:ext cx="8349840" cy="4177800"/>
+          </a:xfrm>
+          <a:prstGeom prst="rect">
+            <a:avLst/>
+          </a:prstGeom>
+          <a:noFill/>
+          <a:ln>
+            <a:noFill/>
+          </a:ln>
+        </p:spPr>
+        <p:txBody>
+          <a:bodyPr tIns="91440" bIns="91440">
+            <a:noAutofit/>
+          </a:bodyPr>
+          <a:lstStyle/>
+          <a:p>
+            <a:pPr marL="457200" indent="-355320">
+              <a:lnSpc>
+                <a:spcPct val="100000"/>
+              </a:lnSpc>
+              <a:spcBef>
+                <a:spcPts val="400"/>
+              </a:spcBef>
+              <a:buClr>
+                <a:srgbClr val="000000"/>
+              </a:buClr>
+              <a:buFont typeface="Arial"/>
+              <a:buChar char="•"/>
+            </a:pPr>
+            <a:r>
+              <a:rPr lang="en-US" sz="1800" b="0" strike="noStrike" spc="-1" dirty="0">
+                <a:solidFill>
+                  <a:srgbClr val="000000"/>
+                </a:solidFill>
+                <a:latin typeface="Gill Sans"/>
+                <a:ea typeface="Gill Sans"/>
+              </a:rPr>
+              <a:t>TBD</a:t>
+            </a:r>
+            <a:endParaRPr lang="en-US" sz="1600" b="0" strike="noStrike" spc="-1" dirty="0">
+              <a:solidFill>
+                <a:srgbClr val="000000"/>
+              </a:solidFill>
+              <a:latin typeface="Arial"/>
+            </a:endParaRPr>
+          </a:p>
+        </p:txBody>
+      </p:sp>
+    </p:spTree>
+    <p:extLst>
+      <p:ext uri="{BB962C8B-B14F-4D97-AF65-F5344CB8AC3E}">
+        <p14:creationId xmlns:p14="http://schemas.microsoft.com/office/powerpoint/2010/main" val="2500032759"/>
+      </p:ext>
+    </p:extLst>
   </p:cSld>
   <p:clrMapOvr>
     <a:masterClrMapping/>

</xml_diff>

<commit_message>
update system squad overview
Signed-off-by: MarkAckert <mark.ackert@broadcom.com>
</commit_message>
<xml_diff>
--- a/Project Management/PI Planning/20PI4 Planning/Zowe Community Squad Focus for 20PI4.pptx
+++ b/Project Management/PI Planning/20PI4 Planning/Zowe Community Squad Focus for 20PI4.pptx
@@ -621,17 +621,7 @@
                 <a:latin typeface="Arial"/>
                 <a:ea typeface="Arial"/>
               </a:rPr>
-              <a:t>Customer apps may have their own way of supporting client </a:t>
-            </a:r>
-            <a:r>
-              <a:rPr lang="en-US" sz="1100" b="0" strike="noStrike" spc="-1" dirty="0" smtClean="0">
-                <a:solidFill>
-                  <a:srgbClr val="000000"/>
-                </a:solidFill>
-                <a:latin typeface="Arial"/>
-                <a:ea typeface="Arial"/>
-              </a:rPr>
-              <a:t>certs</a:t>
+              <a:t>Customer apps may have their own way of supporting client certs</a:t>
             </a:r>
           </a:p>
           <a:p>
@@ -640,7 +630,7 @@
                 <a:spcPct val="100000"/>
               </a:lnSpc>
             </a:pPr>
-            <a:endParaRPr lang="en-US" sz="1100" b="0" strike="noStrike" spc="-1" dirty="0" smtClean="0">
+            <a:endParaRPr lang="en-US" sz="1100" b="0" strike="noStrike" spc="-1" dirty="0">
               <a:solidFill>
                 <a:srgbClr val="000000"/>
               </a:solidFill>
@@ -654,7 +644,7 @@
               </a:lnSpc>
             </a:pPr>
             <a:r>
-              <a:rPr lang="en-US" sz="1100" b="0" strike="noStrike" spc="-1" dirty="0" smtClean="0">
+              <a:rPr lang="en-US" sz="1100" b="0" strike="noStrike" spc="-1" dirty="0">
                 <a:solidFill>
                   <a:srgbClr val="000000"/>
                 </a:solidFill>
@@ -670,7 +660,7 @@
               </a:lnSpc>
             </a:pPr>
             <a:r>
-              <a:rPr lang="en-US" sz="1100" b="0" strike="noStrike" spc="-1" dirty="0" smtClean="0">
+              <a:rPr lang="en-US" sz="1100" b="0" strike="noStrike" spc="-1" dirty="0">
                 <a:solidFill>
                   <a:srgbClr val="000000"/>
                 </a:solidFill>
@@ -686,7 +676,7 @@
               </a:lnSpc>
             </a:pPr>
             <a:r>
-              <a:rPr lang="en-US" sz="1100" b="0" strike="noStrike" spc="-1" dirty="0" smtClean="0">
+              <a:rPr lang="en-US" sz="1100" b="0" strike="noStrike" spc="-1" dirty="0">
                 <a:solidFill>
                   <a:srgbClr val="000000"/>
                 </a:solidFill>
@@ -695,7 +685,7 @@
               <a:t>Support needed from System Squad; introducing</a:t>
             </a:r>
             <a:r>
-              <a:rPr lang="en-US" sz="1100" b="0" strike="noStrike" spc="-1" baseline="0" dirty="0" smtClean="0">
+              <a:rPr lang="en-US" sz="1100" b="0" strike="noStrike" spc="-1" baseline="0" dirty="0">
                 <a:solidFill>
                   <a:srgbClr val="000000"/>
                 </a:solidFill>
@@ -2743,7 +2733,7 @@
               </a:lnSpc>
             </a:pPr>
             <a:r>
-              <a:rPr lang="en-US" sz="1200" kern="1200" dirty="0" smtClean="0">
+              <a:rPr lang="en-US" sz="1200" kern="1200" dirty="0">
                 <a:solidFill>
                   <a:schemeClr val="tx1"/>
                 </a:solidFill>
@@ -2755,7 +2745,7 @@
               <a:t>The initial Metrics Service will include basic monitoring information and features, relying heavily on pre-configuration given by Netflix </a:t>
             </a:r>
             <a:r>
-              <a:rPr lang="en-US" sz="1200" kern="1200" dirty="0" err="1" smtClean="0">
+              <a:rPr lang="en-US" sz="1200" kern="1200" dirty="0" err="1">
                 <a:solidFill>
                   <a:schemeClr val="tx1"/>
                 </a:solidFill>
@@ -2767,7 +2757,7 @@
               <a:t>Hystrix</a:t>
             </a:r>
             <a:r>
-              <a:rPr lang="en-US" sz="1200" kern="1200" dirty="0" smtClean="0">
+              <a:rPr lang="en-US" sz="1200" kern="1200" dirty="0">
                 <a:solidFill>
                   <a:schemeClr val="tx1"/>
                 </a:solidFill>
@@ -2778,7 +2768,7 @@
               </a:rPr>
               <a:t> and Turbine. As the service is implemented and matures, further features could be added that allow for more customization.</a:t>
             </a:r>
-            <a:endParaRPr lang="en-US" sz="1100" spc="-1" dirty="0" smtClean="0">
+            <a:endParaRPr lang="en-US" sz="1100" spc="-1" dirty="0">
               <a:solidFill>
                 <a:srgbClr val="000000"/>
               </a:solidFill>
@@ -2792,7 +2782,7 @@
                 <a:spcPct val="100000"/>
               </a:lnSpc>
             </a:pPr>
-            <a:endParaRPr lang="en-US" sz="1100" spc="-1" dirty="0" smtClean="0">
+            <a:endParaRPr lang="en-US" sz="1100" spc="-1" dirty="0">
               <a:solidFill>
                 <a:srgbClr val="000000"/>
               </a:solidFill>
@@ -2807,7 +2797,7 @@
               </a:lnSpc>
             </a:pPr>
             <a:r>
-              <a:rPr lang="en-US" sz="1100" spc="-1" dirty="0" smtClean="0">
+              <a:rPr lang="en-US" sz="1100" spc="-1" dirty="0">
                 <a:solidFill>
                   <a:srgbClr val="000000"/>
                 </a:solidFill>
@@ -2823,7 +2813,7 @@
                 <a:spcPct val="100000"/>
               </a:lnSpc>
             </a:pPr>
-            <a:endParaRPr lang="en-US" sz="1100" spc="-1" dirty="0" smtClean="0">
+            <a:endParaRPr lang="en-US" sz="1100" spc="-1" dirty="0">
               <a:solidFill>
                 <a:srgbClr val="000000"/>
               </a:solidFill>
@@ -2838,7 +2828,7 @@
               </a:lnSpc>
             </a:pPr>
             <a:r>
-              <a:rPr lang="en-US" sz="1100" spc="-1" dirty="0" smtClean="0">
+              <a:rPr lang="en-US" sz="1100" spc="-1" dirty="0">
                 <a:solidFill>
                   <a:srgbClr val="000000"/>
                 </a:solidFill>
@@ -2854,7 +2844,7 @@
                 <a:spcPct val="100000"/>
               </a:lnSpc>
             </a:pPr>
-            <a:endParaRPr lang="en-US" sz="1100" b="0" strike="noStrike" spc="-1" dirty="0" smtClean="0">
+            <a:endParaRPr lang="en-US" sz="1100" b="0" strike="noStrike" spc="-1" dirty="0">
               <a:solidFill>
                 <a:srgbClr val="000000"/>
               </a:solidFill>
@@ -2863,7 +2853,7 @@
           </a:p>
           <a:p>
             <a:r>
-              <a:rPr lang="en-US" sz="1200" u="sng" kern="1200" dirty="0" smtClean="0">
+              <a:rPr lang="en-US" sz="1200" u="sng" kern="1200" dirty="0">
                 <a:solidFill>
                   <a:schemeClr val="tx1"/>
                 </a:solidFill>
@@ -2874,11 +2864,11 @@
               </a:rPr>
               <a:t>Solution Implementation Options</a:t>
             </a:r>
-            <a:endParaRPr lang="en-US" sz="1100" dirty="0" smtClean="0"/>
-          </a:p>
-          <a:p>
-            <a:r>
-              <a:rPr lang="en-US" sz="1200" kern="1200" dirty="0" smtClean="0">
+            <a:endParaRPr lang="en-US" sz="1100" dirty="0"/>
+          </a:p>
+          <a:p>
+            <a:r>
+              <a:rPr lang="en-US" sz="1200" kern="1200" dirty="0">
                 <a:solidFill>
                   <a:schemeClr val="tx1"/>
                 </a:solidFill>
@@ -2889,11 +2879,11 @@
               </a:rPr>
               <a:t>Create a new, custom dashboard utilizing a new service that coordinates metrics collection.</a:t>
             </a:r>
-            <a:endParaRPr lang="en-US" sz="1100" dirty="0" smtClean="0"/>
-          </a:p>
-          <a:p>
-            <a:r>
-              <a:rPr lang="en-US" sz="1200" kern="1200" dirty="0" smtClean="0">
+            <a:endParaRPr lang="en-US" sz="1100" dirty="0"/>
+          </a:p>
+          <a:p>
+            <a:r>
+              <a:rPr lang="en-US" sz="1200" kern="1200" dirty="0">
                 <a:solidFill>
                   <a:schemeClr val="tx1"/>
                 </a:solidFill>
@@ -2904,11 +2894,11 @@
               </a:rPr>
               <a:t>Integrate a metrics dashboard into the API Catalog Service, adding metrics coordination to the API Catalog Service.</a:t>
             </a:r>
-            <a:endParaRPr lang="en-US" sz="1100" dirty="0" smtClean="0"/>
-          </a:p>
-          <a:p>
-            <a:r>
-              <a:rPr lang="en-US" sz="1200" kern="1200" dirty="0" smtClean="0">
+            <a:endParaRPr lang="en-US" sz="1100" dirty="0"/>
+          </a:p>
+          <a:p>
+            <a:r>
+              <a:rPr lang="en-US" sz="1200" kern="1200" dirty="0">
                 <a:solidFill>
                   <a:schemeClr val="tx1"/>
                 </a:solidFill>
@@ -2919,7 +2909,7 @@
               </a:rPr>
               <a:t>Integrate a metrics dashboard into the Discovery Service, adding metrics coordination to the Discovery Service.</a:t>
             </a:r>
-            <a:endParaRPr lang="en-US" sz="1100" dirty="0" smtClean="0"/>
+            <a:endParaRPr lang="en-US" sz="1100" dirty="0"/>
           </a:p>
           <a:p>
             <a:pPr>
@@ -3390,10 +3380,6 @@
                 <a:hlinkClick r:id="rId10"/>
               </a:rPr>
               <a:t>https://github.com/zowe/zowe-cli/issues/498</a:t>
-            </a:r>
-            <a:r>
-              <a:rPr lang="en-US" sz="1100" dirty="0"/>
-              <a:t/>
             </a:r>
             <a:br>
               <a:rPr lang="en-US" sz="1100" dirty="0"/>
@@ -12496,10 +12482,6 @@
               </a:rPr>
               <a:t>Zowe Community 20PI4 </a:t>
             </a:r>
-            <a:r>
-              <a:rPr dirty="0"/>
-              <a:t/>
-            </a:r>
             <a:br>
               <a:rPr dirty="0"/>
             </a:br>
@@ -12636,7 +12618,7 @@
               <a:t>Feature </a:t>
             </a:r>
             <a:r>
-              <a:rPr lang="en-US" sz="3000" spc="-1" dirty="0" smtClean="0">
+              <a:rPr lang="en-US" sz="3000" spc="-1" dirty="0">
                 <a:solidFill>
                   <a:srgbClr val="262626"/>
                 </a:solidFill>
@@ -12700,6 +12682,8 @@
               </a:rPr>
               <a:t> </a:t>
             </a:r>
+          </a:p>
+          <a:p>
             <a:endParaRPr lang="en-US" sz="2000" spc="-1" dirty="0">
               <a:solidFill>
                 <a:srgbClr val="000000"/>
@@ -12709,34 +12693,15 @@
             </a:endParaRPr>
           </a:p>
           <a:p>
-            <a:endParaRPr lang="en-US" sz="2000" spc="-1" dirty="0" smtClean="0">
-              <a:solidFill>
-                <a:srgbClr val="000000"/>
-              </a:solidFill>
-              <a:latin typeface="Gill Sans"/>
-              <a:ea typeface="Gill Sans"/>
-            </a:endParaRPr>
-          </a:p>
-          <a:p>
-            <a:r>
-              <a:rPr lang="en-US" sz="2000" spc="-1" dirty="0" smtClean="0">
+            <a:r>
+              <a:rPr lang="en-US" sz="2000" spc="-1" dirty="0">
                 <a:solidFill>
                   <a:srgbClr val="000000"/>
                 </a:solidFill>
                 <a:latin typeface="Gill Sans"/>
                 <a:ea typeface="Gill Sans"/>
               </a:rPr>
-              <a:t>The </a:t>
-            </a:r>
-            <a:r>
-              <a:rPr lang="en-US" sz="2000" spc="-1" dirty="0">
-                <a:solidFill>
-                  <a:srgbClr val="000000"/>
-                </a:solidFill>
-                <a:latin typeface="Gill Sans"/>
-                <a:ea typeface="Gill Sans"/>
-              </a:rPr>
-              <a:t>API ML gateway now offers the ability to use multiple versions of an API at the same time. This objective will see this reflected in the Catalog so that it displays the major API versions of a service. </a:t>
+              <a:t>The API ML gateway now offers the ability to use multiple versions of an API at the same time. This objective will see this reflected in the Catalog so that it displays the major API versions of a service. </a:t>
             </a:r>
           </a:p>
           <a:p>
@@ -12757,7 +12722,7 @@
                 <a:spcPts val="400"/>
               </a:spcBef>
             </a:pPr>
-            <a:endParaRPr lang="en-US" sz="2000" b="1" strike="noStrike" spc="-1" dirty="0" smtClean="0">
+            <a:endParaRPr lang="en-US" sz="2000" b="1" strike="noStrike" spc="-1" dirty="0">
               <a:solidFill>
                 <a:srgbClr val="000000"/>
               </a:solidFill>
@@ -12775,7 +12740,7 @@
               </a:spcBef>
             </a:pPr>
             <a:r>
-              <a:rPr lang="en-US" sz="2000" b="1" strike="noStrike" spc="-1" dirty="0" smtClean="0">
+              <a:rPr lang="en-US" sz="2000" b="1" strike="noStrike" spc="-1" dirty="0">
                 <a:solidFill>
                   <a:srgbClr val="000000"/>
                 </a:solidFill>
@@ -12798,44 +12763,14 @@
               </a:spcBef>
             </a:pPr>
             <a:r>
-              <a:rPr lang="en-US" sz="2000" spc="-1" dirty="0" smtClean="0">
+              <a:rPr lang="en-US" sz="2000" spc="-1" dirty="0">
                 <a:solidFill>
                   <a:srgbClr val="000000"/>
                 </a:solidFill>
                 <a:latin typeface="Gill Sans"/>
                 <a:ea typeface="Gill Sans"/>
               </a:rPr>
-              <a:t>API </a:t>
-            </a:r>
-            <a:r>
-              <a:rPr lang="en-US" sz="2000" spc="-1" dirty="0">
-                <a:solidFill>
-                  <a:srgbClr val="000000"/>
-                </a:solidFill>
-                <a:latin typeface="Gill Sans"/>
-                <a:ea typeface="Gill Sans"/>
-              </a:rPr>
-              <a:t>Catalog displays the major API versions of a service. </a:t>
-            </a:r>
-            <a:r>
-              <a:rPr lang="en-US" sz="2000" spc="-1" dirty="0" smtClean="0">
-                <a:solidFill>
-                  <a:srgbClr val="000000"/>
-                </a:solidFill>
-                <a:latin typeface="Gill Sans"/>
-                <a:ea typeface="Gill Sans"/>
-              </a:rPr>
-              <a:t>The </a:t>
-            </a:r>
-            <a:r>
-              <a:rPr lang="en-US" sz="2000" spc="-1" dirty="0">
-                <a:solidFill>
-                  <a:srgbClr val="000000"/>
-                </a:solidFill>
-                <a:latin typeface="Gill Sans"/>
-                <a:ea typeface="Gill Sans"/>
-              </a:rPr>
-              <a:t>recommended version from the service owner is shown by default.</a:t>
+              <a:t>API Catalog displays the major API versions of a service. The recommended version from the service owner is shown by default.</a:t>
             </a:r>
           </a:p>
           <a:p>
@@ -12986,17 +12921,7 @@
                 <a:latin typeface="Gill Sans"/>
                 <a:ea typeface="Gill Sans"/>
               </a:rPr>
-              <a:t>Feature </a:t>
-            </a:r>
-            <a:r>
-              <a:rPr lang="en-US" sz="3000" b="0" strike="noStrike" spc="-1" dirty="0" smtClean="0">
-                <a:solidFill>
-                  <a:srgbClr val="262626"/>
-                </a:solidFill>
-                <a:latin typeface="Gill Sans"/>
-                <a:ea typeface="Gill Sans"/>
-              </a:rPr>
-              <a:t>4</a:t>
+              <a:t>Feature 4</a:t>
             </a:r>
             <a:endParaRPr lang="en-US" sz="3000" b="0" strike="noStrike" spc="-1" dirty="0">
               <a:solidFill>
@@ -13053,7 +12978,9 @@
               </a:rPr>
               <a:t> </a:t>
             </a:r>
-            <a:endParaRPr lang="en-US" sz="2000" spc="-1" dirty="0" smtClean="0">
+          </a:p>
+          <a:p>
+            <a:endParaRPr lang="en-US" sz="2000" spc="-1" dirty="0">
               <a:solidFill>
                 <a:srgbClr val="000000"/>
               </a:solidFill>
@@ -13062,74 +12989,15 @@
             </a:endParaRPr>
           </a:p>
           <a:p>
-            <a:endParaRPr lang="en-US" sz="2000" spc="-1" dirty="0">
-              <a:solidFill>
-                <a:srgbClr val="000000"/>
-              </a:solidFill>
-              <a:latin typeface="Gill Sans"/>
-              <a:ea typeface="Gill Sans"/>
-            </a:endParaRPr>
-          </a:p>
-          <a:p>
-            <a:r>
-              <a:rPr lang="en-US" sz="2000" spc="-1" dirty="0" smtClean="0">
+            <a:r>
+              <a:rPr lang="en-US" sz="2000" spc="-1" dirty="0">
                 <a:solidFill>
                   <a:srgbClr val="000000"/>
                 </a:solidFill>
                 <a:latin typeface="Gill Sans"/>
                 <a:ea typeface="Gill Sans"/>
               </a:rPr>
-              <a:t>Allow </a:t>
-            </a:r>
-            <a:r>
-              <a:rPr lang="en-US" sz="2000" spc="-1" dirty="0">
-                <a:solidFill>
-                  <a:srgbClr val="000000"/>
-                </a:solidFill>
-                <a:latin typeface="Gill Sans"/>
-                <a:ea typeface="Gill Sans"/>
-              </a:rPr>
-              <a:t>Tyler, the Zowe API ML </a:t>
-            </a:r>
-            <a:r>
-              <a:rPr lang="en-US" sz="2000" spc="-1" dirty="0" smtClean="0">
-                <a:solidFill>
-                  <a:srgbClr val="000000"/>
-                </a:solidFill>
-                <a:latin typeface="Gill Sans"/>
-                <a:ea typeface="Gill Sans"/>
-              </a:rPr>
-              <a:t>administrator, </a:t>
-            </a:r>
-            <a:r>
-              <a:rPr lang="en-US" sz="2000" spc="-1" dirty="0">
-                <a:solidFill>
-                  <a:srgbClr val="000000"/>
-                </a:solidFill>
-                <a:latin typeface="Gill Sans"/>
-                <a:ea typeface="Gill Sans"/>
-              </a:rPr>
-              <a:t>to track the </a:t>
-            </a:r>
-            <a:r>
-              <a:rPr lang="en-US" sz="2000" spc="-1" dirty="0" smtClean="0">
-                <a:solidFill>
-                  <a:srgbClr val="000000"/>
-                </a:solidFill>
-                <a:latin typeface="Gill Sans"/>
-                <a:ea typeface="Gill Sans"/>
-              </a:rPr>
-              <a:t>health </a:t>
-            </a:r>
-            <a:r>
-              <a:rPr lang="en-US" sz="2000" spc="-1" dirty="0">
-                <a:solidFill>
-                  <a:srgbClr val="000000"/>
-                </a:solidFill>
-                <a:latin typeface="Gill Sans"/>
-                <a:ea typeface="Gill Sans"/>
-              </a:rPr>
-              <a:t>and performance of the API ML. </a:t>
+              <a:t>Allow Tyler, the Zowe API ML administrator, to track the health and performance of the API ML. </a:t>
             </a:r>
           </a:p>
           <a:p>
@@ -13151,7 +13019,7 @@
               </a:spcBef>
             </a:pPr>
             <a:r>
-              <a:rPr lang="en-US" sz="2000" b="1" strike="noStrike" spc="-1" dirty="0" smtClean="0">
+              <a:rPr lang="en-US" sz="2000" b="1" strike="noStrike" spc="-1" dirty="0">
                 <a:solidFill>
                   <a:srgbClr val="000000"/>
                 </a:solidFill>
@@ -13169,16 +13037,8 @@
           </a:p>
           <a:p>
             <a:r>
-              <a:rPr lang="en-US" dirty="0" smtClean="0"/>
-              <a:t>A Minimum </a:t>
-            </a:r>
-            <a:r>
               <a:rPr lang="en-US" dirty="0"/>
-              <a:t>Viable </a:t>
-            </a:r>
-            <a:r>
-              <a:rPr lang="en-US" dirty="0" smtClean="0"/>
-              <a:t>Product that </a:t>
+              <a:t>A Minimum Viable Product that </a:t>
             </a:r>
           </a:p>
           <a:p>
@@ -13187,12 +13047,8 @@
               <a:buChar char="•"/>
             </a:pPr>
             <a:r>
-              <a:rPr lang="en-US" dirty="0" smtClean="0"/>
-              <a:t>Displays </a:t>
-            </a:r>
-            <a:r>
               <a:rPr lang="en-US" dirty="0"/>
-              <a:t>HTTP request information, such as traffic load, number of requests, request rate, error rate, etc. for each endpoint</a:t>
+              <a:t>Displays HTTP request information, such as traffic load, number of requests, request rate, error rate, etc. for each endpoint</a:t>
             </a:r>
             <a:endParaRPr lang="en-US" sz="2000" dirty="0"/>
           </a:p>
@@ -13202,20 +13058,8 @@
               <a:buChar char="•"/>
             </a:pPr>
             <a:r>
-              <a:rPr lang="en-US" dirty="0" smtClean="0"/>
-              <a:t>Displays </a:t>
-            </a:r>
-            <a:r>
               <a:rPr lang="en-US" dirty="0"/>
-              <a:t>system information such as CPU usage, memory usage, etc. for the core </a:t>
-            </a:r>
-            <a:r>
-              <a:rPr lang="en-US" dirty="0" smtClean="0"/>
-              <a:t>API ML </a:t>
-            </a:r>
-            <a:r>
-              <a:rPr lang="en-US" dirty="0"/>
-              <a:t>services (Discovery, Gateway, and API Catalog)</a:t>
+              <a:t>Displays system information such as CPU usage, memory usage, etc. for the core API ML services (Discovery, Gateway, and API Catalog)</a:t>
             </a:r>
             <a:endParaRPr lang="en-US" sz="2000" dirty="0"/>
           </a:p>
@@ -13225,12 +13069,8 @@
               <a:buChar char="•"/>
             </a:pPr>
             <a:r>
-              <a:rPr lang="en-US" dirty="0" smtClean="0"/>
-              <a:t>Enables </a:t>
-            </a:r>
-            <a:r>
               <a:rPr lang="en-US" dirty="0"/>
-              <a:t>custom integrations for system information collection</a:t>
+              <a:t>Enables custom integrations for system information collection</a:t>
             </a:r>
             <a:endParaRPr lang="en-US" sz="2000" dirty="0"/>
           </a:p>
@@ -13390,7 +13230,7 @@
               <a:t>5</a:t>
             </a:r>
             <a:r>
-              <a:rPr lang="en-US" sz="3000" b="0" strike="noStrike" spc="-1" dirty="0" smtClean="0">
+              <a:rPr lang="en-US" sz="3000" b="0" strike="noStrike" spc="-1" dirty="0">
                 <a:solidFill>
                   <a:srgbClr val="262626"/>
                 </a:solidFill>
@@ -13454,6 +13294,8 @@
               </a:rPr>
               <a:t> </a:t>
             </a:r>
+          </a:p>
+          <a:p>
             <a:endParaRPr lang="en-US" sz="2000" spc="-1" dirty="0">
               <a:solidFill>
                 <a:srgbClr val="000000"/>
@@ -13463,112 +13305,16 @@
             </a:endParaRPr>
           </a:p>
           <a:p>
-            <a:endParaRPr lang="en-US" sz="2000" spc="-1" dirty="0">
-              <a:solidFill>
-                <a:srgbClr val="000000"/>
-              </a:solidFill>
-              <a:latin typeface="Gill Sans"/>
-              <a:ea typeface="Gill Sans"/>
-            </a:endParaRPr>
-          </a:p>
-          <a:p>
-            <a:r>
-              <a:rPr lang="en-US" sz="2000" spc="-1" dirty="0" smtClean="0">
+            <a:r>
+              <a:rPr lang="en-US" sz="2000" spc="-1" dirty="0">
                 <a:solidFill>
                   <a:srgbClr val="000000"/>
                 </a:solidFill>
                 <a:latin typeface="Gill Sans"/>
                 <a:ea typeface="Gill Sans"/>
               </a:rPr>
-              <a:t>Accelerate </a:t>
-            </a:r>
-            <a:r>
-              <a:rPr lang="en-US" sz="2000" spc="-1" dirty="0">
-                <a:solidFill>
-                  <a:srgbClr val="000000"/>
-                </a:solidFill>
-                <a:latin typeface="Gill Sans"/>
-                <a:ea typeface="Gill Sans"/>
-              </a:rPr>
-              <a:t>adoption </a:t>
-            </a:r>
-            <a:r>
-              <a:rPr lang="en-US" sz="2000" spc="-1" dirty="0" smtClean="0">
-                <a:solidFill>
-                  <a:srgbClr val="000000"/>
-                </a:solidFill>
-                <a:latin typeface="Gill Sans"/>
-                <a:ea typeface="Gill Sans"/>
-              </a:rPr>
-              <a:t>of Zowe by enabling </a:t>
-            </a:r>
-            <a:r>
-              <a:rPr lang="en-US" sz="2000" spc="-1" dirty="0">
-                <a:solidFill>
-                  <a:srgbClr val="000000"/>
-                </a:solidFill>
-                <a:latin typeface="Gill Sans"/>
-                <a:ea typeface="Gill Sans"/>
-              </a:rPr>
-              <a:t>and </a:t>
-            </a:r>
-            <a:r>
-              <a:rPr lang="en-US" sz="2000" spc="-1" dirty="0" smtClean="0">
-                <a:solidFill>
-                  <a:srgbClr val="000000"/>
-                </a:solidFill>
-                <a:latin typeface="Gill Sans"/>
-                <a:ea typeface="Gill Sans"/>
-              </a:rPr>
-              <a:t>documenting the easy installation </a:t>
-            </a:r>
-            <a:r>
-              <a:rPr lang="en-US" sz="2000" spc="-1" dirty="0">
-                <a:solidFill>
-                  <a:srgbClr val="000000"/>
-                </a:solidFill>
-                <a:latin typeface="Gill Sans"/>
-                <a:ea typeface="Gill Sans"/>
-              </a:rPr>
-              <a:t>&amp; </a:t>
-            </a:r>
-            <a:r>
-              <a:rPr lang="en-US" sz="2000" spc="-1" dirty="0" smtClean="0">
-                <a:solidFill>
-                  <a:srgbClr val="000000"/>
-                </a:solidFill>
-                <a:latin typeface="Gill Sans"/>
-                <a:ea typeface="Gill Sans"/>
-              </a:rPr>
-              <a:t>configuration </a:t>
-            </a:r>
-            <a:r>
-              <a:rPr lang="en-US" sz="2000" spc="-1" dirty="0">
-                <a:solidFill>
-                  <a:srgbClr val="000000"/>
-                </a:solidFill>
-                <a:latin typeface="Gill Sans"/>
-                <a:ea typeface="Gill Sans"/>
-              </a:rPr>
-              <a:t>of the Zowe </a:t>
-            </a:r>
-            <a:r>
-              <a:rPr lang="en-US" sz="2000" spc="-1" dirty="0" smtClean="0">
-                <a:solidFill>
-                  <a:srgbClr val="000000"/>
-                </a:solidFill>
-                <a:latin typeface="Gill Sans"/>
-                <a:ea typeface="Gill Sans"/>
-              </a:rPr>
-              <a:t>APIML as a stand alone component.</a:t>
-            </a:r>
-            <a:endParaRPr lang="en-US" sz="2000" spc="-1" dirty="0">
-              <a:solidFill>
-                <a:srgbClr val="000000"/>
-              </a:solidFill>
-              <a:latin typeface="Gill Sans"/>
-              <a:ea typeface="Gill Sans"/>
-            </a:endParaRPr>
+              <a:t>Accelerate adoption of Zowe by enabling and documenting the easy installation &amp; configuration of the Zowe APIML as a stand alone component.</a:t>
+            </a:r>
           </a:p>
           <a:p>
             <a:endParaRPr lang="en-US" sz="2000" b="0" strike="noStrike" spc="-1" dirty="0">
@@ -13595,50 +13341,30 @@
                 <a:latin typeface="Gill Sans"/>
                 <a:ea typeface="Gill Sans"/>
               </a:rPr>
-              <a:t>Deliverable</a:t>
-            </a:r>
-            <a:r>
-              <a:rPr lang="en-US" sz="2000" b="1" strike="noStrike" spc="-1" dirty="0" smtClean="0">
+              <a:t>Deliverable:</a:t>
+            </a:r>
+            <a:endParaRPr lang="en-US" sz="2000" b="0" strike="noStrike" spc="-1" dirty="0">
+              <a:solidFill>
+                <a:srgbClr val="000000"/>
+              </a:solidFill>
+              <a:latin typeface="Gill Sans"/>
+            </a:endParaRPr>
+          </a:p>
+          <a:p>
+            <a:pPr marL="101520">
+              <a:spcBef>
+                <a:spcPts val="400"/>
+              </a:spcBef>
+            </a:pPr>
+            <a:r>
+              <a:rPr lang="en-US" sz="2000" spc="-1" dirty="0">
                 <a:solidFill>
                   <a:srgbClr val="000000"/>
                 </a:solidFill>
                 <a:latin typeface="Gill Sans"/>
                 <a:ea typeface="Gill Sans"/>
               </a:rPr>
-              <a:t>:</a:t>
-            </a:r>
-            <a:endParaRPr lang="en-US" sz="2000" b="0" strike="noStrike" spc="-1" dirty="0">
-              <a:solidFill>
-                <a:srgbClr val="000000"/>
-              </a:solidFill>
-              <a:latin typeface="Gill Sans"/>
-            </a:endParaRPr>
-          </a:p>
-          <a:p>
-            <a:pPr marL="101520">
-              <a:spcBef>
-                <a:spcPts val="400"/>
-              </a:spcBef>
-            </a:pPr>
-            <a:r>
-              <a:rPr lang="en-US" sz="2000" spc="-1" dirty="0" smtClean="0">
-                <a:solidFill>
-                  <a:srgbClr val="000000"/>
-                </a:solidFill>
-                <a:latin typeface="Gill Sans"/>
-                <a:ea typeface="Gill Sans"/>
-              </a:rPr>
-              <a:t>Offer </a:t>
-            </a:r>
-            <a:r>
-              <a:rPr lang="en-US" sz="2000" spc="-1" dirty="0">
-                <a:solidFill>
-                  <a:srgbClr val="000000"/>
-                </a:solidFill>
-                <a:latin typeface="Gill Sans"/>
-                <a:ea typeface="Gill Sans"/>
-              </a:rPr>
-              <a:t>the post-install configuration and deployment of the API ML as a standalone component (from the current </a:t>
+              <a:t>Offer the post-install configuration and deployment of the API ML as a standalone component (from the current </a:t>
             </a:r>
             <a:r>
               <a:rPr lang="en-US" sz="2000" spc="-1" dirty="0" err="1">
@@ -13854,23 +13580,19 @@
               </a:spcBef>
             </a:pPr>
             <a:r>
-              <a:rPr lang="en-US" dirty="0" err="1" smtClean="0"/>
+              <a:rPr lang="en-US" dirty="0" err="1"/>
               <a:t>WebUI</a:t>
             </a:r>
             <a:r>
-              <a:rPr lang="en-US" dirty="0" smtClean="0"/>
-              <a:t> Squad and Zowe </a:t>
-            </a:r>
-            <a:r>
               <a:rPr lang="en-US" dirty="0"/>
-              <a:t>Launcher / </a:t>
-            </a:r>
-            <a:r>
-              <a:rPr lang="en-US" dirty="0" err="1" smtClean="0"/>
+              <a:t> Squad and Zowe Launcher / </a:t>
+            </a:r>
+            <a:r>
+              <a:rPr lang="en-US" dirty="0" err="1"/>
               <a:t>zLauncher</a:t>
             </a:r>
             <a:r>
-              <a:rPr lang="en-US" dirty="0" smtClean="0"/>
+              <a:rPr lang="en-US" dirty="0"/>
               <a:t> for:</a:t>
             </a:r>
             <a:endParaRPr lang="en-US" dirty="0">
@@ -13905,11 +13627,7 @@
             </a:pPr>
             <a:r>
               <a:rPr lang="en-US" dirty="0"/>
-              <a:t>Support </a:t>
-            </a:r>
-            <a:r>
-              <a:rPr lang="en-US" dirty="0"/>
-              <a:t>for high availability / </a:t>
+              <a:t>Support for high availability / </a:t>
             </a:r>
             <a:r>
               <a:rPr lang="en-US" dirty="0" err="1"/>
@@ -13917,11 +13635,7 @@
             </a:r>
             <a:r>
               <a:rPr lang="en-US" dirty="0"/>
-              <a:t> distributor in API Mediation </a:t>
-            </a:r>
-            <a:r>
-              <a:rPr lang="en-US" dirty="0"/>
-              <a:t>Layer</a:t>
+              <a:t> distributor in API Mediation Layer</a:t>
             </a:r>
             <a:endParaRPr lang="en-US" dirty="0">
               <a:hlinkClick r:id="rId2"/>
@@ -13935,17 +13649,8 @@
             </a:pPr>
             <a:r>
               <a:rPr lang="it-IT" dirty="0"/>
-              <a:t>(HA</a:t>
-            </a:r>
-            <a:r>
-              <a:rPr lang="it-IT" dirty="0"/>
-              <a:t>: Componentize start script per APIML </a:t>
-            </a:r>
-            <a:r>
-              <a:rPr lang="it-IT" dirty="0"/>
-              <a:t>service#862)</a:t>
-            </a:r>
-            <a:endParaRPr lang="it-IT" dirty="0"/>
+              <a:t>(HA: Componentize start script per APIML service#862)</a:t>
+            </a:r>
           </a:p>
           <a:p>
             <a:pPr marL="285750" indent="-285750">
@@ -13975,17 +13680,8 @@
             </a:pPr>
             <a:r>
               <a:rPr lang="en-US" dirty="0"/>
-              <a:t>Zowe </a:t>
-            </a:r>
-            <a:r>
-              <a:rPr lang="en-US" dirty="0"/>
-              <a:t>API ML as a standalone component #856</a:t>
-            </a:r>
-            <a:r>
-              <a:rPr lang="en-US" dirty="0"/>
-              <a:t> </a:t>
-            </a:r>
-            <a:endParaRPr lang="en-US" dirty="0"/>
+              <a:t>Zowe API ML as a standalone component #856 </a:t>
+            </a:r>
           </a:p>
           <a:p>
             <a:pPr marL="285750" indent="-285750">
@@ -14959,9 +14655,16 @@
               </a:rPr>
               <a:t>Performance Testing</a:t>
             </a:r>
-          </a:p>
-          <a:p>
-            <a:pPr marL="914400" lvl="1" indent="-355320">
+            <a:endParaRPr lang="en-US" sz="1600" spc="-1" dirty="0">
+              <a:solidFill>
+                <a:srgbClr val="000000"/>
+              </a:solidFill>
+              <a:latin typeface="Gill Sans" panose="020B0502020104020203" pitchFamily="34" charset="-79"/>
+              <a:cs typeface="Gill Sans" panose="020B0502020104020203" pitchFamily="34" charset="-79"/>
+            </a:endParaRPr>
+          </a:p>
+          <a:p>
+            <a:pPr marL="457200" indent="-355320">
               <a:spcBef>
                 <a:spcPts val="400"/>
               </a:spcBef>
@@ -14972,18 +14675,18 @@
               <a:buChar char="•"/>
             </a:pPr>
             <a:r>
-              <a:rPr lang="en-US" sz="1600" spc="-1" dirty="0">
+              <a:rPr lang="en-US" sz="2000" spc="-1" dirty="0">
                 <a:solidFill>
                   <a:srgbClr val="000000"/>
                 </a:solidFill>
                 <a:latin typeface="Gill Sans" panose="020B0502020104020203" pitchFamily="34" charset="-79"/>
                 <a:cs typeface="Gill Sans" panose="020B0502020104020203" pitchFamily="34" charset="-79"/>
               </a:rPr>
-              <a:t>Test Library Rollout, and Initial Set of Test Suites</a:t>
-            </a:r>
-          </a:p>
-          <a:p>
-            <a:pPr marL="457200" indent="-355320">
+              <a:t>High Availability Implementation</a:t>
+            </a:r>
+          </a:p>
+          <a:p>
+            <a:pPr marL="914400" lvl="1" indent="-355320">
               <a:spcBef>
                 <a:spcPts val="400"/>
               </a:spcBef>
@@ -14994,18 +14697,28 @@
               <a:buChar char="•"/>
             </a:pPr>
             <a:r>
-              <a:rPr lang="en-US" sz="2000" spc="-1" dirty="0">
+              <a:rPr lang="en-US" sz="1600" spc="-1" dirty="0" err="1">
                 <a:solidFill>
                   <a:srgbClr val="000000"/>
                 </a:solidFill>
                 <a:latin typeface="Gill Sans" panose="020B0502020104020203" pitchFamily="34" charset="-79"/>
                 <a:cs typeface="Gill Sans" panose="020B0502020104020203" pitchFamily="34" charset="-79"/>
               </a:rPr>
-              <a:t>High Availability Implementation</a:t>
-            </a:r>
-          </a:p>
-          <a:p>
-            <a:pPr marL="914400" lvl="1" indent="-355320">
+              <a:t>Zowe</a:t>
+            </a:r>
+            <a:r>
+              <a:rPr lang="en-US" sz="1600" spc="-1" dirty="0">
+                <a:solidFill>
+                  <a:srgbClr val="000000"/>
+                </a:solidFill>
+                <a:latin typeface="Gill Sans" panose="020B0502020104020203" pitchFamily="34" charset="-79"/>
+                <a:cs typeface="Gill Sans" panose="020B0502020104020203" pitchFamily="34" charset="-79"/>
+              </a:rPr>
+              <a:t> Launcher</a:t>
+            </a:r>
+          </a:p>
+          <a:p>
+            <a:pPr marL="457200" indent="-355320">
               <a:spcBef>
                 <a:spcPts val="400"/>
               </a:spcBef>
@@ -15016,54 +14729,14 @@
               <a:buChar char="•"/>
             </a:pPr>
             <a:r>
-              <a:rPr lang="en-US" sz="1600" spc="-1" dirty="0">
+              <a:rPr lang="en-US" sz="2000" spc="-1" dirty="0">
                 <a:solidFill>
                   <a:srgbClr val="000000"/>
                 </a:solidFill>
                 <a:latin typeface="Gill Sans" panose="020B0502020104020203" pitchFamily="34" charset="-79"/>
                 <a:cs typeface="Gill Sans" panose="020B0502020104020203" pitchFamily="34" charset="-79"/>
               </a:rPr>
-              <a:t>New Components, </a:t>
-            </a:r>
-            <a:r>
-              <a:rPr lang="en-US" sz="1600" spc="-1" dirty="0" err="1">
-                <a:solidFill>
-                  <a:srgbClr val="000000"/>
-                </a:solidFill>
-                <a:latin typeface="Gill Sans" panose="020B0502020104020203" pitchFamily="34" charset="-79"/>
-                <a:cs typeface="Gill Sans" panose="020B0502020104020203" pitchFamily="34" charset="-79"/>
-              </a:rPr>
-              <a:t>Sysplex</a:t>
-            </a:r>
-            <a:r>
-              <a:rPr lang="en-US" sz="1600" spc="-1" dirty="0">
-                <a:solidFill>
-                  <a:srgbClr val="000000"/>
-                </a:solidFill>
-                <a:latin typeface="Gill Sans" panose="020B0502020104020203" pitchFamily="34" charset="-79"/>
-                <a:cs typeface="Gill Sans" panose="020B0502020104020203" pitchFamily="34" charset="-79"/>
-              </a:rPr>
-              <a:t>, </a:t>
-            </a:r>
-            <a:r>
-              <a:rPr lang="en-US" sz="1600" spc="-1" dirty="0" err="1">
-                <a:solidFill>
-                  <a:srgbClr val="000000"/>
-                </a:solidFill>
-                <a:latin typeface="Gill Sans" panose="020B0502020104020203" pitchFamily="34" charset="-79"/>
-                <a:cs typeface="Gill Sans" panose="020B0502020104020203" pitchFamily="34" charset="-79"/>
-              </a:rPr>
-              <a:t>Zowe</a:t>
-            </a:r>
-            <a:r>
-              <a:rPr lang="en-US" sz="1600" spc="-1" dirty="0">
-                <a:solidFill>
-                  <a:srgbClr val="000000"/>
-                </a:solidFill>
-                <a:latin typeface="Gill Sans" panose="020B0502020104020203" pitchFamily="34" charset="-79"/>
-                <a:cs typeface="Gill Sans" panose="020B0502020104020203" pitchFamily="34" charset="-79"/>
-              </a:rPr>
-              <a:t> Launcher</a:t>
+              <a:t>Automation and Infrastructure</a:t>
             </a:r>
           </a:p>
           <a:p>
@@ -15085,11 +14758,11 @@
                 <a:latin typeface="Gill Sans" panose="020B0502020104020203" pitchFamily="34" charset="-79"/>
                 <a:cs typeface="Gill Sans" panose="020B0502020104020203" pitchFamily="34" charset="-79"/>
               </a:rPr>
-              <a:t>Existing Component Preparation and Configuration</a:t>
-            </a:r>
-          </a:p>
-          <a:p>
-            <a:pPr marL="457200" indent="-355320">
+              <a:t>Pipeline Improvements</a:t>
+            </a:r>
+          </a:p>
+          <a:p>
+            <a:pPr marL="914400" lvl="1" indent="-355320">
               <a:spcBef>
                 <a:spcPts val="400"/>
               </a:spcBef>
@@ -15100,14 +14773,14 @@
               <a:buChar char="•"/>
             </a:pPr>
             <a:r>
-              <a:rPr lang="en-US" sz="2000" spc="-1" dirty="0">
+              <a:rPr lang="en-US" sz="1600" spc="-1" dirty="0">
                 <a:solidFill>
                   <a:srgbClr val="000000"/>
                 </a:solidFill>
                 <a:latin typeface="Gill Sans" panose="020B0502020104020203" pitchFamily="34" charset="-79"/>
                 <a:cs typeface="Gill Sans" panose="020B0502020104020203" pitchFamily="34" charset="-79"/>
               </a:rPr>
-              <a:t>Automation and Infrastructure</a:t>
+              <a:t>Automated testing catch-up</a:t>
             </a:r>
           </a:p>
           <a:p>
@@ -15129,159 +14802,7 @@
                 <a:latin typeface="Gill Sans" panose="020B0502020104020203" pitchFamily="34" charset="-79"/>
                 <a:cs typeface="Gill Sans" panose="020B0502020104020203" pitchFamily="34" charset="-79"/>
               </a:rPr>
-              <a:t>Pipeline Improvements</a:t>
-            </a:r>
-          </a:p>
-          <a:p>
-            <a:pPr marL="1371600" lvl="2" indent="-355320">
-              <a:spcBef>
-                <a:spcPts val="400"/>
-              </a:spcBef>
-              <a:buClr>
-                <a:srgbClr val="000000"/>
-              </a:buClr>
-              <a:buFont typeface="Arial"/>
-              <a:buChar char="•"/>
-            </a:pPr>
-            <a:r>
-              <a:rPr lang="en-US" sz="1600" spc="-1" dirty="0">
-                <a:solidFill>
-                  <a:srgbClr val="000000"/>
-                </a:solidFill>
-                <a:latin typeface="Gill Sans" panose="020B0502020104020203" pitchFamily="34" charset="-79"/>
-                <a:cs typeface="Gill Sans" panose="020B0502020104020203" pitchFamily="34" charset="-79"/>
-              </a:rPr>
-              <a:t>Expand pipeline automation to support </a:t>
-            </a:r>
-            <a:r>
-              <a:rPr lang="en-US" sz="1600" spc="-1" dirty="0" err="1">
-                <a:solidFill>
-                  <a:srgbClr val="000000"/>
-                </a:solidFill>
-                <a:latin typeface="Gill Sans" panose="020B0502020104020203" pitchFamily="34" charset="-79"/>
-                <a:cs typeface="Gill Sans" panose="020B0502020104020203" pitchFamily="34" charset="-79"/>
-              </a:rPr>
-              <a:t>Zowe</a:t>
-            </a:r>
-            <a:r>
-              <a:rPr lang="en-US" sz="1600" spc="-1" dirty="0">
-                <a:solidFill>
-                  <a:srgbClr val="000000"/>
-                </a:solidFill>
-                <a:latin typeface="Gill Sans" panose="020B0502020104020203" pitchFamily="34" charset="-79"/>
-                <a:cs typeface="Gill Sans" panose="020B0502020104020203" pitchFamily="34" charset="-79"/>
-              </a:rPr>
-              <a:t> z/OS extension installs</a:t>
-            </a:r>
-          </a:p>
-          <a:p>
-            <a:pPr marL="1371600" lvl="2" indent="-355320">
-              <a:spcBef>
-                <a:spcPts val="400"/>
-              </a:spcBef>
-              <a:buClr>
-                <a:srgbClr val="000000"/>
-              </a:buClr>
-              <a:buFont typeface="Arial"/>
-              <a:buChar char="•"/>
-            </a:pPr>
-            <a:r>
-              <a:rPr lang="en-US" sz="1600" spc="-1" dirty="0">
-                <a:solidFill>
-                  <a:srgbClr val="000000"/>
-                </a:solidFill>
-                <a:latin typeface="Gill Sans" panose="020B0502020104020203" pitchFamily="34" charset="-79"/>
-                <a:cs typeface="Gill Sans" panose="020B0502020104020203" pitchFamily="34" charset="-79"/>
-              </a:rPr>
-              <a:t>Technical debt / continuous improvement – consistency</a:t>
-            </a:r>
-          </a:p>
-          <a:p>
-            <a:pPr marL="914400" lvl="1" indent="-355320">
-              <a:spcBef>
-                <a:spcPts val="400"/>
-              </a:spcBef>
-              <a:buClr>
-                <a:srgbClr val="000000"/>
-              </a:buClr>
-              <a:buFont typeface="Arial"/>
-              <a:buChar char="•"/>
-            </a:pPr>
-            <a:r>
-              <a:rPr lang="en-US" sz="1600" spc="-1" dirty="0">
-                <a:solidFill>
-                  <a:srgbClr val="000000"/>
-                </a:solidFill>
-                <a:latin typeface="Gill Sans" panose="020B0502020104020203" pitchFamily="34" charset="-79"/>
-                <a:cs typeface="Gill Sans" panose="020B0502020104020203" pitchFamily="34" charset="-79"/>
-              </a:rPr>
-              <a:t>Automated testing catch-up</a:t>
-            </a:r>
-          </a:p>
-          <a:p>
-            <a:pPr marL="914400" lvl="1" indent="-355320">
-              <a:spcBef>
-                <a:spcPts val="400"/>
-              </a:spcBef>
-              <a:buClr>
-                <a:srgbClr val="000000"/>
-              </a:buClr>
-              <a:buFont typeface="Arial"/>
-              <a:buChar char="•"/>
-            </a:pPr>
-            <a:r>
-              <a:rPr lang="en-US" sz="1600" spc="-1" dirty="0">
-                <a:solidFill>
-                  <a:srgbClr val="000000"/>
-                </a:solidFill>
-                <a:latin typeface="Gill Sans" panose="020B0502020104020203" pitchFamily="34" charset="-79"/>
-                <a:cs typeface="Gill Sans" panose="020B0502020104020203" pitchFamily="34" charset="-79"/>
-              </a:rPr>
-              <a:t>Open Infrastructure</a:t>
-            </a:r>
-          </a:p>
-          <a:p>
-            <a:pPr marL="1371600" lvl="2" indent="-355320">
-              <a:spcBef>
-                <a:spcPts val="400"/>
-              </a:spcBef>
-              <a:buClr>
-                <a:srgbClr val="000000"/>
-              </a:buClr>
-              <a:buFont typeface="Arial"/>
-              <a:buChar char="•"/>
-            </a:pPr>
-            <a:r>
-              <a:rPr lang="en-US" sz="1600" spc="-1" dirty="0">
-                <a:solidFill>
-                  <a:srgbClr val="000000"/>
-                </a:solidFill>
-                <a:latin typeface="Gill Sans" panose="020B0502020104020203" pitchFamily="34" charset="-79"/>
-                <a:cs typeface="Gill Sans" panose="020B0502020104020203" pitchFamily="34" charset="-79"/>
-              </a:rPr>
-              <a:t>Monitoring</a:t>
-            </a:r>
-          </a:p>
-          <a:p>
-            <a:pPr marL="1371600" lvl="2" indent="-355320">
-              <a:spcBef>
-                <a:spcPts val="400"/>
-              </a:spcBef>
-              <a:buClr>
-                <a:srgbClr val="000000"/>
-              </a:buClr>
-              <a:buFont typeface="Arial"/>
-              <a:buChar char="•"/>
-            </a:pPr>
-            <a:r>
-              <a:rPr lang="en-US" sz="1600" spc="-1" dirty="0">
-                <a:solidFill>
-                  <a:srgbClr val="000000"/>
-                </a:solidFill>
-                <a:latin typeface="Gill Sans" panose="020B0502020104020203" pitchFamily="34" charset="-79"/>
-                <a:cs typeface="Gill Sans" panose="020B0502020104020203" pitchFamily="34" charset="-79"/>
-              </a:rPr>
-              <a:t>Software</a:t>
+              <a:t>Open Infrastructure Enhancement</a:t>
             </a:r>
           </a:p>
         </p:txBody>
@@ -19236,15 +18757,7 @@
                   <a:srgbClr val="000000"/>
                 </a:solidFill>
               </a:rPr>
-              <a:t>Zowe Explorer Squad </a:t>
-            </a:r>
-            <a:r>
-              <a:rPr lang="en-US" sz="2000" spc="-1" dirty="0" smtClean="0">
-                <a:solidFill>
-                  <a:srgbClr val="000000"/>
-                </a:solidFill>
-              </a:rPr>
-              <a:t>Focus</a:t>
+              <a:t>Zowe Explorer Squad Focus</a:t>
             </a:r>
           </a:p>
           <a:p>
@@ -19259,22 +18772,13 @@
               <a:buChar char="•"/>
             </a:pPr>
             <a:r>
-              <a:rPr lang="en-US" sz="2000" spc="-1" dirty="0" smtClean="0">
+              <a:rPr lang="en-US" sz="2000" spc="-1" dirty="0">
                 <a:solidFill>
                   <a:srgbClr val="000000"/>
                 </a:solidFill>
                 <a:ea typeface="Arial"/>
               </a:rPr>
-              <a:t>Zowe API </a:t>
-            </a:r>
-            <a:r>
-              <a:rPr lang="en-US" sz="2000" spc="-1" dirty="0">
-                <a:solidFill>
-                  <a:srgbClr val="000000"/>
-                </a:solidFill>
-                <a:ea typeface="Arial"/>
-              </a:rPr>
-              <a:t>Mediation Layer Squad Focus</a:t>
+              <a:t>Zowe API Mediation Layer Squad Focus</a:t>
             </a:r>
             <a:endParaRPr lang="en-US" sz="2000" spc="-1" dirty="0">
               <a:solidFill>
@@ -19297,22 +18801,13 @@
               <a:buChar char="•"/>
             </a:pPr>
             <a:r>
-              <a:rPr lang="en-US" sz="2000" spc="-1" dirty="0" smtClean="0">
+              <a:rPr lang="en-US" sz="2000" spc="-1" dirty="0">
                 <a:solidFill>
                   <a:srgbClr val="000000"/>
                 </a:solidFill>
                 <a:latin typeface="+mj-lt"/>
               </a:rPr>
-              <a:t>Zowe </a:t>
-            </a:r>
-            <a:r>
-              <a:rPr lang="en-US" sz="2000" spc="-1" dirty="0">
-                <a:solidFill>
-                  <a:srgbClr val="000000"/>
-                </a:solidFill>
-                <a:latin typeface="+mj-lt"/>
-              </a:rPr>
-              <a:t>CLI Squad Focus</a:t>
+              <a:t>Zowe CLI Squad Focus</a:t>
             </a:r>
           </a:p>
           <a:p>
@@ -22738,24 +22233,14 @@
               </a:spcBef>
             </a:pPr>
             <a:r>
-              <a:rPr lang="en-US" sz="3000" b="1" strike="noStrike" spc="-1" dirty="0" smtClean="0">
+              <a:rPr lang="en-US" sz="3000" b="1" strike="noStrike" spc="-1" dirty="0">
                 <a:solidFill>
                   <a:srgbClr val="000000"/>
                 </a:solidFill>
                 <a:latin typeface="Arial"/>
                 <a:ea typeface="Arial"/>
               </a:rPr>
-              <a:t>API Mediation Layer </a:t>
-            </a:r>
-            <a:r>
-              <a:rPr lang="en-US" sz="3000" b="1" strike="noStrike" spc="-1" dirty="0">
-                <a:solidFill>
-                  <a:srgbClr val="000000"/>
-                </a:solidFill>
-                <a:latin typeface="Arial"/>
-                <a:ea typeface="Arial"/>
-              </a:rPr>
-              <a:t>Squad Focus</a:t>
+              <a:t>API Mediation Layer Squad Focus</a:t>
             </a:r>
             <a:endParaRPr lang="en-US" sz="3000" b="0" strike="noStrike" spc="-1" dirty="0">
               <a:solidFill>
@@ -22774,7 +22259,7 @@
               </a:spcBef>
             </a:pPr>
             <a:r>
-              <a:rPr lang="en-US" sz="2000" b="1" strike="noStrike" spc="-1" dirty="0" smtClean="0">
+              <a:rPr lang="en-US" sz="2000" b="1" strike="noStrike" spc="-1" dirty="0">
                 <a:solidFill>
                   <a:srgbClr val="000000"/>
                 </a:solidFill>
@@ -22890,17 +22375,7 @@
                 <a:latin typeface="Gill Sans"/>
                 <a:ea typeface="Gill Sans"/>
               </a:rPr>
-              <a:t>Feature </a:t>
-            </a:r>
-            <a:r>
-              <a:rPr lang="en-US" sz="3000" b="0" strike="noStrike" spc="-1" dirty="0" smtClean="0">
-                <a:solidFill>
-                  <a:srgbClr val="262626"/>
-                </a:solidFill>
-                <a:latin typeface="Gill Sans"/>
-                <a:ea typeface="Gill Sans"/>
-              </a:rPr>
-              <a:t>1 – continued from 20PI3</a:t>
+              <a:t>Feature 1 – continued from 20PI3</a:t>
             </a:r>
             <a:endParaRPr lang="en-US" sz="3000" b="0" strike="noStrike" spc="-1" dirty="0">
               <a:solidFill>
@@ -23032,17 +22507,7 @@
                 <a:latin typeface="Gill Sans"/>
                 <a:ea typeface="Gill Sans"/>
               </a:rPr>
-              <a:t>As a system admin / security admin, I want to allow Zowe users and client applications (such as Zowe clients and custom applications) to authenticate with Zowe API ML using client certificates (x.509</a:t>
-            </a:r>
-            <a:r>
-              <a:rPr lang="en-US" sz="2000" b="0" strike="noStrike" spc="-1" dirty="0" smtClean="0">
-                <a:solidFill>
-                  <a:srgbClr val="000000"/>
-                </a:solidFill>
-                <a:latin typeface="Gill Sans"/>
-                <a:ea typeface="Gill Sans"/>
-              </a:rPr>
-              <a:t>).</a:t>
+              <a:t>As a system admin / security admin, I want to allow Zowe users and client applications (such as Zowe clients and custom applications) to authenticate with Zowe API ML using client certificates (x.509).</a:t>
             </a:r>
             <a:endParaRPr lang="en-US" sz="2000" b="0" strike="noStrike" spc="-1" dirty="0">
               <a:solidFill>
@@ -23228,7 +22693,7 @@
               </a:lnSpc>
             </a:pPr>
             <a:r>
-              <a:rPr lang="en-US" sz="3000" b="0" strike="noStrike" spc="-1" dirty="0" smtClean="0">
+              <a:rPr lang="en-US" sz="3000" b="0" strike="noStrike" spc="-1" dirty="0">
                 <a:solidFill>
                   <a:srgbClr val="262626"/>
                 </a:solidFill>

</xml_diff>